<commit_message>
sidle + báo cáo +data ++
</commit_message>
<xml_diff>
--- a/Slide.pptx
+++ b/Slide.pptx
@@ -112,7 +112,7 @@
   </p:defaultTextStyle>
   <p:extLst>
     <p:ext uri="{EFAFB233-063F-42B5-8137-9DF3F51BA10A}">
-      <p15:sldGuideLst xmlns:p15="http://schemas.microsoft.com/office/powerpoint/2012/main"/>
+      <p15:sldGuideLst xmlns:p15="http://schemas.microsoft.com/office/powerpoint/2012/main" xmlns=""/>
     </p:ext>
   </p:extLst>
 </p:presentation>
@@ -454,7 +454,7 @@
             <a:fld id="{5923F103-BC34-4FE4-A40E-EDDEECFDA5D0}" type="datetimeFigureOut">
               <a:rPr lang="en-US" dirty="0"/>
               <a:pPr/>
-              <a:t>6/3/2021</a:t>
+              <a:t>06/03/2021</a:t>
             </a:fld>
             <a:endParaRPr lang="en-US" dirty="0"/>
           </a:p>
@@ -1542,7 +1542,7 @@
           <a:p>
             <a:fld id="{923A1CC3-2375-41D4-9E03-427CAF2A4C1A}" type="datetimeFigureOut">
               <a:rPr lang="en-US" dirty="0"/>
-              <a:t>6/3/2021</a:t>
+              <a:t>06/03/2021</a:t>
             </a:fld>
             <a:endParaRPr lang="en-US" dirty="0"/>
           </a:p>
@@ -2522,7 +2522,7 @@
           <a:p>
             <a:fld id="{AFF16868-8199-4C2C-A5B1-63AEE139F88E}" type="datetimeFigureOut">
               <a:rPr lang="en-US" dirty="0"/>
-              <a:t>6/3/2021</a:t>
+              <a:t>06/03/2021</a:t>
             </a:fld>
             <a:endParaRPr lang="en-US" dirty="0"/>
           </a:p>
@@ -3656,7 +3656,7 @@
           <a:p>
             <a:fld id="{AAD9FF7F-6988-44CC-821B-644E70CD2F73}" type="datetimeFigureOut">
               <a:rPr lang="en-US" dirty="0"/>
-              <a:t>6/3/2021</a:t>
+              <a:t>06/03/2021</a:t>
             </a:fld>
             <a:endParaRPr lang="en-US" dirty="0"/>
           </a:p>
@@ -4689,7 +4689,7 @@
           <a:p>
             <a:fld id="{5C12C299-16B2-4475-990D-751901EACC14}" type="datetimeFigureOut">
               <a:rPr lang="en-US" dirty="0"/>
-              <a:t>6/3/2021</a:t>
+              <a:t>06/03/2021</a:t>
             </a:fld>
             <a:endParaRPr lang="en-US" dirty="0"/>
           </a:p>
@@ -5349,7 +5349,7 @@
           <a:p>
             <a:fld id="{9FE86839-B9D8-4651-8783-F325ECE74E65}" type="datetimeFigureOut">
               <a:rPr lang="en-US" dirty="0"/>
-              <a:t>6/3/2021</a:t>
+              <a:t>06/03/2021</a:t>
             </a:fld>
             <a:endParaRPr lang="en-US" dirty="0"/>
           </a:p>
@@ -6210,7 +6210,7 @@
           <a:p>
             <a:fld id="{FD484F64-32F6-45C5-931F-ADC1662401D0}" type="datetimeFigureOut">
               <a:rPr lang="en-US" dirty="0"/>
-              <a:t>6/3/2021</a:t>
+              <a:t>06/03/2021</a:t>
             </a:fld>
             <a:endParaRPr lang="en-US" dirty="0"/>
           </a:p>
@@ -6400,7 +6400,7 @@
           <a:p>
             <a:fld id="{53086D93-FCAC-47E0-A2EE-787E62CA814C}" type="datetimeFigureOut">
               <a:rPr lang="en-US" dirty="0"/>
-              <a:t>6/3/2021</a:t>
+              <a:t>06/03/2021</a:t>
             </a:fld>
             <a:endParaRPr lang="en-US" dirty="0"/>
           </a:p>
@@ -7372,7 +7372,7 @@
           <a:p>
             <a:fld id="{CDA879A6-0FD0-4734-A311-86BFCA472E6E}" type="datetimeFigureOut">
               <a:rPr lang="en-US" dirty="0"/>
-              <a:t>6/3/2021</a:t>
+              <a:t>06/03/2021</a:t>
             </a:fld>
             <a:endParaRPr lang="en-US" dirty="0"/>
           </a:p>
@@ -7583,7 +7583,7 @@
           <a:p>
             <a:fld id="{19C9CA7B-DFD4-44B5-8C60-D14B8CD1FB59}" type="datetimeFigureOut">
               <a:rPr lang="en-US" dirty="0"/>
-              <a:t>6/3/2021</a:t>
+              <a:t>06/03/2021</a:t>
             </a:fld>
             <a:endParaRPr lang="en-US" dirty="0"/>
           </a:p>
@@ -8617,7 +8617,7 @@
           <a:p>
             <a:fld id="{F34E6425-0181-43F2-84FC-787E803FD2F8}" type="datetimeFigureOut">
               <a:rPr lang="en-US" dirty="0"/>
-              <a:t>6/3/2021</a:t>
+              <a:t>06/03/2021</a:t>
             </a:fld>
             <a:endParaRPr lang="en-US" dirty="0"/>
           </a:p>
@@ -8889,7 +8889,7 @@
           <a:p>
             <a:fld id="{3BDB8791-F1B0-41E7-B7FD-A781E65C4266}" type="datetimeFigureOut">
               <a:rPr lang="en-US" dirty="0"/>
-              <a:t>6/3/2021</a:t>
+              <a:t>06/03/2021</a:t>
             </a:fld>
             <a:endParaRPr lang="en-US" dirty="0"/>
           </a:p>
@@ -9299,7 +9299,7 @@
           <a:p>
             <a:fld id="{5FDD63B2-E120-4ED8-B27B-C685F510A5FE}" type="datetimeFigureOut">
               <a:rPr lang="en-US" dirty="0"/>
-              <a:t>6/3/2021</a:t>
+              <a:t>06/03/2021</a:t>
             </a:fld>
             <a:endParaRPr lang="en-US" dirty="0"/>
           </a:p>
@@ -9426,7 +9426,7 @@
           <a:p>
             <a:fld id="{7AA18ACC-A947-437B-A130-35BD54FDF1E9}" type="datetimeFigureOut">
               <a:rPr lang="en-US" dirty="0"/>
-              <a:t>6/3/2021</a:t>
+              <a:t>06/03/2021</a:t>
             </a:fld>
             <a:endParaRPr lang="en-US" dirty="0"/>
           </a:p>
@@ -9521,7 +9521,7 @@
           <a:p>
             <a:fld id="{7C8D7E02-BCB8-4D50-A234-369438C08659}" type="datetimeFigureOut">
               <a:rPr lang="en-US" dirty="0"/>
-              <a:t>6/3/2021</a:t>
+              <a:t>06/03/2021</a:t>
             </a:fld>
             <a:endParaRPr lang="en-US" dirty="0"/>
           </a:p>
@@ -10602,7 +10602,7 @@
           <a:p>
             <a:fld id="{76E86A4C-8E40-4F87-A4F0-01A0687C5742}" type="datetimeFigureOut">
               <a:rPr lang="en-US" dirty="0"/>
-              <a:t>6/3/2021</a:t>
+              <a:t>06/03/2021</a:t>
             </a:fld>
             <a:endParaRPr lang="en-US" dirty="0"/>
           </a:p>
@@ -11710,7 +11710,7 @@
           <a:p>
             <a:fld id="{35E72C73-2D91-4E12-BA25-F0AA0C03599B}" type="datetimeFigureOut">
               <a:rPr lang="en-US" dirty="0"/>
-              <a:t>6/3/2021</a:t>
+              <a:t>06/03/2021</a:t>
             </a:fld>
             <a:endParaRPr lang="en-US" dirty="0"/>
           </a:p>
@@ -12707,7 +12707,7 @@
           <a:p>
             <a:fld id="{2BE451C3-0FF4-47C4-B829-773ADF60F88C}" type="datetimeFigureOut">
               <a:rPr lang="en-US" dirty="0"/>
-              <a:t>6/3/2021</a:t>
+              <a:t>06/03/2021</a:t>
             </a:fld>
             <a:endParaRPr lang="en-US" dirty="0"/>
           </a:p>
@@ -13375,21 +13375,28 @@
                 <a:latin typeface="Segoe UI" panose="020B0502040204020203" pitchFamily="34" charset="0"/>
                 <a:cs typeface="Segoe UI" panose="020B0502040204020203" pitchFamily="34" charset="0"/>
               </a:rPr>
-              <a:t> :    </a:t>
+              <a:t> :     - </a:t>
+            </a:r>
+            <a:r>
+              <a:rPr lang="en-US" dirty="0" err="1" smtClean="0">
+                <a:latin typeface="Segoe UI" panose="020B0502040204020203" pitchFamily="34" charset="0"/>
+                <a:cs typeface="Segoe UI" panose="020B0502040204020203" pitchFamily="34" charset="0"/>
+              </a:rPr>
+              <a:t>Ngô</a:t>
             </a:r>
             <a:r>
               <a:rPr lang="en-US" dirty="0" smtClean="0">
                 <a:latin typeface="Segoe UI" panose="020B0502040204020203" pitchFamily="34" charset="0"/>
                 <a:cs typeface="Segoe UI" panose="020B0502040204020203" pitchFamily="34" charset="0"/>
               </a:rPr>
-              <a:t> - </a:t>
+              <a:t> </a:t>
             </a:r>
             <a:r>
               <a:rPr lang="en-US" dirty="0" err="1" smtClean="0">
                 <a:latin typeface="Segoe UI" panose="020B0502040204020203" pitchFamily="34" charset="0"/>
                 <a:cs typeface="Segoe UI" panose="020B0502040204020203" pitchFamily="34" charset="0"/>
               </a:rPr>
-              <a:t>Ngô</a:t>
+              <a:t>Văn</a:t>
             </a:r>
             <a:r>
               <a:rPr lang="en-US" dirty="0" smtClean="0">
@@ -13403,56 +13410,28 @@
                 <a:latin typeface="Segoe UI" panose="020B0502040204020203" pitchFamily="34" charset="0"/>
                 <a:cs typeface="Segoe UI" panose="020B0502040204020203" pitchFamily="34" charset="0"/>
               </a:rPr>
-              <a:t>Văn</a:t>
+              <a:t>thường</a:t>
             </a:r>
             <a:r>
               <a:rPr lang="en-US" dirty="0" smtClean="0">
                 <a:latin typeface="Segoe UI" panose="020B0502040204020203" pitchFamily="34" charset="0"/>
                 <a:cs typeface="Segoe UI" panose="020B0502040204020203" pitchFamily="34" charset="0"/>
               </a:rPr>
-              <a:t> </a:t>
+              <a:t> -</a:t>
             </a:r>
             <a:r>
               <a:rPr lang="en-US" dirty="0" err="1" smtClean="0">
                 <a:latin typeface="Segoe UI" panose="020B0502040204020203" pitchFamily="34" charset="0"/>
                 <a:cs typeface="Segoe UI" panose="020B0502040204020203" pitchFamily="34" charset="0"/>
               </a:rPr>
-              <a:t>thường</a:t>
+              <a:t>Khóa</a:t>
             </a:r>
             <a:r>
               <a:rPr lang="en-US" dirty="0" smtClean="0">
                 <a:latin typeface="Segoe UI" panose="020B0502040204020203" pitchFamily="34" charset="0"/>
                 <a:cs typeface="Segoe UI" panose="020B0502040204020203" pitchFamily="34" charset="0"/>
               </a:rPr>
-              <a:t> </a:t>
-            </a:r>
-            <a:r>
-              <a:rPr lang="en-US" dirty="0" smtClean="0">
-                <a:latin typeface="Segoe UI" panose="020B0502040204020203" pitchFamily="34" charset="0"/>
-                <a:cs typeface="Segoe UI" panose="020B0502040204020203" pitchFamily="34" charset="0"/>
-              </a:rPr>
-              <a:t>-</a:t>
-            </a:r>
-            <a:r>
-              <a:rPr lang="en-US" dirty="0" err="1" smtClean="0">
-                <a:latin typeface="Segoe UI" panose="020B0502040204020203" pitchFamily="34" charset="0"/>
-                <a:cs typeface="Segoe UI" panose="020B0502040204020203" pitchFamily="34" charset="0"/>
-              </a:rPr>
-              <a:t>Khóa</a:t>
-            </a:r>
-            <a:r>
-              <a:rPr lang="en-US" dirty="0" smtClean="0">
-                <a:latin typeface="Segoe UI" panose="020B0502040204020203" pitchFamily="34" charset="0"/>
-                <a:cs typeface="Segoe UI" panose="020B0502040204020203" pitchFamily="34" charset="0"/>
-              </a:rPr>
-              <a:t> </a:t>
-            </a:r>
-            <a:r>
-              <a:rPr lang="en-US" dirty="0" smtClean="0">
-                <a:latin typeface="Segoe UI" panose="020B0502040204020203" pitchFamily="34" charset="0"/>
-                <a:cs typeface="Segoe UI" panose="020B0502040204020203" pitchFamily="34" charset="0"/>
-              </a:rPr>
-              <a:t>15 </a:t>
+              <a:t> 15 </a:t>
             </a:r>
           </a:p>
           <a:p>
@@ -13468,21 +13447,28 @@
                 <a:latin typeface="Segoe UI" panose="020B0502040204020203" pitchFamily="34" charset="0"/>
                 <a:cs typeface="Segoe UI" panose="020B0502040204020203" pitchFamily="34" charset="0"/>
               </a:rPr>
-              <a:t>		</a:t>
+              <a:t>					- </a:t>
+            </a:r>
+            <a:r>
+              <a:rPr lang="en-US" dirty="0" err="1" smtClean="0">
+                <a:latin typeface="Segoe UI" panose="020B0502040204020203" pitchFamily="34" charset="0"/>
+                <a:cs typeface="Segoe UI" panose="020B0502040204020203" pitchFamily="34" charset="0"/>
+              </a:rPr>
+              <a:t>Nguyễn</a:t>
             </a:r>
             <a:r>
               <a:rPr lang="en-US" dirty="0" smtClean="0">
                 <a:latin typeface="Segoe UI" panose="020B0502040204020203" pitchFamily="34" charset="0"/>
                 <a:cs typeface="Segoe UI" panose="020B0502040204020203" pitchFamily="34" charset="0"/>
               </a:rPr>
-              <a:t>			- </a:t>
+              <a:t> </a:t>
             </a:r>
             <a:r>
               <a:rPr lang="en-US" dirty="0" err="1" smtClean="0">
                 <a:latin typeface="Segoe UI" panose="020B0502040204020203" pitchFamily="34" charset="0"/>
                 <a:cs typeface="Segoe UI" panose="020B0502040204020203" pitchFamily="34" charset="0"/>
               </a:rPr>
-              <a:t>Nguyễn</a:t>
+              <a:t>Đức</a:t>
             </a:r>
             <a:r>
               <a:rPr lang="en-US" dirty="0" smtClean="0">
@@ -13496,56 +13482,28 @@
                 <a:latin typeface="Segoe UI" panose="020B0502040204020203" pitchFamily="34" charset="0"/>
                 <a:cs typeface="Segoe UI" panose="020B0502040204020203" pitchFamily="34" charset="0"/>
               </a:rPr>
-              <a:t>Đức</a:t>
+              <a:t>hậu</a:t>
             </a:r>
             <a:r>
               <a:rPr lang="en-US" dirty="0" smtClean="0">
                 <a:latin typeface="Segoe UI" panose="020B0502040204020203" pitchFamily="34" charset="0"/>
                 <a:cs typeface="Segoe UI" panose="020B0502040204020203" pitchFamily="34" charset="0"/>
               </a:rPr>
-              <a:t> </a:t>
+              <a:t> - </a:t>
             </a:r>
             <a:r>
               <a:rPr lang="en-US" dirty="0" err="1" smtClean="0">
                 <a:latin typeface="Segoe UI" panose="020B0502040204020203" pitchFamily="34" charset="0"/>
                 <a:cs typeface="Segoe UI" panose="020B0502040204020203" pitchFamily="34" charset="0"/>
               </a:rPr>
-              <a:t>hậu</a:t>
+              <a:t>khóa</a:t>
             </a:r>
             <a:r>
               <a:rPr lang="en-US" dirty="0" smtClean="0">
                 <a:latin typeface="Segoe UI" panose="020B0502040204020203" pitchFamily="34" charset="0"/>
                 <a:cs typeface="Segoe UI" panose="020B0502040204020203" pitchFamily="34" charset="0"/>
               </a:rPr>
-              <a:t> </a:t>
-            </a:r>
-            <a:r>
-              <a:rPr lang="en-US" dirty="0" smtClean="0">
-                <a:latin typeface="Segoe UI" panose="020B0502040204020203" pitchFamily="34" charset="0"/>
-                <a:cs typeface="Segoe UI" panose="020B0502040204020203" pitchFamily="34" charset="0"/>
-              </a:rPr>
-              <a:t>- </a:t>
-            </a:r>
-            <a:r>
-              <a:rPr lang="en-US" dirty="0" err="1" smtClean="0">
-                <a:latin typeface="Segoe UI" panose="020B0502040204020203" pitchFamily="34" charset="0"/>
-                <a:cs typeface="Segoe UI" panose="020B0502040204020203" pitchFamily="34" charset="0"/>
-              </a:rPr>
-              <a:t>khóa</a:t>
-            </a:r>
-            <a:r>
-              <a:rPr lang="en-US" dirty="0" smtClean="0">
-                <a:latin typeface="Segoe UI" panose="020B0502040204020203" pitchFamily="34" charset="0"/>
-                <a:cs typeface="Segoe UI" panose="020B0502040204020203" pitchFamily="34" charset="0"/>
-              </a:rPr>
-              <a:t> </a:t>
-            </a:r>
-            <a:r>
-              <a:rPr lang="en-US" dirty="0" smtClean="0">
-                <a:latin typeface="Segoe UI" panose="020B0502040204020203" pitchFamily="34" charset="0"/>
-                <a:cs typeface="Segoe UI" panose="020B0502040204020203" pitchFamily="34" charset="0"/>
-              </a:rPr>
-              <a:t>15</a:t>
+              <a:t> 15</a:t>
             </a:r>
           </a:p>
           <a:p>
@@ -14854,18 +14812,25 @@
               <a:buAutoNum type="romanUcPeriod"/>
             </a:pPr>
             <a:r>
+              <a:rPr lang="en-US" sz="2400" dirty="0" err="1" smtClean="0">
+                <a:latin typeface="Segoe UI" panose="020B0502040204020203" pitchFamily="34" charset="0"/>
+                <a:cs typeface="Segoe UI" panose="020B0502040204020203" pitchFamily="34" charset="0"/>
+              </a:rPr>
+              <a:t>Trình</a:t>
+            </a:r>
+            <a:r>
               <a:rPr lang="en-US" sz="2400" dirty="0" smtClean="0">
                 <a:latin typeface="Segoe UI" panose="020B0502040204020203" pitchFamily="34" charset="0"/>
                 <a:cs typeface="Segoe UI" panose="020B0502040204020203" pitchFamily="34" charset="0"/>
               </a:rPr>
-              <a:t>Thu </a:t>
+              <a:t> </a:t>
             </a:r>
             <a:r>
               <a:rPr lang="en-US" sz="2400" dirty="0" err="1" smtClean="0">
                 <a:latin typeface="Segoe UI" panose="020B0502040204020203" pitchFamily="34" charset="0"/>
                 <a:cs typeface="Segoe UI" panose="020B0502040204020203" pitchFamily="34" charset="0"/>
               </a:rPr>
-              <a:t>thập</a:t>
+              <a:t>bày</a:t>
             </a:r>
             <a:r>
               <a:rPr lang="en-US" sz="2400" dirty="0" smtClean="0">
@@ -14879,7 +14844,7 @@
                 <a:latin typeface="Segoe UI" panose="020B0502040204020203" pitchFamily="34" charset="0"/>
                 <a:cs typeface="Segoe UI" panose="020B0502040204020203" pitchFamily="34" charset="0"/>
               </a:rPr>
-              <a:t>và</a:t>
+              <a:t>nguồn</a:t>
             </a:r>
             <a:r>
               <a:rPr lang="en-US" sz="2400" dirty="0" smtClean="0">
@@ -14893,6 +14858,132 @@
                 <a:latin typeface="Segoe UI" panose="020B0502040204020203" pitchFamily="34" charset="0"/>
                 <a:cs typeface="Segoe UI" panose="020B0502040204020203" pitchFamily="34" charset="0"/>
               </a:rPr>
+              <a:t>dữ</a:t>
+            </a:r>
+            <a:r>
+              <a:rPr lang="en-US" sz="2400" dirty="0" smtClean="0">
+                <a:latin typeface="Segoe UI" panose="020B0502040204020203" pitchFamily="34" charset="0"/>
+                <a:cs typeface="Segoe UI" panose="020B0502040204020203" pitchFamily="34" charset="0"/>
+              </a:rPr>
+              <a:t> </a:t>
+            </a:r>
+            <a:r>
+              <a:rPr lang="en-US" sz="2400" dirty="0" err="1" smtClean="0">
+                <a:latin typeface="Segoe UI" panose="020B0502040204020203" pitchFamily="34" charset="0"/>
+                <a:cs typeface="Segoe UI" panose="020B0502040204020203" pitchFamily="34" charset="0"/>
+              </a:rPr>
+              <a:t>liệu</a:t>
+            </a:r>
+            <a:r>
+              <a:rPr lang="en-US" sz="2400" dirty="0" smtClean="0">
+                <a:latin typeface="Segoe UI" panose="020B0502040204020203" pitchFamily="34" charset="0"/>
+                <a:cs typeface="Segoe UI" panose="020B0502040204020203" pitchFamily="34" charset="0"/>
+              </a:rPr>
+              <a:t>, </a:t>
+            </a:r>
+            <a:r>
+              <a:rPr lang="en-US" sz="2400" dirty="0" err="1" smtClean="0">
+                <a:latin typeface="Segoe UI" panose="020B0502040204020203" pitchFamily="34" charset="0"/>
+                <a:cs typeface="Segoe UI" panose="020B0502040204020203" pitchFamily="34" charset="0"/>
+              </a:rPr>
+              <a:t>phân</a:t>
+            </a:r>
+            <a:r>
+              <a:rPr lang="en-US" sz="2400" dirty="0" smtClean="0">
+                <a:latin typeface="Segoe UI" panose="020B0502040204020203" pitchFamily="34" charset="0"/>
+                <a:cs typeface="Segoe UI" panose="020B0502040204020203" pitchFamily="34" charset="0"/>
+              </a:rPr>
+              <a:t> </a:t>
+            </a:r>
+            <a:r>
+              <a:rPr lang="en-US" sz="2400" dirty="0" err="1" smtClean="0">
+                <a:latin typeface="Segoe UI" panose="020B0502040204020203" pitchFamily="34" charset="0"/>
+                <a:cs typeface="Segoe UI" panose="020B0502040204020203" pitchFamily="34" charset="0"/>
+              </a:rPr>
+              <a:t>tích</a:t>
+            </a:r>
+            <a:r>
+              <a:rPr lang="en-US" sz="2400" dirty="0" smtClean="0">
+                <a:latin typeface="Segoe UI" panose="020B0502040204020203" pitchFamily="34" charset="0"/>
+                <a:cs typeface="Segoe UI" panose="020B0502040204020203" pitchFamily="34" charset="0"/>
+              </a:rPr>
+              <a:t> </a:t>
+            </a:r>
+            <a:r>
+              <a:rPr lang="en-US" sz="2400" dirty="0" err="1" smtClean="0">
+                <a:latin typeface="Segoe UI" panose="020B0502040204020203" pitchFamily="34" charset="0"/>
+                <a:cs typeface="Segoe UI" panose="020B0502040204020203" pitchFamily="34" charset="0"/>
+              </a:rPr>
+              <a:t>chọn</a:t>
+            </a:r>
+            <a:r>
+              <a:rPr lang="en-US" sz="2400" dirty="0" smtClean="0">
+                <a:latin typeface="Segoe UI" panose="020B0502040204020203" pitchFamily="34" charset="0"/>
+                <a:cs typeface="Segoe UI" panose="020B0502040204020203" pitchFamily="34" charset="0"/>
+              </a:rPr>
+              <a:t> </a:t>
+            </a:r>
+            <a:r>
+              <a:rPr lang="en-US" sz="2400" dirty="0" err="1" smtClean="0">
+                <a:latin typeface="Segoe UI" panose="020B0502040204020203" pitchFamily="34" charset="0"/>
+                <a:cs typeface="Segoe UI" panose="020B0502040204020203" pitchFamily="34" charset="0"/>
+              </a:rPr>
+              <a:t>kết</a:t>
+            </a:r>
+            <a:r>
+              <a:rPr lang="en-US" sz="2400" dirty="0" smtClean="0">
+                <a:latin typeface="Segoe UI" panose="020B0502040204020203" pitchFamily="34" charset="0"/>
+                <a:cs typeface="Segoe UI" panose="020B0502040204020203" pitchFamily="34" charset="0"/>
+              </a:rPr>
+              <a:t> </a:t>
+            </a:r>
+            <a:r>
+              <a:rPr lang="en-US" sz="2400" dirty="0" err="1" smtClean="0">
+                <a:latin typeface="Segoe UI" panose="020B0502040204020203" pitchFamily="34" charset="0"/>
+                <a:cs typeface="Segoe UI" panose="020B0502040204020203" pitchFamily="34" charset="0"/>
+              </a:rPr>
+              <a:t>quả</a:t>
+            </a:r>
+            <a:r>
+              <a:rPr lang="en-US" sz="2400" dirty="0" smtClean="0">
+                <a:latin typeface="Segoe UI" panose="020B0502040204020203" pitchFamily="34" charset="0"/>
+                <a:cs typeface="Segoe UI" panose="020B0502040204020203" pitchFamily="34" charset="0"/>
+              </a:rPr>
+              <a:t>,  </a:t>
+            </a:r>
+            <a:r>
+              <a:rPr lang="en-US" sz="2400" dirty="0" err="1" smtClean="0">
+                <a:latin typeface="Segoe UI" panose="020B0502040204020203" pitchFamily="34" charset="0"/>
+                <a:cs typeface="Segoe UI" panose="020B0502040204020203" pitchFamily="34" charset="0"/>
+              </a:rPr>
+              <a:t>thuộc</a:t>
+            </a:r>
+            <a:r>
+              <a:rPr lang="en-US" sz="2400" dirty="0" smtClean="0">
+                <a:latin typeface="Segoe UI" panose="020B0502040204020203" pitchFamily="34" charset="0"/>
+                <a:cs typeface="Segoe UI" panose="020B0502040204020203" pitchFamily="34" charset="0"/>
+              </a:rPr>
+              <a:t> </a:t>
+            </a:r>
+            <a:r>
+              <a:rPr lang="en-US" sz="2400" dirty="0" err="1" smtClean="0">
+                <a:latin typeface="Segoe UI" panose="020B0502040204020203" pitchFamily="34" charset="0"/>
+                <a:cs typeface="Segoe UI" panose="020B0502040204020203" pitchFamily="34" charset="0"/>
+              </a:rPr>
+              <a:t>tính</a:t>
+            </a:r>
+            <a:r>
+              <a:rPr lang="en-US" sz="2400" dirty="0" smtClean="0">
+                <a:latin typeface="Segoe UI" panose="020B0502040204020203" pitchFamily="34" charset="0"/>
+                <a:cs typeface="Segoe UI" panose="020B0502040204020203" pitchFamily="34" charset="0"/>
+              </a:rPr>
+              <a:t> </a:t>
+            </a:r>
+            <a:r>
+              <a:rPr lang="en-US" sz="2400" dirty="0" err="1" smtClean="0">
+                <a:latin typeface="Segoe UI" panose="020B0502040204020203" pitchFamily="34" charset="0"/>
+                <a:cs typeface="Segoe UI" panose="020B0502040204020203" pitchFamily="34" charset="0"/>
+              </a:rPr>
               <a:t>xử</a:t>
             </a:r>
             <a:r>
@@ -14921,6 +15012,48 @@
                 <a:latin typeface="Segoe UI" panose="020B0502040204020203" pitchFamily="34" charset="0"/>
                 <a:cs typeface="Segoe UI" panose="020B0502040204020203" pitchFamily="34" charset="0"/>
               </a:rPr>
+              <a:t>tiền</a:t>
+            </a:r>
+            <a:r>
+              <a:rPr lang="en-US" sz="2400" dirty="0" smtClean="0">
+                <a:latin typeface="Segoe UI" panose="020B0502040204020203" pitchFamily="34" charset="0"/>
+                <a:cs typeface="Segoe UI" panose="020B0502040204020203" pitchFamily="34" charset="0"/>
+              </a:rPr>
+              <a:t> </a:t>
+            </a:r>
+            <a:r>
+              <a:rPr lang="en-US" sz="2400" dirty="0" err="1" smtClean="0">
+                <a:latin typeface="Segoe UI" panose="020B0502040204020203" pitchFamily="34" charset="0"/>
+                <a:cs typeface="Segoe UI" panose="020B0502040204020203" pitchFamily="34" charset="0"/>
+              </a:rPr>
+              <a:t>xử</a:t>
+            </a:r>
+            <a:r>
+              <a:rPr lang="en-US" sz="2400" dirty="0" smtClean="0">
+                <a:latin typeface="Segoe UI" panose="020B0502040204020203" pitchFamily="34" charset="0"/>
+                <a:cs typeface="Segoe UI" panose="020B0502040204020203" pitchFamily="34" charset="0"/>
+              </a:rPr>
+              <a:t> </a:t>
+            </a:r>
+            <a:r>
+              <a:rPr lang="en-US" sz="2400" dirty="0" err="1" smtClean="0">
+                <a:latin typeface="Segoe UI" panose="020B0502040204020203" pitchFamily="34" charset="0"/>
+                <a:cs typeface="Segoe UI" panose="020B0502040204020203" pitchFamily="34" charset="0"/>
+              </a:rPr>
+              <a:t>lý</a:t>
+            </a:r>
+            <a:r>
+              <a:rPr lang="en-US" sz="2400" dirty="0" smtClean="0">
+                <a:latin typeface="Segoe UI" panose="020B0502040204020203" pitchFamily="34" charset="0"/>
+                <a:cs typeface="Segoe UI" panose="020B0502040204020203" pitchFamily="34" charset="0"/>
+              </a:rPr>
+              <a:t> </a:t>
+            </a:r>
+            <a:r>
+              <a:rPr lang="en-US" sz="2400" dirty="0" err="1" smtClean="0">
+                <a:latin typeface="Segoe UI" panose="020B0502040204020203" pitchFamily="34" charset="0"/>
+                <a:cs typeface="Segoe UI" panose="020B0502040204020203" pitchFamily="34" charset="0"/>
+              </a:rPr>
               <a:t>dữ</a:t>
             </a:r>
             <a:r>
@@ -14937,26 +15070,19 @@
               </a:rPr>
               <a:t>liệu</a:t>
             </a:r>
-            <a:endParaRPr lang="en-US" sz="2400" dirty="0" smtClean="0">
-              <a:latin typeface="Segoe UI" panose="020B0502040204020203" pitchFamily="34" charset="0"/>
-              <a:cs typeface="Segoe UI" panose="020B0502040204020203" pitchFamily="34" charset="0"/>
-            </a:endParaRPr>
-          </a:p>
-          <a:p>
-            <a:pPr marL="514350" indent="-514350">
-              <a:buClr>
-                <a:schemeClr val="tx1"/>
-              </a:buClr>
-              <a:buSzPct val="85000"/>
-              <a:buFont typeface="+mj-lt"/>
-              <a:buAutoNum type="romanUcPeriod"/>
-            </a:pPr>
+            <a:r>
+              <a:rPr lang="en-US" sz="2400" dirty="0" smtClean="0">
+                <a:latin typeface="Segoe UI" panose="020B0502040204020203" pitchFamily="34" charset="0"/>
+                <a:cs typeface="Segoe UI" panose="020B0502040204020203" pitchFamily="34" charset="0"/>
+              </a:rPr>
+              <a:t>  , </a:t>
+            </a:r>
             <a:r>
               <a:rPr lang="en-US" sz="2400" dirty="0" err="1" smtClean="0">
                 <a:latin typeface="Segoe UI" panose="020B0502040204020203" pitchFamily="34" charset="0"/>
                 <a:cs typeface="Segoe UI" panose="020B0502040204020203" pitchFamily="34" charset="0"/>
               </a:rPr>
-              <a:t>Xây</a:t>
+              <a:t>tổng</a:t>
             </a:r>
             <a:r>
               <a:rPr lang="en-US" sz="2400" dirty="0" smtClean="0">
@@ -14970,312 +15096,7 @@
                 <a:latin typeface="Segoe UI" panose="020B0502040204020203" pitchFamily="34" charset="0"/>
                 <a:cs typeface="Segoe UI" panose="020B0502040204020203" pitchFamily="34" charset="0"/>
               </a:rPr>
-              <a:t>dựng</a:t>
-            </a:r>
-            <a:r>
-              <a:rPr lang="en-US" sz="2400" dirty="0" smtClean="0">
-                <a:latin typeface="Segoe UI" panose="020B0502040204020203" pitchFamily="34" charset="0"/>
-                <a:cs typeface="Segoe UI" panose="020B0502040204020203" pitchFamily="34" charset="0"/>
-              </a:rPr>
-              <a:t> </a:t>
-            </a:r>
-            <a:r>
-              <a:rPr lang="en-US" sz="2400" dirty="0" err="1" smtClean="0">
-                <a:latin typeface="Segoe UI" panose="020B0502040204020203" pitchFamily="34" charset="0"/>
-                <a:cs typeface="Segoe UI" panose="020B0502040204020203" pitchFamily="34" charset="0"/>
-              </a:rPr>
-              <a:t>mô</a:t>
-            </a:r>
-            <a:r>
-              <a:rPr lang="en-US" sz="2400" dirty="0" smtClean="0">
-                <a:latin typeface="Segoe UI" panose="020B0502040204020203" pitchFamily="34" charset="0"/>
-                <a:cs typeface="Segoe UI" panose="020B0502040204020203" pitchFamily="34" charset="0"/>
-              </a:rPr>
-              <a:t> </a:t>
-            </a:r>
-            <a:r>
-              <a:rPr lang="en-US" sz="2400" dirty="0" err="1" smtClean="0">
-                <a:latin typeface="Segoe UI" panose="020B0502040204020203" pitchFamily="34" charset="0"/>
-                <a:cs typeface="Segoe UI" panose="020B0502040204020203" pitchFamily="34" charset="0"/>
-              </a:rPr>
-              <a:t>hình</a:t>
-            </a:r>
-            <a:r>
-              <a:rPr lang="en-US" sz="2400" dirty="0" smtClean="0">
-                <a:latin typeface="Segoe UI" panose="020B0502040204020203" pitchFamily="34" charset="0"/>
-                <a:cs typeface="Segoe UI" panose="020B0502040204020203" pitchFamily="34" charset="0"/>
-              </a:rPr>
-              <a:t> </a:t>
-            </a:r>
-            <a:r>
-              <a:rPr lang="en-US" sz="2400" dirty="0" err="1" smtClean="0">
-                <a:latin typeface="Segoe UI" panose="020B0502040204020203" pitchFamily="34" charset="0"/>
-                <a:cs typeface="Segoe UI" panose="020B0502040204020203" pitchFamily="34" charset="0"/>
-              </a:rPr>
-              <a:t>học</a:t>
-            </a:r>
-            <a:r>
-              <a:rPr lang="en-US" sz="2400" dirty="0" smtClean="0">
-                <a:latin typeface="Segoe UI" panose="020B0502040204020203" pitchFamily="34" charset="0"/>
-                <a:cs typeface="Segoe UI" panose="020B0502040204020203" pitchFamily="34" charset="0"/>
-              </a:rPr>
-              <a:t> </a:t>
-            </a:r>
-            <a:r>
-              <a:rPr lang="en-US" sz="2400" dirty="0" err="1" smtClean="0">
-                <a:latin typeface="Segoe UI" panose="020B0502040204020203" pitchFamily="34" charset="0"/>
-                <a:cs typeface="Segoe UI" panose="020B0502040204020203" pitchFamily="34" charset="0"/>
-              </a:rPr>
-              <a:t>sâu</a:t>
-            </a:r>
-            <a:r>
-              <a:rPr lang="en-US" sz="2400" dirty="0" smtClean="0">
-                <a:latin typeface="Segoe UI" panose="020B0502040204020203" pitchFamily="34" charset="0"/>
-                <a:cs typeface="Segoe UI" panose="020B0502040204020203" pitchFamily="34" charset="0"/>
-              </a:rPr>
-              <a:t> </a:t>
-            </a:r>
-            <a:r>
-              <a:rPr lang="en-US" sz="2400" dirty="0" err="1" smtClean="0">
-                <a:latin typeface="Segoe UI" panose="020B0502040204020203" pitchFamily="34" charset="0"/>
-                <a:cs typeface="Segoe UI" panose="020B0502040204020203" pitchFamily="34" charset="0"/>
-              </a:rPr>
-              <a:t>cho</a:t>
-            </a:r>
-            <a:r>
-              <a:rPr lang="en-US" sz="2400" dirty="0" smtClean="0">
-                <a:latin typeface="Segoe UI" panose="020B0502040204020203" pitchFamily="34" charset="0"/>
-                <a:cs typeface="Segoe UI" panose="020B0502040204020203" pitchFamily="34" charset="0"/>
-              </a:rPr>
-              <a:t> </a:t>
-            </a:r>
-            <a:r>
-              <a:rPr lang="en-US" sz="2400" dirty="0" err="1" smtClean="0">
-                <a:latin typeface="Segoe UI" panose="020B0502040204020203" pitchFamily="34" charset="0"/>
-                <a:cs typeface="Segoe UI" panose="020B0502040204020203" pitchFamily="34" charset="0"/>
-              </a:rPr>
-              <a:t>bài</a:t>
-            </a:r>
-            <a:r>
-              <a:rPr lang="en-US" sz="2400" dirty="0" smtClean="0">
-                <a:latin typeface="Segoe UI" panose="020B0502040204020203" pitchFamily="34" charset="0"/>
-                <a:cs typeface="Segoe UI" panose="020B0502040204020203" pitchFamily="34" charset="0"/>
-              </a:rPr>
-              <a:t> </a:t>
-            </a:r>
-            <a:r>
-              <a:rPr lang="en-US" sz="2400" dirty="0" err="1" smtClean="0">
-                <a:latin typeface="Segoe UI" panose="020B0502040204020203" pitchFamily="34" charset="0"/>
-                <a:cs typeface="Segoe UI" panose="020B0502040204020203" pitchFamily="34" charset="0"/>
-              </a:rPr>
-              <a:t>toán</a:t>
-            </a:r>
-            <a:endParaRPr lang="en-US" sz="2400" dirty="0" smtClean="0">
-              <a:latin typeface="Segoe UI" panose="020B0502040204020203" pitchFamily="34" charset="0"/>
-              <a:cs typeface="Segoe UI" panose="020B0502040204020203" pitchFamily="34" charset="0"/>
-            </a:endParaRPr>
-          </a:p>
-          <a:p>
-            <a:pPr marL="0" indent="0">
-              <a:buClr>
-                <a:schemeClr val="tx1"/>
-              </a:buClr>
-              <a:buSzPct val="85000"/>
-              <a:buNone/>
-            </a:pPr>
-            <a:r>
-              <a:rPr lang="en-US" sz="2400" dirty="0" smtClean="0">
-                <a:latin typeface="Segoe UI" panose="020B0502040204020203" pitchFamily="34" charset="0"/>
-                <a:cs typeface="Segoe UI" panose="020B0502040204020203" pitchFamily="34" charset="0"/>
-              </a:rPr>
-              <a:t>III. 	</a:t>
-            </a:r>
-            <a:r>
-              <a:rPr lang="en-US" sz="2400" dirty="0" err="1" smtClean="0">
-                <a:latin typeface="Segoe UI" panose="020B0502040204020203" pitchFamily="34" charset="0"/>
-                <a:cs typeface="Segoe UI" panose="020B0502040204020203" pitchFamily="34" charset="0"/>
-              </a:rPr>
-              <a:t>Tối</a:t>
-            </a:r>
-            <a:r>
-              <a:rPr lang="en-US" sz="2400" dirty="0" smtClean="0">
-                <a:latin typeface="Segoe UI" panose="020B0502040204020203" pitchFamily="34" charset="0"/>
-                <a:cs typeface="Segoe UI" panose="020B0502040204020203" pitchFamily="34" charset="0"/>
-              </a:rPr>
-              <a:t> </a:t>
-            </a:r>
-            <a:r>
-              <a:rPr lang="en-US" sz="2400" dirty="0" err="1" smtClean="0">
-                <a:latin typeface="Segoe UI" panose="020B0502040204020203" pitchFamily="34" charset="0"/>
-                <a:cs typeface="Segoe UI" panose="020B0502040204020203" pitchFamily="34" charset="0"/>
-              </a:rPr>
-              <a:t>ưu</a:t>
-            </a:r>
-            <a:r>
-              <a:rPr lang="en-US" sz="2400" dirty="0" smtClean="0">
-                <a:latin typeface="Segoe UI" panose="020B0502040204020203" pitchFamily="34" charset="0"/>
-                <a:cs typeface="Segoe UI" panose="020B0502040204020203" pitchFamily="34" charset="0"/>
-              </a:rPr>
-              <a:t> </a:t>
-            </a:r>
-            <a:r>
-              <a:rPr lang="en-US" sz="2400" dirty="0" err="1" smtClean="0">
-                <a:latin typeface="Segoe UI" panose="020B0502040204020203" pitchFamily="34" charset="0"/>
-                <a:cs typeface="Segoe UI" panose="020B0502040204020203" pitchFamily="34" charset="0"/>
-              </a:rPr>
-              <a:t>và</a:t>
-            </a:r>
-            <a:r>
-              <a:rPr lang="en-US" sz="2400" dirty="0" smtClean="0">
-                <a:latin typeface="Segoe UI" panose="020B0502040204020203" pitchFamily="34" charset="0"/>
-                <a:cs typeface="Segoe UI" panose="020B0502040204020203" pitchFamily="34" charset="0"/>
-              </a:rPr>
-              <a:t> </a:t>
-            </a:r>
-            <a:r>
-              <a:rPr lang="en-US" sz="2400" dirty="0" err="1" smtClean="0">
-                <a:latin typeface="Segoe UI" panose="020B0502040204020203" pitchFamily="34" charset="0"/>
-                <a:cs typeface="Segoe UI" panose="020B0502040204020203" pitchFamily="34" charset="0"/>
-              </a:rPr>
-              <a:t>đánh</a:t>
-            </a:r>
-            <a:r>
-              <a:rPr lang="en-US" sz="2400" dirty="0" smtClean="0">
-                <a:latin typeface="Segoe UI" panose="020B0502040204020203" pitchFamily="34" charset="0"/>
-                <a:cs typeface="Segoe UI" panose="020B0502040204020203" pitchFamily="34" charset="0"/>
-              </a:rPr>
-              <a:t> </a:t>
-            </a:r>
-            <a:r>
-              <a:rPr lang="en-US" sz="2400" dirty="0" err="1" smtClean="0">
-                <a:latin typeface="Segoe UI" panose="020B0502040204020203" pitchFamily="34" charset="0"/>
-                <a:cs typeface="Segoe UI" panose="020B0502040204020203" pitchFamily="34" charset="0"/>
-              </a:rPr>
-              <a:t>giá</a:t>
-            </a:r>
-            <a:r>
-              <a:rPr lang="en-US" sz="2400" dirty="0" smtClean="0">
-                <a:latin typeface="Segoe UI" panose="020B0502040204020203" pitchFamily="34" charset="0"/>
-                <a:cs typeface="Segoe UI" panose="020B0502040204020203" pitchFamily="34" charset="0"/>
-              </a:rPr>
-              <a:t> </a:t>
-            </a:r>
-            <a:r>
-              <a:rPr lang="en-US" sz="2400" dirty="0" err="1" smtClean="0">
-                <a:latin typeface="Segoe UI" panose="020B0502040204020203" pitchFamily="34" charset="0"/>
-                <a:cs typeface="Segoe UI" panose="020B0502040204020203" pitchFamily="34" charset="0"/>
-              </a:rPr>
-              <a:t>mô</a:t>
-            </a:r>
-            <a:r>
-              <a:rPr lang="en-US" sz="2400" dirty="0" smtClean="0">
-                <a:latin typeface="Segoe UI" panose="020B0502040204020203" pitchFamily="34" charset="0"/>
-                <a:cs typeface="Segoe UI" panose="020B0502040204020203" pitchFamily="34" charset="0"/>
-              </a:rPr>
-              <a:t> </a:t>
-            </a:r>
-            <a:r>
-              <a:rPr lang="en-US" sz="2400" dirty="0" err="1" smtClean="0">
-                <a:latin typeface="Segoe UI" panose="020B0502040204020203" pitchFamily="34" charset="0"/>
-                <a:cs typeface="Segoe UI" panose="020B0502040204020203" pitchFamily="34" charset="0"/>
-              </a:rPr>
-              <a:t>hình</a:t>
-            </a:r>
-            <a:r>
-              <a:rPr lang="en-US" sz="2400" dirty="0" smtClean="0">
-                <a:latin typeface="Segoe UI" panose="020B0502040204020203" pitchFamily="34" charset="0"/>
-                <a:cs typeface="Segoe UI" panose="020B0502040204020203" pitchFamily="34" charset="0"/>
-              </a:rPr>
-              <a:t> </a:t>
-            </a:r>
-          </a:p>
-          <a:p>
-            <a:pPr marL="0" indent="0">
-              <a:buNone/>
-            </a:pPr>
-            <a:r>
-              <a:rPr lang="en-US" sz="2400" dirty="0" smtClean="0">
-                <a:latin typeface="Segoe UI" panose="020B0502040204020203" pitchFamily="34" charset="0"/>
-                <a:cs typeface="Segoe UI" panose="020B0502040204020203" pitchFamily="34" charset="0"/>
-              </a:rPr>
-              <a:t>IV. 	</a:t>
-            </a:r>
-            <a:r>
-              <a:rPr lang="en-US" sz="2400" dirty="0" err="1" smtClean="0">
-                <a:latin typeface="Segoe UI" panose="020B0502040204020203" pitchFamily="34" charset="0"/>
-                <a:cs typeface="Segoe UI" panose="020B0502040204020203" pitchFamily="34" charset="0"/>
-              </a:rPr>
-              <a:t>Xây</a:t>
-            </a:r>
-            <a:r>
-              <a:rPr lang="en-US" sz="2400" dirty="0" smtClean="0">
-                <a:latin typeface="Segoe UI" panose="020B0502040204020203" pitchFamily="34" charset="0"/>
-                <a:cs typeface="Segoe UI" panose="020B0502040204020203" pitchFamily="34" charset="0"/>
-              </a:rPr>
-              <a:t> </a:t>
-            </a:r>
-            <a:r>
-              <a:rPr lang="en-US" sz="2400" dirty="0" err="1" smtClean="0">
-                <a:latin typeface="Segoe UI" panose="020B0502040204020203" pitchFamily="34" charset="0"/>
-                <a:cs typeface="Segoe UI" panose="020B0502040204020203" pitchFamily="34" charset="0"/>
-              </a:rPr>
-              <a:t>dựng</a:t>
-            </a:r>
-            <a:r>
-              <a:rPr lang="en-US" sz="2400" dirty="0" smtClean="0">
-                <a:latin typeface="Segoe UI" panose="020B0502040204020203" pitchFamily="34" charset="0"/>
-                <a:cs typeface="Segoe UI" panose="020B0502040204020203" pitchFamily="34" charset="0"/>
-              </a:rPr>
-              <a:t> </a:t>
-            </a:r>
-            <a:r>
-              <a:rPr lang="en-US" sz="2400" dirty="0" err="1" smtClean="0">
-                <a:latin typeface="Segoe UI" panose="020B0502040204020203" pitchFamily="34" charset="0"/>
-                <a:cs typeface="Segoe UI" panose="020B0502040204020203" pitchFamily="34" charset="0"/>
-              </a:rPr>
-              <a:t>ứng</a:t>
-            </a:r>
-            <a:r>
-              <a:rPr lang="en-US" sz="2400" dirty="0" smtClean="0">
-                <a:latin typeface="Segoe UI" panose="020B0502040204020203" pitchFamily="34" charset="0"/>
-                <a:cs typeface="Segoe UI" panose="020B0502040204020203" pitchFamily="34" charset="0"/>
-              </a:rPr>
-              <a:t> </a:t>
-            </a:r>
-            <a:r>
-              <a:rPr lang="en-US" sz="2400" dirty="0" err="1" smtClean="0">
-                <a:latin typeface="Segoe UI" panose="020B0502040204020203" pitchFamily="34" charset="0"/>
-                <a:cs typeface="Segoe UI" panose="020B0502040204020203" pitchFamily="34" charset="0"/>
-              </a:rPr>
-              <a:t>dụng</a:t>
-            </a:r>
-            <a:r>
-              <a:rPr lang="en-US" sz="2400" dirty="0" smtClean="0">
-                <a:latin typeface="Segoe UI" panose="020B0502040204020203" pitchFamily="34" charset="0"/>
-                <a:cs typeface="Segoe UI" panose="020B0502040204020203" pitchFamily="34" charset="0"/>
-              </a:rPr>
-              <a:t> </a:t>
-            </a:r>
-            <a:r>
-              <a:rPr lang="en-US" sz="2400" dirty="0" err="1" smtClean="0">
-                <a:latin typeface="Segoe UI" panose="020B0502040204020203" pitchFamily="34" charset="0"/>
-                <a:cs typeface="Segoe UI" panose="020B0502040204020203" pitchFamily="34" charset="0"/>
-              </a:rPr>
-              <a:t>dự</a:t>
-            </a:r>
-            <a:r>
-              <a:rPr lang="en-US" sz="2400" dirty="0" smtClean="0">
-                <a:latin typeface="Segoe UI" panose="020B0502040204020203" pitchFamily="34" charset="0"/>
-                <a:cs typeface="Segoe UI" panose="020B0502040204020203" pitchFamily="34" charset="0"/>
-              </a:rPr>
-              <a:t> </a:t>
-            </a:r>
-            <a:r>
-              <a:rPr lang="en-US" sz="2400" dirty="0" err="1" smtClean="0">
-                <a:latin typeface="Segoe UI" panose="020B0502040204020203" pitchFamily="34" charset="0"/>
-                <a:cs typeface="Segoe UI" panose="020B0502040204020203" pitchFamily="34" charset="0"/>
-              </a:rPr>
-              <a:t>báo</a:t>
+              <a:t>kết</a:t>
             </a:r>
             <a:endParaRPr lang="en-US" sz="2400" dirty="0">
               <a:latin typeface="Segoe UI" panose="020B0502040204020203" pitchFamily="34" charset="0"/>
@@ -15690,18 +15511,25 @@
               <a:buAutoNum type="romanUcPeriod"/>
             </a:pPr>
             <a:r>
+              <a:rPr lang="en-US" sz="2400" dirty="0" err="1" smtClean="0">
+                <a:latin typeface="Segoe UI" panose="020B0502040204020203" pitchFamily="34" charset="0"/>
+                <a:cs typeface="Segoe UI" panose="020B0502040204020203" pitchFamily="34" charset="0"/>
+              </a:rPr>
+              <a:t>Trình</a:t>
+            </a:r>
+            <a:r>
               <a:rPr lang="en-US" sz="2400" dirty="0" smtClean="0">
                 <a:latin typeface="Segoe UI" panose="020B0502040204020203" pitchFamily="34" charset="0"/>
                 <a:cs typeface="Segoe UI" panose="020B0502040204020203" pitchFamily="34" charset="0"/>
               </a:rPr>
-              <a:t>Thu </a:t>
+              <a:t> </a:t>
             </a:r>
             <a:r>
               <a:rPr lang="en-US" sz="2400" dirty="0" err="1" smtClean="0">
                 <a:latin typeface="Segoe UI" panose="020B0502040204020203" pitchFamily="34" charset="0"/>
                 <a:cs typeface="Segoe UI" panose="020B0502040204020203" pitchFamily="34" charset="0"/>
               </a:rPr>
-              <a:t>thập</a:t>
+              <a:t>bày</a:t>
             </a:r>
             <a:r>
               <a:rPr lang="en-US" sz="2400" dirty="0" smtClean="0">
@@ -15715,7 +15543,7 @@
                 <a:latin typeface="Segoe UI" panose="020B0502040204020203" pitchFamily="34" charset="0"/>
                 <a:cs typeface="Segoe UI" panose="020B0502040204020203" pitchFamily="34" charset="0"/>
               </a:rPr>
-              <a:t>và</a:t>
+              <a:t>cách</a:t>
             </a:r>
             <a:r>
               <a:rPr lang="en-US" sz="2400" dirty="0" smtClean="0">
@@ -15729,7 +15557,7 @@
                 <a:latin typeface="Segoe UI" panose="020B0502040204020203" pitchFamily="34" charset="0"/>
                 <a:cs typeface="Segoe UI" panose="020B0502040204020203" pitchFamily="34" charset="0"/>
               </a:rPr>
-              <a:t>xử</a:t>
+              <a:t>chọn</a:t>
             </a:r>
             <a:r>
               <a:rPr lang="en-US" sz="2400" dirty="0" smtClean="0">
@@ -15743,13 +15571,41 @@
                 <a:latin typeface="Segoe UI" panose="020B0502040204020203" pitchFamily="34" charset="0"/>
                 <a:cs typeface="Segoe UI" panose="020B0502040204020203" pitchFamily="34" charset="0"/>
               </a:rPr>
-              <a:t>lý</a:t>
+              <a:t>số</a:t>
             </a:r>
             <a:r>
               <a:rPr lang="en-US" sz="2400" dirty="0" smtClean="0">
                 <a:latin typeface="Segoe UI" panose="020B0502040204020203" pitchFamily="34" charset="0"/>
                 <a:cs typeface="Segoe UI" panose="020B0502040204020203" pitchFamily="34" charset="0"/>
               </a:rPr>
+              <a:t> hidden layer , </a:t>
+            </a:r>
+            <a:r>
+              <a:rPr lang="en-US" sz="2400" dirty="0" err="1" smtClean="0">
+                <a:latin typeface="Segoe UI" panose="020B0502040204020203" pitchFamily="34" charset="0"/>
+                <a:cs typeface="Segoe UI" panose="020B0502040204020203" pitchFamily="34" charset="0"/>
+              </a:rPr>
+              <a:t>số</a:t>
+            </a:r>
+            <a:r>
+              <a:rPr lang="en-US" sz="2400" dirty="0" smtClean="0">
+                <a:latin typeface="Segoe UI" panose="020B0502040204020203" pitchFamily="34" charset="0"/>
+                <a:cs typeface="Segoe UI" panose="020B0502040204020203" pitchFamily="34" charset="0"/>
+              </a:rPr>
+              <a:t> neural </a:t>
+            </a:r>
+            <a:r>
+              <a:rPr lang="en-US" sz="2400" dirty="0" err="1" smtClean="0">
+                <a:latin typeface="Segoe UI" panose="020B0502040204020203" pitchFamily="34" charset="0"/>
+                <a:cs typeface="Segoe UI" panose="020B0502040204020203" pitchFamily="34" charset="0"/>
+              </a:rPr>
+              <a:t>của</a:t>
+            </a:r>
+            <a:r>
+              <a:rPr lang="en-US" sz="2400" dirty="0" smtClean="0">
+                <a:latin typeface="Segoe UI" panose="020B0502040204020203" pitchFamily="34" charset="0"/>
+                <a:cs typeface="Segoe UI" panose="020B0502040204020203" pitchFamily="34" charset="0"/>
+              </a:rPr>
               <a:t> </a:t>
             </a:r>
             <a:r>
@@ -15757,13 +15613,27 @@
                 <a:latin typeface="Segoe UI" panose="020B0502040204020203" pitchFamily="34" charset="0"/>
                 <a:cs typeface="Segoe UI" panose="020B0502040204020203" pitchFamily="34" charset="0"/>
               </a:rPr>
-              <a:t>dữ</a:t>
+              <a:t>mỗi</a:t>
             </a:r>
             <a:r>
               <a:rPr lang="en-US" sz="2400" dirty="0" smtClean="0">
                 <a:latin typeface="Segoe UI" panose="020B0502040204020203" pitchFamily="34" charset="0"/>
                 <a:cs typeface="Segoe UI" panose="020B0502040204020203" pitchFamily="34" charset="0"/>
               </a:rPr>
+              <a:t> hidden, </a:t>
+            </a:r>
+            <a:r>
+              <a:rPr lang="en-US" sz="2400" dirty="0" err="1" smtClean="0">
+                <a:latin typeface="Segoe UI" panose="020B0502040204020203" pitchFamily="34" charset="0"/>
+                <a:cs typeface="Segoe UI" panose="020B0502040204020203" pitchFamily="34" charset="0"/>
+              </a:rPr>
+              <a:t>chọn</a:t>
+            </a:r>
+            <a:r>
+              <a:rPr lang="en-US" sz="2400" dirty="0" smtClean="0">
+                <a:latin typeface="Segoe UI" panose="020B0502040204020203" pitchFamily="34" charset="0"/>
+                <a:cs typeface="Segoe UI" panose="020B0502040204020203" pitchFamily="34" charset="0"/>
+              </a:rPr>
               <a:t> </a:t>
             </a:r>
             <a:r>
@@ -15771,28 +15641,21 @@
                 <a:latin typeface="Segoe UI" panose="020B0502040204020203" pitchFamily="34" charset="0"/>
                 <a:cs typeface="Segoe UI" panose="020B0502040204020203" pitchFamily="34" charset="0"/>
               </a:rPr>
-              <a:t>liệu</a:t>
-            </a:r>
-            <a:endParaRPr lang="en-US" sz="2400" dirty="0" smtClean="0">
-              <a:latin typeface="Segoe UI" panose="020B0502040204020203" pitchFamily="34" charset="0"/>
-              <a:cs typeface="Segoe UI" panose="020B0502040204020203" pitchFamily="34" charset="0"/>
-            </a:endParaRPr>
-          </a:p>
-          <a:p>
-            <a:pPr marL="514350" indent="-514350">
-              <a:buClr>
-                <a:schemeClr val="tx1"/>
-              </a:buClr>
-              <a:buSzPct val="85000"/>
-              <a:buFont typeface="+mj-lt"/>
-              <a:buAutoNum type="romanUcPeriod"/>
-            </a:pPr>
+              <a:t>hàm</a:t>
+            </a:r>
+            <a:r>
+              <a:rPr lang="en-US" sz="2400" dirty="0" smtClean="0">
+                <a:latin typeface="Segoe UI" panose="020B0502040204020203" pitchFamily="34" charset="0"/>
+                <a:cs typeface="Segoe UI" panose="020B0502040204020203" pitchFamily="34" charset="0"/>
+              </a:rPr>
+              <a:t> </a:t>
+            </a:r>
             <a:r>
               <a:rPr lang="en-US" sz="2400" dirty="0" err="1" smtClean="0">
                 <a:latin typeface="Segoe UI" panose="020B0502040204020203" pitchFamily="34" charset="0"/>
                 <a:cs typeface="Segoe UI" panose="020B0502040204020203" pitchFamily="34" charset="0"/>
               </a:rPr>
-              <a:t>Xây</a:t>
+              <a:t>kích</a:t>
             </a:r>
             <a:r>
               <a:rPr lang="en-US" sz="2400" dirty="0" smtClean="0">
@@ -15806,7 +15669,7 @@
                 <a:latin typeface="Segoe UI" panose="020B0502040204020203" pitchFamily="34" charset="0"/>
                 <a:cs typeface="Segoe UI" panose="020B0502040204020203" pitchFamily="34" charset="0"/>
               </a:rPr>
-              <a:t>dựng</a:t>
+              <a:t>hoạt</a:t>
             </a:r>
             <a:r>
               <a:rPr lang="en-US" sz="2400" dirty="0" smtClean="0">
@@ -15814,304 +15677,6 @@
                 <a:cs typeface="Segoe UI" panose="020B0502040204020203" pitchFamily="34" charset="0"/>
               </a:rPr>
               <a:t> </a:t>
-            </a:r>
-            <a:r>
-              <a:rPr lang="en-US" sz="2400" dirty="0" err="1" smtClean="0">
-                <a:latin typeface="Segoe UI" panose="020B0502040204020203" pitchFamily="34" charset="0"/>
-                <a:cs typeface="Segoe UI" panose="020B0502040204020203" pitchFamily="34" charset="0"/>
-              </a:rPr>
-              <a:t>mô</a:t>
-            </a:r>
-            <a:r>
-              <a:rPr lang="en-US" sz="2400" dirty="0" smtClean="0">
-                <a:latin typeface="Segoe UI" panose="020B0502040204020203" pitchFamily="34" charset="0"/>
-                <a:cs typeface="Segoe UI" panose="020B0502040204020203" pitchFamily="34" charset="0"/>
-              </a:rPr>
-              <a:t> </a:t>
-            </a:r>
-            <a:r>
-              <a:rPr lang="en-US" sz="2400" dirty="0" err="1" smtClean="0">
-                <a:latin typeface="Segoe UI" panose="020B0502040204020203" pitchFamily="34" charset="0"/>
-                <a:cs typeface="Segoe UI" panose="020B0502040204020203" pitchFamily="34" charset="0"/>
-              </a:rPr>
-              <a:t>hình</a:t>
-            </a:r>
-            <a:r>
-              <a:rPr lang="en-US" sz="2400" dirty="0" smtClean="0">
-                <a:latin typeface="Segoe UI" panose="020B0502040204020203" pitchFamily="34" charset="0"/>
-                <a:cs typeface="Segoe UI" panose="020B0502040204020203" pitchFamily="34" charset="0"/>
-              </a:rPr>
-              <a:t> </a:t>
-            </a:r>
-            <a:r>
-              <a:rPr lang="en-US" sz="2400" dirty="0" err="1" smtClean="0">
-                <a:latin typeface="Segoe UI" panose="020B0502040204020203" pitchFamily="34" charset="0"/>
-                <a:cs typeface="Segoe UI" panose="020B0502040204020203" pitchFamily="34" charset="0"/>
-              </a:rPr>
-              <a:t>học</a:t>
-            </a:r>
-            <a:r>
-              <a:rPr lang="en-US" sz="2400" dirty="0" smtClean="0">
-                <a:latin typeface="Segoe UI" panose="020B0502040204020203" pitchFamily="34" charset="0"/>
-                <a:cs typeface="Segoe UI" panose="020B0502040204020203" pitchFamily="34" charset="0"/>
-              </a:rPr>
-              <a:t> </a:t>
-            </a:r>
-            <a:r>
-              <a:rPr lang="en-US" sz="2400" dirty="0" err="1" smtClean="0">
-                <a:latin typeface="Segoe UI" panose="020B0502040204020203" pitchFamily="34" charset="0"/>
-                <a:cs typeface="Segoe UI" panose="020B0502040204020203" pitchFamily="34" charset="0"/>
-              </a:rPr>
-              <a:t>sâu</a:t>
-            </a:r>
-            <a:r>
-              <a:rPr lang="en-US" sz="2400" dirty="0" smtClean="0">
-                <a:latin typeface="Segoe UI" panose="020B0502040204020203" pitchFamily="34" charset="0"/>
-                <a:cs typeface="Segoe UI" panose="020B0502040204020203" pitchFamily="34" charset="0"/>
-              </a:rPr>
-              <a:t> </a:t>
-            </a:r>
-            <a:r>
-              <a:rPr lang="en-US" sz="2400" dirty="0" err="1" smtClean="0">
-                <a:latin typeface="Segoe UI" panose="020B0502040204020203" pitchFamily="34" charset="0"/>
-                <a:cs typeface="Segoe UI" panose="020B0502040204020203" pitchFamily="34" charset="0"/>
-              </a:rPr>
-              <a:t>cho</a:t>
-            </a:r>
-            <a:r>
-              <a:rPr lang="en-US" sz="2400" dirty="0" smtClean="0">
-                <a:latin typeface="Segoe UI" panose="020B0502040204020203" pitchFamily="34" charset="0"/>
-                <a:cs typeface="Segoe UI" panose="020B0502040204020203" pitchFamily="34" charset="0"/>
-              </a:rPr>
-              <a:t> </a:t>
-            </a:r>
-            <a:r>
-              <a:rPr lang="en-US" sz="2400" dirty="0" err="1" smtClean="0">
-                <a:latin typeface="Segoe UI" panose="020B0502040204020203" pitchFamily="34" charset="0"/>
-                <a:cs typeface="Segoe UI" panose="020B0502040204020203" pitchFamily="34" charset="0"/>
-              </a:rPr>
-              <a:t>bài</a:t>
-            </a:r>
-            <a:r>
-              <a:rPr lang="en-US" sz="2400" dirty="0" smtClean="0">
-                <a:latin typeface="Segoe UI" panose="020B0502040204020203" pitchFamily="34" charset="0"/>
-                <a:cs typeface="Segoe UI" panose="020B0502040204020203" pitchFamily="34" charset="0"/>
-              </a:rPr>
-              <a:t> </a:t>
-            </a:r>
-            <a:r>
-              <a:rPr lang="en-US" sz="2400" dirty="0" err="1" smtClean="0">
-                <a:latin typeface="Segoe UI" panose="020B0502040204020203" pitchFamily="34" charset="0"/>
-                <a:cs typeface="Segoe UI" panose="020B0502040204020203" pitchFamily="34" charset="0"/>
-              </a:rPr>
-              <a:t>toán</a:t>
-            </a:r>
-            <a:endParaRPr lang="en-US" sz="2400" dirty="0" smtClean="0">
-              <a:latin typeface="Segoe UI" panose="020B0502040204020203" pitchFamily="34" charset="0"/>
-              <a:cs typeface="Segoe UI" panose="020B0502040204020203" pitchFamily="34" charset="0"/>
-            </a:endParaRPr>
-          </a:p>
-          <a:p>
-            <a:pPr marL="0" indent="0">
-              <a:buClr>
-                <a:schemeClr val="tx1"/>
-              </a:buClr>
-              <a:buSzPct val="85000"/>
-              <a:buNone/>
-            </a:pPr>
-            <a:r>
-              <a:rPr lang="en-US" sz="2400" dirty="0" smtClean="0">
-                <a:latin typeface="Segoe UI" panose="020B0502040204020203" pitchFamily="34" charset="0"/>
-                <a:cs typeface="Segoe UI" panose="020B0502040204020203" pitchFamily="34" charset="0"/>
-              </a:rPr>
-              <a:t>III. 	</a:t>
-            </a:r>
-            <a:r>
-              <a:rPr lang="en-US" sz="2400" dirty="0" err="1" smtClean="0">
-                <a:latin typeface="Segoe UI" panose="020B0502040204020203" pitchFamily="34" charset="0"/>
-                <a:cs typeface="Segoe UI" panose="020B0502040204020203" pitchFamily="34" charset="0"/>
-              </a:rPr>
-              <a:t>Tối</a:t>
-            </a:r>
-            <a:r>
-              <a:rPr lang="en-US" sz="2400" dirty="0" smtClean="0">
-                <a:latin typeface="Segoe UI" panose="020B0502040204020203" pitchFamily="34" charset="0"/>
-                <a:cs typeface="Segoe UI" panose="020B0502040204020203" pitchFamily="34" charset="0"/>
-              </a:rPr>
-              <a:t> </a:t>
-            </a:r>
-            <a:r>
-              <a:rPr lang="en-US" sz="2400" dirty="0" err="1" smtClean="0">
-                <a:latin typeface="Segoe UI" panose="020B0502040204020203" pitchFamily="34" charset="0"/>
-                <a:cs typeface="Segoe UI" panose="020B0502040204020203" pitchFamily="34" charset="0"/>
-              </a:rPr>
-              <a:t>ưu</a:t>
-            </a:r>
-            <a:r>
-              <a:rPr lang="en-US" sz="2400" dirty="0" smtClean="0">
-                <a:latin typeface="Segoe UI" panose="020B0502040204020203" pitchFamily="34" charset="0"/>
-                <a:cs typeface="Segoe UI" panose="020B0502040204020203" pitchFamily="34" charset="0"/>
-              </a:rPr>
-              <a:t> </a:t>
-            </a:r>
-            <a:r>
-              <a:rPr lang="en-US" sz="2400" dirty="0" err="1" smtClean="0">
-                <a:latin typeface="Segoe UI" panose="020B0502040204020203" pitchFamily="34" charset="0"/>
-                <a:cs typeface="Segoe UI" panose="020B0502040204020203" pitchFamily="34" charset="0"/>
-              </a:rPr>
-              <a:t>và</a:t>
-            </a:r>
-            <a:r>
-              <a:rPr lang="en-US" sz="2400" dirty="0" smtClean="0">
-                <a:latin typeface="Segoe UI" panose="020B0502040204020203" pitchFamily="34" charset="0"/>
-                <a:cs typeface="Segoe UI" panose="020B0502040204020203" pitchFamily="34" charset="0"/>
-              </a:rPr>
-              <a:t> </a:t>
-            </a:r>
-            <a:r>
-              <a:rPr lang="en-US" sz="2400" dirty="0" err="1" smtClean="0">
-                <a:latin typeface="Segoe UI" panose="020B0502040204020203" pitchFamily="34" charset="0"/>
-                <a:cs typeface="Segoe UI" panose="020B0502040204020203" pitchFamily="34" charset="0"/>
-              </a:rPr>
-              <a:t>đánh</a:t>
-            </a:r>
-            <a:r>
-              <a:rPr lang="en-US" sz="2400" dirty="0" smtClean="0">
-                <a:latin typeface="Segoe UI" panose="020B0502040204020203" pitchFamily="34" charset="0"/>
-                <a:cs typeface="Segoe UI" panose="020B0502040204020203" pitchFamily="34" charset="0"/>
-              </a:rPr>
-              <a:t> </a:t>
-            </a:r>
-            <a:r>
-              <a:rPr lang="en-US" sz="2400" dirty="0" err="1" smtClean="0">
-                <a:latin typeface="Segoe UI" panose="020B0502040204020203" pitchFamily="34" charset="0"/>
-                <a:cs typeface="Segoe UI" panose="020B0502040204020203" pitchFamily="34" charset="0"/>
-              </a:rPr>
-              <a:t>giá</a:t>
-            </a:r>
-            <a:r>
-              <a:rPr lang="en-US" sz="2400" dirty="0" smtClean="0">
-                <a:latin typeface="Segoe UI" panose="020B0502040204020203" pitchFamily="34" charset="0"/>
-                <a:cs typeface="Segoe UI" panose="020B0502040204020203" pitchFamily="34" charset="0"/>
-              </a:rPr>
-              <a:t> </a:t>
-            </a:r>
-            <a:r>
-              <a:rPr lang="en-US" sz="2400" dirty="0" err="1" smtClean="0">
-                <a:latin typeface="Segoe UI" panose="020B0502040204020203" pitchFamily="34" charset="0"/>
-                <a:cs typeface="Segoe UI" panose="020B0502040204020203" pitchFamily="34" charset="0"/>
-              </a:rPr>
-              <a:t>mô</a:t>
-            </a:r>
-            <a:r>
-              <a:rPr lang="en-US" sz="2400" dirty="0" smtClean="0">
-                <a:latin typeface="Segoe UI" panose="020B0502040204020203" pitchFamily="34" charset="0"/>
-                <a:cs typeface="Segoe UI" panose="020B0502040204020203" pitchFamily="34" charset="0"/>
-              </a:rPr>
-              <a:t> </a:t>
-            </a:r>
-            <a:r>
-              <a:rPr lang="en-US" sz="2400" dirty="0" err="1" smtClean="0">
-                <a:latin typeface="Segoe UI" panose="020B0502040204020203" pitchFamily="34" charset="0"/>
-                <a:cs typeface="Segoe UI" panose="020B0502040204020203" pitchFamily="34" charset="0"/>
-              </a:rPr>
-              <a:t>hình</a:t>
-            </a:r>
-            <a:r>
-              <a:rPr lang="en-US" sz="2400" dirty="0" smtClean="0">
-                <a:latin typeface="Segoe UI" panose="020B0502040204020203" pitchFamily="34" charset="0"/>
-                <a:cs typeface="Segoe UI" panose="020B0502040204020203" pitchFamily="34" charset="0"/>
-              </a:rPr>
-              <a:t> </a:t>
-            </a:r>
-          </a:p>
-          <a:p>
-            <a:pPr marL="0" indent="0">
-              <a:buNone/>
-            </a:pPr>
-            <a:r>
-              <a:rPr lang="en-US" sz="2400" dirty="0" smtClean="0">
-                <a:latin typeface="Segoe UI" panose="020B0502040204020203" pitchFamily="34" charset="0"/>
-                <a:cs typeface="Segoe UI" panose="020B0502040204020203" pitchFamily="34" charset="0"/>
-              </a:rPr>
-              <a:t>IV. 	</a:t>
-            </a:r>
-            <a:r>
-              <a:rPr lang="en-US" sz="2400" dirty="0" err="1" smtClean="0">
-                <a:latin typeface="Segoe UI" panose="020B0502040204020203" pitchFamily="34" charset="0"/>
-                <a:cs typeface="Segoe UI" panose="020B0502040204020203" pitchFamily="34" charset="0"/>
-              </a:rPr>
-              <a:t>Xây</a:t>
-            </a:r>
-            <a:r>
-              <a:rPr lang="en-US" sz="2400" dirty="0" smtClean="0">
-                <a:latin typeface="Segoe UI" panose="020B0502040204020203" pitchFamily="34" charset="0"/>
-                <a:cs typeface="Segoe UI" panose="020B0502040204020203" pitchFamily="34" charset="0"/>
-              </a:rPr>
-              <a:t> </a:t>
-            </a:r>
-            <a:r>
-              <a:rPr lang="en-US" sz="2400" dirty="0" err="1" smtClean="0">
-                <a:latin typeface="Segoe UI" panose="020B0502040204020203" pitchFamily="34" charset="0"/>
-                <a:cs typeface="Segoe UI" panose="020B0502040204020203" pitchFamily="34" charset="0"/>
-              </a:rPr>
-              <a:t>dựng</a:t>
-            </a:r>
-            <a:r>
-              <a:rPr lang="en-US" sz="2400" dirty="0" smtClean="0">
-                <a:latin typeface="Segoe UI" panose="020B0502040204020203" pitchFamily="34" charset="0"/>
-                <a:cs typeface="Segoe UI" panose="020B0502040204020203" pitchFamily="34" charset="0"/>
-              </a:rPr>
-              <a:t> </a:t>
-            </a:r>
-            <a:r>
-              <a:rPr lang="en-US" sz="2400" dirty="0" err="1" smtClean="0">
-                <a:latin typeface="Segoe UI" panose="020B0502040204020203" pitchFamily="34" charset="0"/>
-                <a:cs typeface="Segoe UI" panose="020B0502040204020203" pitchFamily="34" charset="0"/>
-              </a:rPr>
-              <a:t>ứng</a:t>
-            </a:r>
-            <a:r>
-              <a:rPr lang="en-US" sz="2400" dirty="0" smtClean="0">
-                <a:latin typeface="Segoe UI" panose="020B0502040204020203" pitchFamily="34" charset="0"/>
-                <a:cs typeface="Segoe UI" panose="020B0502040204020203" pitchFamily="34" charset="0"/>
-              </a:rPr>
-              <a:t> </a:t>
-            </a:r>
-            <a:r>
-              <a:rPr lang="en-US" sz="2400" dirty="0" err="1" smtClean="0">
-                <a:latin typeface="Segoe UI" panose="020B0502040204020203" pitchFamily="34" charset="0"/>
-                <a:cs typeface="Segoe UI" panose="020B0502040204020203" pitchFamily="34" charset="0"/>
-              </a:rPr>
-              <a:t>dụng</a:t>
-            </a:r>
-            <a:r>
-              <a:rPr lang="en-US" sz="2400" dirty="0" smtClean="0">
-                <a:latin typeface="Segoe UI" panose="020B0502040204020203" pitchFamily="34" charset="0"/>
-                <a:cs typeface="Segoe UI" panose="020B0502040204020203" pitchFamily="34" charset="0"/>
-              </a:rPr>
-              <a:t> </a:t>
-            </a:r>
-            <a:r>
-              <a:rPr lang="en-US" sz="2400" dirty="0" err="1" smtClean="0">
-                <a:latin typeface="Segoe UI" panose="020B0502040204020203" pitchFamily="34" charset="0"/>
-                <a:cs typeface="Segoe UI" panose="020B0502040204020203" pitchFamily="34" charset="0"/>
-              </a:rPr>
-              <a:t>dự</a:t>
-            </a:r>
-            <a:r>
-              <a:rPr lang="en-US" sz="2400" dirty="0" smtClean="0">
-                <a:latin typeface="Segoe UI" panose="020B0502040204020203" pitchFamily="34" charset="0"/>
-                <a:cs typeface="Segoe UI" panose="020B0502040204020203" pitchFamily="34" charset="0"/>
-              </a:rPr>
-              <a:t> </a:t>
-            </a:r>
-            <a:r>
-              <a:rPr lang="en-US" sz="2400" dirty="0" err="1" smtClean="0">
-                <a:latin typeface="Segoe UI" panose="020B0502040204020203" pitchFamily="34" charset="0"/>
-                <a:cs typeface="Segoe UI" panose="020B0502040204020203" pitchFamily="34" charset="0"/>
-              </a:rPr>
-              <a:t>báo</a:t>
             </a:r>
             <a:endParaRPr lang="en-US" sz="2400" dirty="0">
               <a:latin typeface="Segoe UI" panose="020B0502040204020203" pitchFamily="34" charset="0"/>
@@ -16526,18 +16091,25 @@
               <a:buAutoNum type="romanUcPeriod"/>
             </a:pPr>
             <a:r>
+              <a:rPr lang="en-US" sz="2400" dirty="0" err="1" smtClean="0">
+                <a:latin typeface="Segoe UI" panose="020B0502040204020203" pitchFamily="34" charset="0"/>
+                <a:cs typeface="Segoe UI" panose="020B0502040204020203" pitchFamily="34" charset="0"/>
+              </a:rPr>
+              <a:t>Trình</a:t>
+            </a:r>
+            <a:r>
               <a:rPr lang="en-US" sz="2400" dirty="0" smtClean="0">
                 <a:latin typeface="Segoe UI" panose="020B0502040204020203" pitchFamily="34" charset="0"/>
                 <a:cs typeface="Segoe UI" panose="020B0502040204020203" pitchFamily="34" charset="0"/>
               </a:rPr>
-              <a:t>Thu </a:t>
+              <a:t> </a:t>
             </a:r>
             <a:r>
               <a:rPr lang="en-US" sz="2400" dirty="0" err="1" smtClean="0">
                 <a:latin typeface="Segoe UI" panose="020B0502040204020203" pitchFamily="34" charset="0"/>
                 <a:cs typeface="Segoe UI" panose="020B0502040204020203" pitchFamily="34" charset="0"/>
               </a:rPr>
-              <a:t>thập</a:t>
+              <a:t>bày</a:t>
             </a:r>
             <a:r>
               <a:rPr lang="en-US" sz="2400" dirty="0" smtClean="0">
@@ -16551,7 +16123,7 @@
                 <a:latin typeface="Segoe UI" panose="020B0502040204020203" pitchFamily="34" charset="0"/>
                 <a:cs typeface="Segoe UI" panose="020B0502040204020203" pitchFamily="34" charset="0"/>
               </a:rPr>
-              <a:t>và</a:t>
+              <a:t>cách</a:t>
             </a:r>
             <a:r>
               <a:rPr lang="en-US" sz="2400" dirty="0" smtClean="0">
@@ -16565,7 +16137,7 @@
                 <a:latin typeface="Segoe UI" panose="020B0502040204020203" pitchFamily="34" charset="0"/>
                 <a:cs typeface="Segoe UI" panose="020B0502040204020203" pitchFamily="34" charset="0"/>
               </a:rPr>
-              <a:t>xử</a:t>
+              <a:t>làm</a:t>
             </a:r>
             <a:r>
               <a:rPr lang="en-US" sz="2400" dirty="0" smtClean="0">
@@ -16579,7 +16151,7 @@
                 <a:latin typeface="Segoe UI" panose="020B0502040204020203" pitchFamily="34" charset="0"/>
                 <a:cs typeface="Segoe UI" panose="020B0502040204020203" pitchFamily="34" charset="0"/>
               </a:rPr>
-              <a:t>lý</a:t>
+              <a:t>tối</a:t>
             </a:r>
             <a:r>
               <a:rPr lang="en-US" sz="2400" dirty="0" smtClean="0">
@@ -16593,7 +16165,7 @@
                 <a:latin typeface="Segoe UI" panose="020B0502040204020203" pitchFamily="34" charset="0"/>
                 <a:cs typeface="Segoe UI" panose="020B0502040204020203" pitchFamily="34" charset="0"/>
               </a:rPr>
-              <a:t>dữ</a:t>
+              <a:t>khởi</a:t>
             </a:r>
             <a:r>
               <a:rPr lang="en-US" sz="2400" dirty="0" smtClean="0">
@@ -16607,349 +16179,352 @@
                 <a:latin typeface="Segoe UI" panose="020B0502040204020203" pitchFamily="34" charset="0"/>
                 <a:cs typeface="Segoe UI" panose="020B0502040204020203" pitchFamily="34" charset="0"/>
               </a:rPr>
-              <a:t>liệu</a:t>
+              <a:t>tạo</a:t>
+            </a:r>
+            <a:r>
+              <a:rPr lang="en-US" sz="2400" dirty="0" smtClean="0">
+                <a:latin typeface="Segoe UI" panose="020B0502040204020203" pitchFamily="34" charset="0"/>
+                <a:cs typeface="Segoe UI" panose="020B0502040204020203" pitchFamily="34" charset="0"/>
+              </a:rPr>
+              <a:t> </a:t>
+            </a:r>
+            <a:r>
+              <a:rPr lang="en-US" sz="2400" dirty="0" err="1" smtClean="0">
+                <a:latin typeface="Segoe UI" panose="020B0502040204020203" pitchFamily="34" charset="0"/>
+                <a:cs typeface="Segoe UI" panose="020B0502040204020203" pitchFamily="34" charset="0"/>
+              </a:rPr>
+              <a:t>tham</a:t>
+            </a:r>
+            <a:r>
+              <a:rPr lang="en-US" sz="2400" dirty="0" smtClean="0">
+                <a:latin typeface="Segoe UI" panose="020B0502040204020203" pitchFamily="34" charset="0"/>
+                <a:cs typeface="Segoe UI" panose="020B0502040204020203" pitchFamily="34" charset="0"/>
+              </a:rPr>
+              <a:t> </a:t>
+            </a:r>
+            <a:r>
+              <a:rPr lang="en-US" sz="2400" dirty="0" err="1" smtClean="0">
+                <a:latin typeface="Segoe UI" panose="020B0502040204020203" pitchFamily="34" charset="0"/>
+                <a:cs typeface="Segoe UI" panose="020B0502040204020203" pitchFamily="34" charset="0"/>
+              </a:rPr>
+              <a:t>số</a:t>
+            </a:r>
+            <a:r>
+              <a:rPr lang="en-US" sz="2400" dirty="0" smtClean="0">
+                <a:latin typeface="Segoe UI" panose="020B0502040204020203" pitchFamily="34" charset="0"/>
+                <a:cs typeface="Segoe UI" panose="020B0502040204020203" pitchFamily="34" charset="0"/>
+              </a:rPr>
+              <a:t> </a:t>
+            </a:r>
+            <a:r>
+              <a:rPr lang="en-US" sz="2400" dirty="0" err="1" smtClean="0">
+                <a:latin typeface="Segoe UI" panose="020B0502040204020203" pitchFamily="34" charset="0"/>
+                <a:cs typeface="Segoe UI" panose="020B0502040204020203" pitchFamily="34" charset="0"/>
+              </a:rPr>
+              <a:t>chọn</a:t>
+            </a:r>
+            <a:r>
+              <a:rPr lang="en-US" sz="2400" dirty="0" smtClean="0">
+                <a:latin typeface="Segoe UI" panose="020B0502040204020203" pitchFamily="34" charset="0"/>
+                <a:cs typeface="Segoe UI" panose="020B0502040204020203" pitchFamily="34" charset="0"/>
+              </a:rPr>
+              <a:t> </a:t>
+            </a:r>
+            <a:r>
+              <a:rPr lang="en-US" sz="2400" dirty="0" err="1" smtClean="0">
+                <a:latin typeface="Segoe UI" panose="020B0502040204020203" pitchFamily="34" charset="0"/>
+                <a:cs typeface="Segoe UI" panose="020B0502040204020203" pitchFamily="34" charset="0"/>
+              </a:rPr>
+              <a:t>phương</a:t>
+            </a:r>
+            <a:r>
+              <a:rPr lang="en-US" sz="2400" dirty="0" smtClean="0">
+                <a:latin typeface="Segoe UI" panose="020B0502040204020203" pitchFamily="34" charset="0"/>
+                <a:cs typeface="Segoe UI" panose="020B0502040204020203" pitchFamily="34" charset="0"/>
+              </a:rPr>
+              <a:t> </a:t>
+            </a:r>
+            <a:r>
+              <a:rPr lang="en-US" sz="2400" dirty="0" err="1" smtClean="0">
+                <a:latin typeface="Segoe UI" panose="020B0502040204020203" pitchFamily="34" charset="0"/>
+                <a:cs typeface="Segoe UI" panose="020B0502040204020203" pitchFamily="34" charset="0"/>
+              </a:rPr>
+              <a:t>pháp</a:t>
+            </a:r>
+            <a:r>
+              <a:rPr lang="en-US" sz="2400" dirty="0" smtClean="0">
+                <a:latin typeface="Segoe UI" panose="020B0502040204020203" pitchFamily="34" charset="0"/>
+                <a:cs typeface="Segoe UI" panose="020B0502040204020203" pitchFamily="34" charset="0"/>
+              </a:rPr>
+              <a:t> </a:t>
+            </a:r>
+            <a:r>
+              <a:rPr lang="en-US" sz="2400" dirty="0" err="1" smtClean="0">
+                <a:latin typeface="Segoe UI" panose="020B0502040204020203" pitchFamily="34" charset="0"/>
+                <a:cs typeface="Segoe UI" panose="020B0502040204020203" pitchFamily="34" charset="0"/>
+              </a:rPr>
+              <a:t>tối</a:t>
+            </a:r>
+            <a:r>
+              <a:rPr lang="en-US" sz="2400" dirty="0" smtClean="0">
+                <a:latin typeface="Segoe UI" panose="020B0502040204020203" pitchFamily="34" charset="0"/>
+                <a:cs typeface="Segoe UI" panose="020B0502040204020203" pitchFamily="34" charset="0"/>
+              </a:rPr>
+              <a:t> </a:t>
+            </a:r>
+            <a:r>
+              <a:rPr lang="en-US" sz="2400" dirty="0" err="1" smtClean="0">
+                <a:latin typeface="Segoe UI" panose="020B0502040204020203" pitchFamily="34" charset="0"/>
+                <a:cs typeface="Segoe UI" panose="020B0502040204020203" pitchFamily="34" charset="0"/>
+              </a:rPr>
+              <a:t>ưu</a:t>
+            </a:r>
+            <a:r>
+              <a:rPr lang="en-US" sz="2400" dirty="0" smtClean="0">
+                <a:latin typeface="Segoe UI" panose="020B0502040204020203" pitchFamily="34" charset="0"/>
+                <a:cs typeface="Segoe UI" panose="020B0502040204020203" pitchFamily="34" charset="0"/>
+              </a:rPr>
+              <a:t> </a:t>
+            </a:r>
+            <a:r>
+              <a:rPr lang="en-US" sz="2400" dirty="0" err="1" smtClean="0">
+                <a:latin typeface="Segoe UI" panose="020B0502040204020203" pitchFamily="34" charset="0"/>
+                <a:cs typeface="Segoe UI" panose="020B0502040204020203" pitchFamily="34" charset="0"/>
+              </a:rPr>
+              <a:t>adam</a:t>
+            </a:r>
+            <a:r>
+              <a:rPr lang="en-US" sz="2400" dirty="0" smtClean="0">
+                <a:latin typeface="Segoe UI" panose="020B0502040204020203" pitchFamily="34" charset="0"/>
+                <a:cs typeface="Segoe UI" panose="020B0502040204020203" pitchFamily="34" charset="0"/>
+              </a:rPr>
+              <a:t> , </a:t>
+            </a:r>
+            <a:r>
+              <a:rPr lang="en-US" sz="2400" dirty="0" err="1" smtClean="0">
+                <a:latin typeface="Segoe UI" panose="020B0502040204020203" pitchFamily="34" charset="0"/>
+                <a:cs typeface="Segoe UI" panose="020B0502040204020203" pitchFamily="34" charset="0"/>
+              </a:rPr>
+              <a:t>sgd</a:t>
+            </a:r>
+            <a:r>
+              <a:rPr lang="en-US" sz="2400" dirty="0" smtClean="0">
+                <a:latin typeface="Segoe UI" panose="020B0502040204020203" pitchFamily="34" charset="0"/>
+                <a:cs typeface="Segoe UI" panose="020B0502040204020203" pitchFamily="34" charset="0"/>
+              </a:rPr>
+              <a:t> + </a:t>
+            </a:r>
+            <a:r>
+              <a:rPr lang="en-US" sz="2400" dirty="0" err="1" smtClean="0">
+                <a:latin typeface="Segoe UI" panose="020B0502040204020203" pitchFamily="34" charset="0"/>
+                <a:cs typeface="Segoe UI" panose="020B0502040204020203" pitchFamily="34" charset="0"/>
+              </a:rPr>
+              <a:t>đánh</a:t>
+            </a:r>
+            <a:r>
+              <a:rPr lang="en-US" sz="2400" dirty="0" smtClean="0">
+                <a:latin typeface="Segoe UI" panose="020B0502040204020203" pitchFamily="34" charset="0"/>
+                <a:cs typeface="Segoe UI" panose="020B0502040204020203" pitchFamily="34" charset="0"/>
+              </a:rPr>
+              <a:t> </a:t>
+            </a:r>
+            <a:r>
+              <a:rPr lang="en-US" sz="2400" dirty="0" err="1" smtClean="0">
+                <a:latin typeface="Segoe UI" panose="020B0502040204020203" pitchFamily="34" charset="0"/>
+                <a:cs typeface="Segoe UI" panose="020B0502040204020203" pitchFamily="34" charset="0"/>
+              </a:rPr>
+              <a:t>giá</a:t>
+            </a:r>
+            <a:r>
+              <a:rPr lang="en-US" sz="2400" dirty="0" smtClean="0">
+                <a:latin typeface="Segoe UI" panose="020B0502040204020203" pitchFamily="34" charset="0"/>
+                <a:cs typeface="Segoe UI" panose="020B0502040204020203" pitchFamily="34" charset="0"/>
+              </a:rPr>
+              <a:t> </a:t>
+            </a:r>
+            <a:r>
+              <a:rPr lang="en-US" sz="2400" dirty="0" err="1" smtClean="0">
+                <a:latin typeface="Segoe UI" panose="020B0502040204020203" pitchFamily="34" charset="0"/>
+                <a:cs typeface="Segoe UI" panose="020B0502040204020203" pitchFamily="34" charset="0"/>
+              </a:rPr>
+              <a:t>mô</a:t>
+            </a:r>
+            <a:r>
+              <a:rPr lang="en-US" sz="2400" dirty="0" smtClean="0">
+                <a:latin typeface="Segoe UI" panose="020B0502040204020203" pitchFamily="34" charset="0"/>
+                <a:cs typeface="Segoe UI" panose="020B0502040204020203" pitchFamily="34" charset="0"/>
+              </a:rPr>
+              <a:t> </a:t>
+            </a:r>
+            <a:r>
+              <a:rPr lang="en-US" sz="2400" dirty="0" err="1" smtClean="0">
+                <a:latin typeface="Segoe UI" panose="020B0502040204020203" pitchFamily="34" charset="0"/>
+                <a:cs typeface="Segoe UI" panose="020B0502040204020203" pitchFamily="34" charset="0"/>
+              </a:rPr>
+              <a:t>hình</a:t>
+            </a:r>
+            <a:r>
+              <a:rPr lang="en-US" sz="2400" dirty="0" smtClean="0">
+                <a:latin typeface="Segoe UI" panose="020B0502040204020203" pitchFamily="34" charset="0"/>
+                <a:cs typeface="Segoe UI" panose="020B0502040204020203" pitchFamily="34" charset="0"/>
+              </a:rPr>
+              <a:t> </a:t>
+            </a:r>
+            <a:r>
+              <a:rPr lang="en-US" sz="2400" dirty="0" err="1" smtClean="0">
+                <a:latin typeface="Segoe UI" panose="020B0502040204020203" pitchFamily="34" charset="0"/>
+                <a:cs typeface="Segoe UI" panose="020B0502040204020203" pitchFamily="34" charset="0"/>
+              </a:rPr>
+              <a:t>với</a:t>
+            </a:r>
+            <a:r>
+              <a:rPr lang="en-US" sz="2400" dirty="0" smtClean="0">
+                <a:latin typeface="Segoe UI" panose="020B0502040204020203" pitchFamily="34" charset="0"/>
+                <a:cs typeface="Segoe UI" panose="020B0502040204020203" pitchFamily="34" charset="0"/>
+              </a:rPr>
+              <a:t> </a:t>
+            </a:r>
+            <a:r>
+              <a:rPr lang="en-US" sz="2400" dirty="0" err="1" smtClean="0">
+                <a:latin typeface="Segoe UI" panose="020B0502040204020203" pitchFamily="34" charset="0"/>
+                <a:cs typeface="Segoe UI" panose="020B0502040204020203" pitchFamily="34" charset="0"/>
+              </a:rPr>
+              <a:t>các</a:t>
+            </a:r>
+            <a:r>
+              <a:rPr lang="en-US" sz="2400" dirty="0" smtClean="0">
+                <a:latin typeface="Segoe UI" panose="020B0502040204020203" pitchFamily="34" charset="0"/>
+                <a:cs typeface="Segoe UI" panose="020B0502040204020203" pitchFamily="34" charset="0"/>
+              </a:rPr>
+              <a:t> </a:t>
+            </a:r>
+            <a:r>
+              <a:rPr lang="en-US" sz="2400" dirty="0" err="1" smtClean="0">
+                <a:latin typeface="Segoe UI" panose="020B0502040204020203" pitchFamily="34" charset="0"/>
+                <a:cs typeface="Segoe UI" panose="020B0502040204020203" pitchFamily="34" charset="0"/>
+              </a:rPr>
+              <a:t>mô</a:t>
+            </a:r>
+            <a:r>
+              <a:rPr lang="en-US" sz="2400" dirty="0" smtClean="0">
+                <a:latin typeface="Segoe UI" panose="020B0502040204020203" pitchFamily="34" charset="0"/>
+                <a:cs typeface="Segoe UI" panose="020B0502040204020203" pitchFamily="34" charset="0"/>
+              </a:rPr>
+              <a:t> </a:t>
+            </a:r>
+            <a:r>
+              <a:rPr lang="en-US" sz="2400" dirty="0" err="1" smtClean="0">
+                <a:latin typeface="Segoe UI" panose="020B0502040204020203" pitchFamily="34" charset="0"/>
+                <a:cs typeface="Segoe UI" panose="020B0502040204020203" pitchFamily="34" charset="0"/>
+              </a:rPr>
+              <a:t>hình</a:t>
+            </a:r>
+            <a:r>
+              <a:rPr lang="en-US" sz="2400" dirty="0" smtClean="0">
+                <a:latin typeface="Segoe UI" panose="020B0502040204020203" pitchFamily="34" charset="0"/>
+                <a:cs typeface="Segoe UI" panose="020B0502040204020203" pitchFamily="34" charset="0"/>
+              </a:rPr>
+              <a:t> </a:t>
+            </a:r>
+            <a:r>
+              <a:rPr lang="en-US" sz="2400" dirty="0" err="1" smtClean="0">
+                <a:latin typeface="Segoe UI" panose="020B0502040204020203" pitchFamily="34" charset="0"/>
+                <a:cs typeface="Segoe UI" panose="020B0502040204020203" pitchFamily="34" charset="0"/>
+              </a:rPr>
+              <a:t>truyền</a:t>
+            </a:r>
+            <a:r>
+              <a:rPr lang="en-US" sz="2400" dirty="0" smtClean="0">
+                <a:latin typeface="Segoe UI" panose="020B0502040204020203" pitchFamily="34" charset="0"/>
+                <a:cs typeface="Segoe UI" panose="020B0502040204020203" pitchFamily="34" charset="0"/>
+              </a:rPr>
+              <a:t> </a:t>
+            </a:r>
+            <a:r>
+              <a:rPr lang="en-US" sz="2400" dirty="0" err="1" smtClean="0">
+                <a:latin typeface="Segoe UI" panose="020B0502040204020203" pitchFamily="34" charset="0"/>
+                <a:cs typeface="Segoe UI" panose="020B0502040204020203" pitchFamily="34" charset="0"/>
+              </a:rPr>
+              <a:t>thống</a:t>
+            </a:r>
+            <a:r>
+              <a:rPr lang="en-US" sz="2400" dirty="0" smtClean="0">
+                <a:latin typeface="Segoe UI" panose="020B0502040204020203" pitchFamily="34" charset="0"/>
+                <a:cs typeface="Segoe UI" panose="020B0502040204020203" pitchFamily="34" charset="0"/>
+              </a:rPr>
+              <a:t> + </a:t>
+            </a:r>
+            <a:r>
+              <a:rPr lang="en-US" sz="2400" dirty="0" err="1" smtClean="0">
+                <a:latin typeface="Segoe UI" panose="020B0502040204020203" pitchFamily="34" charset="0"/>
+                <a:cs typeface="Segoe UI" panose="020B0502040204020203" pitchFamily="34" charset="0"/>
+              </a:rPr>
+              <a:t>chọn</a:t>
+            </a:r>
+            <a:r>
+              <a:rPr lang="en-US" sz="2400" dirty="0" smtClean="0">
+                <a:latin typeface="Segoe UI" panose="020B0502040204020203" pitchFamily="34" charset="0"/>
+                <a:cs typeface="Segoe UI" panose="020B0502040204020203" pitchFamily="34" charset="0"/>
+              </a:rPr>
+              <a:t> </a:t>
+            </a:r>
+            <a:r>
+              <a:rPr lang="en-US" sz="2400" dirty="0" err="1" smtClean="0">
+                <a:latin typeface="Segoe UI" panose="020B0502040204020203" pitchFamily="34" charset="0"/>
+                <a:cs typeface="Segoe UI" panose="020B0502040204020203" pitchFamily="34" charset="0"/>
+              </a:rPr>
+              <a:t>phương</a:t>
+            </a:r>
+            <a:r>
+              <a:rPr lang="en-US" sz="2400" dirty="0" smtClean="0">
+                <a:latin typeface="Segoe UI" panose="020B0502040204020203" pitchFamily="34" charset="0"/>
+                <a:cs typeface="Segoe UI" panose="020B0502040204020203" pitchFamily="34" charset="0"/>
+              </a:rPr>
+              <a:t> </a:t>
+            </a:r>
+            <a:r>
+              <a:rPr lang="en-US" sz="2400" dirty="0" err="1" smtClean="0">
+                <a:latin typeface="Segoe UI" panose="020B0502040204020203" pitchFamily="34" charset="0"/>
+                <a:cs typeface="Segoe UI" panose="020B0502040204020203" pitchFamily="34" charset="0"/>
+              </a:rPr>
+              <a:t>pháp</a:t>
+            </a:r>
+            <a:r>
+              <a:rPr lang="en-US" sz="2400" dirty="0" smtClean="0">
+                <a:latin typeface="Segoe UI" panose="020B0502040204020203" pitchFamily="34" charset="0"/>
+                <a:cs typeface="Segoe UI" panose="020B0502040204020203" pitchFamily="34" charset="0"/>
+              </a:rPr>
+              <a:t> </a:t>
+            </a:r>
+            <a:r>
+              <a:rPr lang="en-US" sz="2400" dirty="0" err="1" smtClean="0">
+                <a:latin typeface="Segoe UI" panose="020B0502040204020203" pitchFamily="34" charset="0"/>
+                <a:cs typeface="Segoe UI" panose="020B0502040204020203" pitchFamily="34" charset="0"/>
+              </a:rPr>
+              <a:t>đánh</a:t>
+            </a:r>
+            <a:r>
+              <a:rPr lang="en-US" sz="2400" dirty="0" smtClean="0">
+                <a:latin typeface="Segoe UI" panose="020B0502040204020203" pitchFamily="34" charset="0"/>
+                <a:cs typeface="Segoe UI" panose="020B0502040204020203" pitchFamily="34" charset="0"/>
+              </a:rPr>
+              <a:t> </a:t>
+            </a:r>
+            <a:r>
+              <a:rPr lang="en-US" sz="2400" dirty="0" err="1" smtClean="0">
+                <a:latin typeface="Segoe UI" panose="020B0502040204020203" pitchFamily="34" charset="0"/>
+                <a:cs typeface="Segoe UI" panose="020B0502040204020203" pitchFamily="34" charset="0"/>
+              </a:rPr>
+              <a:t>giá</a:t>
+            </a:r>
+            <a:r>
+              <a:rPr lang="en-US" sz="2400" dirty="0" smtClean="0">
+                <a:latin typeface="Segoe UI" panose="020B0502040204020203" pitchFamily="34" charset="0"/>
+                <a:cs typeface="Segoe UI" panose="020B0502040204020203" pitchFamily="34" charset="0"/>
+              </a:rPr>
+              <a:t> </a:t>
             </a:r>
             <a:endParaRPr lang="en-US" sz="2400" dirty="0" smtClean="0">
-              <a:latin typeface="Segoe UI" panose="020B0502040204020203" pitchFamily="34" charset="0"/>
-              <a:cs typeface="Segoe UI" panose="020B0502040204020203" pitchFamily="34" charset="0"/>
-            </a:endParaRPr>
-          </a:p>
-          <a:p>
-            <a:pPr marL="514350" indent="-514350">
-              <a:buClr>
-                <a:schemeClr val="tx1"/>
-              </a:buClr>
-              <a:buSzPct val="85000"/>
-              <a:buFont typeface="+mj-lt"/>
-              <a:buAutoNum type="romanUcPeriod"/>
-            </a:pPr>
-            <a:r>
-              <a:rPr lang="en-US" sz="2400" dirty="0" err="1" smtClean="0">
-                <a:latin typeface="Segoe UI" panose="020B0502040204020203" pitchFamily="34" charset="0"/>
-                <a:cs typeface="Segoe UI" panose="020B0502040204020203" pitchFamily="34" charset="0"/>
-              </a:rPr>
-              <a:t>Xây</a:t>
-            </a:r>
-            <a:r>
-              <a:rPr lang="en-US" sz="2400" dirty="0" smtClean="0">
-                <a:latin typeface="Segoe UI" panose="020B0502040204020203" pitchFamily="34" charset="0"/>
-                <a:cs typeface="Segoe UI" panose="020B0502040204020203" pitchFamily="34" charset="0"/>
-              </a:rPr>
-              <a:t> </a:t>
-            </a:r>
-            <a:r>
-              <a:rPr lang="en-US" sz="2400" dirty="0" err="1" smtClean="0">
-                <a:latin typeface="Segoe UI" panose="020B0502040204020203" pitchFamily="34" charset="0"/>
-                <a:cs typeface="Segoe UI" panose="020B0502040204020203" pitchFamily="34" charset="0"/>
-              </a:rPr>
-              <a:t>dựng</a:t>
-            </a:r>
-            <a:r>
-              <a:rPr lang="en-US" sz="2400" dirty="0" smtClean="0">
-                <a:latin typeface="Segoe UI" panose="020B0502040204020203" pitchFamily="34" charset="0"/>
-                <a:cs typeface="Segoe UI" panose="020B0502040204020203" pitchFamily="34" charset="0"/>
-              </a:rPr>
-              <a:t> </a:t>
-            </a:r>
-            <a:r>
-              <a:rPr lang="en-US" sz="2400" dirty="0" err="1" smtClean="0">
-                <a:latin typeface="Segoe UI" panose="020B0502040204020203" pitchFamily="34" charset="0"/>
-                <a:cs typeface="Segoe UI" panose="020B0502040204020203" pitchFamily="34" charset="0"/>
-              </a:rPr>
-              <a:t>mô</a:t>
-            </a:r>
-            <a:r>
-              <a:rPr lang="en-US" sz="2400" dirty="0" smtClean="0">
-                <a:latin typeface="Segoe UI" panose="020B0502040204020203" pitchFamily="34" charset="0"/>
-                <a:cs typeface="Segoe UI" panose="020B0502040204020203" pitchFamily="34" charset="0"/>
-              </a:rPr>
-              <a:t> </a:t>
-            </a:r>
-            <a:r>
-              <a:rPr lang="en-US" sz="2400" dirty="0" err="1" smtClean="0">
-                <a:latin typeface="Segoe UI" panose="020B0502040204020203" pitchFamily="34" charset="0"/>
-                <a:cs typeface="Segoe UI" panose="020B0502040204020203" pitchFamily="34" charset="0"/>
-              </a:rPr>
-              <a:t>hình</a:t>
-            </a:r>
-            <a:r>
-              <a:rPr lang="en-US" sz="2400" dirty="0" smtClean="0">
-                <a:latin typeface="Segoe UI" panose="020B0502040204020203" pitchFamily="34" charset="0"/>
-                <a:cs typeface="Segoe UI" panose="020B0502040204020203" pitchFamily="34" charset="0"/>
-              </a:rPr>
-              <a:t> </a:t>
-            </a:r>
-            <a:r>
-              <a:rPr lang="en-US" sz="2400" dirty="0" err="1" smtClean="0">
-                <a:latin typeface="Segoe UI" panose="020B0502040204020203" pitchFamily="34" charset="0"/>
-                <a:cs typeface="Segoe UI" panose="020B0502040204020203" pitchFamily="34" charset="0"/>
-              </a:rPr>
-              <a:t>học</a:t>
-            </a:r>
-            <a:r>
-              <a:rPr lang="en-US" sz="2400" dirty="0" smtClean="0">
-                <a:latin typeface="Segoe UI" panose="020B0502040204020203" pitchFamily="34" charset="0"/>
-                <a:cs typeface="Segoe UI" panose="020B0502040204020203" pitchFamily="34" charset="0"/>
-              </a:rPr>
-              <a:t> </a:t>
-            </a:r>
-            <a:r>
-              <a:rPr lang="en-US" sz="2400" dirty="0" err="1" smtClean="0">
-                <a:latin typeface="Segoe UI" panose="020B0502040204020203" pitchFamily="34" charset="0"/>
-                <a:cs typeface="Segoe UI" panose="020B0502040204020203" pitchFamily="34" charset="0"/>
-              </a:rPr>
-              <a:t>sâu</a:t>
-            </a:r>
-            <a:r>
-              <a:rPr lang="en-US" sz="2400" dirty="0" smtClean="0">
-                <a:latin typeface="Segoe UI" panose="020B0502040204020203" pitchFamily="34" charset="0"/>
-                <a:cs typeface="Segoe UI" panose="020B0502040204020203" pitchFamily="34" charset="0"/>
-              </a:rPr>
-              <a:t> </a:t>
-            </a:r>
-            <a:r>
-              <a:rPr lang="en-US" sz="2400" dirty="0" err="1" smtClean="0">
-                <a:latin typeface="Segoe UI" panose="020B0502040204020203" pitchFamily="34" charset="0"/>
-                <a:cs typeface="Segoe UI" panose="020B0502040204020203" pitchFamily="34" charset="0"/>
-              </a:rPr>
-              <a:t>cho</a:t>
-            </a:r>
-            <a:r>
-              <a:rPr lang="en-US" sz="2400" dirty="0" smtClean="0">
-                <a:latin typeface="Segoe UI" panose="020B0502040204020203" pitchFamily="34" charset="0"/>
-                <a:cs typeface="Segoe UI" panose="020B0502040204020203" pitchFamily="34" charset="0"/>
-              </a:rPr>
-              <a:t> </a:t>
-            </a:r>
-            <a:r>
-              <a:rPr lang="en-US" sz="2400" dirty="0" err="1" smtClean="0">
-                <a:latin typeface="Segoe UI" panose="020B0502040204020203" pitchFamily="34" charset="0"/>
-                <a:cs typeface="Segoe UI" panose="020B0502040204020203" pitchFamily="34" charset="0"/>
-              </a:rPr>
-              <a:t>bài</a:t>
-            </a:r>
-            <a:r>
-              <a:rPr lang="en-US" sz="2400" dirty="0" smtClean="0">
-                <a:latin typeface="Segoe UI" panose="020B0502040204020203" pitchFamily="34" charset="0"/>
-                <a:cs typeface="Segoe UI" panose="020B0502040204020203" pitchFamily="34" charset="0"/>
-              </a:rPr>
-              <a:t> </a:t>
-            </a:r>
-            <a:r>
-              <a:rPr lang="en-US" sz="2400" dirty="0" err="1" smtClean="0">
-                <a:latin typeface="Segoe UI" panose="020B0502040204020203" pitchFamily="34" charset="0"/>
-                <a:cs typeface="Segoe UI" panose="020B0502040204020203" pitchFamily="34" charset="0"/>
-              </a:rPr>
-              <a:t>toán</a:t>
-            </a:r>
-            <a:endParaRPr lang="en-US" sz="2400" dirty="0" smtClean="0">
-              <a:latin typeface="Segoe UI" panose="020B0502040204020203" pitchFamily="34" charset="0"/>
-              <a:cs typeface="Segoe UI" panose="020B0502040204020203" pitchFamily="34" charset="0"/>
-            </a:endParaRPr>
-          </a:p>
-          <a:p>
-            <a:pPr marL="0" indent="0">
-              <a:buClr>
-                <a:schemeClr val="tx1"/>
-              </a:buClr>
-              <a:buSzPct val="85000"/>
-              <a:buNone/>
-            </a:pPr>
-            <a:r>
-              <a:rPr lang="en-US" sz="2400" dirty="0" smtClean="0">
-                <a:latin typeface="Segoe UI" panose="020B0502040204020203" pitchFamily="34" charset="0"/>
-                <a:cs typeface="Segoe UI" panose="020B0502040204020203" pitchFamily="34" charset="0"/>
-              </a:rPr>
-              <a:t>III. 	</a:t>
-            </a:r>
-            <a:r>
-              <a:rPr lang="en-US" sz="2400" dirty="0" err="1" smtClean="0">
-                <a:latin typeface="Segoe UI" panose="020B0502040204020203" pitchFamily="34" charset="0"/>
-                <a:cs typeface="Segoe UI" panose="020B0502040204020203" pitchFamily="34" charset="0"/>
-              </a:rPr>
-              <a:t>Tối</a:t>
-            </a:r>
-            <a:r>
-              <a:rPr lang="en-US" sz="2400" dirty="0" smtClean="0">
-                <a:latin typeface="Segoe UI" panose="020B0502040204020203" pitchFamily="34" charset="0"/>
-                <a:cs typeface="Segoe UI" panose="020B0502040204020203" pitchFamily="34" charset="0"/>
-              </a:rPr>
-              <a:t> </a:t>
-            </a:r>
-            <a:r>
-              <a:rPr lang="en-US" sz="2400" dirty="0" err="1" smtClean="0">
-                <a:latin typeface="Segoe UI" panose="020B0502040204020203" pitchFamily="34" charset="0"/>
-                <a:cs typeface="Segoe UI" panose="020B0502040204020203" pitchFamily="34" charset="0"/>
-              </a:rPr>
-              <a:t>ưu</a:t>
-            </a:r>
-            <a:r>
-              <a:rPr lang="en-US" sz="2400" dirty="0" smtClean="0">
-                <a:latin typeface="Segoe UI" panose="020B0502040204020203" pitchFamily="34" charset="0"/>
-                <a:cs typeface="Segoe UI" panose="020B0502040204020203" pitchFamily="34" charset="0"/>
-              </a:rPr>
-              <a:t> </a:t>
-            </a:r>
-            <a:r>
-              <a:rPr lang="en-US" sz="2400" dirty="0" err="1" smtClean="0">
-                <a:latin typeface="Segoe UI" panose="020B0502040204020203" pitchFamily="34" charset="0"/>
-                <a:cs typeface="Segoe UI" panose="020B0502040204020203" pitchFamily="34" charset="0"/>
-              </a:rPr>
-              <a:t>và</a:t>
-            </a:r>
-            <a:r>
-              <a:rPr lang="en-US" sz="2400" dirty="0" smtClean="0">
-                <a:latin typeface="Segoe UI" panose="020B0502040204020203" pitchFamily="34" charset="0"/>
-                <a:cs typeface="Segoe UI" panose="020B0502040204020203" pitchFamily="34" charset="0"/>
-              </a:rPr>
-              <a:t> </a:t>
-            </a:r>
-            <a:r>
-              <a:rPr lang="en-US" sz="2400" dirty="0" err="1" smtClean="0">
-                <a:latin typeface="Segoe UI" panose="020B0502040204020203" pitchFamily="34" charset="0"/>
-                <a:cs typeface="Segoe UI" panose="020B0502040204020203" pitchFamily="34" charset="0"/>
-              </a:rPr>
-              <a:t>đánh</a:t>
-            </a:r>
-            <a:r>
-              <a:rPr lang="en-US" sz="2400" dirty="0" smtClean="0">
-                <a:latin typeface="Segoe UI" panose="020B0502040204020203" pitchFamily="34" charset="0"/>
-                <a:cs typeface="Segoe UI" panose="020B0502040204020203" pitchFamily="34" charset="0"/>
-              </a:rPr>
-              <a:t> </a:t>
-            </a:r>
-            <a:r>
-              <a:rPr lang="en-US" sz="2400" dirty="0" err="1" smtClean="0">
-                <a:latin typeface="Segoe UI" panose="020B0502040204020203" pitchFamily="34" charset="0"/>
-                <a:cs typeface="Segoe UI" panose="020B0502040204020203" pitchFamily="34" charset="0"/>
-              </a:rPr>
-              <a:t>giá</a:t>
-            </a:r>
-            <a:r>
-              <a:rPr lang="en-US" sz="2400" dirty="0" smtClean="0">
-                <a:latin typeface="Segoe UI" panose="020B0502040204020203" pitchFamily="34" charset="0"/>
-                <a:cs typeface="Segoe UI" panose="020B0502040204020203" pitchFamily="34" charset="0"/>
-              </a:rPr>
-              <a:t> </a:t>
-            </a:r>
-            <a:r>
-              <a:rPr lang="en-US" sz="2400" dirty="0" err="1" smtClean="0">
-                <a:latin typeface="Segoe UI" panose="020B0502040204020203" pitchFamily="34" charset="0"/>
-                <a:cs typeface="Segoe UI" panose="020B0502040204020203" pitchFamily="34" charset="0"/>
-              </a:rPr>
-              <a:t>mô</a:t>
-            </a:r>
-            <a:r>
-              <a:rPr lang="en-US" sz="2400" dirty="0" smtClean="0">
-                <a:latin typeface="Segoe UI" panose="020B0502040204020203" pitchFamily="34" charset="0"/>
-                <a:cs typeface="Segoe UI" panose="020B0502040204020203" pitchFamily="34" charset="0"/>
-              </a:rPr>
-              <a:t> </a:t>
-            </a:r>
-            <a:r>
-              <a:rPr lang="en-US" sz="2400" dirty="0" err="1" smtClean="0">
-                <a:latin typeface="Segoe UI" panose="020B0502040204020203" pitchFamily="34" charset="0"/>
-                <a:cs typeface="Segoe UI" panose="020B0502040204020203" pitchFamily="34" charset="0"/>
-              </a:rPr>
-              <a:t>hình</a:t>
-            </a:r>
-            <a:r>
-              <a:rPr lang="en-US" sz="2400" dirty="0" smtClean="0">
-                <a:latin typeface="Segoe UI" panose="020B0502040204020203" pitchFamily="34" charset="0"/>
-                <a:cs typeface="Segoe UI" panose="020B0502040204020203" pitchFamily="34" charset="0"/>
-              </a:rPr>
-              <a:t> </a:t>
-            </a:r>
-          </a:p>
-          <a:p>
-            <a:pPr marL="0" indent="0">
-              <a:buNone/>
-            </a:pPr>
-            <a:r>
-              <a:rPr lang="en-US" sz="2400" dirty="0" smtClean="0">
-                <a:latin typeface="Segoe UI" panose="020B0502040204020203" pitchFamily="34" charset="0"/>
-                <a:cs typeface="Segoe UI" panose="020B0502040204020203" pitchFamily="34" charset="0"/>
-              </a:rPr>
-              <a:t>IV. 	</a:t>
-            </a:r>
-            <a:r>
-              <a:rPr lang="en-US" sz="2400" dirty="0" err="1" smtClean="0">
-                <a:latin typeface="Segoe UI" panose="020B0502040204020203" pitchFamily="34" charset="0"/>
-                <a:cs typeface="Segoe UI" panose="020B0502040204020203" pitchFamily="34" charset="0"/>
-              </a:rPr>
-              <a:t>Xây</a:t>
-            </a:r>
-            <a:r>
-              <a:rPr lang="en-US" sz="2400" dirty="0" smtClean="0">
-                <a:latin typeface="Segoe UI" panose="020B0502040204020203" pitchFamily="34" charset="0"/>
-                <a:cs typeface="Segoe UI" panose="020B0502040204020203" pitchFamily="34" charset="0"/>
-              </a:rPr>
-              <a:t> </a:t>
-            </a:r>
-            <a:r>
-              <a:rPr lang="en-US" sz="2400" dirty="0" err="1" smtClean="0">
-                <a:latin typeface="Segoe UI" panose="020B0502040204020203" pitchFamily="34" charset="0"/>
-                <a:cs typeface="Segoe UI" panose="020B0502040204020203" pitchFamily="34" charset="0"/>
-              </a:rPr>
-              <a:t>dựng</a:t>
-            </a:r>
-            <a:r>
-              <a:rPr lang="en-US" sz="2400" dirty="0" smtClean="0">
-                <a:latin typeface="Segoe UI" panose="020B0502040204020203" pitchFamily="34" charset="0"/>
-                <a:cs typeface="Segoe UI" panose="020B0502040204020203" pitchFamily="34" charset="0"/>
-              </a:rPr>
-              <a:t> </a:t>
-            </a:r>
-            <a:r>
-              <a:rPr lang="en-US" sz="2400" dirty="0" err="1" smtClean="0">
-                <a:latin typeface="Segoe UI" panose="020B0502040204020203" pitchFamily="34" charset="0"/>
-                <a:cs typeface="Segoe UI" panose="020B0502040204020203" pitchFamily="34" charset="0"/>
-              </a:rPr>
-              <a:t>ứng</a:t>
-            </a:r>
-            <a:r>
-              <a:rPr lang="en-US" sz="2400" dirty="0" smtClean="0">
-                <a:latin typeface="Segoe UI" panose="020B0502040204020203" pitchFamily="34" charset="0"/>
-                <a:cs typeface="Segoe UI" panose="020B0502040204020203" pitchFamily="34" charset="0"/>
-              </a:rPr>
-              <a:t> </a:t>
-            </a:r>
-            <a:r>
-              <a:rPr lang="en-US" sz="2400" dirty="0" err="1" smtClean="0">
-                <a:latin typeface="Segoe UI" panose="020B0502040204020203" pitchFamily="34" charset="0"/>
-                <a:cs typeface="Segoe UI" panose="020B0502040204020203" pitchFamily="34" charset="0"/>
-              </a:rPr>
-              <a:t>dụng</a:t>
-            </a:r>
-            <a:r>
-              <a:rPr lang="en-US" sz="2400" dirty="0" smtClean="0">
-                <a:latin typeface="Segoe UI" panose="020B0502040204020203" pitchFamily="34" charset="0"/>
-                <a:cs typeface="Segoe UI" panose="020B0502040204020203" pitchFamily="34" charset="0"/>
-              </a:rPr>
-              <a:t> </a:t>
-            </a:r>
-            <a:r>
-              <a:rPr lang="en-US" sz="2400" dirty="0" err="1" smtClean="0">
-                <a:latin typeface="Segoe UI" panose="020B0502040204020203" pitchFamily="34" charset="0"/>
-                <a:cs typeface="Segoe UI" panose="020B0502040204020203" pitchFamily="34" charset="0"/>
-              </a:rPr>
-              <a:t>dự</a:t>
-            </a:r>
-            <a:r>
-              <a:rPr lang="en-US" sz="2400" dirty="0" smtClean="0">
-                <a:latin typeface="Segoe UI" panose="020B0502040204020203" pitchFamily="34" charset="0"/>
-                <a:cs typeface="Segoe UI" panose="020B0502040204020203" pitchFamily="34" charset="0"/>
-              </a:rPr>
-              <a:t> </a:t>
-            </a:r>
-            <a:r>
-              <a:rPr lang="en-US" sz="2400" dirty="0" err="1" smtClean="0">
-                <a:latin typeface="Segoe UI" panose="020B0502040204020203" pitchFamily="34" charset="0"/>
-                <a:cs typeface="Segoe UI" panose="020B0502040204020203" pitchFamily="34" charset="0"/>
-              </a:rPr>
-              <a:t>báo</a:t>
-            </a:r>
-            <a:endParaRPr lang="en-US" sz="2400" dirty="0">
               <a:latin typeface="Segoe UI" panose="020B0502040204020203" pitchFamily="34" charset="0"/>
               <a:cs typeface="Segoe UI" panose="020B0502040204020203" pitchFamily="34" charset="0"/>
             </a:endParaRPr>
@@ -17348,18 +16923,25 @@
               <a:buAutoNum type="romanUcPeriod"/>
             </a:pPr>
             <a:r>
+              <a:rPr lang="en-US" sz="2400" dirty="0" err="1" smtClean="0">
+                <a:latin typeface="Segoe UI" panose="020B0502040204020203" pitchFamily="34" charset="0"/>
+                <a:cs typeface="Segoe UI" panose="020B0502040204020203" pitchFamily="34" charset="0"/>
+              </a:rPr>
+              <a:t>Trình</a:t>
+            </a:r>
+            <a:r>
               <a:rPr lang="en-US" sz="2400" dirty="0" smtClean="0">
                 <a:latin typeface="Segoe UI" panose="020B0502040204020203" pitchFamily="34" charset="0"/>
                 <a:cs typeface="Segoe UI" panose="020B0502040204020203" pitchFamily="34" charset="0"/>
               </a:rPr>
-              <a:t>Thu </a:t>
+              <a:t> </a:t>
             </a:r>
             <a:r>
               <a:rPr lang="en-US" sz="2400" dirty="0" err="1" smtClean="0">
                 <a:latin typeface="Segoe UI" panose="020B0502040204020203" pitchFamily="34" charset="0"/>
                 <a:cs typeface="Segoe UI" panose="020B0502040204020203" pitchFamily="34" charset="0"/>
               </a:rPr>
-              <a:t>thập</a:t>
+              <a:t>bày</a:t>
             </a:r>
             <a:r>
               <a:rPr lang="en-US" sz="2400" dirty="0" smtClean="0">
@@ -17373,6 +16955,139 @@
                 <a:latin typeface="Segoe UI" panose="020B0502040204020203" pitchFamily="34" charset="0"/>
                 <a:cs typeface="Segoe UI" panose="020B0502040204020203" pitchFamily="34" charset="0"/>
               </a:rPr>
+              <a:t>cách</a:t>
+            </a:r>
+            <a:r>
+              <a:rPr lang="en-US" sz="2400" dirty="0" smtClean="0">
+                <a:latin typeface="Segoe UI" panose="020B0502040204020203" pitchFamily="34" charset="0"/>
+                <a:cs typeface="Segoe UI" panose="020B0502040204020203" pitchFamily="34" charset="0"/>
+              </a:rPr>
+              <a:t> </a:t>
+            </a:r>
+            <a:r>
+              <a:rPr lang="en-US" sz="2400" dirty="0" err="1" smtClean="0">
+                <a:latin typeface="Segoe UI" panose="020B0502040204020203" pitchFamily="34" charset="0"/>
+                <a:cs typeface="Segoe UI" panose="020B0502040204020203" pitchFamily="34" charset="0"/>
+              </a:rPr>
+              <a:t>sử</a:t>
+            </a:r>
+            <a:r>
+              <a:rPr lang="en-US" sz="2400" dirty="0" smtClean="0">
+                <a:latin typeface="Segoe UI" panose="020B0502040204020203" pitchFamily="34" charset="0"/>
+                <a:cs typeface="Segoe UI" panose="020B0502040204020203" pitchFamily="34" charset="0"/>
+              </a:rPr>
+              <a:t> </a:t>
+            </a:r>
+            <a:r>
+              <a:rPr lang="en-US" sz="2400" dirty="0" err="1" smtClean="0">
+                <a:latin typeface="Segoe UI" panose="020B0502040204020203" pitchFamily="34" charset="0"/>
+                <a:cs typeface="Segoe UI" panose="020B0502040204020203" pitchFamily="34" charset="0"/>
+              </a:rPr>
+              <a:t>dụng</a:t>
+            </a:r>
+            <a:r>
+              <a:rPr lang="en-US" sz="2400" dirty="0" smtClean="0">
+                <a:latin typeface="Segoe UI" panose="020B0502040204020203" pitchFamily="34" charset="0"/>
+                <a:cs typeface="Segoe UI" panose="020B0502040204020203" pitchFamily="34" charset="0"/>
+              </a:rPr>
+              <a:t> + </a:t>
+            </a:r>
+            <a:r>
+              <a:rPr lang="en-US" sz="2400" dirty="0" err="1" smtClean="0">
+                <a:latin typeface="Segoe UI" panose="020B0502040204020203" pitchFamily="34" charset="0"/>
+                <a:cs typeface="Segoe UI" panose="020B0502040204020203" pitchFamily="34" charset="0"/>
+              </a:rPr>
+              <a:t>Công</a:t>
+            </a:r>
+            <a:r>
+              <a:rPr lang="en-US" sz="2400" dirty="0" smtClean="0">
+                <a:latin typeface="Segoe UI" panose="020B0502040204020203" pitchFamily="34" charset="0"/>
+                <a:cs typeface="Segoe UI" panose="020B0502040204020203" pitchFamily="34" charset="0"/>
+              </a:rPr>
+              <a:t> </a:t>
+            </a:r>
+            <a:r>
+              <a:rPr lang="en-US" sz="2400" dirty="0" err="1" smtClean="0">
+                <a:latin typeface="Segoe UI" panose="020B0502040204020203" pitchFamily="34" charset="0"/>
+                <a:cs typeface="Segoe UI" panose="020B0502040204020203" pitchFamily="34" charset="0"/>
+              </a:rPr>
+              <a:t>nghệ</a:t>
+            </a:r>
+            <a:r>
+              <a:rPr lang="en-US" sz="2400" dirty="0" smtClean="0">
+                <a:latin typeface="Segoe UI" panose="020B0502040204020203" pitchFamily="34" charset="0"/>
+                <a:cs typeface="Segoe UI" panose="020B0502040204020203" pitchFamily="34" charset="0"/>
+              </a:rPr>
+              <a:t> </a:t>
+            </a:r>
+            <a:r>
+              <a:rPr lang="en-US" sz="2400" dirty="0" err="1" smtClean="0">
+                <a:latin typeface="Segoe UI" panose="020B0502040204020203" pitchFamily="34" charset="0"/>
+                <a:cs typeface="Segoe UI" panose="020B0502040204020203" pitchFamily="34" charset="0"/>
+              </a:rPr>
+              <a:t>sử</a:t>
+            </a:r>
+            <a:r>
+              <a:rPr lang="en-US" sz="2400" dirty="0" smtClean="0">
+                <a:latin typeface="Segoe UI" panose="020B0502040204020203" pitchFamily="34" charset="0"/>
+                <a:cs typeface="Segoe UI" panose="020B0502040204020203" pitchFamily="34" charset="0"/>
+              </a:rPr>
+              <a:t> </a:t>
+            </a:r>
+            <a:r>
+              <a:rPr lang="en-US" sz="2400" dirty="0" err="1" smtClean="0">
+                <a:latin typeface="Segoe UI" panose="020B0502040204020203" pitchFamily="34" charset="0"/>
+                <a:cs typeface="Segoe UI" panose="020B0502040204020203" pitchFamily="34" charset="0"/>
+              </a:rPr>
+              <a:t>dụng</a:t>
+            </a:r>
+            <a:r>
+              <a:rPr lang="en-US" sz="2400" dirty="0" smtClean="0">
+                <a:latin typeface="Segoe UI" panose="020B0502040204020203" pitchFamily="34" charset="0"/>
+                <a:cs typeface="Segoe UI" panose="020B0502040204020203" pitchFamily="34" charset="0"/>
+              </a:rPr>
+              <a:t> + </a:t>
+            </a:r>
+            <a:r>
+              <a:rPr lang="en-US" sz="2400" dirty="0" err="1" smtClean="0">
+                <a:latin typeface="Segoe UI" panose="020B0502040204020203" pitchFamily="34" charset="0"/>
+                <a:cs typeface="Segoe UI" panose="020B0502040204020203" pitchFamily="34" charset="0"/>
+              </a:rPr>
+              <a:t>tha</a:t>
+            </a:r>
+            <a:r>
+              <a:rPr lang="en-US" sz="2400" dirty="0" err="1" smtClean="0">
+                <a:latin typeface="Segoe UI" panose="020B0502040204020203" pitchFamily="34" charset="0"/>
+                <a:cs typeface="Segoe UI" panose="020B0502040204020203" pitchFamily="34" charset="0"/>
+              </a:rPr>
+              <a:t>o</a:t>
+            </a:r>
+            <a:r>
+              <a:rPr lang="en-US" sz="2400" dirty="0" smtClean="0">
+                <a:latin typeface="Segoe UI" panose="020B0502040204020203" pitchFamily="34" charset="0"/>
+                <a:cs typeface="Segoe UI" panose="020B0502040204020203" pitchFamily="34" charset="0"/>
+              </a:rPr>
+              <a:t> </a:t>
+            </a:r>
+            <a:r>
+              <a:rPr lang="en-US" sz="2400" dirty="0" err="1" smtClean="0">
+                <a:latin typeface="Segoe UI" panose="020B0502040204020203" pitchFamily="34" charset="0"/>
+                <a:cs typeface="Segoe UI" panose="020B0502040204020203" pitchFamily="34" charset="0"/>
+              </a:rPr>
+              <a:t>tác</a:t>
+            </a:r>
+            <a:r>
+              <a:rPr lang="en-US" sz="2400" dirty="0" smtClean="0">
+                <a:latin typeface="Segoe UI" panose="020B0502040204020203" pitchFamily="34" charset="0"/>
+                <a:cs typeface="Segoe UI" panose="020B0502040204020203" pitchFamily="34" charset="0"/>
+              </a:rPr>
+              <a:t> </a:t>
+            </a:r>
+            <a:r>
+              <a:rPr lang="en-US" sz="2400" dirty="0" err="1" smtClean="0">
+                <a:latin typeface="Segoe UI" panose="020B0502040204020203" pitchFamily="34" charset="0"/>
+                <a:cs typeface="Segoe UI" panose="020B0502040204020203" pitchFamily="34" charset="0"/>
+              </a:rPr>
               <a:t>và</a:t>
             </a:r>
             <a:r>
@@ -17387,7 +17102,7 @@
                 <a:latin typeface="Segoe UI" panose="020B0502040204020203" pitchFamily="34" charset="0"/>
                 <a:cs typeface="Segoe UI" panose="020B0502040204020203" pitchFamily="34" charset="0"/>
               </a:rPr>
-              <a:t>xử</a:t>
+              <a:t>kết</a:t>
             </a:r>
             <a:r>
               <a:rPr lang="en-US" sz="2400" dirty="0" smtClean="0">
@@ -17401,7 +17116,7 @@
                 <a:latin typeface="Segoe UI" panose="020B0502040204020203" pitchFamily="34" charset="0"/>
                 <a:cs typeface="Segoe UI" panose="020B0502040204020203" pitchFamily="34" charset="0"/>
               </a:rPr>
-              <a:t>lý</a:t>
+              <a:t>quả</a:t>
             </a:r>
             <a:r>
               <a:rPr lang="en-US" sz="2400" dirty="0" smtClean="0">
@@ -17415,7 +17130,7 @@
                 <a:latin typeface="Segoe UI" panose="020B0502040204020203" pitchFamily="34" charset="0"/>
                 <a:cs typeface="Segoe UI" panose="020B0502040204020203" pitchFamily="34" charset="0"/>
               </a:rPr>
-              <a:t>dữ</a:t>
+              <a:t>của</a:t>
             </a:r>
             <a:r>
               <a:rPr lang="en-US" sz="2400" dirty="0" smtClean="0">
@@ -17429,349 +17144,30 @@
                 <a:latin typeface="Segoe UI" panose="020B0502040204020203" pitchFamily="34" charset="0"/>
                 <a:cs typeface="Segoe UI" panose="020B0502040204020203" pitchFamily="34" charset="0"/>
               </a:rPr>
-              <a:t>liệu</a:t>
+              <a:t>ứng</a:t>
+            </a:r>
+            <a:r>
+              <a:rPr lang="en-US" sz="2400" dirty="0" smtClean="0">
+                <a:latin typeface="Segoe UI" panose="020B0502040204020203" pitchFamily="34" charset="0"/>
+                <a:cs typeface="Segoe UI" panose="020B0502040204020203" pitchFamily="34" charset="0"/>
+              </a:rPr>
+              <a:t> </a:t>
+            </a:r>
+            <a:r>
+              <a:rPr lang="en-US" sz="2400" dirty="0" err="1" smtClean="0">
+                <a:latin typeface="Segoe UI" panose="020B0502040204020203" pitchFamily="34" charset="0"/>
+                <a:cs typeface="Segoe UI" panose="020B0502040204020203" pitchFamily="34" charset="0"/>
+              </a:rPr>
+              <a:t>dụng</a:t>
+            </a:r>
+            <a:r>
+              <a:rPr lang="en-US" sz="2400" dirty="0" smtClean="0">
+                <a:latin typeface="Segoe UI" panose="020B0502040204020203" pitchFamily="34" charset="0"/>
+                <a:cs typeface="Segoe UI" panose="020B0502040204020203" pitchFamily="34" charset="0"/>
+              </a:rPr>
+              <a:t> </a:t>
             </a:r>
             <a:endParaRPr lang="en-US" sz="2400" dirty="0" smtClean="0">
-              <a:latin typeface="Segoe UI" panose="020B0502040204020203" pitchFamily="34" charset="0"/>
-              <a:cs typeface="Segoe UI" panose="020B0502040204020203" pitchFamily="34" charset="0"/>
-            </a:endParaRPr>
-          </a:p>
-          <a:p>
-            <a:pPr marL="514350" indent="-514350">
-              <a:buClr>
-                <a:schemeClr val="tx1"/>
-              </a:buClr>
-              <a:buSzPct val="85000"/>
-              <a:buFont typeface="+mj-lt"/>
-              <a:buAutoNum type="romanUcPeriod"/>
-            </a:pPr>
-            <a:r>
-              <a:rPr lang="en-US" sz="2400" dirty="0" err="1" smtClean="0">
-                <a:latin typeface="Segoe UI" panose="020B0502040204020203" pitchFamily="34" charset="0"/>
-                <a:cs typeface="Segoe UI" panose="020B0502040204020203" pitchFamily="34" charset="0"/>
-              </a:rPr>
-              <a:t>Xây</a:t>
-            </a:r>
-            <a:r>
-              <a:rPr lang="en-US" sz="2400" dirty="0" smtClean="0">
-                <a:latin typeface="Segoe UI" panose="020B0502040204020203" pitchFamily="34" charset="0"/>
-                <a:cs typeface="Segoe UI" panose="020B0502040204020203" pitchFamily="34" charset="0"/>
-              </a:rPr>
-              <a:t> </a:t>
-            </a:r>
-            <a:r>
-              <a:rPr lang="en-US" sz="2400" dirty="0" err="1" smtClean="0">
-                <a:latin typeface="Segoe UI" panose="020B0502040204020203" pitchFamily="34" charset="0"/>
-                <a:cs typeface="Segoe UI" panose="020B0502040204020203" pitchFamily="34" charset="0"/>
-              </a:rPr>
-              <a:t>dựng</a:t>
-            </a:r>
-            <a:r>
-              <a:rPr lang="en-US" sz="2400" dirty="0" smtClean="0">
-                <a:latin typeface="Segoe UI" panose="020B0502040204020203" pitchFamily="34" charset="0"/>
-                <a:cs typeface="Segoe UI" panose="020B0502040204020203" pitchFamily="34" charset="0"/>
-              </a:rPr>
-              <a:t> </a:t>
-            </a:r>
-            <a:r>
-              <a:rPr lang="en-US" sz="2400" dirty="0" err="1" smtClean="0">
-                <a:latin typeface="Segoe UI" panose="020B0502040204020203" pitchFamily="34" charset="0"/>
-                <a:cs typeface="Segoe UI" panose="020B0502040204020203" pitchFamily="34" charset="0"/>
-              </a:rPr>
-              <a:t>mô</a:t>
-            </a:r>
-            <a:r>
-              <a:rPr lang="en-US" sz="2400" dirty="0" smtClean="0">
-                <a:latin typeface="Segoe UI" panose="020B0502040204020203" pitchFamily="34" charset="0"/>
-                <a:cs typeface="Segoe UI" panose="020B0502040204020203" pitchFamily="34" charset="0"/>
-              </a:rPr>
-              <a:t> </a:t>
-            </a:r>
-            <a:r>
-              <a:rPr lang="en-US" sz="2400" dirty="0" err="1" smtClean="0">
-                <a:latin typeface="Segoe UI" panose="020B0502040204020203" pitchFamily="34" charset="0"/>
-                <a:cs typeface="Segoe UI" panose="020B0502040204020203" pitchFamily="34" charset="0"/>
-              </a:rPr>
-              <a:t>hình</a:t>
-            </a:r>
-            <a:r>
-              <a:rPr lang="en-US" sz="2400" dirty="0" smtClean="0">
-                <a:latin typeface="Segoe UI" panose="020B0502040204020203" pitchFamily="34" charset="0"/>
-                <a:cs typeface="Segoe UI" panose="020B0502040204020203" pitchFamily="34" charset="0"/>
-              </a:rPr>
-              <a:t> </a:t>
-            </a:r>
-            <a:r>
-              <a:rPr lang="en-US" sz="2400" dirty="0" err="1" smtClean="0">
-                <a:latin typeface="Segoe UI" panose="020B0502040204020203" pitchFamily="34" charset="0"/>
-                <a:cs typeface="Segoe UI" panose="020B0502040204020203" pitchFamily="34" charset="0"/>
-              </a:rPr>
-              <a:t>học</a:t>
-            </a:r>
-            <a:r>
-              <a:rPr lang="en-US" sz="2400" dirty="0" smtClean="0">
-                <a:latin typeface="Segoe UI" panose="020B0502040204020203" pitchFamily="34" charset="0"/>
-                <a:cs typeface="Segoe UI" panose="020B0502040204020203" pitchFamily="34" charset="0"/>
-              </a:rPr>
-              <a:t> </a:t>
-            </a:r>
-            <a:r>
-              <a:rPr lang="en-US" sz="2400" dirty="0" err="1" smtClean="0">
-                <a:latin typeface="Segoe UI" panose="020B0502040204020203" pitchFamily="34" charset="0"/>
-                <a:cs typeface="Segoe UI" panose="020B0502040204020203" pitchFamily="34" charset="0"/>
-              </a:rPr>
-              <a:t>sâu</a:t>
-            </a:r>
-            <a:r>
-              <a:rPr lang="en-US" sz="2400" dirty="0" smtClean="0">
-                <a:latin typeface="Segoe UI" panose="020B0502040204020203" pitchFamily="34" charset="0"/>
-                <a:cs typeface="Segoe UI" panose="020B0502040204020203" pitchFamily="34" charset="0"/>
-              </a:rPr>
-              <a:t> </a:t>
-            </a:r>
-            <a:r>
-              <a:rPr lang="en-US" sz="2400" dirty="0" err="1" smtClean="0">
-                <a:latin typeface="Segoe UI" panose="020B0502040204020203" pitchFamily="34" charset="0"/>
-                <a:cs typeface="Segoe UI" panose="020B0502040204020203" pitchFamily="34" charset="0"/>
-              </a:rPr>
-              <a:t>cho</a:t>
-            </a:r>
-            <a:r>
-              <a:rPr lang="en-US" sz="2400" dirty="0" smtClean="0">
-                <a:latin typeface="Segoe UI" panose="020B0502040204020203" pitchFamily="34" charset="0"/>
-                <a:cs typeface="Segoe UI" panose="020B0502040204020203" pitchFamily="34" charset="0"/>
-              </a:rPr>
-              <a:t> </a:t>
-            </a:r>
-            <a:r>
-              <a:rPr lang="en-US" sz="2400" dirty="0" err="1" smtClean="0">
-                <a:latin typeface="Segoe UI" panose="020B0502040204020203" pitchFamily="34" charset="0"/>
-                <a:cs typeface="Segoe UI" panose="020B0502040204020203" pitchFamily="34" charset="0"/>
-              </a:rPr>
-              <a:t>bài</a:t>
-            </a:r>
-            <a:r>
-              <a:rPr lang="en-US" sz="2400" dirty="0" smtClean="0">
-                <a:latin typeface="Segoe UI" panose="020B0502040204020203" pitchFamily="34" charset="0"/>
-                <a:cs typeface="Segoe UI" panose="020B0502040204020203" pitchFamily="34" charset="0"/>
-              </a:rPr>
-              <a:t> </a:t>
-            </a:r>
-            <a:r>
-              <a:rPr lang="en-US" sz="2400" dirty="0" err="1" smtClean="0">
-                <a:latin typeface="Segoe UI" panose="020B0502040204020203" pitchFamily="34" charset="0"/>
-                <a:cs typeface="Segoe UI" panose="020B0502040204020203" pitchFamily="34" charset="0"/>
-              </a:rPr>
-              <a:t>toán</a:t>
-            </a:r>
-            <a:endParaRPr lang="en-US" sz="2400" dirty="0" smtClean="0">
-              <a:latin typeface="Segoe UI" panose="020B0502040204020203" pitchFamily="34" charset="0"/>
-              <a:cs typeface="Segoe UI" panose="020B0502040204020203" pitchFamily="34" charset="0"/>
-            </a:endParaRPr>
-          </a:p>
-          <a:p>
-            <a:pPr marL="0" indent="0">
-              <a:buClr>
-                <a:schemeClr val="tx1"/>
-              </a:buClr>
-              <a:buSzPct val="85000"/>
-              <a:buNone/>
-            </a:pPr>
-            <a:r>
-              <a:rPr lang="en-US" sz="2400" dirty="0" smtClean="0">
-                <a:latin typeface="Segoe UI" panose="020B0502040204020203" pitchFamily="34" charset="0"/>
-                <a:cs typeface="Segoe UI" panose="020B0502040204020203" pitchFamily="34" charset="0"/>
-              </a:rPr>
-              <a:t>III. 	</a:t>
-            </a:r>
-            <a:r>
-              <a:rPr lang="en-US" sz="2400" dirty="0" err="1" smtClean="0">
-                <a:latin typeface="Segoe UI" panose="020B0502040204020203" pitchFamily="34" charset="0"/>
-                <a:cs typeface="Segoe UI" panose="020B0502040204020203" pitchFamily="34" charset="0"/>
-              </a:rPr>
-              <a:t>Tối</a:t>
-            </a:r>
-            <a:r>
-              <a:rPr lang="en-US" sz="2400" dirty="0" smtClean="0">
-                <a:latin typeface="Segoe UI" panose="020B0502040204020203" pitchFamily="34" charset="0"/>
-                <a:cs typeface="Segoe UI" panose="020B0502040204020203" pitchFamily="34" charset="0"/>
-              </a:rPr>
-              <a:t> </a:t>
-            </a:r>
-            <a:r>
-              <a:rPr lang="en-US" sz="2400" dirty="0" err="1" smtClean="0">
-                <a:latin typeface="Segoe UI" panose="020B0502040204020203" pitchFamily="34" charset="0"/>
-                <a:cs typeface="Segoe UI" panose="020B0502040204020203" pitchFamily="34" charset="0"/>
-              </a:rPr>
-              <a:t>ưu</a:t>
-            </a:r>
-            <a:r>
-              <a:rPr lang="en-US" sz="2400" dirty="0" smtClean="0">
-                <a:latin typeface="Segoe UI" panose="020B0502040204020203" pitchFamily="34" charset="0"/>
-                <a:cs typeface="Segoe UI" panose="020B0502040204020203" pitchFamily="34" charset="0"/>
-              </a:rPr>
-              <a:t> </a:t>
-            </a:r>
-            <a:r>
-              <a:rPr lang="en-US" sz="2400" dirty="0" err="1" smtClean="0">
-                <a:latin typeface="Segoe UI" panose="020B0502040204020203" pitchFamily="34" charset="0"/>
-                <a:cs typeface="Segoe UI" panose="020B0502040204020203" pitchFamily="34" charset="0"/>
-              </a:rPr>
-              <a:t>và</a:t>
-            </a:r>
-            <a:r>
-              <a:rPr lang="en-US" sz="2400" dirty="0" smtClean="0">
-                <a:latin typeface="Segoe UI" panose="020B0502040204020203" pitchFamily="34" charset="0"/>
-                <a:cs typeface="Segoe UI" panose="020B0502040204020203" pitchFamily="34" charset="0"/>
-              </a:rPr>
-              <a:t> </a:t>
-            </a:r>
-            <a:r>
-              <a:rPr lang="en-US" sz="2400" dirty="0" err="1" smtClean="0">
-                <a:latin typeface="Segoe UI" panose="020B0502040204020203" pitchFamily="34" charset="0"/>
-                <a:cs typeface="Segoe UI" panose="020B0502040204020203" pitchFamily="34" charset="0"/>
-              </a:rPr>
-              <a:t>đánh</a:t>
-            </a:r>
-            <a:r>
-              <a:rPr lang="en-US" sz="2400" dirty="0" smtClean="0">
-                <a:latin typeface="Segoe UI" panose="020B0502040204020203" pitchFamily="34" charset="0"/>
-                <a:cs typeface="Segoe UI" panose="020B0502040204020203" pitchFamily="34" charset="0"/>
-              </a:rPr>
-              <a:t> </a:t>
-            </a:r>
-            <a:r>
-              <a:rPr lang="en-US" sz="2400" dirty="0" err="1" smtClean="0">
-                <a:latin typeface="Segoe UI" panose="020B0502040204020203" pitchFamily="34" charset="0"/>
-                <a:cs typeface="Segoe UI" panose="020B0502040204020203" pitchFamily="34" charset="0"/>
-              </a:rPr>
-              <a:t>giá</a:t>
-            </a:r>
-            <a:r>
-              <a:rPr lang="en-US" sz="2400" dirty="0" smtClean="0">
-                <a:latin typeface="Segoe UI" panose="020B0502040204020203" pitchFamily="34" charset="0"/>
-                <a:cs typeface="Segoe UI" panose="020B0502040204020203" pitchFamily="34" charset="0"/>
-              </a:rPr>
-              <a:t> </a:t>
-            </a:r>
-            <a:r>
-              <a:rPr lang="en-US" sz="2400" dirty="0" err="1" smtClean="0">
-                <a:latin typeface="Segoe UI" panose="020B0502040204020203" pitchFamily="34" charset="0"/>
-                <a:cs typeface="Segoe UI" panose="020B0502040204020203" pitchFamily="34" charset="0"/>
-              </a:rPr>
-              <a:t>mô</a:t>
-            </a:r>
-            <a:r>
-              <a:rPr lang="en-US" sz="2400" dirty="0" smtClean="0">
-                <a:latin typeface="Segoe UI" panose="020B0502040204020203" pitchFamily="34" charset="0"/>
-                <a:cs typeface="Segoe UI" panose="020B0502040204020203" pitchFamily="34" charset="0"/>
-              </a:rPr>
-              <a:t> </a:t>
-            </a:r>
-            <a:r>
-              <a:rPr lang="en-US" sz="2400" dirty="0" err="1" smtClean="0">
-                <a:latin typeface="Segoe UI" panose="020B0502040204020203" pitchFamily="34" charset="0"/>
-                <a:cs typeface="Segoe UI" panose="020B0502040204020203" pitchFamily="34" charset="0"/>
-              </a:rPr>
-              <a:t>hình</a:t>
-            </a:r>
-            <a:r>
-              <a:rPr lang="en-US" sz="2400" dirty="0" smtClean="0">
-                <a:latin typeface="Segoe UI" panose="020B0502040204020203" pitchFamily="34" charset="0"/>
-                <a:cs typeface="Segoe UI" panose="020B0502040204020203" pitchFamily="34" charset="0"/>
-              </a:rPr>
-              <a:t> </a:t>
-            </a:r>
-          </a:p>
-          <a:p>
-            <a:pPr marL="0" indent="0">
-              <a:buNone/>
-            </a:pPr>
-            <a:r>
-              <a:rPr lang="en-US" sz="2400" dirty="0" smtClean="0">
-                <a:latin typeface="Segoe UI" panose="020B0502040204020203" pitchFamily="34" charset="0"/>
-                <a:cs typeface="Segoe UI" panose="020B0502040204020203" pitchFamily="34" charset="0"/>
-              </a:rPr>
-              <a:t>IV. 	</a:t>
-            </a:r>
-            <a:r>
-              <a:rPr lang="en-US" sz="2400" dirty="0" err="1" smtClean="0">
-                <a:latin typeface="Segoe UI" panose="020B0502040204020203" pitchFamily="34" charset="0"/>
-                <a:cs typeface="Segoe UI" panose="020B0502040204020203" pitchFamily="34" charset="0"/>
-              </a:rPr>
-              <a:t>Xây</a:t>
-            </a:r>
-            <a:r>
-              <a:rPr lang="en-US" sz="2400" dirty="0" smtClean="0">
-                <a:latin typeface="Segoe UI" panose="020B0502040204020203" pitchFamily="34" charset="0"/>
-                <a:cs typeface="Segoe UI" panose="020B0502040204020203" pitchFamily="34" charset="0"/>
-              </a:rPr>
-              <a:t> </a:t>
-            </a:r>
-            <a:r>
-              <a:rPr lang="en-US" sz="2400" dirty="0" err="1" smtClean="0">
-                <a:latin typeface="Segoe UI" panose="020B0502040204020203" pitchFamily="34" charset="0"/>
-                <a:cs typeface="Segoe UI" panose="020B0502040204020203" pitchFamily="34" charset="0"/>
-              </a:rPr>
-              <a:t>dựng</a:t>
-            </a:r>
-            <a:r>
-              <a:rPr lang="en-US" sz="2400" dirty="0" smtClean="0">
-                <a:latin typeface="Segoe UI" panose="020B0502040204020203" pitchFamily="34" charset="0"/>
-                <a:cs typeface="Segoe UI" panose="020B0502040204020203" pitchFamily="34" charset="0"/>
-              </a:rPr>
-              <a:t> </a:t>
-            </a:r>
-            <a:r>
-              <a:rPr lang="en-US" sz="2400" dirty="0" err="1" smtClean="0">
-                <a:latin typeface="Segoe UI" panose="020B0502040204020203" pitchFamily="34" charset="0"/>
-                <a:cs typeface="Segoe UI" panose="020B0502040204020203" pitchFamily="34" charset="0"/>
-              </a:rPr>
-              <a:t>ứng</a:t>
-            </a:r>
-            <a:r>
-              <a:rPr lang="en-US" sz="2400" dirty="0" smtClean="0">
-                <a:latin typeface="Segoe UI" panose="020B0502040204020203" pitchFamily="34" charset="0"/>
-                <a:cs typeface="Segoe UI" panose="020B0502040204020203" pitchFamily="34" charset="0"/>
-              </a:rPr>
-              <a:t> </a:t>
-            </a:r>
-            <a:r>
-              <a:rPr lang="en-US" sz="2400" dirty="0" err="1" smtClean="0">
-                <a:latin typeface="Segoe UI" panose="020B0502040204020203" pitchFamily="34" charset="0"/>
-                <a:cs typeface="Segoe UI" panose="020B0502040204020203" pitchFamily="34" charset="0"/>
-              </a:rPr>
-              <a:t>dụng</a:t>
-            </a:r>
-            <a:r>
-              <a:rPr lang="en-US" sz="2400" dirty="0" smtClean="0">
-                <a:latin typeface="Segoe UI" panose="020B0502040204020203" pitchFamily="34" charset="0"/>
-                <a:cs typeface="Segoe UI" panose="020B0502040204020203" pitchFamily="34" charset="0"/>
-              </a:rPr>
-              <a:t> </a:t>
-            </a:r>
-            <a:r>
-              <a:rPr lang="en-US" sz="2400" dirty="0" err="1" smtClean="0">
-                <a:latin typeface="Segoe UI" panose="020B0502040204020203" pitchFamily="34" charset="0"/>
-                <a:cs typeface="Segoe UI" panose="020B0502040204020203" pitchFamily="34" charset="0"/>
-              </a:rPr>
-              <a:t>dự</a:t>
-            </a:r>
-            <a:r>
-              <a:rPr lang="en-US" sz="2400" dirty="0" smtClean="0">
-                <a:latin typeface="Segoe UI" panose="020B0502040204020203" pitchFamily="34" charset="0"/>
-                <a:cs typeface="Segoe UI" panose="020B0502040204020203" pitchFamily="34" charset="0"/>
-              </a:rPr>
-              <a:t> </a:t>
-            </a:r>
-            <a:r>
-              <a:rPr lang="en-US" sz="2400" dirty="0" err="1" smtClean="0">
-                <a:latin typeface="Segoe UI" panose="020B0502040204020203" pitchFamily="34" charset="0"/>
-                <a:cs typeface="Segoe UI" panose="020B0502040204020203" pitchFamily="34" charset="0"/>
-              </a:rPr>
-              <a:t>báo</a:t>
-            </a:r>
-            <a:endParaRPr lang="en-US" sz="2400" dirty="0">
               <a:latin typeface="Segoe UI" panose="020B0502040204020203" pitchFamily="34" charset="0"/>
               <a:cs typeface="Segoe UI" panose="020B0502040204020203" pitchFamily="34" charset="0"/>
             </a:endParaRPr>
@@ -18114,18 +17510,25 @@
               <a:buAutoNum type="romanUcPeriod"/>
             </a:pPr>
             <a:r>
+              <a:rPr lang="en-US" sz="2400" dirty="0" err="1" smtClean="0">
+                <a:latin typeface="Segoe UI" panose="020B0502040204020203" pitchFamily="34" charset="0"/>
+                <a:cs typeface="Segoe UI" panose="020B0502040204020203" pitchFamily="34" charset="0"/>
+              </a:rPr>
+              <a:t>Kết</a:t>
+            </a:r>
+            <a:r>
               <a:rPr lang="en-US" sz="2400" dirty="0" smtClean="0">
                 <a:latin typeface="Segoe UI" panose="020B0502040204020203" pitchFamily="34" charset="0"/>
                 <a:cs typeface="Segoe UI" panose="020B0502040204020203" pitchFamily="34" charset="0"/>
               </a:rPr>
-              <a:t>Thu </a:t>
+              <a:t> </a:t>
             </a:r>
             <a:r>
               <a:rPr lang="en-US" sz="2400" dirty="0" err="1" smtClean="0">
                 <a:latin typeface="Segoe UI" panose="020B0502040204020203" pitchFamily="34" charset="0"/>
                 <a:cs typeface="Segoe UI" panose="020B0502040204020203" pitchFamily="34" charset="0"/>
               </a:rPr>
-              <a:t>thập</a:t>
+              <a:t>quả</a:t>
             </a:r>
             <a:r>
               <a:rPr lang="en-US" sz="2400" dirty="0" smtClean="0">
@@ -18139,7 +17542,7 @@
                 <a:latin typeface="Segoe UI" panose="020B0502040204020203" pitchFamily="34" charset="0"/>
                 <a:cs typeface="Segoe UI" panose="020B0502040204020203" pitchFamily="34" charset="0"/>
               </a:rPr>
-              <a:t>và</a:t>
+              <a:t>đạt</a:t>
             </a:r>
             <a:r>
               <a:rPr lang="en-US" sz="2400" dirty="0" smtClean="0">
@@ -18153,13 +17556,27 @@
                 <a:latin typeface="Segoe UI" panose="020B0502040204020203" pitchFamily="34" charset="0"/>
                 <a:cs typeface="Segoe UI" panose="020B0502040204020203" pitchFamily="34" charset="0"/>
               </a:rPr>
-              <a:t>xử</a:t>
+              <a:t>được</a:t>
             </a:r>
             <a:r>
               <a:rPr lang="en-US" sz="2400" dirty="0" smtClean="0">
                 <a:latin typeface="Segoe UI" panose="020B0502040204020203" pitchFamily="34" charset="0"/>
                 <a:cs typeface="Segoe UI" panose="020B0502040204020203" pitchFamily="34" charset="0"/>
               </a:rPr>
+              <a:t>, </a:t>
+            </a:r>
+            <a:r>
+              <a:rPr lang="en-US" sz="2400" dirty="0" err="1" smtClean="0">
+                <a:latin typeface="Segoe UI" panose="020B0502040204020203" pitchFamily="34" charset="0"/>
+                <a:cs typeface="Segoe UI" panose="020B0502040204020203" pitchFamily="34" charset="0"/>
+              </a:rPr>
+              <a:t>ưu</a:t>
+            </a:r>
+            <a:r>
+              <a:rPr lang="en-US" sz="2400" dirty="0" smtClean="0">
+                <a:latin typeface="Segoe UI" panose="020B0502040204020203" pitchFamily="34" charset="0"/>
+                <a:cs typeface="Segoe UI" panose="020B0502040204020203" pitchFamily="34" charset="0"/>
+              </a:rPr>
               <a:t> </a:t>
             </a:r>
             <a:r>
@@ -18167,7 +17584,7 @@
                 <a:latin typeface="Segoe UI" panose="020B0502040204020203" pitchFamily="34" charset="0"/>
                 <a:cs typeface="Segoe UI" panose="020B0502040204020203" pitchFamily="34" charset="0"/>
               </a:rPr>
-              <a:t>lý</a:t>
+              <a:t>nhược</a:t>
             </a:r>
             <a:r>
               <a:rPr lang="en-US" sz="2400" dirty="0" smtClean="0">
@@ -18181,7 +17598,14 @@
                 <a:latin typeface="Segoe UI" panose="020B0502040204020203" pitchFamily="34" charset="0"/>
                 <a:cs typeface="Segoe UI" panose="020B0502040204020203" pitchFamily="34" charset="0"/>
               </a:rPr>
-              <a:t>dữ</a:t>
+              <a:t>điểm</a:t>
+            </a:r>
+            <a:r>
+              <a:rPr lang="en-US" sz="2400" dirty="0">
+                <a:latin typeface="Segoe UI" panose="020B0502040204020203" pitchFamily="34" charset="0"/>
+                <a:cs typeface="Segoe UI" panose="020B0502040204020203" pitchFamily="34" charset="0"/>
+              </a:rPr>
+              <a:t>,</a:t>
             </a:r>
             <a:r>
               <a:rPr lang="en-US" sz="2400" dirty="0" smtClean="0">
@@ -18195,28 +17619,21 @@
                 <a:latin typeface="Segoe UI" panose="020B0502040204020203" pitchFamily="34" charset="0"/>
                 <a:cs typeface="Segoe UI" panose="020B0502040204020203" pitchFamily="34" charset="0"/>
               </a:rPr>
-              <a:t>liệu</a:t>
-            </a:r>
-            <a:endParaRPr lang="en-US" sz="2400" dirty="0" smtClean="0">
-              <a:latin typeface="Segoe UI" panose="020B0502040204020203" pitchFamily="34" charset="0"/>
-              <a:cs typeface="Segoe UI" panose="020B0502040204020203" pitchFamily="34" charset="0"/>
-            </a:endParaRPr>
-          </a:p>
-          <a:p>
-            <a:pPr marL="514350" indent="-514350">
-              <a:buClr>
-                <a:schemeClr val="tx1"/>
-              </a:buClr>
-              <a:buSzPct val="85000"/>
-              <a:buFont typeface="+mj-lt"/>
-              <a:buAutoNum type="romanUcPeriod"/>
-            </a:pPr>
+              <a:t>hướng</a:t>
+            </a:r>
+            <a:r>
+              <a:rPr lang="en-US" sz="2400" dirty="0" smtClean="0">
+                <a:latin typeface="Segoe UI" panose="020B0502040204020203" pitchFamily="34" charset="0"/>
+                <a:cs typeface="Segoe UI" panose="020B0502040204020203" pitchFamily="34" charset="0"/>
+              </a:rPr>
+              <a:t> </a:t>
+            </a:r>
             <a:r>
               <a:rPr lang="en-US" sz="2400" dirty="0" err="1" smtClean="0">
                 <a:latin typeface="Segoe UI" panose="020B0502040204020203" pitchFamily="34" charset="0"/>
                 <a:cs typeface="Segoe UI" panose="020B0502040204020203" pitchFamily="34" charset="0"/>
               </a:rPr>
-              <a:t>Xây</a:t>
+              <a:t>phát</a:t>
             </a:r>
             <a:r>
               <a:rPr lang="en-US" sz="2400" dirty="0" smtClean="0">
@@ -18230,7 +17647,7 @@
                 <a:latin typeface="Segoe UI" panose="020B0502040204020203" pitchFamily="34" charset="0"/>
                 <a:cs typeface="Segoe UI" panose="020B0502040204020203" pitchFamily="34" charset="0"/>
               </a:rPr>
-              <a:t>dựng</a:t>
+              <a:t>triển</a:t>
             </a:r>
             <a:r>
               <a:rPr lang="en-US" sz="2400" dirty="0" smtClean="0">
@@ -18244,7 +17661,7 @@
                 <a:latin typeface="Segoe UI" panose="020B0502040204020203" pitchFamily="34" charset="0"/>
                 <a:cs typeface="Segoe UI" panose="020B0502040204020203" pitchFamily="34" charset="0"/>
               </a:rPr>
-              <a:t>mô</a:t>
+              <a:t>tương</a:t>
             </a:r>
             <a:r>
               <a:rPr lang="en-US" sz="2400" dirty="0" smtClean="0">
@@ -18258,284 +17675,7 @@
                 <a:latin typeface="Segoe UI" panose="020B0502040204020203" pitchFamily="34" charset="0"/>
                 <a:cs typeface="Segoe UI" panose="020B0502040204020203" pitchFamily="34" charset="0"/>
               </a:rPr>
-              <a:t>hình</a:t>
-            </a:r>
-            <a:r>
-              <a:rPr lang="en-US" sz="2400" dirty="0" smtClean="0">
-                <a:latin typeface="Segoe UI" panose="020B0502040204020203" pitchFamily="34" charset="0"/>
-                <a:cs typeface="Segoe UI" panose="020B0502040204020203" pitchFamily="34" charset="0"/>
-              </a:rPr>
-              <a:t> </a:t>
-            </a:r>
-            <a:r>
-              <a:rPr lang="en-US" sz="2400" dirty="0" err="1" smtClean="0">
-                <a:latin typeface="Segoe UI" panose="020B0502040204020203" pitchFamily="34" charset="0"/>
-                <a:cs typeface="Segoe UI" panose="020B0502040204020203" pitchFamily="34" charset="0"/>
-              </a:rPr>
-              <a:t>học</a:t>
-            </a:r>
-            <a:r>
-              <a:rPr lang="en-US" sz="2400" dirty="0" smtClean="0">
-                <a:latin typeface="Segoe UI" panose="020B0502040204020203" pitchFamily="34" charset="0"/>
-                <a:cs typeface="Segoe UI" panose="020B0502040204020203" pitchFamily="34" charset="0"/>
-              </a:rPr>
-              <a:t> </a:t>
-            </a:r>
-            <a:r>
-              <a:rPr lang="en-US" sz="2400" dirty="0" err="1" smtClean="0">
-                <a:latin typeface="Segoe UI" panose="020B0502040204020203" pitchFamily="34" charset="0"/>
-                <a:cs typeface="Segoe UI" panose="020B0502040204020203" pitchFamily="34" charset="0"/>
-              </a:rPr>
-              <a:t>sâu</a:t>
-            </a:r>
-            <a:r>
-              <a:rPr lang="en-US" sz="2400" dirty="0" smtClean="0">
-                <a:latin typeface="Segoe UI" panose="020B0502040204020203" pitchFamily="34" charset="0"/>
-                <a:cs typeface="Segoe UI" panose="020B0502040204020203" pitchFamily="34" charset="0"/>
-              </a:rPr>
-              <a:t> </a:t>
-            </a:r>
-            <a:r>
-              <a:rPr lang="en-US" sz="2400" dirty="0" err="1" smtClean="0">
-                <a:latin typeface="Segoe UI" panose="020B0502040204020203" pitchFamily="34" charset="0"/>
-                <a:cs typeface="Segoe UI" panose="020B0502040204020203" pitchFamily="34" charset="0"/>
-              </a:rPr>
-              <a:t>cho</a:t>
-            </a:r>
-            <a:r>
-              <a:rPr lang="en-US" sz="2400" dirty="0" smtClean="0">
-                <a:latin typeface="Segoe UI" panose="020B0502040204020203" pitchFamily="34" charset="0"/>
-                <a:cs typeface="Segoe UI" panose="020B0502040204020203" pitchFamily="34" charset="0"/>
-              </a:rPr>
-              <a:t> </a:t>
-            </a:r>
-            <a:r>
-              <a:rPr lang="en-US" sz="2400" dirty="0" err="1" smtClean="0">
-                <a:latin typeface="Segoe UI" panose="020B0502040204020203" pitchFamily="34" charset="0"/>
-                <a:cs typeface="Segoe UI" panose="020B0502040204020203" pitchFamily="34" charset="0"/>
-              </a:rPr>
-              <a:t>bài</a:t>
-            </a:r>
-            <a:r>
-              <a:rPr lang="en-US" sz="2400" dirty="0" smtClean="0">
-                <a:latin typeface="Segoe UI" panose="020B0502040204020203" pitchFamily="34" charset="0"/>
-                <a:cs typeface="Segoe UI" panose="020B0502040204020203" pitchFamily="34" charset="0"/>
-              </a:rPr>
-              <a:t> </a:t>
-            </a:r>
-            <a:r>
-              <a:rPr lang="en-US" sz="2400" dirty="0" err="1" smtClean="0">
-                <a:latin typeface="Segoe UI" panose="020B0502040204020203" pitchFamily="34" charset="0"/>
-                <a:cs typeface="Segoe UI" panose="020B0502040204020203" pitchFamily="34" charset="0"/>
-              </a:rPr>
-              <a:t>toán</a:t>
-            </a:r>
-            <a:endParaRPr lang="en-US" sz="2400" dirty="0" smtClean="0">
-              <a:latin typeface="Segoe UI" panose="020B0502040204020203" pitchFamily="34" charset="0"/>
-              <a:cs typeface="Segoe UI" panose="020B0502040204020203" pitchFamily="34" charset="0"/>
-            </a:endParaRPr>
-          </a:p>
-          <a:p>
-            <a:pPr marL="0" indent="0">
-              <a:buClr>
-                <a:schemeClr val="tx1"/>
-              </a:buClr>
-              <a:buSzPct val="85000"/>
-              <a:buNone/>
-            </a:pPr>
-            <a:r>
-              <a:rPr lang="en-US" sz="2400" dirty="0" smtClean="0">
-                <a:latin typeface="Segoe UI" panose="020B0502040204020203" pitchFamily="34" charset="0"/>
-                <a:cs typeface="Segoe UI" panose="020B0502040204020203" pitchFamily="34" charset="0"/>
-              </a:rPr>
-              <a:t>III. 	</a:t>
-            </a:r>
-            <a:r>
-              <a:rPr lang="en-US" sz="2400" dirty="0" err="1" smtClean="0">
-                <a:latin typeface="Segoe UI" panose="020B0502040204020203" pitchFamily="34" charset="0"/>
-                <a:cs typeface="Segoe UI" panose="020B0502040204020203" pitchFamily="34" charset="0"/>
-              </a:rPr>
-              <a:t>Tối</a:t>
-            </a:r>
-            <a:r>
-              <a:rPr lang="en-US" sz="2400" dirty="0" smtClean="0">
-                <a:latin typeface="Segoe UI" panose="020B0502040204020203" pitchFamily="34" charset="0"/>
-                <a:cs typeface="Segoe UI" panose="020B0502040204020203" pitchFamily="34" charset="0"/>
-              </a:rPr>
-              <a:t> </a:t>
-            </a:r>
-            <a:r>
-              <a:rPr lang="en-US" sz="2400" dirty="0" err="1" smtClean="0">
-                <a:latin typeface="Segoe UI" panose="020B0502040204020203" pitchFamily="34" charset="0"/>
-                <a:cs typeface="Segoe UI" panose="020B0502040204020203" pitchFamily="34" charset="0"/>
-              </a:rPr>
-              <a:t>ưu</a:t>
-            </a:r>
-            <a:r>
-              <a:rPr lang="en-US" sz="2400" dirty="0" smtClean="0">
-                <a:latin typeface="Segoe UI" panose="020B0502040204020203" pitchFamily="34" charset="0"/>
-                <a:cs typeface="Segoe UI" panose="020B0502040204020203" pitchFamily="34" charset="0"/>
-              </a:rPr>
-              <a:t> </a:t>
-            </a:r>
-            <a:r>
-              <a:rPr lang="en-US" sz="2400" dirty="0" err="1" smtClean="0">
-                <a:latin typeface="Segoe UI" panose="020B0502040204020203" pitchFamily="34" charset="0"/>
-                <a:cs typeface="Segoe UI" panose="020B0502040204020203" pitchFamily="34" charset="0"/>
-              </a:rPr>
-              <a:t>và</a:t>
-            </a:r>
-            <a:r>
-              <a:rPr lang="en-US" sz="2400" dirty="0" smtClean="0">
-                <a:latin typeface="Segoe UI" panose="020B0502040204020203" pitchFamily="34" charset="0"/>
-                <a:cs typeface="Segoe UI" panose="020B0502040204020203" pitchFamily="34" charset="0"/>
-              </a:rPr>
-              <a:t> </a:t>
-            </a:r>
-            <a:r>
-              <a:rPr lang="en-US" sz="2400" dirty="0" err="1" smtClean="0">
-                <a:latin typeface="Segoe UI" panose="020B0502040204020203" pitchFamily="34" charset="0"/>
-                <a:cs typeface="Segoe UI" panose="020B0502040204020203" pitchFamily="34" charset="0"/>
-              </a:rPr>
-              <a:t>đánh</a:t>
-            </a:r>
-            <a:r>
-              <a:rPr lang="en-US" sz="2400" dirty="0" smtClean="0">
-                <a:latin typeface="Segoe UI" panose="020B0502040204020203" pitchFamily="34" charset="0"/>
-                <a:cs typeface="Segoe UI" panose="020B0502040204020203" pitchFamily="34" charset="0"/>
-              </a:rPr>
-              <a:t> </a:t>
-            </a:r>
-            <a:r>
-              <a:rPr lang="en-US" sz="2400" dirty="0" err="1" smtClean="0">
-                <a:latin typeface="Segoe UI" panose="020B0502040204020203" pitchFamily="34" charset="0"/>
-                <a:cs typeface="Segoe UI" panose="020B0502040204020203" pitchFamily="34" charset="0"/>
-              </a:rPr>
-              <a:t>giá</a:t>
-            </a:r>
-            <a:r>
-              <a:rPr lang="en-US" sz="2400" dirty="0" smtClean="0">
-                <a:latin typeface="Segoe UI" panose="020B0502040204020203" pitchFamily="34" charset="0"/>
-                <a:cs typeface="Segoe UI" panose="020B0502040204020203" pitchFamily="34" charset="0"/>
-              </a:rPr>
-              <a:t> </a:t>
-            </a:r>
-            <a:r>
-              <a:rPr lang="en-US" sz="2400" dirty="0" err="1" smtClean="0">
-                <a:latin typeface="Segoe UI" panose="020B0502040204020203" pitchFamily="34" charset="0"/>
-                <a:cs typeface="Segoe UI" panose="020B0502040204020203" pitchFamily="34" charset="0"/>
-              </a:rPr>
-              <a:t>mô</a:t>
-            </a:r>
-            <a:r>
-              <a:rPr lang="en-US" sz="2400" dirty="0" smtClean="0">
-                <a:latin typeface="Segoe UI" panose="020B0502040204020203" pitchFamily="34" charset="0"/>
-                <a:cs typeface="Segoe UI" panose="020B0502040204020203" pitchFamily="34" charset="0"/>
-              </a:rPr>
-              <a:t> </a:t>
-            </a:r>
-            <a:r>
-              <a:rPr lang="en-US" sz="2400" dirty="0" err="1" smtClean="0">
-                <a:latin typeface="Segoe UI" panose="020B0502040204020203" pitchFamily="34" charset="0"/>
-                <a:cs typeface="Segoe UI" panose="020B0502040204020203" pitchFamily="34" charset="0"/>
-              </a:rPr>
-              <a:t>hình</a:t>
-            </a:r>
-            <a:r>
-              <a:rPr lang="en-US" sz="2400" dirty="0" smtClean="0">
-                <a:latin typeface="Segoe UI" panose="020B0502040204020203" pitchFamily="34" charset="0"/>
-                <a:cs typeface="Segoe UI" panose="020B0502040204020203" pitchFamily="34" charset="0"/>
-              </a:rPr>
-              <a:t> </a:t>
-            </a:r>
-          </a:p>
-          <a:p>
-            <a:pPr marL="0" indent="0">
-              <a:buNone/>
-            </a:pPr>
-            <a:r>
-              <a:rPr lang="en-US" sz="2400" dirty="0" smtClean="0">
-                <a:latin typeface="Segoe UI" panose="020B0502040204020203" pitchFamily="34" charset="0"/>
-                <a:cs typeface="Segoe UI" panose="020B0502040204020203" pitchFamily="34" charset="0"/>
-              </a:rPr>
-              <a:t>IV. 	</a:t>
-            </a:r>
-            <a:r>
-              <a:rPr lang="en-US" sz="2400" dirty="0" err="1" smtClean="0">
-                <a:latin typeface="Segoe UI" panose="020B0502040204020203" pitchFamily="34" charset="0"/>
-                <a:cs typeface="Segoe UI" panose="020B0502040204020203" pitchFamily="34" charset="0"/>
-              </a:rPr>
-              <a:t>Xây</a:t>
-            </a:r>
-            <a:r>
-              <a:rPr lang="en-US" sz="2400" dirty="0" smtClean="0">
-                <a:latin typeface="Segoe UI" panose="020B0502040204020203" pitchFamily="34" charset="0"/>
-                <a:cs typeface="Segoe UI" panose="020B0502040204020203" pitchFamily="34" charset="0"/>
-              </a:rPr>
-              <a:t> </a:t>
-            </a:r>
-            <a:r>
-              <a:rPr lang="en-US" sz="2400" dirty="0" err="1" smtClean="0">
-                <a:latin typeface="Segoe UI" panose="020B0502040204020203" pitchFamily="34" charset="0"/>
-                <a:cs typeface="Segoe UI" panose="020B0502040204020203" pitchFamily="34" charset="0"/>
-              </a:rPr>
-              <a:t>dựng</a:t>
-            </a:r>
-            <a:r>
-              <a:rPr lang="en-US" sz="2400" dirty="0" smtClean="0">
-                <a:latin typeface="Segoe UI" panose="020B0502040204020203" pitchFamily="34" charset="0"/>
-                <a:cs typeface="Segoe UI" panose="020B0502040204020203" pitchFamily="34" charset="0"/>
-              </a:rPr>
-              <a:t> </a:t>
-            </a:r>
-            <a:r>
-              <a:rPr lang="en-US" sz="2400" dirty="0" err="1" smtClean="0">
-                <a:latin typeface="Segoe UI" panose="020B0502040204020203" pitchFamily="34" charset="0"/>
-                <a:cs typeface="Segoe UI" panose="020B0502040204020203" pitchFamily="34" charset="0"/>
-              </a:rPr>
-              <a:t>ứng</a:t>
-            </a:r>
-            <a:r>
-              <a:rPr lang="en-US" sz="2400" dirty="0" smtClean="0">
-                <a:latin typeface="Segoe UI" panose="020B0502040204020203" pitchFamily="34" charset="0"/>
-                <a:cs typeface="Segoe UI" panose="020B0502040204020203" pitchFamily="34" charset="0"/>
-              </a:rPr>
-              <a:t> </a:t>
-            </a:r>
-            <a:r>
-              <a:rPr lang="en-US" sz="2400" dirty="0" err="1" smtClean="0">
-                <a:latin typeface="Segoe UI" panose="020B0502040204020203" pitchFamily="34" charset="0"/>
-                <a:cs typeface="Segoe UI" panose="020B0502040204020203" pitchFamily="34" charset="0"/>
-              </a:rPr>
-              <a:t>dụng</a:t>
-            </a:r>
-            <a:r>
-              <a:rPr lang="en-US" sz="2400" dirty="0" smtClean="0">
-                <a:latin typeface="Segoe UI" panose="020B0502040204020203" pitchFamily="34" charset="0"/>
-                <a:cs typeface="Segoe UI" panose="020B0502040204020203" pitchFamily="34" charset="0"/>
-              </a:rPr>
-              <a:t> </a:t>
-            </a:r>
-            <a:r>
-              <a:rPr lang="en-US" sz="2400" dirty="0" err="1" smtClean="0">
-                <a:latin typeface="Segoe UI" panose="020B0502040204020203" pitchFamily="34" charset="0"/>
-                <a:cs typeface="Segoe UI" panose="020B0502040204020203" pitchFamily="34" charset="0"/>
-              </a:rPr>
-              <a:t>dự</a:t>
-            </a:r>
-            <a:r>
-              <a:rPr lang="en-US" sz="2400" dirty="0" smtClean="0">
-                <a:latin typeface="Segoe UI" panose="020B0502040204020203" pitchFamily="34" charset="0"/>
-                <a:cs typeface="Segoe UI" panose="020B0502040204020203" pitchFamily="34" charset="0"/>
-              </a:rPr>
-              <a:t> </a:t>
-            </a:r>
-            <a:r>
-              <a:rPr lang="en-US" sz="2400" dirty="0" err="1" smtClean="0">
-                <a:latin typeface="Segoe UI" panose="020B0502040204020203" pitchFamily="34" charset="0"/>
-                <a:cs typeface="Segoe UI" panose="020B0502040204020203" pitchFamily="34" charset="0"/>
-              </a:rPr>
-              <a:t>báo</a:t>
+              <a:t>lai</a:t>
             </a:r>
             <a:endParaRPr lang="en-US" sz="2400" dirty="0">
               <a:latin typeface="Segoe UI" panose="020B0502040204020203" pitchFamily="34" charset="0"/>
@@ -18607,7 +17747,7 @@
     </a:clrScheme>
     <a:fontScheme name="Ion Boardroom">
       <a:majorFont>
-        <a:latin typeface="Century Gothic" panose="020B0502020202020204"/>
+        <a:latin typeface="Century Gothic"/>
         <a:ea typeface=""/>
         <a:cs typeface=""/>
         <a:font script="Jpan" typeface="メイリオ"/>
@@ -18642,7 +17782,7 @@
         <a:font script="Geor" typeface="Sylfaen"/>
       </a:majorFont>
       <a:minorFont>
-        <a:latin typeface="Century Gothic" panose="020B0502020202020204"/>
+        <a:latin typeface="Century Gothic"/>
         <a:ea typeface=""/>
         <a:cs typeface=""/>
         <a:font script="Jpan" typeface="メイリオ"/>
@@ -18822,7 +17962,7 @@
   <a:extraClrSchemeLst/>
   <a:extLst>
     <a:ext uri="{05A4C25C-085E-4340-85A3-A5531E510DB2}">
-      <thm15:themeFamily xmlns:thm15="http://schemas.microsoft.com/office/thememl/2012/main" name="Ion Boardroom" id="{FC33163D-4339-46B1-8EED-24C834239D99}" vid="{B8502691-933B-45FE-8764-BA278511EF27}"/>
+      <thm15:themeFamily xmlns:thm15="http://schemas.microsoft.com/office/thememl/2012/main" xmlns="" name="Ion Boardroom" id="{FC33163D-4339-46B1-8EED-24C834239D99}" vid="{B8502691-933B-45FE-8764-BA278511EF27}"/>
     </a:ext>
   </a:extLst>
 </a:theme>

</xml_diff>

<commit_message>
[] bao cao + slide
</commit_message>
<xml_diff>
--- a/Slide.pptx
+++ b/Slide.pptx
@@ -129,7 +129,7 @@
   </p:defaultTextStyle>
   <p:extLst>
     <p:ext uri="{EFAFB233-063F-42B5-8137-9DF3F51BA10A}">
-      <p15:sldGuideLst xmlns:p15="http://schemas.microsoft.com/office/powerpoint/2012/main" xmlns="">
+      <p15:sldGuideLst xmlns="" xmlns:p15="http://schemas.microsoft.com/office/powerpoint/2012/main">
         <p15:guide id="1" orient="horz" pos="2160">
           <p15:clr>
             <a:srgbClr val="A4A3A4"/>
@@ -482,7 +482,7 @@
             <a:fld id="{5923F103-BC34-4FE4-A40E-EDDEECFDA5D0}" type="datetimeFigureOut">
               <a:rPr lang="en-US" dirty="0"/>
               <a:pPr/>
-              <a:t>06/14/2021</a:t>
+              <a:t>06/15/2021</a:t>
             </a:fld>
             <a:endParaRPr lang="en-US" dirty="0"/>
           </a:p>
@@ -1570,7 +1570,7 @@
           <a:p>
             <a:fld id="{923A1CC3-2375-41D4-9E03-427CAF2A4C1A}" type="datetimeFigureOut">
               <a:rPr lang="en-US" dirty="0"/>
-              <a:t>06/14/2021</a:t>
+              <a:t>06/15/2021</a:t>
             </a:fld>
             <a:endParaRPr lang="en-US" dirty="0"/>
           </a:p>
@@ -2550,7 +2550,7 @@
           <a:p>
             <a:fld id="{AFF16868-8199-4C2C-A5B1-63AEE139F88E}" type="datetimeFigureOut">
               <a:rPr lang="en-US" dirty="0"/>
-              <a:t>06/14/2021</a:t>
+              <a:t>06/15/2021</a:t>
             </a:fld>
             <a:endParaRPr lang="en-US" dirty="0"/>
           </a:p>
@@ -3684,7 +3684,7 @@
           <a:p>
             <a:fld id="{AAD9FF7F-6988-44CC-821B-644E70CD2F73}" type="datetimeFigureOut">
               <a:rPr lang="en-US" dirty="0"/>
-              <a:t>06/14/2021</a:t>
+              <a:t>06/15/2021</a:t>
             </a:fld>
             <a:endParaRPr lang="en-US" dirty="0"/>
           </a:p>
@@ -4717,7 +4717,7 @@
           <a:p>
             <a:fld id="{5C12C299-16B2-4475-990D-751901EACC14}" type="datetimeFigureOut">
               <a:rPr lang="en-US" dirty="0"/>
-              <a:t>06/14/2021</a:t>
+              <a:t>06/15/2021</a:t>
             </a:fld>
             <a:endParaRPr lang="en-US" dirty="0"/>
           </a:p>
@@ -5377,7 +5377,7 @@
           <a:p>
             <a:fld id="{9FE86839-B9D8-4651-8783-F325ECE74E65}" type="datetimeFigureOut">
               <a:rPr lang="en-US" dirty="0"/>
-              <a:t>06/14/2021</a:t>
+              <a:t>06/15/2021</a:t>
             </a:fld>
             <a:endParaRPr lang="en-US" dirty="0"/>
           </a:p>
@@ -6238,7 +6238,7 @@
           <a:p>
             <a:fld id="{FD484F64-32F6-45C5-931F-ADC1662401D0}" type="datetimeFigureOut">
               <a:rPr lang="en-US" dirty="0"/>
-              <a:t>06/14/2021</a:t>
+              <a:t>06/15/2021</a:t>
             </a:fld>
             <a:endParaRPr lang="en-US" dirty="0"/>
           </a:p>
@@ -6428,7 +6428,7 @@
           <a:p>
             <a:fld id="{53086D93-FCAC-47E0-A2EE-787E62CA814C}" type="datetimeFigureOut">
               <a:rPr lang="en-US" dirty="0"/>
-              <a:t>06/14/2021</a:t>
+              <a:t>06/15/2021</a:t>
             </a:fld>
             <a:endParaRPr lang="en-US" dirty="0"/>
           </a:p>
@@ -7400,7 +7400,7 @@
           <a:p>
             <a:fld id="{CDA879A6-0FD0-4734-A311-86BFCA472E6E}" type="datetimeFigureOut">
               <a:rPr lang="en-US" dirty="0"/>
-              <a:t>06/14/2021</a:t>
+              <a:t>06/15/2021</a:t>
             </a:fld>
             <a:endParaRPr lang="en-US" dirty="0"/>
           </a:p>
@@ -7611,7 +7611,7 @@
           <a:p>
             <a:fld id="{19C9CA7B-DFD4-44B5-8C60-D14B8CD1FB59}" type="datetimeFigureOut">
               <a:rPr lang="en-US" dirty="0"/>
-              <a:t>06/14/2021</a:t>
+              <a:t>06/15/2021</a:t>
             </a:fld>
             <a:endParaRPr lang="en-US" dirty="0"/>
           </a:p>
@@ -8645,7 +8645,7 @@
           <a:p>
             <a:fld id="{F34E6425-0181-43F2-84FC-787E803FD2F8}" type="datetimeFigureOut">
               <a:rPr lang="en-US" dirty="0"/>
-              <a:t>06/14/2021</a:t>
+              <a:t>06/15/2021</a:t>
             </a:fld>
             <a:endParaRPr lang="en-US" dirty="0"/>
           </a:p>
@@ -8917,7 +8917,7 @@
           <a:p>
             <a:fld id="{3BDB8791-F1B0-41E7-B7FD-A781E65C4266}" type="datetimeFigureOut">
               <a:rPr lang="en-US" dirty="0"/>
-              <a:t>06/14/2021</a:t>
+              <a:t>06/15/2021</a:t>
             </a:fld>
             <a:endParaRPr lang="en-US" dirty="0"/>
           </a:p>
@@ -9327,7 +9327,7 @@
           <a:p>
             <a:fld id="{5FDD63B2-E120-4ED8-B27B-C685F510A5FE}" type="datetimeFigureOut">
               <a:rPr lang="en-US" dirty="0"/>
-              <a:t>06/14/2021</a:t>
+              <a:t>06/15/2021</a:t>
             </a:fld>
             <a:endParaRPr lang="en-US" dirty="0"/>
           </a:p>
@@ -9454,7 +9454,7 @@
           <a:p>
             <a:fld id="{7AA18ACC-A947-437B-A130-35BD54FDF1E9}" type="datetimeFigureOut">
               <a:rPr lang="en-US" dirty="0"/>
-              <a:t>06/14/2021</a:t>
+              <a:t>06/15/2021</a:t>
             </a:fld>
             <a:endParaRPr lang="en-US" dirty="0"/>
           </a:p>
@@ -9549,7 +9549,7 @@
           <a:p>
             <a:fld id="{7C8D7E02-BCB8-4D50-A234-369438C08659}" type="datetimeFigureOut">
               <a:rPr lang="en-US" dirty="0"/>
-              <a:t>06/14/2021</a:t>
+              <a:t>06/15/2021</a:t>
             </a:fld>
             <a:endParaRPr lang="en-US" dirty="0"/>
           </a:p>
@@ -10630,7 +10630,7 @@
           <a:p>
             <a:fld id="{76E86A4C-8E40-4F87-A4F0-01A0687C5742}" type="datetimeFigureOut">
               <a:rPr lang="en-US" dirty="0"/>
-              <a:t>06/14/2021</a:t>
+              <a:t>06/15/2021</a:t>
             </a:fld>
             <a:endParaRPr lang="en-US" dirty="0"/>
           </a:p>
@@ -11738,7 +11738,7 @@
           <a:p>
             <a:fld id="{35E72C73-2D91-4E12-BA25-F0AA0C03599B}" type="datetimeFigureOut">
               <a:rPr lang="en-US" dirty="0"/>
-              <a:t>06/14/2021</a:t>
+              <a:t>06/15/2021</a:t>
             </a:fld>
             <a:endParaRPr lang="en-US" dirty="0"/>
           </a:p>
@@ -12735,7 +12735,7 @@
           <a:p>
             <a:fld id="{2BE451C3-0FF4-47C4-B829-773ADF60F88C}" type="datetimeFigureOut">
               <a:rPr lang="en-US" dirty="0"/>
-              <a:t>06/14/2021</a:t>
+              <a:t>06/15/2021</a:t>
             </a:fld>
             <a:endParaRPr lang="en-US" dirty="0"/>
           </a:p>
@@ -13320,7 +13320,21 @@
                 <a:latin typeface="Segoe UI" panose="020B0502040204020203" pitchFamily="34" charset="0"/>
                 <a:cs typeface="Segoe UI" panose="020B0502040204020203" pitchFamily="34" charset="0"/>
               </a:rPr>
-              <a:t>ỨNG DỤNG KỸ THUẬT HỌC SÂU TRONG XÂY DỰNG DỊCH VỤ DỰ BÁO GIÁ PHÒNG CHO THUÊ</a:t>
+              <a:t>ỨNG DỤNG KỸ THUẬT HỌC SÂU TRONG XÂY DỰNG DỊCH VỤ DỰ BÁO GIÁ </a:t>
+            </a:r>
+            <a:r>
+              <a:rPr lang="en-US" sz="3200" b="1" dirty="0" smtClean="0">
+                <a:latin typeface="Segoe UI" panose="020B0502040204020203" pitchFamily="34" charset="0"/>
+                <a:cs typeface="Segoe UI" panose="020B0502040204020203" pitchFamily="34" charset="0"/>
+              </a:rPr>
+              <a:t>NHÀ CHO </a:t>
+            </a:r>
+            <a:r>
+              <a:rPr lang="en-US" sz="3200" b="1" dirty="0">
+                <a:latin typeface="Segoe UI" panose="020B0502040204020203" pitchFamily="34" charset="0"/>
+                <a:cs typeface="Segoe UI" panose="020B0502040204020203" pitchFamily="34" charset="0"/>
+              </a:rPr>
+              <a:t>THUÊ</a:t>
             </a:r>
             <a:endParaRPr lang="en-US" sz="3200" dirty="0">
               <a:latin typeface="Segoe UI" panose="020B0502040204020203" pitchFamily="34" charset="0"/>
@@ -13664,6 +13678,13 @@
   <p:clrMapOvr>
     <a:masterClrMapping/>
   </p:clrMapOvr>
+  <p:timing>
+    <p:tnLst>
+      <p:par>
+        <p:cTn id="1" dur="indefinite" restart="never" nodeType="tmRoot"/>
+      </p:par>
+    </p:tnLst>
+  </p:timing>
 </p:sld>
 </file>
 
@@ -14427,7 +14448,21 @@
                 <a:latin typeface="Segoe UI" panose="020B0502040204020203" pitchFamily="34" charset="0"/>
                 <a:cs typeface="Segoe UI" panose="020B0502040204020203" pitchFamily="34" charset="0"/>
               </a:rPr>
-              <a:t>: 1500 </a:t>
+              <a:t>: </a:t>
+            </a:r>
+            <a:r>
+              <a:rPr lang="en-US" sz="2000" dirty="0" err="1" smtClean="0">
+                <a:latin typeface="Segoe UI" panose="020B0502040204020203" pitchFamily="34" charset="0"/>
+                <a:cs typeface="Segoe UI" panose="020B0502040204020203" pitchFamily="34" charset="0"/>
+              </a:rPr>
+              <a:t>Gần</a:t>
+            </a:r>
+            <a:r>
+              <a:rPr lang="en-US" sz="2000" dirty="0" smtClean="0">
+                <a:latin typeface="Segoe UI" panose="020B0502040204020203" pitchFamily="34" charset="0"/>
+                <a:cs typeface="Segoe UI" panose="020B0502040204020203" pitchFamily="34" charset="0"/>
+              </a:rPr>
+              <a:t> 2000 </a:t>
             </a:r>
             <a:r>
               <a:rPr lang="en-US" sz="2000" dirty="0" err="1">
@@ -14470,20 +14505,209 @@
               <a:buNone/>
             </a:pPr>
             <a:r>
+              <a:rPr lang="en-US" sz="2000" dirty="0" err="1" smtClean="0">
+                <a:latin typeface="Segoe UI" panose="020B0502040204020203" pitchFamily="34" charset="0"/>
+                <a:cs typeface="Segoe UI" panose="020B0502040204020203" pitchFamily="34" charset="0"/>
+              </a:rPr>
+              <a:t>Tất</a:t>
+            </a:r>
+            <a:r>
+              <a:rPr lang="en-US" sz="2000" dirty="0" smtClean="0">
+                <a:latin typeface="Segoe UI" panose="020B0502040204020203" pitchFamily="34" charset="0"/>
+                <a:cs typeface="Segoe UI" panose="020B0502040204020203" pitchFamily="34" charset="0"/>
+              </a:rPr>
+              <a:t> </a:t>
+            </a:r>
+            <a:r>
+              <a:rPr lang="en-US" sz="2000" dirty="0" err="1">
+                <a:latin typeface="Segoe UI" panose="020B0502040204020203" pitchFamily="34" charset="0"/>
+                <a:cs typeface="Segoe UI" panose="020B0502040204020203" pitchFamily="34" charset="0"/>
+              </a:rPr>
+              <a:t>cả</a:t>
+            </a:r>
+            <a:r>
               <a:rPr lang="en-US" sz="2000" dirty="0">
                 <a:latin typeface="Segoe UI" panose="020B0502040204020203" pitchFamily="34" charset="0"/>
                 <a:cs typeface="Segoe UI" panose="020B0502040204020203" pitchFamily="34" charset="0"/>
               </a:rPr>
-              <a:t>Do </a:t>
+              <a:t> </a:t>
+            </a:r>
+            <a:r>
+              <a:rPr lang="en-US" sz="2000" dirty="0" err="1" smtClean="0">
+                <a:latin typeface="Segoe UI" panose="020B0502040204020203" pitchFamily="34" charset="0"/>
+                <a:cs typeface="Segoe UI" panose="020B0502040204020203" pitchFamily="34" charset="0"/>
+              </a:rPr>
+              <a:t>dữ</a:t>
+            </a:r>
+            <a:r>
+              <a:rPr lang="en-US" sz="2000" dirty="0" smtClean="0">
+                <a:latin typeface="Segoe UI" panose="020B0502040204020203" pitchFamily="34" charset="0"/>
+                <a:cs typeface="Segoe UI" panose="020B0502040204020203" pitchFamily="34" charset="0"/>
+              </a:rPr>
+              <a:t> </a:t>
             </a:r>
             <a:r>
               <a:rPr lang="en-US" sz="2000" dirty="0" err="1">
                 <a:latin typeface="Segoe UI" panose="020B0502040204020203" pitchFamily="34" charset="0"/>
                 <a:cs typeface="Segoe UI" panose="020B0502040204020203" pitchFamily="34" charset="0"/>
               </a:rPr>
+              <a:t>liệu</a:t>
+            </a:r>
+            <a:r>
+              <a:rPr lang="en-US" sz="2000" dirty="0">
+                <a:latin typeface="Segoe UI" panose="020B0502040204020203" pitchFamily="34" charset="0"/>
+                <a:cs typeface="Segoe UI" panose="020B0502040204020203" pitchFamily="34" charset="0"/>
+              </a:rPr>
+              <a:t> </a:t>
+            </a:r>
+            <a:r>
+              <a:rPr lang="en-US" sz="2000" dirty="0" err="1">
+                <a:latin typeface="Segoe UI" panose="020B0502040204020203" pitchFamily="34" charset="0"/>
+                <a:cs typeface="Segoe UI" panose="020B0502040204020203" pitchFamily="34" charset="0"/>
+              </a:rPr>
+              <a:t>được</a:t>
+            </a:r>
+            <a:r>
+              <a:rPr lang="en-US" sz="2000" dirty="0">
+                <a:latin typeface="Segoe UI" panose="020B0502040204020203" pitchFamily="34" charset="0"/>
+                <a:cs typeface="Segoe UI" panose="020B0502040204020203" pitchFamily="34" charset="0"/>
+              </a:rPr>
+              <a:t> </a:t>
+            </a:r>
+            <a:r>
+              <a:rPr lang="en-US" sz="2000" dirty="0" err="1">
+                <a:latin typeface="Segoe UI" panose="020B0502040204020203" pitchFamily="34" charset="0"/>
+                <a:cs typeface="Segoe UI" panose="020B0502040204020203" pitchFamily="34" charset="0"/>
+              </a:rPr>
+              <a:t>lưu</a:t>
+            </a:r>
+            <a:r>
+              <a:rPr lang="en-US" sz="2000" dirty="0">
+                <a:latin typeface="Segoe UI" panose="020B0502040204020203" pitchFamily="34" charset="0"/>
+                <a:cs typeface="Segoe UI" panose="020B0502040204020203" pitchFamily="34" charset="0"/>
+              </a:rPr>
+              <a:t> </a:t>
+            </a:r>
+            <a:r>
+              <a:rPr lang="en-US" sz="2000" dirty="0" err="1">
+                <a:latin typeface="Segoe UI" panose="020B0502040204020203" pitchFamily="34" charset="0"/>
+                <a:cs typeface="Segoe UI" panose="020B0502040204020203" pitchFamily="34" charset="0"/>
+              </a:rPr>
+              <a:t>trữ</a:t>
+            </a:r>
+            <a:r>
+              <a:rPr lang="en-US" sz="2000" dirty="0">
+                <a:latin typeface="Segoe UI" panose="020B0502040204020203" pitchFamily="34" charset="0"/>
+                <a:cs typeface="Segoe UI" panose="020B0502040204020203" pitchFamily="34" charset="0"/>
+              </a:rPr>
+              <a:t> </a:t>
+            </a:r>
+            <a:r>
+              <a:rPr lang="en-US" sz="2000" dirty="0" err="1">
+                <a:latin typeface="Segoe UI" panose="020B0502040204020203" pitchFamily="34" charset="0"/>
+                <a:cs typeface="Segoe UI" panose="020B0502040204020203" pitchFamily="34" charset="0"/>
+              </a:rPr>
+              <a:t>trong</a:t>
+            </a:r>
+            <a:r>
+              <a:rPr lang="en-US" sz="2000" dirty="0">
+                <a:latin typeface="Segoe UI" panose="020B0502040204020203" pitchFamily="34" charset="0"/>
+                <a:cs typeface="Segoe UI" panose="020B0502040204020203" pitchFamily="34" charset="0"/>
+              </a:rPr>
+              <a:t> </a:t>
+            </a:r>
+            <a:r>
+              <a:rPr lang="en-US" sz="2000" dirty="0" err="1">
+                <a:latin typeface="Segoe UI" panose="020B0502040204020203" pitchFamily="34" charset="0"/>
+                <a:cs typeface="Segoe UI" panose="020B0502040204020203" pitchFamily="34" charset="0"/>
+              </a:rPr>
+              <a:t>các</a:t>
+            </a:r>
+            <a:r>
+              <a:rPr lang="en-US" sz="2000" dirty="0">
+                <a:latin typeface="Segoe UI" panose="020B0502040204020203" pitchFamily="34" charset="0"/>
+                <a:cs typeface="Segoe UI" panose="020B0502040204020203" pitchFamily="34" charset="0"/>
+              </a:rPr>
+              <a:t> file .</a:t>
+            </a:r>
+            <a:r>
+              <a:rPr lang="en-US" sz="2000" dirty="0" err="1" smtClean="0">
+                <a:latin typeface="Segoe UI" panose="020B0502040204020203" pitchFamily="34" charset="0"/>
+                <a:cs typeface="Segoe UI" panose="020B0502040204020203" pitchFamily="34" charset="0"/>
+              </a:rPr>
+              <a:t>csv</a:t>
+            </a:r>
+            <a:r>
+              <a:rPr lang="en-US" sz="2000" dirty="0">
+                <a:latin typeface="Segoe UI" panose="020B0502040204020203" pitchFamily="34" charset="0"/>
+                <a:cs typeface="Segoe UI" panose="020B0502040204020203" pitchFamily="34" charset="0"/>
+              </a:rPr>
+              <a:t>.</a:t>
+            </a:r>
+            <a:r>
+              <a:rPr lang="en-US" sz="2000" dirty="0" smtClean="0">
+                <a:latin typeface="Segoe UI" panose="020B0502040204020203" pitchFamily="34" charset="0"/>
+                <a:cs typeface="Segoe UI" panose="020B0502040204020203" pitchFamily="34" charset="0"/>
+              </a:rPr>
+              <a:t> File </a:t>
+            </a:r>
+            <a:r>
+              <a:rPr lang="en-US" sz="2000" dirty="0" err="1" smtClean="0">
+                <a:latin typeface="Segoe UI" panose="020B0502040204020203" pitchFamily="34" charset="0"/>
+                <a:cs typeface="Segoe UI" panose="020B0502040204020203" pitchFamily="34" charset="0"/>
+              </a:rPr>
               <a:t>dữ</a:t>
             </a:r>
             <a:r>
+              <a:rPr lang="en-US" sz="2000" dirty="0" smtClean="0">
+                <a:latin typeface="Segoe UI" panose="020B0502040204020203" pitchFamily="34" charset="0"/>
+                <a:cs typeface="Segoe UI" panose="020B0502040204020203" pitchFamily="34" charset="0"/>
+              </a:rPr>
+              <a:t> </a:t>
+            </a:r>
+            <a:r>
+              <a:rPr lang="en-US" sz="2000" dirty="0" err="1" smtClean="0">
+                <a:latin typeface="Segoe UI" panose="020B0502040204020203" pitchFamily="34" charset="0"/>
+                <a:cs typeface="Segoe UI" panose="020B0502040204020203" pitchFamily="34" charset="0"/>
+              </a:rPr>
+              <a:t>liệu</a:t>
+            </a:r>
+            <a:r>
+              <a:rPr lang="en-US" sz="2000" dirty="0" smtClean="0">
+                <a:latin typeface="Segoe UI" panose="020B0502040204020203" pitchFamily="34" charset="0"/>
+                <a:cs typeface="Segoe UI" panose="020B0502040204020203" pitchFamily="34" charset="0"/>
+              </a:rPr>
+              <a:t> </a:t>
+            </a:r>
+            <a:r>
+              <a:rPr lang="en-US" sz="2000" dirty="0" err="1">
+                <a:latin typeface="Segoe UI" panose="020B0502040204020203" pitchFamily="34" charset="0"/>
+                <a:cs typeface="Segoe UI" panose="020B0502040204020203" pitchFamily="34" charset="0"/>
+              </a:rPr>
+              <a:t>b</a:t>
+            </a:r>
+            <a:r>
+              <a:rPr lang="en-US" sz="2000" dirty="0" err="1" smtClean="0">
+                <a:latin typeface="Segoe UI" panose="020B0502040204020203" pitchFamily="34" charset="0"/>
+                <a:cs typeface="Segoe UI" panose="020B0502040204020203" pitchFamily="34" charset="0"/>
+              </a:rPr>
+              <a:t>ao</a:t>
+            </a:r>
+            <a:r>
+              <a:rPr lang="en-US" sz="2000" dirty="0" smtClean="0">
+                <a:latin typeface="Segoe UI" panose="020B0502040204020203" pitchFamily="34" charset="0"/>
+                <a:cs typeface="Segoe UI" panose="020B0502040204020203" pitchFamily="34" charset="0"/>
+              </a:rPr>
+              <a:t> </a:t>
+            </a:r>
+            <a:r>
+              <a:rPr lang="en-US" sz="2000" dirty="0" err="1">
+                <a:latin typeface="Segoe UI" panose="020B0502040204020203" pitchFamily="34" charset="0"/>
+                <a:cs typeface="Segoe UI" panose="020B0502040204020203" pitchFamily="34" charset="0"/>
+              </a:rPr>
+              <a:t>gồm</a:t>
+            </a:r>
+            <a:r>
               <a:rPr lang="en-US" sz="2000" dirty="0">
                 <a:latin typeface="Segoe UI" panose="020B0502040204020203" pitchFamily="34" charset="0"/>
                 <a:cs typeface="Segoe UI" panose="020B0502040204020203" pitchFamily="34" charset="0"/>
@@ -14491,290 +14715,25 @@
               <a:t> </a:t>
             </a:r>
             <a:r>
-              <a:rPr lang="en-US" sz="2000" dirty="0" err="1">
-                <a:latin typeface="Segoe UI" panose="020B0502040204020203" pitchFamily="34" charset="0"/>
-                <a:cs typeface="Segoe UI" panose="020B0502040204020203" pitchFamily="34" charset="0"/>
-              </a:rPr>
-              <a:t>liệu</a:t>
+              <a:rPr lang="en-US" sz="2000" dirty="0" err="1" smtClean="0">
+                <a:latin typeface="Segoe UI" panose="020B0502040204020203" pitchFamily="34" charset="0"/>
+                <a:cs typeface="Segoe UI" panose="020B0502040204020203" pitchFamily="34" charset="0"/>
+              </a:rPr>
+              <a:t>trường</a:t>
+            </a:r>
+            <a:r>
+              <a:rPr lang="en-US" sz="2000" dirty="0" smtClean="0">
+                <a:latin typeface="Segoe UI" panose="020B0502040204020203" pitchFamily="34" charset="0"/>
+                <a:cs typeface="Segoe UI" panose="020B0502040204020203" pitchFamily="34" charset="0"/>
+              </a:rPr>
+              <a:t> : </a:t>
             </a:r>
             <a:r>
               <a:rPr lang="en-US" sz="2000" dirty="0">
                 <a:latin typeface="Segoe UI" panose="020B0502040204020203" pitchFamily="34" charset="0"/>
                 <a:cs typeface="Segoe UI" panose="020B0502040204020203" pitchFamily="34" charset="0"/>
               </a:rPr>
-              <a:t> </a:t>
-            </a:r>
-            <a:r>
-              <a:rPr lang="en-US" sz="2000" dirty="0" err="1">
-                <a:latin typeface="Segoe UI" panose="020B0502040204020203" pitchFamily="34" charset="0"/>
-                <a:cs typeface="Segoe UI" panose="020B0502040204020203" pitchFamily="34" charset="0"/>
-              </a:rPr>
-              <a:t>không</a:t>
-            </a:r>
-            <a:r>
-              <a:rPr lang="en-US" sz="2000" dirty="0">
-                <a:latin typeface="Segoe UI" panose="020B0502040204020203" pitchFamily="34" charset="0"/>
-                <a:cs typeface="Segoe UI" panose="020B0502040204020203" pitchFamily="34" charset="0"/>
-              </a:rPr>
-              <a:t> </a:t>
-            </a:r>
-            <a:r>
-              <a:rPr lang="en-US" sz="2000" dirty="0" err="1">
-                <a:latin typeface="Segoe UI" panose="020B0502040204020203" pitchFamily="34" charset="0"/>
-                <a:cs typeface="Segoe UI" panose="020B0502040204020203" pitchFamily="34" charset="0"/>
-              </a:rPr>
-              <a:t>quá</a:t>
-            </a:r>
-            <a:r>
-              <a:rPr lang="en-US" sz="2000" dirty="0">
-                <a:latin typeface="Segoe UI" panose="020B0502040204020203" pitchFamily="34" charset="0"/>
-                <a:cs typeface="Segoe UI" panose="020B0502040204020203" pitchFamily="34" charset="0"/>
-              </a:rPr>
-              <a:t> </a:t>
-            </a:r>
-            <a:r>
-              <a:rPr lang="en-US" sz="2000" dirty="0" err="1">
-                <a:latin typeface="Segoe UI" panose="020B0502040204020203" pitchFamily="34" charset="0"/>
-                <a:cs typeface="Segoe UI" panose="020B0502040204020203" pitchFamily="34" charset="0"/>
-              </a:rPr>
-              <a:t>lớn</a:t>
-            </a:r>
-            <a:r>
-              <a:rPr lang="en-US" sz="2000" dirty="0">
-                <a:latin typeface="Segoe UI" panose="020B0502040204020203" pitchFamily="34" charset="0"/>
-                <a:cs typeface="Segoe UI" panose="020B0502040204020203" pitchFamily="34" charset="0"/>
-              </a:rPr>
-              <a:t> &gt; </a:t>
-            </a:r>
-            <a:r>
-              <a:rPr lang="en-US" sz="2000" dirty="0" err="1">
-                <a:latin typeface="Segoe UI" panose="020B0502040204020203" pitchFamily="34" charset="0"/>
-                <a:cs typeface="Segoe UI" panose="020B0502040204020203" pitchFamily="34" charset="0"/>
-              </a:rPr>
-              <a:t>Tất</a:t>
-            </a:r>
-            <a:r>
-              <a:rPr lang="en-US" sz="2000" dirty="0">
-                <a:latin typeface="Segoe UI" panose="020B0502040204020203" pitchFamily="34" charset="0"/>
-                <a:cs typeface="Segoe UI" panose="020B0502040204020203" pitchFamily="34" charset="0"/>
-              </a:rPr>
-              <a:t> </a:t>
-            </a:r>
-            <a:r>
-              <a:rPr lang="en-US" sz="2000" dirty="0" err="1">
-                <a:latin typeface="Segoe UI" panose="020B0502040204020203" pitchFamily="34" charset="0"/>
-                <a:cs typeface="Segoe UI" panose="020B0502040204020203" pitchFamily="34" charset="0"/>
-              </a:rPr>
-              <a:t>cả</a:t>
-            </a:r>
-            <a:r>
-              <a:rPr lang="en-US" sz="2000" dirty="0">
-                <a:latin typeface="Segoe UI" panose="020B0502040204020203" pitchFamily="34" charset="0"/>
-                <a:cs typeface="Segoe UI" panose="020B0502040204020203" pitchFamily="34" charset="0"/>
-              </a:rPr>
-              <a:t> </a:t>
-            </a:r>
-            <a:r>
-              <a:rPr lang="en-US" sz="2000" dirty="0" err="1">
-                <a:latin typeface="Segoe UI" panose="020B0502040204020203" pitchFamily="34" charset="0"/>
-                <a:cs typeface="Segoe UI" panose="020B0502040204020203" pitchFamily="34" charset="0"/>
-              </a:rPr>
-              <a:t>thông</a:t>
-            </a:r>
-            <a:r>
-              <a:rPr lang="en-US" sz="2000" dirty="0">
-                <a:latin typeface="Segoe UI" panose="020B0502040204020203" pitchFamily="34" charset="0"/>
-                <a:cs typeface="Segoe UI" panose="020B0502040204020203" pitchFamily="34" charset="0"/>
-              </a:rPr>
-              <a:t> tin </a:t>
-            </a:r>
-            <a:r>
-              <a:rPr lang="en-US" sz="2000" dirty="0" err="1">
-                <a:latin typeface="Segoe UI" panose="020B0502040204020203" pitchFamily="34" charset="0"/>
-                <a:cs typeface="Segoe UI" panose="020B0502040204020203" pitchFamily="34" charset="0"/>
-              </a:rPr>
-              <a:t>dữ</a:t>
-            </a:r>
-            <a:r>
-              <a:rPr lang="en-US" sz="2000" dirty="0">
-                <a:latin typeface="Segoe UI" panose="020B0502040204020203" pitchFamily="34" charset="0"/>
-                <a:cs typeface="Segoe UI" panose="020B0502040204020203" pitchFamily="34" charset="0"/>
-              </a:rPr>
-              <a:t> </a:t>
-            </a:r>
-            <a:r>
-              <a:rPr lang="en-US" sz="2000" dirty="0" err="1">
-                <a:latin typeface="Segoe UI" panose="020B0502040204020203" pitchFamily="34" charset="0"/>
-                <a:cs typeface="Segoe UI" panose="020B0502040204020203" pitchFamily="34" charset="0"/>
-              </a:rPr>
-              <a:t>liệu</a:t>
-            </a:r>
-            <a:r>
-              <a:rPr lang="en-US" sz="2000" dirty="0">
-                <a:latin typeface="Segoe UI" panose="020B0502040204020203" pitchFamily="34" charset="0"/>
-                <a:cs typeface="Segoe UI" panose="020B0502040204020203" pitchFamily="34" charset="0"/>
-              </a:rPr>
-              <a:t> </a:t>
-            </a:r>
-            <a:r>
-              <a:rPr lang="en-US" sz="2000" dirty="0" err="1">
-                <a:latin typeface="Segoe UI" panose="020B0502040204020203" pitchFamily="34" charset="0"/>
-                <a:cs typeface="Segoe UI" panose="020B0502040204020203" pitchFamily="34" charset="0"/>
-              </a:rPr>
-              <a:t>được</a:t>
-            </a:r>
-            <a:r>
-              <a:rPr lang="en-US" sz="2000" dirty="0">
-                <a:latin typeface="Segoe UI" panose="020B0502040204020203" pitchFamily="34" charset="0"/>
-                <a:cs typeface="Segoe UI" panose="020B0502040204020203" pitchFamily="34" charset="0"/>
-              </a:rPr>
-              <a:t> </a:t>
-            </a:r>
-            <a:r>
-              <a:rPr lang="en-US" sz="2000" dirty="0" err="1">
-                <a:latin typeface="Segoe UI" panose="020B0502040204020203" pitchFamily="34" charset="0"/>
-                <a:cs typeface="Segoe UI" panose="020B0502040204020203" pitchFamily="34" charset="0"/>
-              </a:rPr>
-              <a:t>lưu</a:t>
-            </a:r>
-            <a:r>
-              <a:rPr lang="en-US" sz="2000" dirty="0">
-                <a:latin typeface="Segoe UI" panose="020B0502040204020203" pitchFamily="34" charset="0"/>
-                <a:cs typeface="Segoe UI" panose="020B0502040204020203" pitchFamily="34" charset="0"/>
-              </a:rPr>
-              <a:t> </a:t>
-            </a:r>
-            <a:r>
-              <a:rPr lang="en-US" sz="2000" dirty="0" err="1">
-                <a:latin typeface="Segoe UI" panose="020B0502040204020203" pitchFamily="34" charset="0"/>
-                <a:cs typeface="Segoe UI" panose="020B0502040204020203" pitchFamily="34" charset="0"/>
-              </a:rPr>
-              <a:t>trữ</a:t>
-            </a:r>
-            <a:r>
-              <a:rPr lang="en-US" sz="2000" dirty="0">
-                <a:latin typeface="Segoe UI" panose="020B0502040204020203" pitchFamily="34" charset="0"/>
-                <a:cs typeface="Segoe UI" panose="020B0502040204020203" pitchFamily="34" charset="0"/>
-              </a:rPr>
-              <a:t> </a:t>
-            </a:r>
-            <a:r>
-              <a:rPr lang="en-US" sz="2000" dirty="0" err="1">
-                <a:latin typeface="Segoe UI" panose="020B0502040204020203" pitchFamily="34" charset="0"/>
-                <a:cs typeface="Segoe UI" panose="020B0502040204020203" pitchFamily="34" charset="0"/>
-              </a:rPr>
-              <a:t>trong</a:t>
-            </a:r>
-            <a:r>
-              <a:rPr lang="en-US" sz="2000" dirty="0">
-                <a:latin typeface="Segoe UI" panose="020B0502040204020203" pitchFamily="34" charset="0"/>
-                <a:cs typeface="Segoe UI" panose="020B0502040204020203" pitchFamily="34" charset="0"/>
-              </a:rPr>
-              <a:t> </a:t>
-            </a:r>
-            <a:r>
-              <a:rPr lang="en-US" sz="2000" dirty="0" err="1">
-                <a:latin typeface="Segoe UI" panose="020B0502040204020203" pitchFamily="34" charset="0"/>
-                <a:cs typeface="Segoe UI" panose="020B0502040204020203" pitchFamily="34" charset="0"/>
-              </a:rPr>
-              <a:t>các</a:t>
-            </a:r>
-            <a:r>
-              <a:rPr lang="en-US" sz="2000" dirty="0">
-                <a:latin typeface="Segoe UI" panose="020B0502040204020203" pitchFamily="34" charset="0"/>
-                <a:cs typeface="Segoe UI" panose="020B0502040204020203" pitchFamily="34" charset="0"/>
-              </a:rPr>
-              <a:t> file .</a:t>
-            </a:r>
-            <a:r>
-              <a:rPr lang="en-US" sz="2000" dirty="0" err="1">
-                <a:latin typeface="Segoe UI" panose="020B0502040204020203" pitchFamily="34" charset="0"/>
-                <a:cs typeface="Segoe UI" panose="020B0502040204020203" pitchFamily="34" charset="0"/>
-              </a:rPr>
-              <a:t>csv</a:t>
-            </a:r>
-            <a:endParaRPr lang="en-US" sz="2000" dirty="0">
-              <a:latin typeface="Segoe UI" panose="020B0502040204020203" pitchFamily="34" charset="0"/>
-              <a:cs typeface="Segoe UI" panose="020B0502040204020203" pitchFamily="34" charset="0"/>
-            </a:endParaRPr>
-          </a:p>
-          <a:p>
-            <a:pPr marL="0" indent="0">
-              <a:buClr>
-                <a:schemeClr val="tx1"/>
-              </a:buClr>
-              <a:buSzPct val="85000"/>
-              <a:buNone/>
-            </a:pPr>
-            <a:r>
-              <a:rPr lang="en-US" sz="2000" dirty="0" err="1">
-                <a:latin typeface="Segoe UI" panose="020B0502040204020203" pitchFamily="34" charset="0"/>
-                <a:cs typeface="Segoe UI" panose="020B0502040204020203" pitchFamily="34" charset="0"/>
-              </a:rPr>
-              <a:t>Bao</a:t>
-            </a:r>
-            <a:r>
-              <a:rPr lang="en-US" sz="2000" dirty="0">
-                <a:latin typeface="Segoe UI" panose="020B0502040204020203" pitchFamily="34" charset="0"/>
-                <a:cs typeface="Segoe UI" panose="020B0502040204020203" pitchFamily="34" charset="0"/>
-              </a:rPr>
-              <a:t> </a:t>
-            </a:r>
-            <a:r>
-              <a:rPr lang="en-US" sz="2000" dirty="0" err="1">
-                <a:latin typeface="Segoe UI" panose="020B0502040204020203" pitchFamily="34" charset="0"/>
-                <a:cs typeface="Segoe UI" panose="020B0502040204020203" pitchFamily="34" charset="0"/>
-              </a:rPr>
-              <a:t>gồm</a:t>
-            </a:r>
-            <a:r>
-              <a:rPr lang="en-US" sz="2000" dirty="0">
-                <a:latin typeface="Segoe UI" panose="020B0502040204020203" pitchFamily="34" charset="0"/>
-                <a:cs typeface="Segoe UI" panose="020B0502040204020203" pitchFamily="34" charset="0"/>
-              </a:rPr>
-              <a:t> 8 </a:t>
-            </a:r>
-            <a:r>
-              <a:rPr lang="en-US" sz="2000" dirty="0" err="1">
-                <a:latin typeface="Segoe UI" panose="020B0502040204020203" pitchFamily="34" charset="0"/>
-                <a:cs typeface="Segoe UI" panose="020B0502040204020203" pitchFamily="34" charset="0"/>
-              </a:rPr>
-              <a:t>trường</a:t>
-            </a:r>
-            <a:r>
-              <a:rPr lang="en-US" sz="2000" dirty="0">
-                <a:latin typeface="Segoe UI" panose="020B0502040204020203" pitchFamily="34" charset="0"/>
-                <a:cs typeface="Segoe UI" panose="020B0502040204020203" pitchFamily="34" charset="0"/>
-              </a:rPr>
-              <a:t> </a:t>
-            </a:r>
-            <a:r>
-              <a:rPr lang="en-US" sz="2000" dirty="0" err="1">
-                <a:latin typeface="Segoe UI" panose="020B0502040204020203" pitchFamily="34" charset="0"/>
-                <a:cs typeface="Segoe UI" panose="020B0502040204020203" pitchFamily="34" charset="0"/>
-              </a:rPr>
-              <a:t>dữ</a:t>
-            </a:r>
-            <a:r>
-              <a:rPr lang="en-US" sz="2000" dirty="0">
-                <a:latin typeface="Segoe UI" panose="020B0502040204020203" pitchFamily="34" charset="0"/>
-                <a:cs typeface="Segoe UI" panose="020B0502040204020203" pitchFamily="34" charset="0"/>
-              </a:rPr>
-              <a:t> </a:t>
-            </a:r>
-            <a:r>
-              <a:rPr lang="en-US" sz="2000" dirty="0" err="1">
-                <a:latin typeface="Segoe UI" panose="020B0502040204020203" pitchFamily="34" charset="0"/>
-                <a:cs typeface="Segoe UI" panose="020B0502040204020203" pitchFamily="34" charset="0"/>
-              </a:rPr>
-              <a:t>liệu</a:t>
-            </a:r>
-            <a:r>
-              <a:rPr lang="en-US" sz="2000" dirty="0">
-                <a:latin typeface="Segoe UI" panose="020B0502040204020203" pitchFamily="34" charset="0"/>
-                <a:cs typeface="Segoe UI" panose="020B0502040204020203" pitchFamily="34" charset="0"/>
-              </a:rPr>
-              <a:t> : URL </a:t>
+              <a:t>URL </a:t>
             </a:r>
             <a:r>
               <a:rPr lang="en-US" sz="2000" dirty="0" err="1">
@@ -16812,14 +16771,14 @@
                 <a:gridCol w="4061460">
                   <a:extLst>
                     <a:ext uri="{9D8B030D-6E8A-4147-A177-3AD203B41FA5}">
-                      <a16:colId xmlns:a16="http://schemas.microsoft.com/office/drawing/2014/main" xmlns="" val="20000"/>
+                      <a16:colId xmlns="" xmlns:a16="http://schemas.microsoft.com/office/drawing/2014/main" val="20000"/>
                     </a:ext>
                   </a:extLst>
                 </a:gridCol>
                 <a:gridCol w="2021840">
                   <a:extLst>
                     <a:ext uri="{9D8B030D-6E8A-4147-A177-3AD203B41FA5}">
-                      <a16:colId xmlns:a16="http://schemas.microsoft.com/office/drawing/2014/main" xmlns="" val="20001"/>
+                      <a16:colId xmlns="" xmlns:a16="http://schemas.microsoft.com/office/drawing/2014/main" val="20001"/>
                     </a:ext>
                   </a:extLst>
                 </a:gridCol>
@@ -16891,7 +16850,7 @@
                 </a:tc>
                 <a:extLst>
                   <a:ext uri="{0D108BD9-81ED-4DB2-BD59-A6C34878D82A}">
-                    <a16:rowId xmlns:a16="http://schemas.microsoft.com/office/drawing/2014/main" xmlns="" val="10000"/>
+                    <a16:rowId xmlns="" xmlns:a16="http://schemas.microsoft.com/office/drawing/2014/main" val="10000"/>
                   </a:ext>
                 </a:extLst>
               </a:tr>
@@ -17000,7 +16959,7 @@
                 </a:tc>
                 <a:extLst>
                   <a:ext uri="{0D108BD9-81ED-4DB2-BD59-A6C34878D82A}">
-                    <a16:rowId xmlns:a16="http://schemas.microsoft.com/office/drawing/2014/main" xmlns="" val="10001"/>
+                    <a16:rowId xmlns="" xmlns:a16="http://schemas.microsoft.com/office/drawing/2014/main" val="10001"/>
                   </a:ext>
                 </a:extLst>
               </a:tr>
@@ -17141,7 +17100,7 @@
                 </a:tc>
                 <a:extLst>
                   <a:ext uri="{0D108BD9-81ED-4DB2-BD59-A6C34878D82A}">
-                    <a16:rowId xmlns:a16="http://schemas.microsoft.com/office/drawing/2014/main" xmlns="" val="10002"/>
+                    <a16:rowId xmlns="" xmlns:a16="http://schemas.microsoft.com/office/drawing/2014/main" val="10002"/>
                   </a:ext>
                 </a:extLst>
               </a:tr>
@@ -19195,14 +19154,14 @@
                 <a:gridCol w="3998007">
                   <a:extLst>
                     <a:ext uri="{9D8B030D-6E8A-4147-A177-3AD203B41FA5}">
-                      <a16:colId xmlns:a16="http://schemas.microsoft.com/office/drawing/2014/main" xmlns="" val="20000"/>
+                      <a16:colId xmlns="" xmlns:a16="http://schemas.microsoft.com/office/drawing/2014/main" val="20000"/>
                     </a:ext>
                   </a:extLst>
                 </a:gridCol>
                 <a:gridCol w="4368752">
                   <a:extLst>
                     <a:ext uri="{9D8B030D-6E8A-4147-A177-3AD203B41FA5}">
-                      <a16:colId xmlns:a16="http://schemas.microsoft.com/office/drawing/2014/main" xmlns="" val="20001"/>
+                      <a16:colId xmlns="" xmlns:a16="http://schemas.microsoft.com/office/drawing/2014/main" val="20001"/>
                     </a:ext>
                   </a:extLst>
                 </a:gridCol>
@@ -19327,7 +19286,7 @@
                 </a:tc>
                 <a:extLst>
                   <a:ext uri="{0D108BD9-81ED-4DB2-BD59-A6C34878D82A}">
-                    <a16:rowId xmlns:a16="http://schemas.microsoft.com/office/drawing/2014/main" xmlns="" val="10000"/>
+                    <a16:rowId xmlns="" xmlns:a16="http://schemas.microsoft.com/office/drawing/2014/main" val="10000"/>
                   </a:ext>
                 </a:extLst>
               </a:tr>
@@ -19446,7 +19405,7 @@
                 </a:tc>
                 <a:extLst>
                   <a:ext uri="{0D108BD9-81ED-4DB2-BD59-A6C34878D82A}">
-                    <a16:rowId xmlns:a16="http://schemas.microsoft.com/office/drawing/2014/main" xmlns="" val="10001"/>
+                    <a16:rowId xmlns="" xmlns:a16="http://schemas.microsoft.com/office/drawing/2014/main" val="10001"/>
                   </a:ext>
                 </a:extLst>
               </a:tr>
@@ -19583,7 +19542,7 @@
                 </a:tc>
                 <a:extLst>
                   <a:ext uri="{0D108BD9-81ED-4DB2-BD59-A6C34878D82A}">
-                    <a16:rowId xmlns:a16="http://schemas.microsoft.com/office/drawing/2014/main" xmlns="" val="10002"/>
+                    <a16:rowId xmlns="" xmlns:a16="http://schemas.microsoft.com/office/drawing/2014/main" val="10002"/>
                   </a:ext>
                 </a:extLst>
               </a:tr>
@@ -19776,7 +19735,7 @@
                 </a:tc>
                 <a:extLst>
                   <a:ext uri="{0D108BD9-81ED-4DB2-BD59-A6C34878D82A}">
-                    <a16:rowId xmlns:a16="http://schemas.microsoft.com/office/drawing/2014/main" xmlns="" val="10003"/>
+                    <a16:rowId xmlns="" xmlns:a16="http://schemas.microsoft.com/office/drawing/2014/main" val="10003"/>
                   </a:ext>
                 </a:extLst>
               </a:tr>
@@ -19955,7 +19914,7 @@
                 </a:tc>
                 <a:extLst>
                   <a:ext uri="{0D108BD9-81ED-4DB2-BD59-A6C34878D82A}">
-                    <a16:rowId xmlns:a16="http://schemas.microsoft.com/office/drawing/2014/main" xmlns="" val="10004"/>
+                    <a16:rowId xmlns="" xmlns:a16="http://schemas.microsoft.com/office/drawing/2014/main" val="10004"/>
                   </a:ext>
                 </a:extLst>
               </a:tr>
@@ -20127,7 +20086,7 @@
                 </a:tc>
                 <a:extLst>
                   <a:ext uri="{0D108BD9-81ED-4DB2-BD59-A6C34878D82A}">
-                    <a16:rowId xmlns:a16="http://schemas.microsoft.com/office/drawing/2014/main" xmlns="" val="10005"/>
+                    <a16:rowId xmlns="" xmlns:a16="http://schemas.microsoft.com/office/drawing/2014/main" val="10005"/>
                   </a:ext>
                 </a:extLst>
               </a:tr>
@@ -20650,6 +20609,9 @@
           </a:lstStyle>
           <a:p>
             <a:pPr marL="0" indent="0">
+              <a:lnSpc>
+                <a:spcPct val="150000"/>
+              </a:lnSpc>
               <a:buClr>
                 <a:schemeClr val="tx1"/>
               </a:buClr>
@@ -20657,349 +20619,384 @@
               <a:buNone/>
             </a:pPr>
             <a:r>
-              <a:rPr lang="en-US" sz="2400" dirty="0" err="1">
+              <a:rPr lang="en-US" sz="2200" dirty="0" err="1">
                 <a:latin typeface="Segoe UI" panose="020B0502040204020203" pitchFamily="34" charset="0"/>
                 <a:cs typeface="Segoe UI" panose="020B0502040204020203" pitchFamily="34" charset="0"/>
               </a:rPr>
               <a:t>Chọn</a:t>
             </a:r>
             <a:r>
-              <a:rPr lang="en-US" sz="2400" dirty="0">
-                <a:latin typeface="Segoe UI" panose="020B0502040204020203" pitchFamily="34" charset="0"/>
-                <a:cs typeface="Segoe UI" panose="020B0502040204020203" pitchFamily="34" charset="0"/>
-              </a:rPr>
-              <a:t> </a:t>
-            </a:r>
-            <a:r>
-              <a:rPr lang="en-US" sz="2400" dirty="0" err="1">
+              <a:rPr lang="en-US" sz="2200" dirty="0">
+                <a:latin typeface="Segoe UI" panose="020B0502040204020203" pitchFamily="34" charset="0"/>
+                <a:cs typeface="Segoe UI" panose="020B0502040204020203" pitchFamily="34" charset="0"/>
+              </a:rPr>
+              <a:t> </a:t>
+            </a:r>
+            <a:r>
+              <a:rPr lang="en-US" sz="2200" dirty="0" err="1">
                 <a:latin typeface="Segoe UI" panose="020B0502040204020203" pitchFamily="34" charset="0"/>
                 <a:cs typeface="Segoe UI" panose="020B0502040204020203" pitchFamily="34" charset="0"/>
               </a:rPr>
               <a:t>thuộc</a:t>
             </a:r>
             <a:r>
-              <a:rPr lang="en-US" sz="2400" dirty="0">
-                <a:latin typeface="Segoe UI" panose="020B0502040204020203" pitchFamily="34" charset="0"/>
-                <a:cs typeface="Segoe UI" panose="020B0502040204020203" pitchFamily="34" charset="0"/>
-              </a:rPr>
-              <a:t> </a:t>
-            </a:r>
-            <a:r>
-              <a:rPr lang="en-US" sz="2400" dirty="0" err="1">
+              <a:rPr lang="en-US" sz="2200" dirty="0">
+                <a:latin typeface="Segoe UI" panose="020B0502040204020203" pitchFamily="34" charset="0"/>
+                <a:cs typeface="Segoe UI" panose="020B0502040204020203" pitchFamily="34" charset="0"/>
+              </a:rPr>
+              <a:t> </a:t>
+            </a:r>
+            <a:r>
+              <a:rPr lang="en-US" sz="2200" dirty="0" err="1">
                 <a:latin typeface="Segoe UI" panose="020B0502040204020203" pitchFamily="34" charset="0"/>
                 <a:cs typeface="Segoe UI" panose="020B0502040204020203" pitchFamily="34" charset="0"/>
               </a:rPr>
               <a:t>tính</a:t>
             </a:r>
             <a:r>
-              <a:rPr lang="en-US" sz="2400" dirty="0">
-                <a:latin typeface="Segoe UI" panose="020B0502040204020203" pitchFamily="34" charset="0"/>
-                <a:cs typeface="Segoe UI" panose="020B0502040204020203" pitchFamily="34" charset="0"/>
-              </a:rPr>
-              <a:t> </a:t>
-            </a:r>
-            <a:r>
-              <a:rPr lang="en-US" sz="2400" dirty="0" err="1">
-                <a:latin typeface="Segoe UI" panose="020B0502040204020203" pitchFamily="34" charset="0"/>
-                <a:cs typeface="Segoe UI" panose="020B0502040204020203" pitchFamily="34" charset="0"/>
-              </a:rPr>
-              <a:t>và</a:t>
-            </a:r>
-            <a:r>
-              <a:rPr lang="en-US" sz="2400" dirty="0">
-                <a:latin typeface="Segoe UI" panose="020B0502040204020203" pitchFamily="34" charset="0"/>
-                <a:cs typeface="Segoe UI" panose="020B0502040204020203" pitchFamily="34" charset="0"/>
-              </a:rPr>
-              <a:t> </a:t>
-            </a:r>
-            <a:r>
-              <a:rPr lang="en-US" sz="2400" dirty="0" err="1">
+              <a:rPr lang="en-US" sz="2200" dirty="0">
+                <a:latin typeface="Segoe UI" panose="020B0502040204020203" pitchFamily="34" charset="0"/>
+                <a:cs typeface="Segoe UI" panose="020B0502040204020203" pitchFamily="34" charset="0"/>
+              </a:rPr>
+              <a:t> </a:t>
+            </a:r>
+            <a:r>
+              <a:rPr lang="en-US" sz="2200" dirty="0" smtClean="0">
+                <a:latin typeface="Segoe UI" panose="020B0502040204020203" pitchFamily="34" charset="0"/>
+                <a:cs typeface="Segoe UI" panose="020B0502040204020203" pitchFamily="34" charset="0"/>
+              </a:rPr>
+              <a:t>: </a:t>
+            </a:r>
+            <a:r>
+              <a:rPr lang="en-US" sz="2200" dirty="0" err="1" smtClean="0">
+                <a:latin typeface="Segoe UI" panose="020B0502040204020203" pitchFamily="34" charset="0"/>
+                <a:cs typeface="Segoe UI" panose="020B0502040204020203" pitchFamily="34" charset="0"/>
+              </a:rPr>
+              <a:t>Việc</a:t>
+            </a:r>
+            <a:r>
+              <a:rPr lang="en-US" sz="2200" dirty="0" smtClean="0">
+                <a:latin typeface="Segoe UI" panose="020B0502040204020203" pitchFamily="34" charset="0"/>
+                <a:cs typeface="Segoe UI" panose="020B0502040204020203" pitchFamily="34" charset="0"/>
+              </a:rPr>
+              <a:t> </a:t>
+            </a:r>
+            <a:r>
+              <a:rPr lang="en-US" sz="2200" dirty="0" err="1" smtClean="0">
+                <a:latin typeface="Segoe UI" panose="020B0502040204020203" pitchFamily="34" charset="0"/>
+                <a:cs typeface="Segoe UI" panose="020B0502040204020203" pitchFamily="34" charset="0"/>
+              </a:rPr>
+              <a:t>chọn</a:t>
+            </a:r>
+            <a:r>
+              <a:rPr lang="en-US" sz="2200" dirty="0" smtClean="0">
+                <a:latin typeface="Segoe UI" panose="020B0502040204020203" pitchFamily="34" charset="0"/>
+                <a:cs typeface="Segoe UI" panose="020B0502040204020203" pitchFamily="34" charset="0"/>
+              </a:rPr>
+              <a:t> </a:t>
+            </a:r>
+            <a:r>
+              <a:rPr lang="en-US" sz="2200" dirty="0" err="1" smtClean="0">
+                <a:latin typeface="Segoe UI" panose="020B0502040204020203" pitchFamily="34" charset="0"/>
+                <a:cs typeface="Segoe UI" panose="020B0502040204020203" pitchFamily="34" charset="0"/>
+              </a:rPr>
+              <a:t>thuộc</a:t>
+            </a:r>
+            <a:r>
+              <a:rPr lang="en-US" sz="2200" dirty="0" smtClean="0">
+                <a:latin typeface="Segoe UI" panose="020B0502040204020203" pitchFamily="34" charset="0"/>
+                <a:cs typeface="Segoe UI" panose="020B0502040204020203" pitchFamily="34" charset="0"/>
+              </a:rPr>
+              <a:t> </a:t>
+            </a:r>
+            <a:r>
+              <a:rPr lang="en-US" sz="2200" dirty="0" err="1" smtClean="0">
+                <a:latin typeface="Segoe UI" panose="020B0502040204020203" pitchFamily="34" charset="0"/>
+                <a:cs typeface="Segoe UI" panose="020B0502040204020203" pitchFamily="34" charset="0"/>
+              </a:rPr>
+              <a:t>tính</a:t>
+            </a:r>
+            <a:r>
+              <a:rPr lang="en-US" sz="2200" dirty="0" smtClean="0">
+                <a:latin typeface="Segoe UI" panose="020B0502040204020203" pitchFamily="34" charset="0"/>
+                <a:cs typeface="Segoe UI" panose="020B0502040204020203" pitchFamily="34" charset="0"/>
+              </a:rPr>
+              <a:t> </a:t>
+            </a:r>
+            <a:r>
+              <a:rPr lang="en-US" sz="2200" dirty="0" err="1" smtClean="0">
                 <a:latin typeface="Segoe UI" panose="020B0502040204020203" pitchFamily="34" charset="0"/>
                 <a:cs typeface="Segoe UI" panose="020B0502040204020203" pitchFamily="34" charset="0"/>
               </a:rPr>
               <a:t>đưa</a:t>
             </a:r>
             <a:r>
-              <a:rPr lang="en-US" sz="2400" dirty="0">
-                <a:latin typeface="Segoe UI" panose="020B0502040204020203" pitchFamily="34" charset="0"/>
-                <a:cs typeface="Segoe UI" panose="020B0502040204020203" pitchFamily="34" charset="0"/>
-              </a:rPr>
-              <a:t> </a:t>
-            </a:r>
-            <a:r>
-              <a:rPr lang="en-US" sz="2400" dirty="0" err="1">
+              <a:rPr lang="en-US" sz="2200" dirty="0" smtClean="0">
+                <a:latin typeface="Segoe UI" panose="020B0502040204020203" pitchFamily="34" charset="0"/>
+                <a:cs typeface="Segoe UI" panose="020B0502040204020203" pitchFamily="34" charset="0"/>
+              </a:rPr>
+              <a:t> </a:t>
+            </a:r>
+            <a:r>
+              <a:rPr lang="en-US" sz="2200" dirty="0" err="1" smtClean="0">
                 <a:latin typeface="Segoe UI" panose="020B0502040204020203" pitchFamily="34" charset="0"/>
                 <a:cs typeface="Segoe UI" panose="020B0502040204020203" pitchFamily="34" charset="0"/>
               </a:rPr>
               <a:t>vào</a:t>
             </a:r>
             <a:r>
-              <a:rPr lang="en-US" sz="2400" dirty="0">
-                <a:latin typeface="Segoe UI" panose="020B0502040204020203" pitchFamily="34" charset="0"/>
-                <a:cs typeface="Segoe UI" panose="020B0502040204020203" pitchFamily="34" charset="0"/>
-              </a:rPr>
-              <a:t> </a:t>
-            </a:r>
-            <a:r>
-              <a:rPr lang="en-US" sz="2400" dirty="0" err="1">
+              <a:rPr lang="en-US" sz="2200" dirty="0" smtClean="0">
+                <a:latin typeface="Segoe UI" panose="020B0502040204020203" pitchFamily="34" charset="0"/>
+                <a:cs typeface="Segoe UI" panose="020B0502040204020203" pitchFamily="34" charset="0"/>
+              </a:rPr>
+              <a:t> </a:t>
+            </a:r>
+            <a:r>
+              <a:rPr lang="en-US" sz="2200" dirty="0" err="1" smtClean="0">
                 <a:latin typeface="Segoe UI" panose="020B0502040204020203" pitchFamily="34" charset="0"/>
                 <a:cs typeface="Segoe UI" panose="020B0502040204020203" pitchFamily="34" charset="0"/>
               </a:rPr>
               <a:t>mô</a:t>
             </a:r>
             <a:r>
-              <a:rPr lang="en-US" sz="2400" dirty="0">
-                <a:latin typeface="Segoe UI" panose="020B0502040204020203" pitchFamily="34" charset="0"/>
-                <a:cs typeface="Segoe UI" panose="020B0502040204020203" pitchFamily="34" charset="0"/>
-              </a:rPr>
-              <a:t> </a:t>
-            </a:r>
-            <a:r>
-              <a:rPr lang="en-US" sz="2400" dirty="0" err="1" smtClean="0">
+              <a:rPr lang="en-US" sz="2200" dirty="0" smtClean="0">
+                <a:latin typeface="Segoe UI" panose="020B0502040204020203" pitchFamily="34" charset="0"/>
+                <a:cs typeface="Segoe UI" panose="020B0502040204020203" pitchFamily="34" charset="0"/>
+              </a:rPr>
+              <a:t> </a:t>
+            </a:r>
+            <a:r>
+              <a:rPr lang="en-US" sz="2200" dirty="0" err="1" smtClean="0">
                 <a:latin typeface="Segoe UI" panose="020B0502040204020203" pitchFamily="34" charset="0"/>
                 <a:cs typeface="Segoe UI" panose="020B0502040204020203" pitchFamily="34" charset="0"/>
               </a:rPr>
               <a:t>hình</a:t>
             </a:r>
             <a:r>
-              <a:rPr lang="en-US" sz="2400" dirty="0" smtClean="0">
-                <a:latin typeface="Segoe UI" panose="020B0502040204020203" pitchFamily="34" charset="0"/>
-                <a:cs typeface="Segoe UI" panose="020B0502040204020203" pitchFamily="34" charset="0"/>
-              </a:rPr>
-              <a:t>: </a:t>
-            </a:r>
-            <a:r>
-              <a:rPr lang="en-US" sz="2400" dirty="0" err="1" smtClean="0">
-                <a:latin typeface="Segoe UI" panose="020B0502040204020203" pitchFamily="34" charset="0"/>
-                <a:cs typeface="Segoe UI" panose="020B0502040204020203" pitchFamily="34" charset="0"/>
-              </a:rPr>
-              <a:t>Chọn</a:t>
-            </a:r>
-            <a:r>
-              <a:rPr lang="en-US" sz="2400" dirty="0" smtClean="0">
-                <a:latin typeface="Segoe UI" panose="020B0502040204020203" pitchFamily="34" charset="0"/>
-                <a:cs typeface="Segoe UI" panose="020B0502040204020203" pitchFamily="34" charset="0"/>
-              </a:rPr>
-              <a:t> </a:t>
-            </a:r>
-            <a:r>
-              <a:rPr lang="en-US" sz="2400" dirty="0" err="1" smtClean="0">
-                <a:latin typeface="Segoe UI" panose="020B0502040204020203" pitchFamily="34" charset="0"/>
-                <a:cs typeface="Segoe UI" panose="020B0502040204020203" pitchFamily="34" charset="0"/>
-              </a:rPr>
-              <a:t>thuộc</a:t>
-            </a:r>
-            <a:r>
-              <a:rPr lang="en-US" sz="2400" dirty="0" smtClean="0">
-                <a:latin typeface="Segoe UI" panose="020B0502040204020203" pitchFamily="34" charset="0"/>
-                <a:cs typeface="Segoe UI" panose="020B0502040204020203" pitchFamily="34" charset="0"/>
-              </a:rPr>
-              <a:t> </a:t>
-            </a:r>
-            <a:r>
-              <a:rPr lang="en-US" sz="2400" dirty="0" err="1" smtClean="0">
-                <a:latin typeface="Segoe UI" panose="020B0502040204020203" pitchFamily="34" charset="0"/>
-                <a:cs typeface="Segoe UI" panose="020B0502040204020203" pitchFamily="34" charset="0"/>
-              </a:rPr>
-              <a:t>tính</a:t>
-            </a:r>
-            <a:r>
-              <a:rPr lang="en-US" sz="2400" dirty="0" smtClean="0">
-                <a:latin typeface="Segoe UI" panose="020B0502040204020203" pitchFamily="34" charset="0"/>
-                <a:cs typeface="Segoe UI" panose="020B0502040204020203" pitchFamily="34" charset="0"/>
-              </a:rPr>
-              <a:t> </a:t>
-            </a:r>
-            <a:r>
-              <a:rPr lang="en-US" sz="2400" dirty="0" err="1" smtClean="0">
+              <a:rPr lang="en-US" sz="2200" dirty="0" smtClean="0">
+                <a:latin typeface="Segoe UI" panose="020B0502040204020203" pitchFamily="34" charset="0"/>
+                <a:cs typeface="Segoe UI" panose="020B0502040204020203" pitchFamily="34" charset="0"/>
+              </a:rPr>
+              <a:t> </a:t>
+            </a:r>
+            <a:r>
+              <a:rPr lang="en-US" sz="2200" dirty="0" err="1" smtClean="0">
                 <a:latin typeface="Segoe UI" panose="020B0502040204020203" pitchFamily="34" charset="0"/>
                 <a:cs typeface="Segoe UI" panose="020B0502040204020203" pitchFamily="34" charset="0"/>
               </a:rPr>
               <a:t>làm</a:t>
             </a:r>
             <a:r>
-              <a:rPr lang="en-US" sz="2400" dirty="0" smtClean="0">
-                <a:latin typeface="Segoe UI" panose="020B0502040204020203" pitchFamily="34" charset="0"/>
-                <a:cs typeface="Segoe UI" panose="020B0502040204020203" pitchFamily="34" charset="0"/>
-              </a:rPr>
-              <a:t> </a:t>
-            </a:r>
-            <a:r>
-              <a:rPr lang="en-US" sz="2400" dirty="0" err="1" smtClean="0">
+              <a:rPr lang="en-US" sz="2200" dirty="0" smtClean="0">
+                <a:latin typeface="Segoe UI" panose="020B0502040204020203" pitchFamily="34" charset="0"/>
+                <a:cs typeface="Segoe UI" panose="020B0502040204020203" pitchFamily="34" charset="0"/>
+              </a:rPr>
+              <a:t> </a:t>
+            </a:r>
+            <a:r>
+              <a:rPr lang="en-US" sz="2200" dirty="0" err="1" smtClean="0">
                 <a:latin typeface="Segoe UI" panose="020B0502040204020203" pitchFamily="34" charset="0"/>
                 <a:cs typeface="Segoe UI" panose="020B0502040204020203" pitchFamily="34" charset="0"/>
               </a:rPr>
               <a:t>mô</a:t>
             </a:r>
             <a:r>
-              <a:rPr lang="en-US" sz="2400" dirty="0" smtClean="0">
-                <a:latin typeface="Segoe UI" panose="020B0502040204020203" pitchFamily="34" charset="0"/>
-                <a:cs typeface="Segoe UI" panose="020B0502040204020203" pitchFamily="34" charset="0"/>
-              </a:rPr>
-              <a:t> </a:t>
-            </a:r>
-            <a:r>
-              <a:rPr lang="en-US" sz="2400" dirty="0" err="1" smtClean="0">
+              <a:rPr lang="en-US" sz="2200" dirty="0" smtClean="0">
+                <a:latin typeface="Segoe UI" panose="020B0502040204020203" pitchFamily="34" charset="0"/>
+                <a:cs typeface="Segoe UI" panose="020B0502040204020203" pitchFamily="34" charset="0"/>
+              </a:rPr>
+              <a:t> </a:t>
+            </a:r>
+            <a:r>
+              <a:rPr lang="en-US" sz="2200" dirty="0" err="1" smtClean="0">
                 <a:latin typeface="Segoe UI" panose="020B0502040204020203" pitchFamily="34" charset="0"/>
                 <a:cs typeface="Segoe UI" panose="020B0502040204020203" pitchFamily="34" charset="0"/>
               </a:rPr>
               <a:t>hình</a:t>
             </a:r>
             <a:r>
-              <a:rPr lang="en-US" sz="2400" dirty="0" smtClean="0">
-                <a:latin typeface="Segoe UI" panose="020B0502040204020203" pitchFamily="34" charset="0"/>
-                <a:cs typeface="Segoe UI" panose="020B0502040204020203" pitchFamily="34" charset="0"/>
-              </a:rPr>
-              <a:t> </a:t>
-            </a:r>
-            <a:r>
-              <a:rPr lang="en-US" sz="2400" dirty="0" err="1" smtClean="0">
+              <a:rPr lang="en-US" sz="2200" dirty="0" smtClean="0">
+                <a:latin typeface="Segoe UI" panose="020B0502040204020203" pitchFamily="34" charset="0"/>
+                <a:cs typeface="Segoe UI" panose="020B0502040204020203" pitchFamily="34" charset="0"/>
+              </a:rPr>
+              <a:t> </a:t>
+            </a:r>
+            <a:r>
+              <a:rPr lang="en-US" sz="2200" dirty="0" err="1" smtClean="0">
                 <a:latin typeface="Segoe UI" panose="020B0502040204020203" pitchFamily="34" charset="0"/>
                 <a:cs typeface="Segoe UI" panose="020B0502040204020203" pitchFamily="34" charset="0"/>
               </a:rPr>
               <a:t>ít</a:t>
             </a:r>
             <a:r>
-              <a:rPr lang="en-US" sz="2400" dirty="0" smtClean="0">
-                <a:latin typeface="Segoe UI" panose="020B0502040204020203" pitchFamily="34" charset="0"/>
-                <a:cs typeface="Segoe UI" panose="020B0502040204020203" pitchFamily="34" charset="0"/>
-              </a:rPr>
-              <a:t> </a:t>
-            </a:r>
-            <a:r>
-              <a:rPr lang="en-US" sz="2400" dirty="0" err="1" smtClean="0">
+              <a:rPr lang="en-US" sz="2200" dirty="0" smtClean="0">
+                <a:latin typeface="Segoe UI" panose="020B0502040204020203" pitchFamily="34" charset="0"/>
+                <a:cs typeface="Segoe UI" panose="020B0502040204020203" pitchFamily="34" charset="0"/>
+              </a:rPr>
+              <a:t> </a:t>
+            </a:r>
+            <a:r>
+              <a:rPr lang="en-US" sz="2200" dirty="0" err="1" smtClean="0">
                 <a:latin typeface="Segoe UI" panose="020B0502040204020203" pitchFamily="34" charset="0"/>
                 <a:cs typeface="Segoe UI" panose="020B0502040204020203" pitchFamily="34" charset="0"/>
               </a:rPr>
               <a:t>phức</a:t>
             </a:r>
             <a:r>
-              <a:rPr lang="en-US" sz="2400" dirty="0" smtClean="0">
-                <a:latin typeface="Segoe UI" panose="020B0502040204020203" pitchFamily="34" charset="0"/>
-                <a:cs typeface="Segoe UI" panose="020B0502040204020203" pitchFamily="34" charset="0"/>
-              </a:rPr>
-              <a:t> </a:t>
-            </a:r>
-            <a:r>
-              <a:rPr lang="en-US" sz="2400" dirty="0" err="1" smtClean="0">
+              <a:rPr lang="en-US" sz="2200" dirty="0" smtClean="0">
+                <a:latin typeface="Segoe UI" panose="020B0502040204020203" pitchFamily="34" charset="0"/>
+                <a:cs typeface="Segoe UI" panose="020B0502040204020203" pitchFamily="34" charset="0"/>
+              </a:rPr>
+              <a:t> </a:t>
+            </a:r>
+            <a:r>
+              <a:rPr lang="en-US" sz="2200" dirty="0" err="1" smtClean="0">
                 <a:latin typeface="Segoe UI" panose="020B0502040204020203" pitchFamily="34" charset="0"/>
                 <a:cs typeface="Segoe UI" panose="020B0502040204020203" pitchFamily="34" charset="0"/>
               </a:rPr>
               <a:t>tạp</a:t>
             </a:r>
             <a:r>
-              <a:rPr lang="en-US" sz="2400" dirty="0" smtClean="0">
-                <a:latin typeface="Segoe UI" panose="020B0502040204020203" pitchFamily="34" charset="0"/>
-                <a:cs typeface="Segoe UI" panose="020B0502040204020203" pitchFamily="34" charset="0"/>
-              </a:rPr>
-              <a:t> </a:t>
-            </a:r>
-            <a:r>
-              <a:rPr lang="en-US" sz="2400" dirty="0" err="1" smtClean="0">
+              <a:rPr lang="en-US" sz="2200" dirty="0" smtClean="0">
+                <a:latin typeface="Segoe UI" panose="020B0502040204020203" pitchFamily="34" charset="0"/>
+                <a:cs typeface="Segoe UI" panose="020B0502040204020203" pitchFamily="34" charset="0"/>
+              </a:rPr>
+              <a:t> </a:t>
+            </a:r>
+            <a:r>
+              <a:rPr lang="en-US" sz="2200" dirty="0" err="1" smtClean="0">
                 <a:latin typeface="Segoe UI" panose="020B0502040204020203" pitchFamily="34" charset="0"/>
                 <a:cs typeface="Segoe UI" panose="020B0502040204020203" pitchFamily="34" charset="0"/>
               </a:rPr>
               <a:t>đồng</a:t>
             </a:r>
             <a:r>
-              <a:rPr lang="en-US" sz="2400" dirty="0" smtClean="0">
-                <a:latin typeface="Segoe UI" panose="020B0502040204020203" pitchFamily="34" charset="0"/>
-                <a:cs typeface="Segoe UI" panose="020B0502040204020203" pitchFamily="34" charset="0"/>
-              </a:rPr>
-              <a:t> </a:t>
-            </a:r>
-            <a:r>
-              <a:rPr lang="en-US" sz="2400" dirty="0" err="1" smtClean="0">
+              <a:rPr lang="en-US" sz="2200" dirty="0" smtClean="0">
+                <a:latin typeface="Segoe UI" panose="020B0502040204020203" pitchFamily="34" charset="0"/>
+                <a:cs typeface="Segoe UI" panose="020B0502040204020203" pitchFamily="34" charset="0"/>
+              </a:rPr>
+              <a:t> </a:t>
+            </a:r>
+            <a:r>
+              <a:rPr lang="en-US" sz="2200" dirty="0" err="1" smtClean="0">
                 <a:latin typeface="Segoe UI" panose="020B0502040204020203" pitchFamily="34" charset="0"/>
                 <a:cs typeface="Segoe UI" panose="020B0502040204020203" pitchFamily="34" charset="0"/>
               </a:rPr>
               <a:t>thời</a:t>
             </a:r>
             <a:r>
-              <a:rPr lang="en-US" sz="2400" dirty="0" smtClean="0">
-                <a:latin typeface="Segoe UI" panose="020B0502040204020203" pitchFamily="34" charset="0"/>
-                <a:cs typeface="Segoe UI" panose="020B0502040204020203" pitchFamily="34" charset="0"/>
-              </a:rPr>
-              <a:t> </a:t>
-            </a:r>
-            <a:r>
-              <a:rPr lang="en-US" sz="2400" dirty="0" err="1" smtClean="0">
+              <a:rPr lang="en-US" sz="2200" dirty="0" smtClean="0">
+                <a:latin typeface="Segoe UI" panose="020B0502040204020203" pitchFamily="34" charset="0"/>
+                <a:cs typeface="Segoe UI" panose="020B0502040204020203" pitchFamily="34" charset="0"/>
+              </a:rPr>
+              <a:t> </a:t>
+            </a:r>
+            <a:r>
+              <a:rPr lang="en-US" sz="2200" dirty="0" err="1" smtClean="0">
                 <a:latin typeface="Segoe UI" panose="020B0502040204020203" pitchFamily="34" charset="0"/>
                 <a:cs typeface="Segoe UI" panose="020B0502040204020203" pitchFamily="34" charset="0"/>
               </a:rPr>
               <a:t>giảm</a:t>
             </a:r>
             <a:r>
-              <a:rPr lang="en-US" sz="2400" dirty="0" smtClean="0">
-                <a:latin typeface="Segoe UI" panose="020B0502040204020203" pitchFamily="34" charset="0"/>
-                <a:cs typeface="Segoe UI" panose="020B0502040204020203" pitchFamily="34" charset="0"/>
-              </a:rPr>
-              <a:t> </a:t>
-            </a:r>
-            <a:r>
-              <a:rPr lang="en-US" sz="2400" dirty="0" err="1" smtClean="0">
+              <a:rPr lang="en-US" sz="2200" dirty="0" smtClean="0">
+                <a:latin typeface="Segoe UI" panose="020B0502040204020203" pitchFamily="34" charset="0"/>
+                <a:cs typeface="Segoe UI" panose="020B0502040204020203" pitchFamily="34" charset="0"/>
+              </a:rPr>
+              <a:t> </a:t>
+            </a:r>
+            <a:r>
+              <a:rPr lang="en-US" sz="2200" dirty="0" err="1" smtClean="0">
                 <a:latin typeface="Segoe UI" panose="020B0502040204020203" pitchFamily="34" charset="0"/>
                 <a:cs typeface="Segoe UI" panose="020B0502040204020203" pitchFamily="34" charset="0"/>
               </a:rPr>
               <a:t>thời</a:t>
             </a:r>
             <a:r>
-              <a:rPr lang="en-US" sz="2400" dirty="0" smtClean="0">
-                <a:latin typeface="Segoe UI" panose="020B0502040204020203" pitchFamily="34" charset="0"/>
-                <a:cs typeface="Segoe UI" panose="020B0502040204020203" pitchFamily="34" charset="0"/>
-              </a:rPr>
-              <a:t> </a:t>
-            </a:r>
-            <a:r>
-              <a:rPr lang="en-US" sz="2400" dirty="0" err="1" smtClean="0">
+              <a:rPr lang="en-US" sz="2200" dirty="0" smtClean="0">
+                <a:latin typeface="Segoe UI" panose="020B0502040204020203" pitchFamily="34" charset="0"/>
+                <a:cs typeface="Segoe UI" panose="020B0502040204020203" pitchFamily="34" charset="0"/>
+              </a:rPr>
+              <a:t> </a:t>
+            </a:r>
+            <a:r>
+              <a:rPr lang="en-US" sz="2200" dirty="0" err="1" smtClean="0">
                 <a:latin typeface="Segoe UI" panose="020B0502040204020203" pitchFamily="34" charset="0"/>
                 <a:cs typeface="Segoe UI" panose="020B0502040204020203" pitchFamily="34" charset="0"/>
               </a:rPr>
               <a:t>gian</a:t>
             </a:r>
             <a:r>
-              <a:rPr lang="en-US" sz="2400" dirty="0" smtClean="0">
-                <a:latin typeface="Segoe UI" panose="020B0502040204020203" pitchFamily="34" charset="0"/>
-                <a:cs typeface="Segoe UI" panose="020B0502040204020203" pitchFamily="34" charset="0"/>
-              </a:rPr>
-              <a:t> </a:t>
-            </a:r>
-            <a:r>
-              <a:rPr lang="en-US" sz="2400" dirty="0" err="1" smtClean="0">
+              <a:rPr lang="en-US" sz="2200" dirty="0" smtClean="0">
+                <a:latin typeface="Segoe UI" panose="020B0502040204020203" pitchFamily="34" charset="0"/>
+                <a:cs typeface="Segoe UI" panose="020B0502040204020203" pitchFamily="34" charset="0"/>
+              </a:rPr>
+              <a:t> </a:t>
+            </a:r>
+            <a:r>
+              <a:rPr lang="en-US" sz="2200" dirty="0" err="1" smtClean="0">
                 <a:latin typeface="Segoe UI" panose="020B0502040204020203" pitchFamily="34" charset="0"/>
                 <a:cs typeface="Segoe UI" panose="020B0502040204020203" pitchFamily="34" charset="0"/>
               </a:rPr>
               <a:t>huấn</a:t>
             </a:r>
             <a:r>
-              <a:rPr lang="en-US" sz="2400" dirty="0" smtClean="0">
-                <a:latin typeface="Segoe UI" panose="020B0502040204020203" pitchFamily="34" charset="0"/>
-                <a:cs typeface="Segoe UI" panose="020B0502040204020203" pitchFamily="34" charset="0"/>
-              </a:rPr>
-              <a:t> </a:t>
-            </a:r>
-            <a:r>
-              <a:rPr lang="en-US" sz="2400" dirty="0" err="1" smtClean="0">
+              <a:rPr lang="en-US" sz="2200" dirty="0" smtClean="0">
+                <a:latin typeface="Segoe UI" panose="020B0502040204020203" pitchFamily="34" charset="0"/>
+                <a:cs typeface="Segoe UI" panose="020B0502040204020203" pitchFamily="34" charset="0"/>
+              </a:rPr>
+              <a:t> </a:t>
+            </a:r>
+            <a:r>
+              <a:rPr lang="en-US" sz="2200" dirty="0" err="1" smtClean="0">
                 <a:latin typeface="Segoe UI" panose="020B0502040204020203" pitchFamily="34" charset="0"/>
                 <a:cs typeface="Segoe UI" panose="020B0502040204020203" pitchFamily="34" charset="0"/>
               </a:rPr>
               <a:t>luyện</a:t>
             </a:r>
             <a:r>
-              <a:rPr lang="en-US" sz="2400" dirty="0">
-                <a:latin typeface="Segoe UI" panose="020B0502040204020203" pitchFamily="34" charset="0"/>
-                <a:cs typeface="Segoe UI" panose="020B0502040204020203" pitchFamily="34" charset="0"/>
-              </a:rPr>
-              <a:t> </a:t>
-            </a:r>
-            <a:r>
-              <a:rPr lang="en-US" sz="2400" dirty="0" err="1" smtClean="0">
+              <a:rPr lang="en-US" sz="2200" dirty="0">
+                <a:latin typeface="Segoe UI" panose="020B0502040204020203" pitchFamily="34" charset="0"/>
+                <a:cs typeface="Segoe UI" panose="020B0502040204020203" pitchFamily="34" charset="0"/>
+              </a:rPr>
+              <a:t> </a:t>
+            </a:r>
+            <a:r>
+              <a:rPr lang="en-US" sz="2200" dirty="0" err="1" smtClean="0">
                 <a:latin typeface="Segoe UI" panose="020B0502040204020203" pitchFamily="34" charset="0"/>
                 <a:cs typeface="Segoe UI" panose="020B0502040204020203" pitchFamily="34" charset="0"/>
               </a:rPr>
               <a:t>tăng</a:t>
             </a:r>
-            <a:endParaRPr lang="en-US" sz="2400" dirty="0" smtClean="0">
+            <a:r>
+              <a:rPr lang="en-US" sz="2200" dirty="0">
+                <a:latin typeface="Segoe UI" panose="020B0502040204020203" pitchFamily="34" charset="0"/>
+                <a:cs typeface="Segoe UI" panose="020B0502040204020203" pitchFamily="34" charset="0"/>
+              </a:rPr>
+              <a:t> </a:t>
+            </a:r>
+            <a:r>
+              <a:rPr lang="en-US" sz="2200" dirty="0" err="1" smtClean="0">
+                <a:latin typeface="Segoe UI" panose="020B0502040204020203" pitchFamily="34" charset="0"/>
+                <a:cs typeface="Segoe UI" panose="020B0502040204020203" pitchFamily="34" charset="0"/>
+              </a:rPr>
+              <a:t>hiệu</a:t>
+            </a:r>
+            <a:r>
+              <a:rPr lang="en-US" sz="2200" dirty="0" smtClean="0">
+                <a:latin typeface="Segoe UI" panose="020B0502040204020203" pitchFamily="34" charset="0"/>
+                <a:cs typeface="Segoe UI" panose="020B0502040204020203" pitchFamily="34" charset="0"/>
+              </a:rPr>
+              <a:t> </a:t>
+            </a:r>
+            <a:r>
+              <a:rPr lang="en-US" sz="2200" dirty="0" err="1" smtClean="0">
+                <a:latin typeface="Segoe UI" panose="020B0502040204020203" pitchFamily="34" charset="0"/>
+                <a:cs typeface="Segoe UI" panose="020B0502040204020203" pitchFamily="34" charset="0"/>
+              </a:rPr>
+              <a:t>suất</a:t>
+            </a:r>
+            <a:endParaRPr lang="en-US" sz="2200" dirty="0" smtClean="0">
               <a:latin typeface="Segoe UI" panose="020B0502040204020203" pitchFamily="34" charset="0"/>
               <a:cs typeface="Segoe UI" panose="020B0502040204020203" pitchFamily="34" charset="0"/>
             </a:endParaRPr>
@@ -21013,76 +21010,41 @@
               <a:buNone/>
             </a:pPr>
             <a:r>
-              <a:rPr lang="en-US" sz="2400" dirty="0" err="1" smtClean="0">
-                <a:latin typeface="Segoe UI" panose="020B0502040204020203" pitchFamily="34" charset="0"/>
-                <a:cs typeface="Segoe UI" panose="020B0502040204020203" pitchFamily="34" charset="0"/>
-              </a:rPr>
-              <a:t>hiệu</a:t>
-            </a:r>
-            <a:r>
-              <a:rPr lang="en-US" sz="2400" dirty="0" smtClean="0">
-                <a:latin typeface="Segoe UI" panose="020B0502040204020203" pitchFamily="34" charset="0"/>
-                <a:cs typeface="Segoe UI" panose="020B0502040204020203" pitchFamily="34" charset="0"/>
-              </a:rPr>
-              <a:t> </a:t>
-            </a:r>
-            <a:r>
-              <a:rPr lang="en-US" sz="2400" dirty="0" err="1" smtClean="0">
-                <a:latin typeface="Segoe UI" panose="020B0502040204020203" pitchFamily="34" charset="0"/>
-                <a:cs typeface="Segoe UI" panose="020B0502040204020203" pitchFamily="34" charset="0"/>
-              </a:rPr>
-              <a:t>suất</a:t>
-            </a:r>
-            <a:r>
-              <a:rPr lang="en-US" sz="2400" dirty="0" smtClean="0">
-                <a:latin typeface="Segoe UI" panose="020B0502040204020203" pitchFamily="34" charset="0"/>
-                <a:cs typeface="Segoe UI" panose="020B0502040204020203" pitchFamily="34" charset="0"/>
-              </a:rPr>
-              <a:t> </a:t>
-            </a:r>
-            <a:r>
-              <a:rPr lang="en-US" sz="2400" dirty="0" err="1" smtClean="0">
+              <a:rPr lang="en-US" sz="2200" dirty="0" err="1" smtClean="0">
                 <a:latin typeface="Segoe UI" panose="020B0502040204020203" pitchFamily="34" charset="0"/>
                 <a:cs typeface="Segoe UI" panose="020B0502040204020203" pitchFamily="34" charset="0"/>
               </a:rPr>
               <a:t>của</a:t>
             </a:r>
             <a:r>
-              <a:rPr lang="en-US" sz="2400" dirty="0" smtClean="0">
-                <a:latin typeface="Segoe UI" panose="020B0502040204020203" pitchFamily="34" charset="0"/>
-                <a:cs typeface="Segoe UI" panose="020B0502040204020203" pitchFamily="34" charset="0"/>
-              </a:rPr>
-              <a:t> </a:t>
-            </a:r>
-            <a:r>
-              <a:rPr lang="en-US" sz="2400" dirty="0" err="1" smtClean="0">
+              <a:rPr lang="en-US" sz="2200" dirty="0" smtClean="0">
+                <a:latin typeface="Segoe UI" panose="020B0502040204020203" pitchFamily="34" charset="0"/>
+                <a:cs typeface="Segoe UI" panose="020B0502040204020203" pitchFamily="34" charset="0"/>
+              </a:rPr>
+              <a:t> </a:t>
+            </a:r>
+            <a:r>
+              <a:rPr lang="en-US" sz="2200" dirty="0" err="1" smtClean="0">
                 <a:latin typeface="Segoe UI" panose="020B0502040204020203" pitchFamily="34" charset="0"/>
                 <a:cs typeface="Segoe UI" panose="020B0502040204020203" pitchFamily="34" charset="0"/>
               </a:rPr>
               <a:t>mô</a:t>
             </a:r>
             <a:r>
-              <a:rPr lang="en-US" sz="2400" dirty="0" smtClean="0">
-                <a:latin typeface="Segoe UI" panose="020B0502040204020203" pitchFamily="34" charset="0"/>
-                <a:cs typeface="Segoe UI" panose="020B0502040204020203" pitchFamily="34" charset="0"/>
-              </a:rPr>
-              <a:t> </a:t>
-            </a:r>
-            <a:r>
-              <a:rPr lang="en-US" sz="2400" dirty="0" err="1" smtClean="0">
+              <a:rPr lang="en-US" sz="2200" dirty="0" smtClean="0">
+                <a:latin typeface="Segoe UI" panose="020B0502040204020203" pitchFamily="34" charset="0"/>
+                <a:cs typeface="Segoe UI" panose="020B0502040204020203" pitchFamily="34" charset="0"/>
+              </a:rPr>
+              <a:t> </a:t>
+            </a:r>
+            <a:r>
+              <a:rPr lang="en-US" sz="2200" dirty="0" err="1" smtClean="0">
                 <a:latin typeface="Segoe UI" panose="020B0502040204020203" pitchFamily="34" charset="0"/>
                 <a:cs typeface="Segoe UI" panose="020B0502040204020203" pitchFamily="34" charset="0"/>
               </a:rPr>
               <a:t>hình</a:t>
             </a:r>
-            <a:r>
-              <a:rPr lang="en-US" sz="2400" dirty="0" smtClean="0">
-                <a:latin typeface="Segoe UI" panose="020B0502040204020203" pitchFamily="34" charset="0"/>
-                <a:cs typeface="Segoe UI" panose="020B0502040204020203" pitchFamily="34" charset="0"/>
-              </a:rPr>
-              <a:t> </a:t>
-            </a:r>
-            <a:endParaRPr lang="en-US" sz="2400" dirty="0" smtClean="0">
+            <a:endParaRPr lang="en-US" sz="2200" dirty="0" smtClean="0">
               <a:latin typeface="Segoe UI" panose="020B0502040204020203" pitchFamily="34" charset="0"/>
               <a:cs typeface="Segoe UI" panose="020B0502040204020203" pitchFamily="34" charset="0"/>
             </a:endParaRPr>
@@ -21145,53 +21107,95 @@
               <a:t> </a:t>
             </a:r>
             <a:r>
-              <a:rPr lang="en-US" sz="2200" dirty="0" err="1">
-                <a:latin typeface="Segoe UI" panose="020B0502040204020203" pitchFamily="34" charset="0"/>
-                <a:cs typeface="Segoe UI" panose="020B0502040204020203" pitchFamily="34" charset="0"/>
-              </a:rPr>
-              <a:t>kinh</a:t>
-            </a:r>
-            <a:r>
-              <a:rPr lang="en-US" sz="2200" dirty="0">
-                <a:latin typeface="Segoe UI" panose="020B0502040204020203" pitchFamily="34" charset="0"/>
-                <a:cs typeface="Segoe UI" panose="020B0502040204020203" pitchFamily="34" charset="0"/>
-              </a:rPr>
-              <a:t> </a:t>
-            </a:r>
-            <a:r>
-              <a:rPr lang="en-US" sz="2200" dirty="0" err="1">
-                <a:latin typeface="Segoe UI" panose="020B0502040204020203" pitchFamily="34" charset="0"/>
-                <a:cs typeface="Segoe UI" panose="020B0502040204020203" pitchFamily="34" charset="0"/>
-              </a:rPr>
-              <a:t>nghiệm</a:t>
-            </a:r>
-            <a:r>
-              <a:rPr lang="en-US" sz="2200" dirty="0">
-                <a:latin typeface="Segoe UI" panose="020B0502040204020203" pitchFamily="34" charset="0"/>
-                <a:cs typeface="Segoe UI" panose="020B0502040204020203" pitchFamily="34" charset="0"/>
-              </a:rPr>
-              <a:t> </a:t>
-            </a:r>
-            <a:r>
-              <a:rPr lang="en-US" sz="2200" dirty="0" err="1">
+              <a:rPr lang="en-US" sz="2200" dirty="0" err="1" smtClean="0">
+                <a:latin typeface="Segoe UI" panose="020B0502040204020203" pitchFamily="34" charset="0"/>
+                <a:cs typeface="Segoe UI" panose="020B0502040204020203" pitchFamily="34" charset="0"/>
+              </a:rPr>
+              <a:t>hiểu</a:t>
+            </a:r>
+            <a:r>
+              <a:rPr lang="en-US" sz="2200" dirty="0" smtClean="0">
+                <a:latin typeface="Segoe UI" panose="020B0502040204020203" pitchFamily="34" charset="0"/>
+                <a:cs typeface="Segoe UI" panose="020B0502040204020203" pitchFamily="34" charset="0"/>
+              </a:rPr>
+              <a:t> </a:t>
+            </a:r>
+            <a:r>
+              <a:rPr lang="en-US" sz="2200" dirty="0" err="1" smtClean="0">
+                <a:latin typeface="Segoe UI" panose="020B0502040204020203" pitchFamily="34" charset="0"/>
+                <a:cs typeface="Segoe UI" panose="020B0502040204020203" pitchFamily="34" charset="0"/>
+              </a:rPr>
+              <a:t>biết</a:t>
+            </a:r>
+            <a:r>
+              <a:rPr lang="en-US" sz="2200" dirty="0" smtClean="0">
+                <a:latin typeface="Segoe UI" panose="020B0502040204020203" pitchFamily="34" charset="0"/>
+                <a:cs typeface="Segoe UI" panose="020B0502040204020203" pitchFamily="34" charset="0"/>
+              </a:rPr>
+              <a:t> </a:t>
+            </a:r>
+            <a:r>
+              <a:rPr lang="en-US" sz="2200" dirty="0" err="1" smtClean="0">
                 <a:latin typeface="Segoe UI" panose="020B0502040204020203" pitchFamily="34" charset="0"/>
                 <a:cs typeface="Segoe UI" panose="020B0502040204020203" pitchFamily="34" charset="0"/>
               </a:rPr>
               <a:t>thực</a:t>
             </a:r>
             <a:r>
-              <a:rPr lang="en-US" sz="2200" dirty="0">
-                <a:latin typeface="Segoe UI" panose="020B0502040204020203" pitchFamily="34" charset="0"/>
-                <a:cs typeface="Segoe UI" panose="020B0502040204020203" pitchFamily="34" charset="0"/>
-              </a:rPr>
-              <a:t> </a:t>
-            </a:r>
-            <a:r>
-              <a:rPr lang="en-US" sz="2200" dirty="0" err="1">
+              <a:rPr lang="en-US" sz="2200" dirty="0" smtClean="0">
+                <a:latin typeface="Segoe UI" panose="020B0502040204020203" pitchFamily="34" charset="0"/>
+                <a:cs typeface="Segoe UI" panose="020B0502040204020203" pitchFamily="34" charset="0"/>
+              </a:rPr>
+              <a:t> </a:t>
+            </a:r>
+            <a:r>
+              <a:rPr lang="en-US" sz="2200" dirty="0" err="1" smtClean="0">
                 <a:latin typeface="Segoe UI" panose="020B0502040204020203" pitchFamily="34" charset="0"/>
                 <a:cs typeface="Segoe UI" panose="020B0502040204020203" pitchFamily="34" charset="0"/>
               </a:rPr>
               <a:t>tế</a:t>
+            </a:r>
+            <a:r>
+              <a:rPr lang="en-US" sz="2200" dirty="0" smtClean="0">
+                <a:latin typeface="Segoe UI" panose="020B0502040204020203" pitchFamily="34" charset="0"/>
+                <a:cs typeface="Segoe UI" panose="020B0502040204020203" pitchFamily="34" charset="0"/>
+              </a:rPr>
+              <a:t> </a:t>
+            </a:r>
+            <a:r>
+              <a:rPr lang="en-US" sz="2200" dirty="0" err="1" smtClean="0">
+                <a:latin typeface="Segoe UI" panose="020B0502040204020203" pitchFamily="34" charset="0"/>
+                <a:cs typeface="Segoe UI" panose="020B0502040204020203" pitchFamily="34" charset="0"/>
+              </a:rPr>
+              <a:t>về</a:t>
+            </a:r>
+            <a:r>
+              <a:rPr lang="en-US" sz="2200" dirty="0" smtClean="0">
+                <a:latin typeface="Segoe UI" panose="020B0502040204020203" pitchFamily="34" charset="0"/>
+                <a:cs typeface="Segoe UI" panose="020B0502040204020203" pitchFamily="34" charset="0"/>
+              </a:rPr>
+              <a:t> </a:t>
+            </a:r>
+            <a:r>
+              <a:rPr lang="en-US" sz="2200" dirty="0" err="1" smtClean="0">
+                <a:latin typeface="Segoe UI" panose="020B0502040204020203" pitchFamily="34" charset="0"/>
+                <a:cs typeface="Segoe UI" panose="020B0502040204020203" pitchFamily="34" charset="0"/>
+              </a:rPr>
+              <a:t>dữ</a:t>
+            </a:r>
+            <a:r>
+              <a:rPr lang="en-US" sz="2200" dirty="0" smtClean="0">
+                <a:latin typeface="Segoe UI" panose="020B0502040204020203" pitchFamily="34" charset="0"/>
+                <a:cs typeface="Segoe UI" panose="020B0502040204020203" pitchFamily="34" charset="0"/>
+              </a:rPr>
+              <a:t> </a:t>
+            </a:r>
+            <a:r>
+              <a:rPr lang="en-US" sz="2200" dirty="0" err="1" smtClean="0">
+                <a:latin typeface="Segoe UI" panose="020B0502040204020203" pitchFamily="34" charset="0"/>
+                <a:cs typeface="Segoe UI" panose="020B0502040204020203" pitchFamily="34" charset="0"/>
+              </a:rPr>
+              <a:t>liệu</a:t>
             </a:r>
             <a:endParaRPr lang="en-US" sz="2200" dirty="0">
               <a:latin typeface="Segoe UI" panose="020B0502040204020203" pitchFamily="34" charset="0"/>
@@ -21254,11 +21258,71 @@
                 <a:latin typeface="Segoe UI" panose="020B0502040204020203" pitchFamily="34" charset="0"/>
                 <a:cs typeface="Segoe UI" panose="020B0502040204020203" pitchFamily="34" charset="0"/>
               </a:rPr>
-              <a:t> Filter selection </a:t>
-            </a:r>
+              <a:t> </a:t>
+            </a:r>
+            <a:r>
+              <a:rPr lang="en-US" sz="2200" dirty="0" err="1" smtClean="0">
+                <a:latin typeface="Segoe UI" panose="020B0502040204020203" pitchFamily="34" charset="0"/>
+                <a:cs typeface="Segoe UI" panose="020B0502040204020203" pitchFamily="34" charset="0"/>
+              </a:rPr>
+              <a:t>đánh</a:t>
+            </a:r>
+            <a:r>
+              <a:rPr lang="en-US" sz="2200" dirty="0" smtClean="0">
+                <a:latin typeface="Segoe UI" panose="020B0502040204020203" pitchFamily="34" charset="0"/>
+                <a:cs typeface="Segoe UI" panose="020B0502040204020203" pitchFamily="34" charset="0"/>
+              </a:rPr>
+              <a:t> </a:t>
+            </a:r>
+            <a:r>
+              <a:rPr lang="en-US" sz="2200" dirty="0" err="1" smtClean="0">
+                <a:latin typeface="Segoe UI" panose="020B0502040204020203" pitchFamily="34" charset="0"/>
+                <a:cs typeface="Segoe UI" panose="020B0502040204020203" pitchFamily="34" charset="0"/>
+              </a:rPr>
+              <a:t>giá</a:t>
+            </a:r>
+            <a:r>
+              <a:rPr lang="en-US" sz="2200" dirty="0" smtClean="0">
+                <a:latin typeface="Segoe UI" panose="020B0502040204020203" pitchFamily="34" charset="0"/>
+                <a:cs typeface="Segoe UI" panose="020B0502040204020203" pitchFamily="34" charset="0"/>
+              </a:rPr>
+              <a:t> </a:t>
+            </a:r>
+            <a:r>
+              <a:rPr lang="en-US" sz="2200" dirty="0" err="1" smtClean="0">
+                <a:latin typeface="Segoe UI" panose="020B0502040204020203" pitchFamily="34" charset="0"/>
+                <a:cs typeface="Segoe UI" panose="020B0502040204020203" pitchFamily="34" charset="0"/>
+              </a:rPr>
+              <a:t>hệ</a:t>
+            </a:r>
+            <a:r>
+              <a:rPr lang="en-US" sz="2200" dirty="0" smtClean="0">
+                <a:latin typeface="Segoe UI" panose="020B0502040204020203" pitchFamily="34" charset="0"/>
+                <a:cs typeface="Segoe UI" panose="020B0502040204020203" pitchFamily="34" charset="0"/>
+              </a:rPr>
+              <a:t> </a:t>
+            </a:r>
+            <a:r>
+              <a:rPr lang="en-US" sz="2200" dirty="0" err="1" smtClean="0">
+                <a:latin typeface="Segoe UI" panose="020B0502040204020203" pitchFamily="34" charset="0"/>
+                <a:cs typeface="Segoe UI" panose="020B0502040204020203" pitchFamily="34" charset="0"/>
+              </a:rPr>
+              <a:t>số</a:t>
+            </a:r>
+            <a:r>
+              <a:rPr lang="en-US" sz="2200" dirty="0" smtClean="0">
+                <a:latin typeface="Segoe UI" panose="020B0502040204020203" pitchFamily="34" charset="0"/>
+                <a:cs typeface="Segoe UI" panose="020B0502040204020203" pitchFamily="34" charset="0"/>
+              </a:rPr>
+              <a:t> </a:t>
+            </a:r>
+            <a:endParaRPr lang="en-US" sz="2200" dirty="0" smtClean="0">
+              <a:latin typeface="Segoe UI" panose="020B0502040204020203" pitchFamily="34" charset="0"/>
+              <a:cs typeface="Segoe UI" panose="020B0502040204020203" pitchFamily="34" charset="0"/>
+            </a:endParaRPr>
           </a:p>
           <a:p>
-            <a:pPr marL="400050" lvl="1" indent="0">
+            <a:pPr marL="457200" lvl="1" indent="0">
               <a:buClr>
                 <a:schemeClr val="tx1"/>
               </a:buClr>
@@ -21266,88 +21330,32 @@
               <a:buNone/>
             </a:pPr>
             <a:r>
-              <a:rPr lang="en-US" sz="2200" dirty="0">
-                <a:latin typeface="Segoe UI" panose="020B0502040204020203" pitchFamily="34" charset="0"/>
-                <a:cs typeface="Segoe UI" panose="020B0502040204020203" pitchFamily="34" charset="0"/>
-              </a:rPr>
-              <a:t> </a:t>
-            </a:r>
-            <a:r>
               <a:rPr lang="en-US" sz="2200" dirty="0" smtClean="0">
                 <a:latin typeface="Segoe UI" panose="020B0502040204020203" pitchFamily="34" charset="0"/>
                 <a:cs typeface="Segoe UI" panose="020B0502040204020203" pitchFamily="34" charset="0"/>
               </a:rPr>
-              <a:t> </a:t>
+              <a:t>     </a:t>
+            </a:r>
+            <a:r>
+              <a:rPr lang="en-US" sz="2200" dirty="0" err="1" smtClean="0">
+                <a:latin typeface="Segoe UI" panose="020B0502040204020203" pitchFamily="34" charset="0"/>
+                <a:cs typeface="Segoe UI" panose="020B0502040204020203" pitchFamily="34" charset="0"/>
+              </a:rPr>
+              <a:t>tương</a:t>
             </a:r>
             <a:r>
               <a:rPr lang="en-US" sz="2200" dirty="0" smtClean="0">
                 <a:latin typeface="Segoe UI" panose="020B0502040204020203" pitchFamily="34" charset="0"/>
                 <a:cs typeface="Segoe UI" panose="020B0502040204020203" pitchFamily="34" charset="0"/>
               </a:rPr>
-              <a:t>   </a:t>
-            </a:r>
-            <a:r>
-              <a:rPr lang="en-US" sz="2200" dirty="0" smtClean="0">
-                <a:latin typeface="Segoe UI" panose="020B0502040204020203" pitchFamily="34" charset="0"/>
-                <a:cs typeface="Segoe UI" panose="020B0502040204020203" pitchFamily="34" charset="0"/>
-              </a:rPr>
-              <a:t>(</a:t>
+              <a:t> </a:t>
             </a:r>
             <a:r>
               <a:rPr lang="en-US" sz="2200" dirty="0" err="1" smtClean="0">
                 <a:latin typeface="Segoe UI" panose="020B0502040204020203" pitchFamily="34" charset="0"/>
                 <a:cs typeface="Segoe UI" panose="020B0502040204020203" pitchFamily="34" charset="0"/>
               </a:rPr>
-              <a:t>hệ</a:t>
-            </a:r>
-            <a:r>
-              <a:rPr lang="en-US" sz="2200" dirty="0" smtClean="0">
-                <a:latin typeface="Segoe UI" panose="020B0502040204020203" pitchFamily="34" charset="0"/>
-                <a:cs typeface="Segoe UI" panose="020B0502040204020203" pitchFamily="34" charset="0"/>
-              </a:rPr>
-              <a:t> </a:t>
-            </a:r>
-            <a:r>
-              <a:rPr lang="en-US" sz="2200" dirty="0" err="1" smtClean="0">
-                <a:latin typeface="Segoe UI" panose="020B0502040204020203" pitchFamily="34" charset="0"/>
-                <a:cs typeface="Segoe UI" panose="020B0502040204020203" pitchFamily="34" charset="0"/>
-              </a:rPr>
-              <a:t>số</a:t>
-            </a:r>
-            <a:r>
-              <a:rPr lang="en-US" sz="2200" dirty="0" smtClean="0">
-                <a:latin typeface="Segoe UI" panose="020B0502040204020203" pitchFamily="34" charset="0"/>
-                <a:cs typeface="Segoe UI" panose="020B0502040204020203" pitchFamily="34" charset="0"/>
-              </a:rPr>
-              <a:t> </a:t>
-            </a:r>
-            <a:r>
-              <a:rPr lang="en-US" sz="2200" dirty="0" err="1" smtClean="0">
-                <a:latin typeface="Segoe UI" panose="020B0502040204020203" pitchFamily="34" charset="0"/>
-                <a:cs typeface="Segoe UI" panose="020B0502040204020203" pitchFamily="34" charset="0"/>
-              </a:rPr>
-              <a:t>tương</a:t>
-            </a:r>
-            <a:r>
-              <a:rPr lang="en-US" sz="2200" dirty="0" smtClean="0">
-                <a:latin typeface="Segoe UI" panose="020B0502040204020203" pitchFamily="34" charset="0"/>
-                <a:cs typeface="Segoe UI" panose="020B0502040204020203" pitchFamily="34" charset="0"/>
-              </a:rPr>
-              <a:t> </a:t>
-            </a:r>
-            <a:r>
-              <a:rPr lang="en-US" sz="2200" dirty="0" err="1" smtClean="0">
-                <a:latin typeface="Segoe UI" panose="020B0502040204020203" pitchFamily="34" charset="0"/>
-                <a:cs typeface="Segoe UI" panose="020B0502040204020203" pitchFamily="34" charset="0"/>
-              </a:rPr>
               <a:t>quan</a:t>
-            </a:r>
-            <a:r>
-              <a:rPr lang="en-US" sz="2200" dirty="0" smtClean="0">
-                <a:latin typeface="Segoe UI" panose="020B0502040204020203" pitchFamily="34" charset="0"/>
-                <a:cs typeface="Segoe UI" panose="020B0502040204020203" pitchFamily="34" charset="0"/>
-              </a:rPr>
-              <a:t>)</a:t>
             </a:r>
             <a:endParaRPr lang="en-US" sz="2200" dirty="0">
               <a:latin typeface="Segoe UI" panose="020B0502040204020203" pitchFamily="34" charset="0"/>
@@ -21379,7 +21387,7 @@
         </p:blipFill>
         <p:spPr bwMode="auto">
           <a:xfrm>
-            <a:off x="6388099" y="2688239"/>
+            <a:off x="6455373" y="2802539"/>
             <a:ext cx="5143501" cy="3861786"/>
           </a:xfrm>
           <a:prstGeom prst="rect">
@@ -22048,60 +22056,158 @@
               <a:t> </a:t>
             </a:r>
             <a:r>
-              <a:rPr lang="en-US" sz="2200" dirty="0" err="1">
+              <a:rPr lang="en-US" sz="2200" dirty="0" err="1" smtClean="0">
+                <a:latin typeface="Segoe UI" panose="020B0502040204020203" pitchFamily="34" charset="0"/>
+                <a:cs typeface="Segoe UI" panose="020B0502040204020203" pitchFamily="34" charset="0"/>
+              </a:rPr>
+              <a:t>lượng</a:t>
+            </a:r>
+            <a:r>
+              <a:rPr lang="en-US" sz="2200" dirty="0" smtClean="0">
+                <a:latin typeface="Segoe UI" panose="020B0502040204020203" pitchFamily="34" charset="0"/>
+                <a:cs typeface="Segoe UI" panose="020B0502040204020203" pitchFamily="34" charset="0"/>
+              </a:rPr>
+              <a:t> neural </a:t>
+            </a:r>
+            <a:r>
+              <a:rPr lang="en-US" sz="2200" dirty="0" err="1" smtClean="0">
+                <a:latin typeface="Segoe UI" panose="020B0502040204020203" pitchFamily="34" charset="0"/>
+                <a:cs typeface="Segoe UI" panose="020B0502040204020203" pitchFamily="34" charset="0"/>
+              </a:rPr>
+              <a:t>đầu</a:t>
+            </a:r>
+            <a:r>
+              <a:rPr lang="en-US" sz="2200" dirty="0" smtClean="0">
+                <a:latin typeface="Segoe UI" panose="020B0502040204020203" pitchFamily="34" charset="0"/>
+                <a:cs typeface="Segoe UI" panose="020B0502040204020203" pitchFamily="34" charset="0"/>
+              </a:rPr>
+              <a:t> </a:t>
+            </a:r>
+            <a:r>
+              <a:rPr lang="en-US" sz="2200" dirty="0" err="1" smtClean="0">
+                <a:latin typeface="Segoe UI" panose="020B0502040204020203" pitchFamily="34" charset="0"/>
+                <a:cs typeface="Segoe UI" panose="020B0502040204020203" pitchFamily="34" charset="0"/>
+              </a:rPr>
+              <a:t>vào</a:t>
+            </a:r>
+            <a:r>
+              <a:rPr lang="en-US" sz="2200" dirty="0" smtClean="0">
+                <a:latin typeface="Segoe UI" panose="020B0502040204020203" pitchFamily="34" charset="0"/>
+                <a:cs typeface="Segoe UI" panose="020B0502040204020203" pitchFamily="34" charset="0"/>
+              </a:rPr>
+              <a:t> </a:t>
+            </a:r>
+            <a:r>
+              <a:rPr lang="en-US" sz="2200" dirty="0" err="1" smtClean="0">
+                <a:latin typeface="Segoe UI" panose="020B0502040204020203" pitchFamily="34" charset="0"/>
+                <a:cs typeface="Segoe UI" panose="020B0502040204020203" pitchFamily="34" charset="0"/>
+              </a:rPr>
+              <a:t>chính</a:t>
+            </a:r>
+            <a:r>
+              <a:rPr lang="en-US" sz="2200" dirty="0" smtClean="0">
+                <a:latin typeface="Segoe UI" panose="020B0502040204020203" pitchFamily="34" charset="0"/>
+                <a:cs typeface="Segoe UI" panose="020B0502040204020203" pitchFamily="34" charset="0"/>
+              </a:rPr>
+              <a:t> </a:t>
+            </a:r>
+            <a:r>
+              <a:rPr lang="en-US" sz="2200" dirty="0" err="1" smtClean="0">
+                <a:latin typeface="Segoe UI" panose="020B0502040204020203" pitchFamily="34" charset="0"/>
+                <a:cs typeface="Segoe UI" panose="020B0502040204020203" pitchFamily="34" charset="0"/>
+              </a:rPr>
+              <a:t>là</a:t>
+            </a:r>
+            <a:r>
+              <a:rPr lang="en-US" sz="2200" dirty="0" smtClean="0">
+                <a:latin typeface="Segoe UI" panose="020B0502040204020203" pitchFamily="34" charset="0"/>
+                <a:cs typeface="Segoe UI" panose="020B0502040204020203" pitchFamily="34" charset="0"/>
+              </a:rPr>
+              <a:t> </a:t>
+            </a:r>
+            <a:r>
+              <a:rPr lang="en-US" sz="2200" dirty="0" err="1" smtClean="0">
+                <a:latin typeface="Segoe UI" panose="020B0502040204020203" pitchFamily="34" charset="0"/>
+                <a:cs typeface="Segoe UI" panose="020B0502040204020203" pitchFamily="34" charset="0"/>
+              </a:rPr>
+              <a:t>số</a:t>
+            </a:r>
+            <a:r>
+              <a:rPr lang="en-US" sz="2200" dirty="0" smtClean="0">
+                <a:latin typeface="Segoe UI" panose="020B0502040204020203" pitchFamily="34" charset="0"/>
+                <a:cs typeface="Segoe UI" panose="020B0502040204020203" pitchFamily="34" charset="0"/>
+              </a:rPr>
+              <a:t> </a:t>
+            </a:r>
+            <a:r>
+              <a:rPr lang="en-US" sz="2200" dirty="0" err="1" smtClean="0">
+                <a:latin typeface="Segoe UI" panose="020B0502040204020203" pitchFamily="34" charset="0"/>
+                <a:cs typeface="Segoe UI" panose="020B0502040204020203" pitchFamily="34" charset="0"/>
+              </a:rPr>
+              <a:t>lượng</a:t>
+            </a:r>
+            <a:r>
+              <a:rPr lang="en-US" sz="2200" dirty="0" smtClean="0">
+                <a:latin typeface="Segoe UI" panose="020B0502040204020203" pitchFamily="34" charset="0"/>
+                <a:cs typeface="Segoe UI" panose="020B0502040204020203" pitchFamily="34" charset="0"/>
+              </a:rPr>
+              <a:t> </a:t>
+            </a:r>
+            <a:r>
+              <a:rPr lang="en-US" sz="2200" dirty="0" err="1" smtClean="0">
                 <a:latin typeface="Segoe UI" panose="020B0502040204020203" pitchFamily="34" charset="0"/>
                 <a:cs typeface="Segoe UI" panose="020B0502040204020203" pitchFamily="34" charset="0"/>
               </a:rPr>
               <a:t>thuộc</a:t>
             </a:r>
             <a:r>
-              <a:rPr lang="en-US" sz="2200" dirty="0">
-                <a:latin typeface="Segoe UI" panose="020B0502040204020203" pitchFamily="34" charset="0"/>
-                <a:cs typeface="Segoe UI" panose="020B0502040204020203" pitchFamily="34" charset="0"/>
-              </a:rPr>
-              <a:t> </a:t>
-            </a:r>
-            <a:r>
-              <a:rPr lang="en-US" sz="2200" dirty="0" err="1">
+              <a:rPr lang="en-US" sz="2200" dirty="0" smtClean="0">
+                <a:latin typeface="Segoe UI" panose="020B0502040204020203" pitchFamily="34" charset="0"/>
+                <a:cs typeface="Segoe UI" panose="020B0502040204020203" pitchFamily="34" charset="0"/>
+              </a:rPr>
+              <a:t> </a:t>
+            </a:r>
+            <a:r>
+              <a:rPr lang="en-US" sz="2200" dirty="0" err="1" smtClean="0">
                 <a:latin typeface="Segoe UI" panose="020B0502040204020203" pitchFamily="34" charset="0"/>
                 <a:cs typeface="Segoe UI" panose="020B0502040204020203" pitchFamily="34" charset="0"/>
               </a:rPr>
               <a:t>tính</a:t>
             </a:r>
             <a:r>
-              <a:rPr lang="en-US" sz="2200" dirty="0">
-                <a:latin typeface="Segoe UI" panose="020B0502040204020203" pitchFamily="34" charset="0"/>
-                <a:cs typeface="Segoe UI" panose="020B0502040204020203" pitchFamily="34" charset="0"/>
-              </a:rPr>
-              <a:t> </a:t>
-            </a:r>
-            <a:r>
-              <a:rPr lang="en-US" sz="2200" dirty="0" err="1">
-                <a:latin typeface="Segoe UI" panose="020B0502040204020203" pitchFamily="34" charset="0"/>
-                <a:cs typeface="Segoe UI" panose="020B0502040204020203" pitchFamily="34" charset="0"/>
-              </a:rPr>
-              <a:t>đầu</a:t>
-            </a:r>
-            <a:r>
-              <a:rPr lang="en-US" sz="2200" dirty="0">
-                <a:latin typeface="Segoe UI" panose="020B0502040204020203" pitchFamily="34" charset="0"/>
-                <a:cs typeface="Segoe UI" panose="020B0502040204020203" pitchFamily="34" charset="0"/>
-              </a:rPr>
-              <a:t> </a:t>
-            </a:r>
-            <a:r>
-              <a:rPr lang="en-US" sz="2200" dirty="0" err="1">
-                <a:latin typeface="Segoe UI" panose="020B0502040204020203" pitchFamily="34" charset="0"/>
-                <a:cs typeface="Segoe UI" panose="020B0502040204020203" pitchFamily="34" charset="0"/>
-              </a:rPr>
-              <a:t>vào</a:t>
-            </a:r>
-            <a:r>
-              <a:rPr lang="en-US" sz="2200" dirty="0">
-                <a:latin typeface="Segoe UI" panose="020B0502040204020203" pitchFamily="34" charset="0"/>
-                <a:cs typeface="Segoe UI" panose="020B0502040204020203" pitchFamily="34" charset="0"/>
-              </a:rPr>
-              <a:t> 37, </a:t>
+              <a:rPr lang="en-US" sz="2200" dirty="0" smtClean="0">
+                <a:latin typeface="Segoe UI" panose="020B0502040204020203" pitchFamily="34" charset="0"/>
+                <a:cs typeface="Segoe UI" panose="020B0502040204020203" pitchFamily="34" charset="0"/>
+              </a:rPr>
+              <a:t> </a:t>
+            </a:r>
+            <a:r>
+              <a:rPr lang="en-US" sz="2200" dirty="0" err="1" smtClean="0">
+                <a:latin typeface="Segoe UI" panose="020B0502040204020203" pitchFamily="34" charset="0"/>
+                <a:cs typeface="Segoe UI" panose="020B0502040204020203" pitchFamily="34" charset="0"/>
+              </a:rPr>
+              <a:t>bài</a:t>
+            </a:r>
+            <a:r>
+              <a:rPr lang="en-US" sz="2200" dirty="0" smtClean="0">
+                <a:latin typeface="Segoe UI" panose="020B0502040204020203" pitchFamily="34" charset="0"/>
+                <a:cs typeface="Segoe UI" panose="020B0502040204020203" pitchFamily="34" charset="0"/>
+              </a:rPr>
+              <a:t> </a:t>
+            </a:r>
+            <a:r>
+              <a:rPr lang="en-US" sz="2200" dirty="0" err="1" smtClean="0">
+                <a:latin typeface="Segoe UI" panose="020B0502040204020203" pitchFamily="34" charset="0"/>
+                <a:cs typeface="Segoe UI" panose="020B0502040204020203" pitchFamily="34" charset="0"/>
+              </a:rPr>
+              <a:t>toán</a:t>
+            </a:r>
+            <a:r>
+              <a:rPr lang="en-US" sz="2200" dirty="0" smtClean="0">
+                <a:latin typeface="Segoe UI" panose="020B0502040204020203" pitchFamily="34" charset="0"/>
+                <a:cs typeface="Segoe UI" panose="020B0502040204020203" pitchFamily="34" charset="0"/>
+              </a:rPr>
+              <a:t>, </a:t>
             </a:r>
             <a:r>
               <a:rPr lang="en-US" sz="2200" dirty="0" err="1">
@@ -26426,14 +26532,14 @@
                 <a:gridCol w="3548450">
                   <a:extLst>
                     <a:ext uri="{9D8B030D-6E8A-4147-A177-3AD203B41FA5}">
-                      <a16:colId xmlns:a16="http://schemas.microsoft.com/office/drawing/2014/main" xmlns="" val="20000"/>
+                      <a16:colId xmlns="" xmlns:a16="http://schemas.microsoft.com/office/drawing/2014/main" val="20000"/>
                     </a:ext>
                   </a:extLst>
                 </a:gridCol>
                 <a:gridCol w="2756535">
                   <a:extLst>
                     <a:ext uri="{9D8B030D-6E8A-4147-A177-3AD203B41FA5}">
-                      <a16:colId xmlns:a16="http://schemas.microsoft.com/office/drawing/2014/main" xmlns="" val="20001"/>
+                      <a16:colId xmlns="" xmlns:a16="http://schemas.microsoft.com/office/drawing/2014/main" val="20001"/>
                     </a:ext>
                   </a:extLst>
                 </a:gridCol>
@@ -26461,7 +26567,7 @@
                 </a:tc>
                 <a:extLst>
                   <a:ext uri="{0D108BD9-81ED-4DB2-BD59-A6C34878D82A}">
-                    <a16:rowId xmlns:a16="http://schemas.microsoft.com/office/drawing/2014/main" xmlns="" val="10000"/>
+                    <a16:rowId xmlns="" xmlns:a16="http://schemas.microsoft.com/office/drawing/2014/main" val="10000"/>
                   </a:ext>
                 </a:extLst>
               </a:tr>
@@ -26589,7 +26695,7 @@
                 </a:tc>
                 <a:extLst>
                   <a:ext uri="{0D108BD9-81ED-4DB2-BD59-A6C34878D82A}">
-                    <a16:rowId xmlns:a16="http://schemas.microsoft.com/office/drawing/2014/main" xmlns="" val="10001"/>
+                    <a16:rowId xmlns="" xmlns:a16="http://schemas.microsoft.com/office/drawing/2014/main" val="10001"/>
                   </a:ext>
                 </a:extLst>
               </a:tr>
@@ -26724,7 +26830,7 @@
                 </a:tc>
                 <a:extLst>
                   <a:ext uri="{0D108BD9-81ED-4DB2-BD59-A6C34878D82A}">
-                    <a16:rowId xmlns:a16="http://schemas.microsoft.com/office/drawing/2014/main" xmlns="" val="10002"/>
+                    <a16:rowId xmlns="" xmlns:a16="http://schemas.microsoft.com/office/drawing/2014/main" val="10002"/>
                   </a:ext>
                 </a:extLst>
               </a:tr>
@@ -26810,7 +26916,7 @@
                 </a:tc>
                 <a:extLst>
                   <a:ext uri="{0D108BD9-81ED-4DB2-BD59-A6C34878D82A}">
-                    <a16:rowId xmlns:a16="http://schemas.microsoft.com/office/drawing/2014/main" xmlns="" val="10003"/>
+                    <a16:rowId xmlns="" xmlns:a16="http://schemas.microsoft.com/office/drawing/2014/main" val="10003"/>
                   </a:ext>
                 </a:extLst>
               </a:tr>
@@ -26881,7 +26987,7 @@
                 </a:tc>
                 <a:extLst>
                   <a:ext uri="{0D108BD9-81ED-4DB2-BD59-A6C34878D82A}">
-                    <a16:rowId xmlns:a16="http://schemas.microsoft.com/office/drawing/2014/main" xmlns="" val="10004"/>
+                    <a16:rowId xmlns="" xmlns:a16="http://schemas.microsoft.com/office/drawing/2014/main" val="10004"/>
                   </a:ext>
                 </a:extLst>
               </a:tr>
@@ -26949,7 +27055,7 @@
                 </a:tc>
                 <a:extLst>
                   <a:ext uri="{0D108BD9-81ED-4DB2-BD59-A6C34878D82A}">
-                    <a16:rowId xmlns:a16="http://schemas.microsoft.com/office/drawing/2014/main" xmlns="" val="10005"/>
+                    <a16:rowId xmlns="" xmlns:a16="http://schemas.microsoft.com/office/drawing/2014/main" val="10005"/>
                   </a:ext>
                 </a:extLst>
               </a:tr>
@@ -28223,7 +28329,7 @@
                 <a:latin typeface="Segoe UI" panose="020B0502040204020203" pitchFamily="34" charset="0"/>
                 <a:cs typeface="Segoe UI" panose="020B0502040204020203" pitchFamily="34" charset="0"/>
               </a:rPr>
-              <a:t>thu</a:t>
+              <a:t>xây</a:t>
             </a:r>
             <a:r>
               <a:rPr lang="en-US" sz="2200" dirty="0" smtClean="0">
@@ -28237,7 +28343,7 @@
                 <a:latin typeface="Segoe UI" panose="020B0502040204020203" pitchFamily="34" charset="0"/>
                 <a:cs typeface="Segoe UI" panose="020B0502040204020203" pitchFamily="34" charset="0"/>
               </a:rPr>
-              <a:t>thập</a:t>
+              <a:t>mô</a:t>
             </a:r>
             <a:r>
               <a:rPr lang="en-US" sz="2200" dirty="0" smtClean="0">
@@ -28251,7 +28357,7 @@
                 <a:latin typeface="Segoe UI" panose="020B0502040204020203" pitchFamily="34" charset="0"/>
                 <a:cs typeface="Segoe UI" panose="020B0502040204020203" pitchFamily="34" charset="0"/>
               </a:rPr>
-              <a:t>xây</a:t>
+              <a:t>hình</a:t>
             </a:r>
             <a:r>
               <a:rPr lang="en-US" sz="2200" dirty="0" smtClean="0">
@@ -28265,7 +28371,7 @@
                 <a:latin typeface="Segoe UI" panose="020B0502040204020203" pitchFamily="34" charset="0"/>
                 <a:cs typeface="Segoe UI" panose="020B0502040204020203" pitchFamily="34" charset="0"/>
               </a:rPr>
-              <a:t>mô</a:t>
+              <a:t>học</a:t>
             </a:r>
             <a:r>
               <a:rPr lang="en-US" sz="2200" dirty="0" smtClean="0">
@@ -28279,7 +28385,7 @@
                 <a:latin typeface="Segoe UI" panose="020B0502040204020203" pitchFamily="34" charset="0"/>
                 <a:cs typeface="Segoe UI" panose="020B0502040204020203" pitchFamily="34" charset="0"/>
               </a:rPr>
-              <a:t>hình</a:t>
+              <a:t>sâu</a:t>
             </a:r>
             <a:r>
               <a:rPr lang="en-US" sz="2200" dirty="0" smtClean="0">
@@ -28293,7 +28399,7 @@
                 <a:latin typeface="Segoe UI" panose="020B0502040204020203" pitchFamily="34" charset="0"/>
                 <a:cs typeface="Segoe UI" panose="020B0502040204020203" pitchFamily="34" charset="0"/>
               </a:rPr>
-              <a:t>học</a:t>
+              <a:t>cho</a:t>
             </a:r>
             <a:r>
               <a:rPr lang="en-US" sz="2200" dirty="0" smtClean="0">
@@ -28307,7 +28413,21 @@
                 <a:latin typeface="Segoe UI" panose="020B0502040204020203" pitchFamily="34" charset="0"/>
                 <a:cs typeface="Segoe UI" panose="020B0502040204020203" pitchFamily="34" charset="0"/>
               </a:rPr>
-              <a:t>sâu</a:t>
+              <a:t>bài</a:t>
+            </a:r>
+            <a:r>
+              <a:rPr lang="en-US" sz="2200" dirty="0" smtClean="0">
+                <a:latin typeface="Segoe UI" panose="020B0502040204020203" pitchFamily="34" charset="0"/>
+                <a:cs typeface="Segoe UI" panose="020B0502040204020203" pitchFamily="34" charset="0"/>
+              </a:rPr>
+              <a:t> </a:t>
+            </a:r>
+            <a:r>
+              <a:rPr lang="en-US" sz="2200" dirty="0" err="1" smtClean="0">
+                <a:latin typeface="Segoe UI" panose="020B0502040204020203" pitchFamily="34" charset="0"/>
+                <a:cs typeface="Segoe UI" panose="020B0502040204020203" pitchFamily="34" charset="0"/>
+              </a:rPr>
+              <a:t>toán</a:t>
             </a:r>
             <a:endParaRPr lang="en-US" sz="2200" dirty="0" smtClean="0">
               <a:latin typeface="Segoe UI" panose="020B0502040204020203" pitchFamily="34" charset="0"/>
@@ -28449,7 +28569,7 @@
           <p:cNvPr id="3" name="Subtitle 2">
             <a:extLst>
               <a:ext uri="{FF2B5EF4-FFF2-40B4-BE49-F238E27FC236}">
-                <a16:creationId xmlns:a16="http://schemas.microsoft.com/office/drawing/2014/main" xmlns="" id="{56C48AFA-E4C6-40E0-9FD6-DBFF38EAF315}"/>
+                <a16:creationId xmlns="" xmlns:a16="http://schemas.microsoft.com/office/drawing/2014/main" id="{56C48AFA-E4C6-40E0-9FD6-DBFF38EAF315}"/>
               </a:ext>
             </a:extLst>
           </p:cNvPr>
@@ -28460,8 +28580,8 @@
         </p:nvSpPr>
         <p:spPr>
           <a:xfrm>
-            <a:off x="642551" y="2421924"/>
-            <a:ext cx="10956324" cy="4128166"/>
+            <a:off x="642551" y="2314575"/>
+            <a:ext cx="10956324" cy="4235515"/>
           </a:xfrm>
           <a:prstGeom prst="rect">
             <a:avLst/>
@@ -28771,88 +28891,214 @@
               <a:buChar char="-"/>
             </a:pPr>
             <a:r>
-              <a:rPr lang="en-US" sz="2400" dirty="0">
-                <a:latin typeface="Segoe UI" panose="020B0502040204020203" pitchFamily="34" charset="0"/>
-                <a:cs typeface="Segoe UI" panose="020B0502040204020203" pitchFamily="34" charset="0"/>
-              </a:rPr>
-              <a:t>Sai </a:t>
+              <a:rPr lang="en-US" sz="2400" dirty="0" err="1" smtClean="0">
+                <a:latin typeface="Segoe UI" panose="020B0502040204020203" pitchFamily="34" charset="0"/>
+                <a:cs typeface="Segoe UI" panose="020B0502040204020203" pitchFamily="34" charset="0"/>
+              </a:rPr>
+              <a:t>Phần</a:t>
+            </a:r>
+            <a:r>
+              <a:rPr lang="en-US" sz="2400" dirty="0" smtClean="0">
+                <a:latin typeface="Segoe UI" panose="020B0502040204020203" pitchFamily="34" charset="0"/>
+                <a:cs typeface="Segoe UI" panose="020B0502040204020203" pitchFamily="34" charset="0"/>
+              </a:rPr>
+              <a:t> </a:t>
+            </a:r>
+            <a:r>
+              <a:rPr lang="en-US" sz="2400" dirty="0" err="1" smtClean="0">
+                <a:latin typeface="Segoe UI" panose="020B0502040204020203" pitchFamily="34" charset="0"/>
+                <a:cs typeface="Segoe UI" panose="020B0502040204020203" pitchFamily="34" charset="0"/>
+              </a:rPr>
+              <a:t>trăm</a:t>
+            </a:r>
+            <a:r>
+              <a:rPr lang="en-US" sz="2400" dirty="0" smtClean="0">
+                <a:latin typeface="Segoe UI" panose="020B0502040204020203" pitchFamily="34" charset="0"/>
+                <a:cs typeface="Segoe UI" panose="020B0502040204020203" pitchFamily="34" charset="0"/>
+              </a:rPr>
+              <a:t> </a:t>
+            </a:r>
+            <a:r>
+              <a:rPr lang="en-US" sz="2400" dirty="0" err="1" smtClean="0">
+                <a:latin typeface="Segoe UI" panose="020B0502040204020203" pitchFamily="34" charset="0"/>
+                <a:cs typeface="Segoe UI" panose="020B0502040204020203" pitchFamily="34" charset="0"/>
+              </a:rPr>
+              <a:t>sai</a:t>
+            </a:r>
+            <a:r>
+              <a:rPr lang="en-US" sz="2400" dirty="0" smtClean="0">
+                <a:latin typeface="Segoe UI" panose="020B0502040204020203" pitchFamily="34" charset="0"/>
+                <a:cs typeface="Segoe UI" panose="020B0502040204020203" pitchFamily="34" charset="0"/>
+              </a:rPr>
+              <a:t> </a:t>
+            </a:r>
+            <a:r>
+              <a:rPr lang="en-US" sz="2400" dirty="0" err="1" smtClean="0">
+                <a:latin typeface="Segoe UI" panose="020B0502040204020203" pitchFamily="34" charset="0"/>
+                <a:cs typeface="Segoe UI" panose="020B0502040204020203" pitchFamily="34" charset="0"/>
+              </a:rPr>
+              <a:t>số</a:t>
+            </a:r>
+            <a:r>
+              <a:rPr lang="en-US" sz="2400" dirty="0" smtClean="0">
+                <a:latin typeface="Segoe UI" panose="020B0502040204020203" pitchFamily="34" charset="0"/>
+                <a:cs typeface="Segoe UI" panose="020B0502040204020203" pitchFamily="34" charset="0"/>
+              </a:rPr>
+              <a:t> </a:t>
+            </a:r>
+            <a:r>
+              <a:rPr lang="en-US" sz="2400" dirty="0" err="1" smtClean="0">
+                <a:latin typeface="Segoe UI" panose="020B0502040204020203" pitchFamily="34" charset="0"/>
+                <a:cs typeface="Segoe UI" panose="020B0502040204020203" pitchFamily="34" charset="0"/>
+              </a:rPr>
+              <a:t>tuyệt</a:t>
+            </a:r>
+            <a:r>
+              <a:rPr lang="en-US" sz="2400" dirty="0" smtClean="0">
+                <a:latin typeface="Segoe UI" panose="020B0502040204020203" pitchFamily="34" charset="0"/>
+                <a:cs typeface="Segoe UI" panose="020B0502040204020203" pitchFamily="34" charset="0"/>
+              </a:rPr>
+              <a:t> </a:t>
+            </a:r>
+            <a:r>
+              <a:rPr lang="en-US" sz="2400" dirty="0" err="1" smtClean="0">
+                <a:latin typeface="Segoe UI" panose="020B0502040204020203" pitchFamily="34" charset="0"/>
+                <a:cs typeface="Segoe UI" panose="020B0502040204020203" pitchFamily="34" charset="0"/>
+              </a:rPr>
+              <a:t>đối</a:t>
+            </a:r>
+            <a:r>
+              <a:rPr lang="en-US" sz="2400" dirty="0" smtClean="0">
+                <a:latin typeface="Segoe UI" panose="020B0502040204020203" pitchFamily="34" charset="0"/>
+                <a:cs typeface="Segoe UI" panose="020B0502040204020203" pitchFamily="34" charset="0"/>
+              </a:rPr>
+              <a:t> </a:t>
+            </a:r>
+            <a:r>
+              <a:rPr lang="en-US" sz="2400" dirty="0" err="1" smtClean="0">
+                <a:latin typeface="Segoe UI" panose="020B0502040204020203" pitchFamily="34" charset="0"/>
+                <a:cs typeface="Segoe UI" panose="020B0502040204020203" pitchFamily="34" charset="0"/>
+              </a:rPr>
+              <a:t>trung</a:t>
+            </a:r>
+            <a:r>
+              <a:rPr lang="en-US" sz="2400" dirty="0" smtClean="0">
+                <a:latin typeface="Segoe UI" panose="020B0502040204020203" pitchFamily="34" charset="0"/>
+                <a:cs typeface="Segoe UI" panose="020B0502040204020203" pitchFamily="34" charset="0"/>
+              </a:rPr>
+              <a:t> </a:t>
+            </a:r>
+            <a:r>
+              <a:rPr lang="en-US" sz="2400" dirty="0" err="1" smtClean="0">
+                <a:latin typeface="Segoe UI" panose="020B0502040204020203" pitchFamily="34" charset="0"/>
+                <a:cs typeface="Segoe UI" panose="020B0502040204020203" pitchFamily="34" charset="0"/>
+              </a:rPr>
+              <a:t>bình</a:t>
+            </a:r>
+            <a:r>
+              <a:rPr lang="en-US" sz="2400" dirty="0" smtClean="0">
+                <a:latin typeface="Segoe UI" panose="020B0502040204020203" pitchFamily="34" charset="0"/>
+                <a:cs typeface="Segoe UI" panose="020B0502040204020203" pitchFamily="34" charset="0"/>
+              </a:rPr>
+              <a:t> (</a:t>
+            </a:r>
+            <a:r>
+              <a:rPr lang="en-US" sz="2400" dirty="0" smtClean="0">
+                <a:latin typeface="Segoe UI" panose="020B0502040204020203" pitchFamily="34" charset="0"/>
+                <a:cs typeface="Segoe UI" panose="020B0502040204020203" pitchFamily="34" charset="0"/>
+              </a:rPr>
+              <a:t>MAPE) </a:t>
+            </a:r>
+            <a:r>
+              <a:rPr lang="en-US" sz="2400" dirty="0" err="1" smtClean="0">
+                <a:latin typeface="Segoe UI" panose="020B0502040204020203" pitchFamily="34" charset="0"/>
+                <a:cs typeface="Segoe UI" panose="020B0502040204020203" pitchFamily="34" charset="0"/>
+              </a:rPr>
+              <a:t>kết</a:t>
+            </a:r>
+            <a:r>
+              <a:rPr lang="en-US" sz="2400" dirty="0" smtClean="0">
+                <a:latin typeface="Segoe UI" panose="020B0502040204020203" pitchFamily="34" charset="0"/>
+                <a:cs typeface="Segoe UI" panose="020B0502040204020203" pitchFamily="34" charset="0"/>
+              </a:rPr>
+              <a:t> </a:t>
+            </a:r>
+            <a:r>
+              <a:rPr lang="en-US" sz="2400" dirty="0" err="1" smtClean="0">
+                <a:latin typeface="Segoe UI" panose="020B0502040204020203" pitchFamily="34" charset="0"/>
+                <a:cs typeface="Segoe UI" panose="020B0502040204020203" pitchFamily="34" charset="0"/>
+              </a:rPr>
+              <a:t>hợp</a:t>
+            </a:r>
+            <a:r>
+              <a:rPr lang="en-US" sz="2400" dirty="0" smtClean="0">
+                <a:latin typeface="Segoe UI" panose="020B0502040204020203" pitchFamily="34" charset="0"/>
+                <a:cs typeface="Segoe UI" panose="020B0502040204020203" pitchFamily="34" charset="0"/>
+              </a:rPr>
+              <a:t> </a:t>
+            </a:r>
+            <a:r>
+              <a:rPr lang="en-US" sz="2400" dirty="0" err="1" smtClean="0">
+                <a:latin typeface="Segoe UI" panose="020B0502040204020203" pitchFamily="34" charset="0"/>
+                <a:cs typeface="Segoe UI" panose="020B0502040204020203" pitchFamily="34" charset="0"/>
+              </a:rPr>
+              <a:t>với</a:t>
+            </a:r>
+            <a:r>
+              <a:rPr lang="en-US" sz="2400" dirty="0" smtClean="0">
+                <a:latin typeface="Segoe UI" panose="020B0502040204020203" pitchFamily="34" charset="0"/>
+                <a:cs typeface="Segoe UI" panose="020B0502040204020203" pitchFamily="34" charset="0"/>
+              </a:rPr>
+              <a:t> </a:t>
             </a:r>
             <a:r>
               <a:rPr lang="en-US" sz="2400" dirty="0" err="1">
                 <a:latin typeface="Segoe UI" panose="020B0502040204020203" pitchFamily="34" charset="0"/>
                 <a:cs typeface="Segoe UI" panose="020B0502040204020203" pitchFamily="34" charset="0"/>
               </a:rPr>
-              <a:t>số</a:t>
-            </a:r>
-            <a:r>
-              <a:rPr lang="en-US" sz="2400" dirty="0">
-                <a:latin typeface="Segoe UI" panose="020B0502040204020203" pitchFamily="34" charset="0"/>
-                <a:cs typeface="Segoe UI" panose="020B0502040204020203" pitchFamily="34" charset="0"/>
-              </a:rPr>
-              <a:t> </a:t>
-            </a:r>
-            <a:r>
-              <a:rPr lang="en-US" sz="2400" dirty="0" err="1">
-                <a:latin typeface="Segoe UI" panose="020B0502040204020203" pitchFamily="34" charset="0"/>
-                <a:cs typeface="Segoe UI" panose="020B0502040204020203" pitchFamily="34" charset="0"/>
-              </a:rPr>
-              <a:t>tuyệt</a:t>
-            </a:r>
-            <a:r>
-              <a:rPr lang="en-US" sz="2400" dirty="0">
-                <a:latin typeface="Segoe UI" panose="020B0502040204020203" pitchFamily="34" charset="0"/>
-                <a:cs typeface="Segoe UI" panose="020B0502040204020203" pitchFamily="34" charset="0"/>
-              </a:rPr>
-              <a:t> </a:t>
-            </a:r>
-            <a:r>
-              <a:rPr lang="en-US" sz="2400" dirty="0" err="1">
-                <a:latin typeface="Segoe UI" panose="020B0502040204020203" pitchFamily="34" charset="0"/>
-                <a:cs typeface="Segoe UI" panose="020B0502040204020203" pitchFamily="34" charset="0"/>
-              </a:rPr>
-              <a:t>đối</a:t>
-            </a:r>
-            <a:r>
-              <a:rPr lang="en-US" sz="2400" dirty="0">
-                <a:latin typeface="Segoe UI" panose="020B0502040204020203" pitchFamily="34" charset="0"/>
-                <a:cs typeface="Segoe UI" panose="020B0502040204020203" pitchFamily="34" charset="0"/>
-              </a:rPr>
-              <a:t> </a:t>
-            </a:r>
-            <a:r>
-              <a:rPr lang="en-US" sz="2400" dirty="0" err="1">
-                <a:latin typeface="Segoe UI" panose="020B0502040204020203" pitchFamily="34" charset="0"/>
-                <a:cs typeface="Segoe UI" panose="020B0502040204020203" pitchFamily="34" charset="0"/>
-              </a:rPr>
-              <a:t>trung</a:t>
-            </a:r>
-            <a:r>
-              <a:rPr lang="en-US" sz="2400" dirty="0">
-                <a:latin typeface="Segoe UI" panose="020B0502040204020203" pitchFamily="34" charset="0"/>
-                <a:cs typeface="Segoe UI" panose="020B0502040204020203" pitchFamily="34" charset="0"/>
-              </a:rPr>
-              <a:t> </a:t>
-            </a:r>
-            <a:r>
-              <a:rPr lang="en-US" sz="2400" dirty="0" err="1">
-                <a:latin typeface="Segoe UI" panose="020B0502040204020203" pitchFamily="34" charset="0"/>
-                <a:cs typeface="Segoe UI" panose="020B0502040204020203" pitchFamily="34" charset="0"/>
-              </a:rPr>
-              <a:t>bình</a:t>
-            </a:r>
-            <a:r>
-              <a:rPr lang="en-US" sz="2400" dirty="0">
-                <a:latin typeface="Segoe UI" panose="020B0502040204020203" pitchFamily="34" charset="0"/>
-                <a:cs typeface="Segoe UI" panose="020B0502040204020203" pitchFamily="34" charset="0"/>
-              </a:rPr>
-              <a:t> </a:t>
+              <a:t>p</a:t>
+            </a:r>
+            <a:r>
+              <a:rPr lang="en-US" sz="2400" dirty="0" err="1" smtClean="0">
+                <a:latin typeface="Segoe UI" panose="020B0502040204020203" pitchFamily="34" charset="0"/>
+                <a:cs typeface="Segoe UI" panose="020B0502040204020203" pitchFamily="34" charset="0"/>
+              </a:rPr>
+              <a:t>hương</a:t>
             </a:r>
             <a:r>
               <a:rPr lang="en-US" sz="2400" dirty="0" smtClean="0">
                 <a:latin typeface="Segoe UI" panose="020B0502040204020203" pitchFamily="34" charset="0"/>
                 <a:cs typeface="Segoe UI" panose="020B0502040204020203" pitchFamily="34" charset="0"/>
               </a:rPr>
-              <a:t>MAPE </a:t>
+              <a:t> </a:t>
+            </a:r>
+            <a:r>
+              <a:rPr lang="en-US" sz="2400" dirty="0" err="1" smtClean="0">
+                <a:latin typeface="Segoe UI" panose="020B0502040204020203" pitchFamily="34" charset="0"/>
+                <a:cs typeface="Segoe UI" panose="020B0502040204020203" pitchFamily="34" charset="0"/>
+              </a:rPr>
+              <a:t>pháp</a:t>
+            </a:r>
+            <a:r>
+              <a:rPr lang="en-US" sz="2400" dirty="0" smtClean="0">
+                <a:latin typeface="Segoe UI" panose="020B0502040204020203" pitchFamily="34" charset="0"/>
+                <a:cs typeface="Segoe UI" panose="020B0502040204020203" pitchFamily="34" charset="0"/>
+              </a:rPr>
+              <a:t> </a:t>
+            </a:r>
+            <a:r>
+              <a:rPr lang="en-US" sz="2400" dirty="0" err="1" smtClean="0">
+                <a:latin typeface="Segoe UI" panose="020B0502040204020203" pitchFamily="34" charset="0"/>
+                <a:cs typeface="Segoe UI" panose="020B0502040204020203" pitchFamily="34" charset="0"/>
+              </a:rPr>
+              <a:t>K_Fold</a:t>
+            </a:r>
+            <a:r>
+              <a:rPr lang="en-US" sz="2400" dirty="0" smtClean="0">
+                <a:latin typeface="Segoe UI" panose="020B0502040204020203" pitchFamily="34" charset="0"/>
+                <a:cs typeface="Segoe UI" panose="020B0502040204020203" pitchFamily="34" charset="0"/>
+              </a:rPr>
+              <a:t> Validation </a:t>
             </a:r>
             <a:endParaRPr lang="en-US" sz="2400" dirty="0">
               <a:latin typeface="Segoe UI" panose="020B0502040204020203" pitchFamily="34" charset="0"/>
@@ -28972,7 +29218,7 @@
           <p:cNvPr id="4" name="Table 3">
             <a:extLst>
               <a:ext uri="{FF2B5EF4-FFF2-40B4-BE49-F238E27FC236}">
-                <a16:creationId xmlns:a16="http://schemas.microsoft.com/office/drawing/2014/main" xmlns="" id="{E092789B-1CB0-4E39-B614-E372263DA5D1}"/>
+                <a16:creationId xmlns="" xmlns:a16="http://schemas.microsoft.com/office/drawing/2014/main" id="{E092789B-1CB0-4E39-B614-E372263DA5D1}"/>
               </a:ext>
             </a:extLst>
           </p:cNvPr>
@@ -28982,14 +29228,14 @@
           <p:nvPr>
             <p:extLst>
               <p:ext uri="{D42A27DB-BD31-4B8C-83A1-F6EECF244321}">
-                <p14:modId xmlns:p14="http://schemas.microsoft.com/office/powerpoint/2010/main" val="4656791"/>
+                <p14:modId xmlns:p14="http://schemas.microsoft.com/office/powerpoint/2010/main" val="3350373359"/>
               </p:ext>
             </p:extLst>
           </p:nvPr>
         </p:nvGraphicFramePr>
         <p:xfrm>
-          <a:off x="893125" y="3909000"/>
-          <a:ext cx="5444175" cy="2476508"/>
+          <a:off x="5312725" y="3563104"/>
+          <a:ext cx="5444175" cy="2437646"/>
         </p:xfrm>
         <a:graphic>
           <a:graphicData uri="http://schemas.openxmlformats.org/drawingml/2006/table">
@@ -29001,14 +29247,14 @@
                 <a:gridCol w="3943823">
                   <a:extLst>
                     <a:ext uri="{9D8B030D-6E8A-4147-A177-3AD203B41FA5}">
-                      <a16:colId xmlns:a16="http://schemas.microsoft.com/office/drawing/2014/main" xmlns="" val="150882546"/>
+                      <a16:colId xmlns="" xmlns:a16="http://schemas.microsoft.com/office/drawing/2014/main" val="150882546"/>
                     </a:ext>
                   </a:extLst>
                 </a:gridCol>
                 <a:gridCol w="1500352">
                   <a:extLst>
                     <a:ext uri="{9D8B030D-6E8A-4147-A177-3AD203B41FA5}">
-                      <a16:colId xmlns:a16="http://schemas.microsoft.com/office/drawing/2014/main" xmlns="" val="4160103928"/>
+                      <a16:colId xmlns="" xmlns:a16="http://schemas.microsoft.com/office/drawing/2014/main" val="4160103928"/>
                     </a:ext>
                   </a:extLst>
                 </a:gridCol>
@@ -29092,7 +29338,7 @@
                 </a:tc>
                 <a:extLst>
                   <a:ext uri="{0D108BD9-81ED-4DB2-BD59-A6C34878D82A}">
-                    <a16:rowId xmlns:a16="http://schemas.microsoft.com/office/drawing/2014/main" xmlns="" val="1780511228"/>
+                    <a16:rowId xmlns="" xmlns:a16="http://schemas.microsoft.com/office/drawing/2014/main" val="1780511228"/>
                   </a:ext>
                 </a:extLst>
               </a:tr>
@@ -29146,12 +29392,24 @@
                         </a:spcAft>
                       </a:pPr>
                       <a:r>
-                        <a:rPr lang="en-GB" sz="1400">
+                        <a:rPr lang="en-GB" sz="1400" dirty="0" smtClean="0">
                           <a:effectLst/>
                         </a:rPr>
-                        <a:t>0.15 +/- 0.01</a:t>
+                        <a:t>15 </a:t>
                       </a:r>
-                      <a:endParaRPr lang="en-US" sz="1400">
+                      <a:r>
+                        <a:rPr lang="en-GB" sz="1400" dirty="0">
+                          <a:effectLst/>
+                        </a:rPr>
+                        <a:t>+/- </a:t>
+                      </a:r>
+                      <a:r>
+                        <a:rPr lang="en-GB" sz="1400" dirty="0" smtClean="0">
+                          <a:effectLst/>
+                        </a:rPr>
+                        <a:t>1</a:t>
+                      </a:r>
+                      <a:endParaRPr lang="en-US" sz="1400" dirty="0">
                         <a:effectLst/>
                         <a:latin typeface="Times New Roman" panose="02020603050405020304" pitchFamily="18" charset="0"/>
                         <a:ea typeface="Times New Roman" panose="02020603050405020304" pitchFamily="18" charset="0"/>
@@ -29163,7 +29421,7 @@
                 </a:tc>
                 <a:extLst>
                   <a:ext uri="{0D108BD9-81ED-4DB2-BD59-A6C34878D82A}">
-                    <a16:rowId xmlns:a16="http://schemas.microsoft.com/office/drawing/2014/main" xmlns="" val="2767936982"/>
+                    <a16:rowId xmlns="" xmlns:a16="http://schemas.microsoft.com/office/drawing/2014/main" val="2767936982"/>
                   </a:ext>
                 </a:extLst>
               </a:tr>
@@ -29217,12 +29475,24 @@
                         </a:spcAft>
                       </a:pPr>
                       <a:r>
-                        <a:rPr lang="en-GB" sz="1400">
+                        <a:rPr lang="en-GB" sz="1400" dirty="0" smtClean="0">
                           <a:effectLst/>
                         </a:rPr>
-                        <a:t>0.18 +/- 0.02</a:t>
+                        <a:t>18 </a:t>
                       </a:r>
-                      <a:endParaRPr lang="en-US" sz="1400">
+                      <a:r>
+                        <a:rPr lang="en-GB" sz="1400" dirty="0">
+                          <a:effectLst/>
+                        </a:rPr>
+                        <a:t>+/- </a:t>
+                      </a:r>
+                      <a:r>
+                        <a:rPr lang="en-GB" sz="1400" dirty="0" smtClean="0">
+                          <a:effectLst/>
+                        </a:rPr>
+                        <a:t>2</a:t>
+                      </a:r>
+                      <a:endParaRPr lang="en-US" sz="1400" dirty="0">
                         <a:effectLst/>
                         <a:latin typeface="Times New Roman" panose="02020603050405020304" pitchFamily="18" charset="0"/>
                         <a:ea typeface="Times New Roman" panose="02020603050405020304" pitchFamily="18" charset="0"/>
@@ -29234,7 +29504,7 @@
                 </a:tc>
                 <a:extLst>
                   <a:ext uri="{0D108BD9-81ED-4DB2-BD59-A6C34878D82A}">
-                    <a16:rowId xmlns:a16="http://schemas.microsoft.com/office/drawing/2014/main" xmlns="" val="3796812353"/>
+                    <a16:rowId xmlns="" xmlns:a16="http://schemas.microsoft.com/office/drawing/2014/main" val="3796812353"/>
                   </a:ext>
                 </a:extLst>
               </a:tr>
@@ -29288,12 +29558,24 @@
                         </a:spcAft>
                       </a:pPr>
                       <a:r>
-                        <a:rPr lang="en-GB" sz="1400">
+                        <a:rPr lang="en-GB" sz="1400" dirty="0" smtClean="0">
                           <a:effectLst/>
                         </a:rPr>
-                        <a:t>0.16 +/- 0.01</a:t>
+                        <a:t>16</a:t>
                       </a:r>
-                      <a:endParaRPr lang="en-US" sz="1400">
+                      <a:r>
+                        <a:rPr lang="en-GB" sz="1400" baseline="0" dirty="0" smtClean="0">
+                          <a:effectLst/>
+                        </a:rPr>
+                        <a:t> </a:t>
+                      </a:r>
+                      <a:r>
+                        <a:rPr lang="en-GB" sz="1400" dirty="0" smtClean="0">
+                          <a:effectLst/>
+                        </a:rPr>
+                        <a:t>+/- 1</a:t>
+                      </a:r>
+                      <a:endParaRPr lang="en-US" sz="1400" dirty="0">
                         <a:effectLst/>
                         <a:latin typeface="Times New Roman" panose="02020603050405020304" pitchFamily="18" charset="0"/>
                         <a:ea typeface="Times New Roman" panose="02020603050405020304" pitchFamily="18" charset="0"/>
@@ -29305,11 +29587,11 @@
                 </a:tc>
                 <a:extLst>
                   <a:ext uri="{0D108BD9-81ED-4DB2-BD59-A6C34878D82A}">
-                    <a16:rowId xmlns:a16="http://schemas.microsoft.com/office/drawing/2014/main" xmlns="" val="2160711784"/>
+                    <a16:rowId xmlns="" xmlns:a16="http://schemas.microsoft.com/office/drawing/2014/main" val="2160711784"/>
                   </a:ext>
                 </a:extLst>
               </a:tr>
-              <a:tr h="655372">
+              <a:tr h="433122">
                 <a:tc>
                   <a:txBody>
                     <a:bodyPr/>
@@ -29381,10 +29663,22 @@
                         </a:spcAft>
                       </a:pPr>
                       <a:r>
+                        <a:rPr lang="en-GB" sz="1400" dirty="0" smtClean="0">
+                          <a:effectLst/>
+                        </a:rPr>
+                        <a:t>14 </a:t>
+                      </a:r>
+                      <a:r>
                         <a:rPr lang="en-GB" sz="1400" dirty="0">
                           <a:effectLst/>
                         </a:rPr>
-                        <a:t>0.14 +/- 0.01</a:t>
+                        <a:t>+/- </a:t>
+                      </a:r>
+                      <a:r>
+                        <a:rPr lang="en-GB" sz="1400" dirty="0" smtClean="0">
+                          <a:effectLst/>
+                        </a:rPr>
+                        <a:t>1</a:t>
                       </a:r>
                       <a:endParaRPr lang="en-US" sz="1400" dirty="0">
                         <a:effectLst/>
@@ -29398,7 +29692,7 @@
                 </a:tc>
                 <a:extLst>
                   <a:ext uri="{0D108BD9-81ED-4DB2-BD59-A6C34878D82A}">
-                    <a16:rowId xmlns:a16="http://schemas.microsoft.com/office/drawing/2014/main" xmlns="" val="4119424671"/>
+                    <a16:rowId xmlns="" xmlns:a16="http://schemas.microsoft.com/office/drawing/2014/main" val="4119424671"/>
                   </a:ext>
                 </a:extLst>
               </a:tr>
@@ -29566,6 +29860,13 @@
   <p:clrMapOvr>
     <a:masterClrMapping/>
   </p:clrMapOvr>
+  <p:timing>
+    <p:tnLst>
+      <p:par>
+        <p:cTn id="1" dur="indefinite" restart="never" nodeType="tmRoot"/>
+      </p:par>
+    </p:tnLst>
+  </p:timing>
 </p:sld>
 </file>
 
@@ -29977,13 +30278,41 @@
               <a:t>: </a:t>
             </a:r>
             <a:r>
-              <a:rPr lang="en-US" sz="2400" dirty="0" err="1">
+              <a:rPr lang="en-US" sz="2400" dirty="0" err="1" smtClean="0">
                 <a:latin typeface="Segoe UI" panose="020B0502040204020203" pitchFamily="34" charset="0"/>
                 <a:cs typeface="Segoe UI" panose="020B0502040204020203" pitchFamily="34" charset="0"/>
               </a:rPr>
               <a:t>Các</a:t>
             </a:r>
             <a:r>
+              <a:rPr lang="en-US" sz="2400" dirty="0" smtClean="0">
+                <a:latin typeface="Segoe UI" panose="020B0502040204020203" pitchFamily="34" charset="0"/>
+                <a:cs typeface="Segoe UI" panose="020B0502040204020203" pitchFamily="34" charset="0"/>
+              </a:rPr>
+              <a:t> </a:t>
+            </a:r>
+            <a:r>
+              <a:rPr lang="en-US" sz="2400" dirty="0" err="1" smtClean="0">
+                <a:latin typeface="Segoe UI" panose="020B0502040204020203" pitchFamily="34" charset="0"/>
+                <a:cs typeface="Segoe UI" panose="020B0502040204020203" pitchFamily="34" charset="0"/>
+              </a:rPr>
+              <a:t>thông</a:t>
+            </a:r>
+            <a:r>
+              <a:rPr lang="en-US" sz="2400" dirty="0" smtClean="0">
+                <a:latin typeface="Segoe UI" panose="020B0502040204020203" pitchFamily="34" charset="0"/>
+                <a:cs typeface="Segoe UI" panose="020B0502040204020203" pitchFamily="34" charset="0"/>
+              </a:rPr>
+              <a:t> tin </a:t>
+            </a:r>
+            <a:r>
+              <a:rPr lang="en-US" sz="2400" dirty="0" err="1" smtClean="0">
+                <a:latin typeface="Segoe UI" panose="020B0502040204020203" pitchFamily="34" charset="0"/>
+                <a:cs typeface="Segoe UI" panose="020B0502040204020203" pitchFamily="34" charset="0"/>
+              </a:rPr>
+              <a:t>như</a:t>
+            </a:r>
+            <a:r>
               <a:rPr lang="en-US" sz="2400" dirty="0">
                 <a:latin typeface="Segoe UI" panose="020B0502040204020203" pitchFamily="34" charset="0"/>
                 <a:cs typeface="Segoe UI" panose="020B0502040204020203" pitchFamily="34" charset="0"/>
@@ -29991,28 +30320,28 @@
               <a:t> </a:t>
             </a:r>
             <a:r>
-              <a:rPr lang="en-US" sz="2400" dirty="0" err="1">
-                <a:latin typeface="Segoe UI" panose="020B0502040204020203" pitchFamily="34" charset="0"/>
-                <a:cs typeface="Segoe UI" panose="020B0502040204020203" pitchFamily="34" charset="0"/>
-              </a:rPr>
-              <a:t>thông</a:t>
-            </a:r>
-            <a:r>
-              <a:rPr lang="en-US" sz="2400" dirty="0">
-                <a:latin typeface="Segoe UI" panose="020B0502040204020203" pitchFamily="34" charset="0"/>
-                <a:cs typeface="Segoe UI" panose="020B0502040204020203" pitchFamily="34" charset="0"/>
-              </a:rPr>
-              <a:t> tin: </a:t>
-            </a:r>
-            <a:r>
-              <a:rPr lang="en-US" sz="2400" dirty="0" err="1">
-                <a:latin typeface="Segoe UI" panose="020B0502040204020203" pitchFamily="34" charset="0"/>
-                <a:cs typeface="Segoe UI" panose="020B0502040204020203" pitchFamily="34" charset="0"/>
-              </a:rPr>
-              <a:t>vị</a:t>
-            </a:r>
-            <a:r>
-              <a:rPr lang="en-US" sz="2400" dirty="0">
+              <a:rPr lang="en-US" sz="2400" dirty="0" smtClean="0">
+                <a:latin typeface="Segoe UI" panose="020B0502040204020203" pitchFamily="34" charset="0"/>
+                <a:cs typeface="Segoe UI" panose="020B0502040204020203" pitchFamily="34" charset="0"/>
+              </a:rPr>
+              <a:t>:</a:t>
+            </a:r>
+            <a:r>
+              <a:rPr lang="en-US" sz="2400" dirty="0" smtClean="0">
+                <a:latin typeface="Segoe UI" panose="020B0502040204020203" pitchFamily="34" charset="0"/>
+                <a:cs typeface="Segoe UI" panose="020B0502040204020203" pitchFamily="34" charset="0"/>
+              </a:rPr>
+              <a:t> </a:t>
+            </a:r>
+            <a:r>
+              <a:rPr lang="en-US" sz="2400" dirty="0" err="1" smtClean="0">
+                <a:latin typeface="Segoe UI" panose="020B0502040204020203" pitchFamily="34" charset="0"/>
+                <a:cs typeface="Segoe UI" panose="020B0502040204020203" pitchFamily="34" charset="0"/>
+              </a:rPr>
+              <a:t>Vị</a:t>
+            </a:r>
+            <a:r>
+              <a:rPr lang="en-US" sz="2400" dirty="0" smtClean="0">
                 <a:latin typeface="Segoe UI" panose="020B0502040204020203" pitchFamily="34" charset="0"/>
                 <a:cs typeface="Segoe UI" panose="020B0502040204020203" pitchFamily="34" charset="0"/>
               </a:rPr>
@@ -30212,35 +30541,84 @@
                 <a:latin typeface="Segoe UI" panose="020B0502040204020203" pitchFamily="34" charset="0"/>
                 <a:cs typeface="Segoe UI" panose="020B0502040204020203" pitchFamily="34" charset="0"/>
               </a:rPr>
-              <a:t>giá</a:t>
-            </a:r>
-            <a:r>
-              <a:rPr lang="en-US" sz="2400" dirty="0">
-                <a:latin typeface="Segoe UI" panose="020B0502040204020203" pitchFamily="34" charset="0"/>
-                <a:cs typeface="Segoe UI" panose="020B0502040204020203" pitchFamily="34" charset="0"/>
-              </a:rPr>
-              <a:t> </a:t>
-            </a:r>
-            <a:r>
-              <a:rPr lang="en-US" sz="2400" dirty="0" err="1">
+              <a:t>G</a:t>
+            </a:r>
+            <a:r>
+              <a:rPr lang="en-US" sz="2400" dirty="0" err="1" smtClean="0">
+                <a:latin typeface="Segoe UI" panose="020B0502040204020203" pitchFamily="34" charset="0"/>
+                <a:cs typeface="Segoe UI" panose="020B0502040204020203" pitchFamily="34" charset="0"/>
+              </a:rPr>
+              <a:t>iá</a:t>
+            </a:r>
+            <a:r>
+              <a:rPr lang="en-US" sz="2400" dirty="0" smtClean="0">
+                <a:latin typeface="Segoe UI" panose="020B0502040204020203" pitchFamily="34" charset="0"/>
+                <a:cs typeface="Segoe UI" panose="020B0502040204020203" pitchFamily="34" charset="0"/>
+              </a:rPr>
+              <a:t> </a:t>
+            </a:r>
+            <a:r>
+              <a:rPr lang="en-US" sz="2400" dirty="0" err="1" smtClean="0">
+                <a:latin typeface="Segoe UI" panose="020B0502040204020203" pitchFamily="34" charset="0"/>
+                <a:cs typeface="Segoe UI" panose="020B0502040204020203" pitchFamily="34" charset="0"/>
+              </a:rPr>
+              <a:t>dự</a:t>
+            </a:r>
+            <a:r>
+              <a:rPr lang="en-US" sz="2400" dirty="0" smtClean="0">
+                <a:latin typeface="Segoe UI" panose="020B0502040204020203" pitchFamily="34" charset="0"/>
+                <a:cs typeface="Segoe UI" panose="020B0502040204020203" pitchFamily="34" charset="0"/>
+              </a:rPr>
+              <a:t> </a:t>
+            </a:r>
+            <a:r>
+              <a:rPr lang="en-US" sz="2400" dirty="0" err="1" smtClean="0">
+                <a:latin typeface="Segoe UI" panose="020B0502040204020203" pitchFamily="34" charset="0"/>
+                <a:cs typeface="Segoe UI" panose="020B0502040204020203" pitchFamily="34" charset="0"/>
+              </a:rPr>
+              <a:t>báo</a:t>
+            </a:r>
+            <a:r>
+              <a:rPr lang="en-US" sz="2400" dirty="0" smtClean="0">
+                <a:latin typeface="Segoe UI" panose="020B0502040204020203" pitchFamily="34" charset="0"/>
+                <a:cs typeface="Segoe UI" panose="020B0502040204020203" pitchFamily="34" charset="0"/>
+              </a:rPr>
+              <a:t> </a:t>
+            </a:r>
+            <a:r>
+              <a:rPr lang="en-US" sz="2400" dirty="0" err="1" smtClean="0">
+                <a:latin typeface="Segoe UI" panose="020B0502040204020203" pitchFamily="34" charset="0"/>
+                <a:cs typeface="Segoe UI" panose="020B0502040204020203" pitchFamily="34" charset="0"/>
+              </a:rPr>
+              <a:t>phòng</a:t>
+            </a:r>
+            <a:r>
+              <a:rPr lang="en-US" sz="2400" dirty="0" smtClean="0">
+                <a:latin typeface="Segoe UI" panose="020B0502040204020203" pitchFamily="34" charset="0"/>
+                <a:cs typeface="Segoe UI" panose="020B0502040204020203" pitchFamily="34" charset="0"/>
+              </a:rPr>
+              <a:t> </a:t>
+            </a:r>
+            <a:r>
+              <a:rPr lang="en-US" sz="2400" dirty="0" err="1" smtClean="0">
+                <a:latin typeface="Segoe UI" panose="020B0502040204020203" pitchFamily="34" charset="0"/>
+                <a:cs typeface="Segoe UI" panose="020B0502040204020203" pitchFamily="34" charset="0"/>
+              </a:rPr>
+              <a:t>cho</a:t>
+            </a:r>
+            <a:r>
+              <a:rPr lang="en-US" sz="2400" dirty="0" smtClean="0">
+                <a:latin typeface="Segoe UI" panose="020B0502040204020203" pitchFamily="34" charset="0"/>
+                <a:cs typeface="Segoe UI" panose="020B0502040204020203" pitchFamily="34" charset="0"/>
+              </a:rPr>
+              <a:t> </a:t>
+            </a:r>
+            <a:r>
+              <a:rPr lang="en-US" sz="2400" dirty="0" err="1" smtClean="0">
                 <a:latin typeface="Segoe UI" panose="020B0502040204020203" pitchFamily="34" charset="0"/>
                 <a:cs typeface="Segoe UI" panose="020B0502040204020203" pitchFamily="34" charset="0"/>
               </a:rPr>
               <a:t>thuê</a:t>
-            </a:r>
-            <a:r>
-              <a:rPr lang="en-US" sz="2400" dirty="0">
-                <a:latin typeface="Segoe UI" panose="020B0502040204020203" pitchFamily="34" charset="0"/>
-                <a:cs typeface="Segoe UI" panose="020B0502040204020203" pitchFamily="34" charset="0"/>
-              </a:rPr>
-              <a:t> </a:t>
-            </a:r>
-            <a:r>
-              <a:rPr lang="en-US" sz="2400" dirty="0" err="1">
-                <a:latin typeface="Segoe UI" panose="020B0502040204020203" pitchFamily="34" charset="0"/>
-                <a:cs typeface="Segoe UI" panose="020B0502040204020203" pitchFamily="34" charset="0"/>
-              </a:rPr>
-              <a:t>phòng</a:t>
             </a:r>
             <a:endParaRPr lang="en-US" sz="2400" dirty="0">
               <a:latin typeface="Segoe UI" panose="020B0502040204020203" pitchFamily="34" charset="0"/>
@@ -30588,6 +30966,13 @@
   <p:clrMapOvr>
     <a:masterClrMapping/>
   </p:clrMapOvr>
+  <p:timing>
+    <p:tnLst>
+      <p:par>
+        <p:cTn id="1" dur="indefinite" restart="never" nodeType="tmRoot"/>
+      </p:par>
+    </p:tnLst>
+  </p:timing>
 </p:sld>
 </file>
 
@@ -30613,7 +30998,7 @@
           <p:cNvPr id="3" name="Subtitle 2">
             <a:extLst>
               <a:ext uri="{FF2B5EF4-FFF2-40B4-BE49-F238E27FC236}">
-                <a16:creationId xmlns:a16="http://schemas.microsoft.com/office/drawing/2014/main" xmlns="" id="{9D6605B7-EB45-4B65-81E9-0E4A3821D32D}"/>
+                <a16:creationId xmlns="" xmlns:a16="http://schemas.microsoft.com/office/drawing/2014/main" id="{9D6605B7-EB45-4B65-81E9-0E4A3821D32D}"/>
               </a:ext>
             </a:extLst>
           </p:cNvPr>
@@ -30907,7 +31292,7 @@
           <p:cNvPr id="4" name="Picture 3">
             <a:extLst>
               <a:ext uri="{FF2B5EF4-FFF2-40B4-BE49-F238E27FC236}">
-                <a16:creationId xmlns:a16="http://schemas.microsoft.com/office/drawing/2014/main" xmlns="" id="{E4D951B9-686F-44D7-B29A-09C9B812F1C0}"/>
+                <a16:creationId xmlns="" xmlns:a16="http://schemas.microsoft.com/office/drawing/2014/main" id="{E4D951B9-686F-44D7-B29A-09C9B812F1C0}"/>
               </a:ext>
             </a:extLst>
           </p:cNvPr>
@@ -30940,7 +31325,7 @@
           <p:cNvPr id="5" name="Picture 4">
             <a:extLst>
               <a:ext uri="{FF2B5EF4-FFF2-40B4-BE49-F238E27FC236}">
-                <a16:creationId xmlns:a16="http://schemas.microsoft.com/office/drawing/2014/main" xmlns="" id="{D2AA9E5D-7596-4184-AF77-E7A4A28B6724}"/>
+                <a16:creationId xmlns="" xmlns:a16="http://schemas.microsoft.com/office/drawing/2014/main" id="{D2AA9E5D-7596-4184-AF77-E7A4A28B6724}"/>
               </a:ext>
             </a:extLst>
           </p:cNvPr>
@@ -30968,7 +31353,7 @@
           <p:cNvPr id="6" name="Rectangle 5">
             <a:extLst>
               <a:ext uri="{FF2B5EF4-FFF2-40B4-BE49-F238E27FC236}">
-                <a16:creationId xmlns:a16="http://schemas.microsoft.com/office/drawing/2014/main" xmlns="" id="{243F69B7-6413-4B73-B46C-E1F19E6DEEC3}"/>
+                <a16:creationId xmlns="" xmlns:a16="http://schemas.microsoft.com/office/drawing/2014/main" id="{243F69B7-6413-4B73-B46C-E1F19E6DEEC3}"/>
               </a:ext>
             </a:extLst>
           </p:cNvPr>
@@ -31150,7 +31535,7 @@
           <p:cNvPr id="7" name="Straight Arrow Connector 6">
             <a:extLst>
               <a:ext uri="{FF2B5EF4-FFF2-40B4-BE49-F238E27FC236}">
-                <a16:creationId xmlns:a16="http://schemas.microsoft.com/office/drawing/2014/main" xmlns="" id="{F0AC5C00-DCCF-490B-ACB4-DAAEF19945A3}"/>
+                <a16:creationId xmlns="" xmlns:a16="http://schemas.microsoft.com/office/drawing/2014/main" id="{F0AC5C00-DCCF-490B-ACB4-DAAEF19945A3}"/>
               </a:ext>
             </a:extLst>
           </p:cNvPr>
@@ -31192,7 +31577,7 @@
           <p:cNvPr id="14" name="Rectangle 13">
             <a:extLst>
               <a:ext uri="{FF2B5EF4-FFF2-40B4-BE49-F238E27FC236}">
-                <a16:creationId xmlns:a16="http://schemas.microsoft.com/office/drawing/2014/main" xmlns="" id="{CF3BE4B5-A3BF-46BB-ADC6-251161593F6B}"/>
+                <a16:creationId xmlns="" xmlns:a16="http://schemas.microsoft.com/office/drawing/2014/main" id="{CF3BE4B5-A3BF-46BB-ADC6-251161593F6B}"/>
               </a:ext>
             </a:extLst>
           </p:cNvPr>
@@ -31290,7 +31675,7 @@
           <p:cNvPr id="15" name="Straight Arrow Connector 14">
             <a:extLst>
               <a:ext uri="{FF2B5EF4-FFF2-40B4-BE49-F238E27FC236}">
-                <a16:creationId xmlns:a16="http://schemas.microsoft.com/office/drawing/2014/main" xmlns="" id="{5559E77B-F589-4542-99BC-6FA54BB3C3EB}"/>
+                <a16:creationId xmlns="" xmlns:a16="http://schemas.microsoft.com/office/drawing/2014/main" id="{5559E77B-F589-4542-99BC-6FA54BB3C3EB}"/>
               </a:ext>
             </a:extLst>
           </p:cNvPr>
@@ -31516,6 +31901,13 @@
   <p:clrMapOvr>
     <a:masterClrMapping/>
   </p:clrMapOvr>
+  <p:timing>
+    <p:tnLst>
+      <p:par>
+        <p:cTn id="1" dur="indefinite" restart="never" nodeType="tmRoot"/>
+      </p:par>
+    </p:tnLst>
+  </p:timing>
 </p:sld>
 </file>
 
@@ -32613,6 +33005,13 @@
   <p:clrMapOvr>
     <a:masterClrMapping/>
   </p:clrMapOvr>
+  <p:timing>
+    <p:tnLst>
+      <p:par>
+        <p:cTn id="1" dur="indefinite" restart="never" nodeType="tmRoot"/>
+      </p:par>
+    </p:tnLst>
+  </p:timing>
 </p:sld>
 </file>
 
@@ -32638,7 +33037,7 @@
           <p:cNvPr id="3" name="Subtitle 2">
             <a:extLst>
               <a:ext uri="{FF2B5EF4-FFF2-40B4-BE49-F238E27FC236}">
-                <a16:creationId xmlns:a16="http://schemas.microsoft.com/office/drawing/2014/main" xmlns="" id="{4E4C4921-7A26-40A0-9392-FF2243BEF77A}"/>
+                <a16:creationId xmlns="" xmlns:a16="http://schemas.microsoft.com/office/drawing/2014/main" id="{4E4C4921-7A26-40A0-9392-FF2243BEF77A}"/>
               </a:ext>
             </a:extLst>
           </p:cNvPr>
@@ -33265,11 +33664,18 @@
               <a:t> </a:t>
             </a:r>
             <a:r>
-              <a:rPr lang="en-US" sz="2400" dirty="0" err="1">
+              <a:rPr lang="en-US" sz="2400" dirty="0" err="1" smtClean="0">
                 <a:latin typeface="Segoe UI" panose="020B0502040204020203" pitchFamily="34" charset="0"/>
                 <a:cs typeface="Segoe UI" panose="020B0502040204020203" pitchFamily="34" charset="0"/>
               </a:rPr>
               <a:t>bình</a:t>
+            </a:r>
+            <a:r>
+              <a:rPr lang="en-US" sz="2400" dirty="0" smtClean="0">
+                <a:latin typeface="Segoe UI" panose="020B0502040204020203" pitchFamily="34" charset="0"/>
+                <a:cs typeface="Segoe UI" panose="020B0502040204020203" pitchFamily="34" charset="0"/>
+              </a:rPr>
+              <a:t> </a:t>
             </a:r>
             <a:endParaRPr lang="en-US" sz="2400" dirty="0">
               <a:latin typeface="Segoe UI" panose="020B0502040204020203" pitchFamily="34" charset="0"/>
@@ -33768,11 +34174,11 @@
               <a:t> </a:t>
             </a:r>
             <a:r>
-              <a:rPr lang="en-US" sz="2400" dirty="0" err="1">
-                <a:latin typeface="Segoe UI" panose="020B0502040204020203" pitchFamily="34" charset="0"/>
-                <a:cs typeface="Segoe UI" panose="020B0502040204020203" pitchFamily="34" charset="0"/>
-              </a:rPr>
-              <a:t>đoán</a:t>
+              <a:rPr lang="en-US" sz="2400" dirty="0" err="1" smtClean="0">
+                <a:latin typeface="Segoe UI" panose="020B0502040204020203" pitchFamily="34" charset="0"/>
+                <a:cs typeface="Segoe UI" panose="020B0502040204020203" pitchFamily="34" charset="0"/>
+              </a:rPr>
+              <a:t>báo</a:t>
             </a:r>
             <a:endParaRPr lang="en-US" sz="2400" dirty="0">
               <a:latin typeface="Segoe UI" panose="020B0502040204020203" pitchFamily="34" charset="0"/>
@@ -33913,6 +34319,13 @@
   <p:clrMapOvr>
     <a:masterClrMapping/>
   </p:clrMapOvr>
+  <p:timing>
+    <p:tnLst>
+      <p:par>
+        <p:cTn id="1" dur="indefinite" restart="never" nodeType="tmRoot"/>
+      </p:par>
+    </p:tnLst>
+  </p:timing>
 </p:sld>
 </file>
 
@@ -35615,7 +36028,14 @@
                 <a:latin typeface="Segoe UI" pitchFamily="34" charset="0"/>
                 <a:cs typeface="Segoe UI" pitchFamily="34" charset="0"/>
               </a:rPr>
-              <a:t> 1940 </a:t>
+              <a:t> </a:t>
+            </a:r>
+            <a:r>
+              <a:rPr lang="en-US" sz="2000" dirty="0" smtClean="0">
+                <a:latin typeface="Segoe UI" pitchFamily="34" charset="0"/>
+                <a:cs typeface="Segoe UI" pitchFamily="34" charset="0"/>
+              </a:rPr>
+              <a:t>1940, </a:t>
             </a:r>
             <a:r>
               <a:rPr lang="en-US" sz="2000" dirty="0" err="1" smtClean="0">
@@ -35664,14 +36084,28 @@
                 <a:latin typeface="Segoe UI" pitchFamily="34" charset="0"/>
                 <a:cs typeface="Segoe UI" pitchFamily="34" charset="0"/>
               </a:rPr>
-              <a:t>Hiện</a:t>
+              <a:t>gần</a:t>
             </a:r>
             <a:r>
               <a:rPr lang="en-US" sz="2000" dirty="0" smtClean="0">
                 <a:latin typeface="Segoe UI" pitchFamily="34" charset="0"/>
                 <a:cs typeface="Segoe UI" pitchFamily="34" charset="0"/>
               </a:rPr>
-              <a:t> nay </a:t>
+              <a:t> </a:t>
+            </a:r>
+            <a:r>
+              <a:rPr lang="en-US" sz="2000" dirty="0" err="1" smtClean="0">
+                <a:latin typeface="Segoe UI" pitchFamily="34" charset="0"/>
+                <a:cs typeface="Segoe UI" pitchFamily="34" charset="0"/>
+              </a:rPr>
+              <a:t>đây</a:t>
+            </a:r>
+            <a:r>
+              <a:rPr lang="en-US" sz="2000" dirty="0" smtClean="0">
+                <a:latin typeface="Segoe UI" pitchFamily="34" charset="0"/>
+                <a:cs typeface="Segoe UI" pitchFamily="34" charset="0"/>
+              </a:rPr>
+              <a:t> </a:t>
             </a:r>
             <a:r>
               <a:rPr lang="en-US" sz="2000" dirty="0" err="1" smtClean="0">
@@ -36487,10 +36921,6 @@
               </a:rPr>
               <a:t>.</a:t>
             </a:r>
-            <a:endParaRPr lang="en-US" sz="2000" dirty="0">
-              <a:latin typeface="Segoe UI" panose="020B0502040204020203" pitchFamily="34" charset="0"/>
-              <a:cs typeface="Segoe UI" panose="020B0502040204020203" pitchFamily="34" charset="0"/>
-            </a:endParaRPr>
           </a:p>
         </p:txBody>
       </p:sp>
@@ -36911,6 +37341,20 @@
                 <a:latin typeface="Segoe UI" pitchFamily="34" charset="0"/>
                 <a:cs typeface="Segoe UI" pitchFamily="34" charset="0"/>
               </a:rPr>
+              <a:t>loại</a:t>
+            </a:r>
+            <a:r>
+              <a:rPr lang="en-US" sz="2000" dirty="0" smtClean="0">
+                <a:latin typeface="Segoe UI" pitchFamily="34" charset="0"/>
+                <a:cs typeface="Segoe UI" pitchFamily="34" charset="0"/>
+              </a:rPr>
+              <a:t> </a:t>
+            </a:r>
+            <a:r>
+              <a:rPr lang="en-US" sz="2000" dirty="0" err="1" smtClean="0">
+                <a:latin typeface="Segoe UI" pitchFamily="34" charset="0"/>
+                <a:cs typeface="Segoe UI" pitchFamily="34" charset="0"/>
+              </a:rPr>
               <a:t>mô</a:t>
             </a:r>
             <a:r>
@@ -37586,7 +38030,56 @@
                 <a:latin typeface="Segoe UI" pitchFamily="34" charset="0"/>
                 <a:cs typeface="Segoe UI" pitchFamily="34" charset="0"/>
               </a:rPr>
-              <a:t>Được</a:t>
+              <a:t>Mạng</a:t>
+            </a:r>
+            <a:r>
+              <a:rPr lang="en-US" sz="2000" dirty="0" smtClean="0">
+                <a:latin typeface="Segoe UI" pitchFamily="34" charset="0"/>
+                <a:cs typeface="Segoe UI" pitchFamily="34" charset="0"/>
+              </a:rPr>
+              <a:t> </a:t>
+            </a:r>
+            <a:r>
+              <a:rPr lang="en-US" sz="2000" dirty="0" err="1" smtClean="0">
+                <a:latin typeface="Segoe UI" pitchFamily="34" charset="0"/>
+                <a:cs typeface="Segoe UI" pitchFamily="34" charset="0"/>
+              </a:rPr>
+              <a:t>tích</a:t>
+            </a:r>
+            <a:r>
+              <a:rPr lang="en-US" sz="2000" dirty="0" smtClean="0">
+                <a:latin typeface="Segoe UI" pitchFamily="34" charset="0"/>
+                <a:cs typeface="Segoe UI" pitchFamily="34" charset="0"/>
+              </a:rPr>
+              <a:t> </a:t>
+            </a:r>
+            <a:r>
+              <a:rPr lang="en-US" sz="2000" dirty="0" err="1" smtClean="0">
+                <a:latin typeface="Segoe UI" pitchFamily="34" charset="0"/>
+                <a:cs typeface="Segoe UI" pitchFamily="34" charset="0"/>
+              </a:rPr>
+              <a:t>chập</a:t>
+            </a:r>
+            <a:r>
+              <a:rPr lang="en-US" sz="2000" dirty="0" smtClean="0">
+                <a:latin typeface="Segoe UI" pitchFamily="34" charset="0"/>
+                <a:cs typeface="Segoe UI" pitchFamily="34" charset="0"/>
+              </a:rPr>
+              <a:t> </a:t>
+            </a:r>
+            <a:r>
+              <a:rPr lang="en-US" sz="2000" dirty="0" err="1" smtClean="0">
+                <a:latin typeface="Segoe UI" pitchFamily="34" charset="0"/>
+                <a:cs typeface="Segoe UI" pitchFamily="34" charset="0"/>
+              </a:rPr>
+              <a:t>đ</a:t>
+            </a:r>
+            <a:r>
+              <a:rPr lang="en-US" sz="2000" dirty="0" err="1" smtClean="0">
+                <a:latin typeface="Segoe UI" pitchFamily="34" charset="0"/>
+                <a:cs typeface="Segoe UI" pitchFamily="34" charset="0"/>
+              </a:rPr>
+              <a:t>ược</a:t>
             </a:r>
             <a:r>
               <a:rPr lang="en-US" sz="2000" dirty="0" smtClean="0">
@@ -37787,11 +38280,46 @@
               <a:t>: </a:t>
             </a:r>
             <a:r>
+              <a:rPr lang="en-US" sz="2000" dirty="0" err="1" smtClean="0">
+                <a:latin typeface="Segoe UI" pitchFamily="34" charset="0"/>
+                <a:cs typeface="Segoe UI" pitchFamily="34" charset="0"/>
+              </a:rPr>
+              <a:t>Mạng</a:t>
+            </a:r>
+            <a:r>
+              <a:rPr lang="en-US" sz="2000" dirty="0" smtClean="0">
+                <a:latin typeface="Segoe UI" pitchFamily="34" charset="0"/>
+                <a:cs typeface="Segoe UI" pitchFamily="34" charset="0"/>
+              </a:rPr>
+              <a:t> </a:t>
+            </a:r>
+            <a:r>
+              <a:rPr lang="en-US" sz="2000" dirty="0" err="1" smtClean="0">
+                <a:latin typeface="Segoe UI" pitchFamily="34" charset="0"/>
+                <a:cs typeface="Segoe UI" pitchFamily="34" charset="0"/>
+              </a:rPr>
+              <a:t>hồi</a:t>
+            </a:r>
+            <a:r>
+              <a:rPr lang="en-US" sz="2000" dirty="0" smtClean="0">
+                <a:latin typeface="Segoe UI" pitchFamily="34" charset="0"/>
+                <a:cs typeface="Segoe UI" pitchFamily="34" charset="0"/>
+              </a:rPr>
+              <a:t> </a:t>
+            </a:r>
+            <a:r>
+              <a:rPr lang="en-US" sz="2000" dirty="0" err="1" smtClean="0">
+                <a:latin typeface="Segoe UI" pitchFamily="34" charset="0"/>
+                <a:cs typeface="Segoe UI" pitchFamily="34" charset="0"/>
+              </a:rPr>
+              <a:t>quy</a:t>
+            </a:r>
+            <a:r>
               <a:rPr lang="vi-VN" sz="2000" dirty="0" smtClean="0">
                 <a:latin typeface="Segoe UI" pitchFamily="34" charset="0"/>
                 <a:cs typeface="Segoe UI" pitchFamily="34" charset="0"/>
               </a:rPr>
-              <a:t>RNN </a:t>
+              <a:t> </a:t>
             </a:r>
             <a:r>
               <a:rPr lang="vi-VN" sz="2000" dirty="0">
@@ -38471,6 +38999,9 @@
           </a:p>
           <a:p>
             <a:pPr>
+              <a:lnSpc>
+                <a:spcPct val="150000"/>
+              </a:lnSpc>
               <a:buClr>
                 <a:schemeClr val="tx1"/>
               </a:buClr>
@@ -38525,6 +39056,34 @@
                 <a:latin typeface="Segoe UI" panose="020B0502040204020203" pitchFamily="34" charset="0"/>
                 <a:cs typeface="Segoe UI" panose="020B0502040204020203" pitchFamily="34" charset="0"/>
               </a:rPr>
+              <a:t>bài</a:t>
+            </a:r>
+            <a:r>
+              <a:rPr lang="en-US" sz="2000" dirty="0" smtClean="0">
+                <a:latin typeface="Segoe UI" panose="020B0502040204020203" pitchFamily="34" charset="0"/>
+                <a:cs typeface="Segoe UI" panose="020B0502040204020203" pitchFamily="34" charset="0"/>
+              </a:rPr>
+              <a:t> </a:t>
+            </a:r>
+            <a:r>
+              <a:rPr lang="en-US" sz="2000" dirty="0" err="1" smtClean="0">
+                <a:latin typeface="Segoe UI" panose="020B0502040204020203" pitchFamily="34" charset="0"/>
+                <a:cs typeface="Segoe UI" panose="020B0502040204020203" pitchFamily="34" charset="0"/>
+              </a:rPr>
+              <a:t>toán</a:t>
+            </a:r>
+            <a:r>
+              <a:rPr lang="en-US" sz="2000" dirty="0" smtClean="0">
+                <a:latin typeface="Segoe UI" panose="020B0502040204020203" pitchFamily="34" charset="0"/>
+                <a:cs typeface="Segoe UI" panose="020B0502040204020203" pitchFamily="34" charset="0"/>
+              </a:rPr>
+              <a:t> </a:t>
+            </a:r>
+            <a:r>
+              <a:rPr lang="en-US" sz="2000" dirty="0" err="1" smtClean="0">
+                <a:latin typeface="Segoe UI" panose="020B0502040204020203" pitchFamily="34" charset="0"/>
+                <a:cs typeface="Segoe UI" panose="020B0502040204020203" pitchFamily="34" charset="0"/>
+              </a:rPr>
               <a:t>dữ</a:t>
             </a:r>
             <a:r>
@@ -38562,9 +39121,16 @@
               </a:rPr>
               <a:t> </a:t>
             </a:r>
+            <a:endParaRPr lang="en-US" sz="2000" dirty="0" smtClean="0">
+              <a:latin typeface="Segoe UI" panose="020B0502040204020203" pitchFamily="34" charset="0"/>
+              <a:cs typeface="Segoe UI" panose="020B0502040204020203" pitchFamily="34" charset="0"/>
+            </a:endParaRPr>
           </a:p>
           <a:p>
             <a:pPr>
+              <a:lnSpc>
+                <a:spcPct val="150000"/>
+              </a:lnSpc>
               <a:buClr>
                 <a:schemeClr val="tx1"/>
               </a:buClr>
@@ -38605,7 +39171,7 @@
                 <a:latin typeface="Segoe UI" panose="020B0502040204020203" pitchFamily="34" charset="0"/>
                 <a:cs typeface="Segoe UI" panose="020B0502040204020203" pitchFamily="34" charset="0"/>
               </a:rPr>
-              <a:t>tận</a:t>
+              <a:t>đạt</a:t>
             </a:r>
             <a:r>
               <a:rPr lang="en-US" sz="2000" dirty="0" smtClean="0">
@@ -38619,7 +39185,7 @@
                 <a:latin typeface="Segoe UI" panose="020B0502040204020203" pitchFamily="34" charset="0"/>
                 <a:cs typeface="Segoe UI" panose="020B0502040204020203" pitchFamily="34" charset="0"/>
               </a:rPr>
-              <a:t>dụng</a:t>
+              <a:t>được</a:t>
             </a:r>
             <a:r>
               <a:rPr lang="en-US" sz="2000" dirty="0" smtClean="0">
@@ -38633,7 +39199,7 @@
                 <a:latin typeface="Segoe UI" panose="020B0502040204020203" pitchFamily="34" charset="0"/>
                 <a:cs typeface="Segoe UI" panose="020B0502040204020203" pitchFamily="34" charset="0"/>
               </a:rPr>
-              <a:t>phần</a:t>
+              <a:t>độ</a:t>
             </a:r>
             <a:r>
               <a:rPr lang="en-US" sz="2000" dirty="0" smtClean="0">
@@ -38647,7 +39213,7 @@
                 <a:latin typeface="Segoe UI" panose="020B0502040204020203" pitchFamily="34" charset="0"/>
                 <a:cs typeface="Segoe UI" panose="020B0502040204020203" pitchFamily="34" charset="0"/>
               </a:rPr>
-              <a:t>cứng</a:t>
+              <a:t>chính</a:t>
             </a:r>
             <a:r>
               <a:rPr lang="en-US" sz="2000" dirty="0" smtClean="0">
@@ -38661,7 +39227,7 @@
                 <a:latin typeface="Segoe UI" panose="020B0502040204020203" pitchFamily="34" charset="0"/>
                 <a:cs typeface="Segoe UI" panose="020B0502040204020203" pitchFamily="34" charset="0"/>
               </a:rPr>
-              <a:t>trong</a:t>
+              <a:t>xác</a:t>
             </a:r>
             <a:r>
               <a:rPr lang="en-US" sz="2000" dirty="0" smtClean="0">
@@ -38675,7 +39241,7 @@
                 <a:latin typeface="Segoe UI" panose="020B0502040204020203" pitchFamily="34" charset="0"/>
                 <a:cs typeface="Segoe UI" panose="020B0502040204020203" pitchFamily="34" charset="0"/>
               </a:rPr>
-              <a:t>huấn</a:t>
+              <a:t>cao</a:t>
             </a:r>
             <a:r>
               <a:rPr lang="en-US" sz="2000" dirty="0" smtClean="0">
@@ -38689,7 +39255,7 @@
                 <a:latin typeface="Segoe UI" panose="020B0502040204020203" pitchFamily="34" charset="0"/>
                 <a:cs typeface="Segoe UI" panose="020B0502040204020203" pitchFamily="34" charset="0"/>
               </a:rPr>
-              <a:t>luyện</a:t>
+              <a:t>hơn</a:t>
             </a:r>
             <a:endParaRPr lang="en-US" sz="2000" dirty="0" smtClean="0">
               <a:latin typeface="Segoe UI" panose="020B0502040204020203" pitchFamily="34" charset="0"/>
@@ -38698,6 +39264,9 @@
           </a:p>
           <a:p>
             <a:pPr>
+              <a:lnSpc>
+                <a:spcPct val="150000"/>
+              </a:lnSpc>
               <a:buClr>
                 <a:schemeClr val="tx1"/>
               </a:buClr>
@@ -38710,7 +39279,14 @@
                 <a:latin typeface="Segoe UI" panose="020B0502040204020203" pitchFamily="34" charset="0"/>
                 <a:cs typeface="Segoe UI" panose="020B0502040204020203" pitchFamily="34" charset="0"/>
               </a:rPr>
-              <a:t>Deep learning </a:t>
+              <a:t>Deep </a:t>
+            </a:r>
+            <a:r>
+              <a:rPr lang="en-US" sz="2000" dirty="0" smtClean="0">
+                <a:latin typeface="Segoe UI" panose="020B0502040204020203" pitchFamily="34" charset="0"/>
+                <a:cs typeface="Segoe UI" panose="020B0502040204020203" pitchFamily="34" charset="0"/>
+              </a:rPr>
+              <a:t>learning </a:t>
             </a:r>
             <a:r>
               <a:rPr lang="en-US" sz="2000" dirty="0" err="1" smtClean="0">
@@ -38796,6 +39372,9 @@
           </a:p>
           <a:p>
             <a:pPr>
+              <a:lnSpc>
+                <a:spcPct val="150000"/>
+              </a:lnSpc>
               <a:buClr>
                 <a:schemeClr val="tx1"/>
               </a:buClr>
@@ -38878,6 +39457,34 @@
                 <a:latin typeface="Segoe UI" panose="020B0502040204020203" pitchFamily="34" charset="0"/>
                 <a:cs typeface="Segoe UI" panose="020B0502040204020203" pitchFamily="34" charset="0"/>
               </a:rPr>
+              <a:t>có</a:t>
+            </a:r>
+            <a:r>
+              <a:rPr lang="en-US" sz="2000" dirty="0" smtClean="0">
+                <a:latin typeface="Segoe UI" panose="020B0502040204020203" pitchFamily="34" charset="0"/>
+                <a:cs typeface="Segoe UI" panose="020B0502040204020203" pitchFamily="34" charset="0"/>
+              </a:rPr>
+              <a:t> </a:t>
+            </a:r>
+            <a:r>
+              <a:rPr lang="en-US" sz="2000" dirty="0" err="1" smtClean="0">
+                <a:latin typeface="Segoe UI" panose="020B0502040204020203" pitchFamily="34" charset="0"/>
+                <a:cs typeface="Segoe UI" panose="020B0502040204020203" pitchFamily="34" charset="0"/>
+              </a:rPr>
+              <a:t>đô</a:t>
+            </a:r>
+            <a:r>
+              <a:rPr lang="en-US" sz="2000" dirty="0" smtClean="0">
+                <a:latin typeface="Segoe UI" panose="020B0502040204020203" pitchFamily="34" charset="0"/>
+                <a:cs typeface="Segoe UI" panose="020B0502040204020203" pitchFamily="34" charset="0"/>
+              </a:rPr>
+              <a:t> </a:t>
+            </a:r>
+            <a:r>
+              <a:rPr lang="en-US" sz="2000" dirty="0" err="1" smtClean="0">
+                <a:latin typeface="Segoe UI" panose="020B0502040204020203" pitchFamily="34" charset="0"/>
+                <a:cs typeface="Segoe UI" panose="020B0502040204020203" pitchFamily="34" charset="0"/>
+              </a:rPr>
               <a:t>phức</a:t>
             </a:r>
             <a:r>
@@ -38893,6 +39500,34 @@
                 <a:cs typeface="Segoe UI" panose="020B0502040204020203" pitchFamily="34" charset="0"/>
               </a:rPr>
               <a:t>tạp</a:t>
+            </a:r>
+            <a:r>
+              <a:rPr lang="en-US" sz="2000" dirty="0" smtClean="0">
+                <a:latin typeface="Segoe UI" panose="020B0502040204020203" pitchFamily="34" charset="0"/>
+                <a:cs typeface="Segoe UI" panose="020B0502040204020203" pitchFamily="34" charset="0"/>
+              </a:rPr>
+              <a:t> </a:t>
+            </a:r>
+            <a:r>
+              <a:rPr lang="en-US" sz="2000" dirty="0" err="1" smtClean="0">
+                <a:latin typeface="Segoe UI" panose="020B0502040204020203" pitchFamily="34" charset="0"/>
+                <a:cs typeface="Segoe UI" panose="020B0502040204020203" pitchFamily="34" charset="0"/>
+              </a:rPr>
+              <a:t>dữ</a:t>
+            </a:r>
+            <a:r>
+              <a:rPr lang="en-US" sz="2000" dirty="0" smtClean="0">
+                <a:latin typeface="Segoe UI" panose="020B0502040204020203" pitchFamily="34" charset="0"/>
+                <a:cs typeface="Segoe UI" panose="020B0502040204020203" pitchFamily="34" charset="0"/>
+              </a:rPr>
+              <a:t> </a:t>
+            </a:r>
+            <a:r>
+              <a:rPr lang="en-US" sz="2000" dirty="0" err="1" smtClean="0">
+                <a:latin typeface="Segoe UI" panose="020B0502040204020203" pitchFamily="34" charset="0"/>
+                <a:cs typeface="Segoe UI" panose="020B0502040204020203" pitchFamily="34" charset="0"/>
+              </a:rPr>
+              <a:t>liệu</a:t>
             </a:r>
             <a:r>
               <a:rPr lang="en-US" sz="2000" dirty="0" smtClean="0">
@@ -39220,8 +39855,8 @@
         </p:nvSpPr>
         <p:spPr>
           <a:xfrm>
-            <a:off x="642551" y="2421924"/>
-            <a:ext cx="10956324" cy="3657600"/>
+            <a:off x="642551" y="2231423"/>
+            <a:ext cx="10956324" cy="4026501"/>
           </a:xfrm>
           <a:prstGeom prst="rect">
             <a:avLst/>
@@ -39482,11 +40117,74 @@
               <a:t>: </a:t>
             </a:r>
             <a:r>
+              <a:rPr lang="en-US" sz="2000" dirty="0" err="1" smtClean="0">
+                <a:latin typeface="Segoe UI" panose="020B0502040204020203" pitchFamily="34" charset="0"/>
+                <a:cs typeface="Segoe UI" panose="020B0502040204020203" pitchFamily="34" charset="0"/>
+              </a:rPr>
+              <a:t>Hiện</a:t>
+            </a:r>
+            <a:r>
+              <a:rPr lang="en-US" sz="2000" dirty="0" smtClean="0">
+                <a:latin typeface="Segoe UI" panose="020B0502040204020203" pitchFamily="34" charset="0"/>
+                <a:cs typeface="Segoe UI" panose="020B0502040204020203" pitchFamily="34" charset="0"/>
+              </a:rPr>
+              <a:t> </a:t>
+            </a:r>
+            <a:r>
+              <a:rPr lang="en-US" sz="2000" dirty="0" err="1" smtClean="0">
+                <a:latin typeface="Segoe UI" panose="020B0502040204020203" pitchFamily="34" charset="0"/>
+                <a:cs typeface="Segoe UI" panose="020B0502040204020203" pitchFamily="34" charset="0"/>
+              </a:rPr>
+              <a:t>tại</a:t>
+            </a:r>
+            <a:r>
+              <a:rPr lang="en-US" sz="2000" dirty="0" smtClean="0">
+                <a:latin typeface="Segoe UI" panose="020B0502040204020203" pitchFamily="34" charset="0"/>
+                <a:cs typeface="Segoe UI" panose="020B0502040204020203" pitchFamily="34" charset="0"/>
+              </a:rPr>
+              <a:t> </a:t>
+            </a:r>
+            <a:r>
+              <a:rPr lang="en-US" sz="2000" dirty="0" err="1" smtClean="0">
+                <a:latin typeface="Segoe UI" panose="020B0502040204020203" pitchFamily="34" charset="0"/>
+                <a:cs typeface="Segoe UI" panose="020B0502040204020203" pitchFamily="34" charset="0"/>
+              </a:rPr>
+              <a:t>vẫn</a:t>
+            </a:r>
+            <a:r>
+              <a:rPr lang="en-US" sz="2000" dirty="0" smtClean="0">
+                <a:latin typeface="Segoe UI" panose="020B0502040204020203" pitchFamily="34" charset="0"/>
+                <a:cs typeface="Segoe UI" panose="020B0502040204020203" pitchFamily="34" charset="0"/>
+              </a:rPr>
+              <a:t> </a:t>
+            </a:r>
+            <a:r>
               <a:rPr lang="en-US" sz="2000" dirty="0" err="1">
                 <a:latin typeface="Segoe UI" panose="020B0502040204020203" pitchFamily="34" charset="0"/>
                 <a:cs typeface="Segoe UI" panose="020B0502040204020203" pitchFamily="34" charset="0"/>
               </a:rPr>
-              <a:t>Không</a:t>
+              <a:t>k</a:t>
+            </a:r>
+            <a:r>
+              <a:rPr lang="en-US" sz="2000" dirty="0" err="1" smtClean="0">
+                <a:latin typeface="Segoe UI" panose="020B0502040204020203" pitchFamily="34" charset="0"/>
+                <a:cs typeface="Segoe UI" panose="020B0502040204020203" pitchFamily="34" charset="0"/>
+              </a:rPr>
+              <a:t>hông</a:t>
+            </a:r>
+            <a:r>
+              <a:rPr lang="en-US" sz="2000" dirty="0" smtClean="0">
+                <a:latin typeface="Segoe UI" panose="020B0502040204020203" pitchFamily="34" charset="0"/>
+                <a:cs typeface="Segoe UI" panose="020B0502040204020203" pitchFamily="34" charset="0"/>
+              </a:rPr>
+              <a:t> </a:t>
+            </a:r>
+            <a:r>
+              <a:rPr lang="en-US" sz="2000" dirty="0" err="1">
+                <a:latin typeface="Segoe UI" panose="020B0502040204020203" pitchFamily="34" charset="0"/>
+                <a:cs typeface="Segoe UI" panose="020B0502040204020203" pitchFamily="34" charset="0"/>
+              </a:rPr>
+              <a:t>có</a:t>
             </a:r>
             <a:r>
               <a:rPr lang="en-US" sz="2000" dirty="0">
@@ -39496,42 +40194,28 @@
               <a:t> </a:t>
             </a:r>
             <a:r>
-              <a:rPr lang="en-US" sz="2000" dirty="0" err="1">
-                <a:latin typeface="Segoe UI" panose="020B0502040204020203" pitchFamily="34" charset="0"/>
-                <a:cs typeface="Segoe UI" panose="020B0502040204020203" pitchFamily="34" charset="0"/>
-              </a:rPr>
-              <a:t>có</a:t>
-            </a:r>
-            <a:r>
-              <a:rPr lang="en-US" sz="2000" dirty="0">
-                <a:latin typeface="Segoe UI" panose="020B0502040204020203" pitchFamily="34" charset="0"/>
-                <a:cs typeface="Segoe UI" panose="020B0502040204020203" pitchFamily="34" charset="0"/>
-              </a:rPr>
-              <a:t> </a:t>
-            </a:r>
-            <a:r>
-              <a:rPr lang="en-US" sz="2000" dirty="0" err="1">
-                <a:latin typeface="Segoe UI" panose="020B0502040204020203" pitchFamily="34" charset="0"/>
-                <a:cs typeface="Segoe UI" panose="020B0502040204020203" pitchFamily="34" charset="0"/>
-              </a:rPr>
-              <a:t>nguồn</a:t>
-            </a:r>
-            <a:r>
-              <a:rPr lang="en-US" sz="2000" dirty="0">
-                <a:latin typeface="Segoe UI" panose="020B0502040204020203" pitchFamily="34" charset="0"/>
-                <a:cs typeface="Segoe UI" panose="020B0502040204020203" pitchFamily="34" charset="0"/>
-              </a:rPr>
-              <a:t> </a:t>
-            </a:r>
-            <a:r>
-              <a:rPr lang="en-US" sz="2000" dirty="0" err="1">
+              <a:rPr lang="en-US" sz="2000" dirty="0" err="1" smtClean="0">
+                <a:latin typeface="Segoe UI" panose="020B0502040204020203" pitchFamily="34" charset="0"/>
+                <a:cs typeface="Segoe UI" panose="020B0502040204020203" pitchFamily="34" charset="0"/>
+              </a:rPr>
+              <a:t>kênh</a:t>
+            </a:r>
+            <a:r>
+              <a:rPr lang="en-US" sz="2000" dirty="0" smtClean="0">
+                <a:latin typeface="Segoe UI" panose="020B0502040204020203" pitchFamily="34" charset="0"/>
+                <a:cs typeface="Segoe UI" panose="020B0502040204020203" pitchFamily="34" charset="0"/>
+              </a:rPr>
+              <a:t> </a:t>
+            </a:r>
+            <a:r>
+              <a:rPr lang="en-US" sz="2000" dirty="0" err="1" smtClean="0">
                 <a:latin typeface="Segoe UI" panose="020B0502040204020203" pitchFamily="34" charset="0"/>
                 <a:cs typeface="Segoe UI" panose="020B0502040204020203" pitchFamily="34" charset="0"/>
               </a:rPr>
               <a:t>dữ</a:t>
             </a:r>
             <a:r>
-              <a:rPr lang="en-US" sz="2000" dirty="0">
+              <a:rPr lang="en-US" sz="2000" dirty="0" smtClean="0">
                 <a:latin typeface="Segoe UI" panose="020B0502040204020203" pitchFamily="34" charset="0"/>
                 <a:cs typeface="Segoe UI" panose="020B0502040204020203" pitchFamily="34" charset="0"/>
               </a:rPr>
@@ -39712,21 +40396,21 @@
                 <a:latin typeface="Segoe UI" panose="020B0502040204020203" pitchFamily="34" charset="0"/>
                 <a:cs typeface="Segoe UI" panose="020B0502040204020203" pitchFamily="34" charset="0"/>
               </a:rPr>
-              <a:t> </a:t>
-            </a:r>
-            <a:r>
-              <a:rPr lang="vi-VN" sz="2000" dirty="0">
-                <a:latin typeface="Segoe UI" panose="020B0502040204020203" pitchFamily="34" charset="0"/>
-                <a:cs typeface="Segoe UI" panose="020B0502040204020203" pitchFamily="34" charset="0"/>
-              </a:rPr>
-              <a:t>W</a:t>
+              <a:t> w</a:t>
+            </a:r>
+            <a:r>
+              <a:rPr lang="en-US" sz="2000" dirty="0" smtClean="0">
+                <a:latin typeface="Segoe UI" panose="020B0502040204020203" pitchFamily="34" charset="0"/>
+                <a:cs typeface="Segoe UI" panose="020B0502040204020203" pitchFamily="34" charset="0"/>
+              </a:rPr>
+              <a:t>eb </a:t>
             </a:r>
             <a:r>
               <a:rPr lang="en-US" sz="2000" dirty="0" err="1">
                 <a:latin typeface="Segoe UI" panose="020B0502040204020203" pitchFamily="34" charset="0"/>
                 <a:cs typeface="Segoe UI" panose="020B0502040204020203" pitchFamily="34" charset="0"/>
               </a:rPr>
-              <a:t>eb</a:t>
+              <a:t>cho</a:t>
             </a:r>
             <a:r>
               <a:rPr lang="en-US" sz="2000" dirty="0">
@@ -39740,7 +40424,7 @@
                 <a:latin typeface="Segoe UI" panose="020B0502040204020203" pitchFamily="34" charset="0"/>
                 <a:cs typeface="Segoe UI" panose="020B0502040204020203" pitchFamily="34" charset="0"/>
               </a:rPr>
-              <a:t>cho</a:t>
+              <a:t>thuê</a:t>
             </a:r>
             <a:r>
               <a:rPr lang="en-US" sz="2000" dirty="0">
@@ -39754,7 +40438,7 @@
                 <a:latin typeface="Segoe UI" panose="020B0502040204020203" pitchFamily="34" charset="0"/>
                 <a:cs typeface="Segoe UI" panose="020B0502040204020203" pitchFamily="34" charset="0"/>
               </a:rPr>
-              <a:t>thuê</a:t>
+              <a:t>phòng</a:t>
             </a:r>
             <a:r>
               <a:rPr lang="en-US" sz="2000" dirty="0">
@@ -39768,28 +40452,21 @@
                 <a:latin typeface="Segoe UI" panose="020B0502040204020203" pitchFamily="34" charset="0"/>
                 <a:cs typeface="Segoe UI" panose="020B0502040204020203" pitchFamily="34" charset="0"/>
               </a:rPr>
-              <a:t>phòng</a:t>
+              <a:t>trên</a:t>
             </a:r>
             <a:r>
               <a:rPr lang="en-US" sz="2000" dirty="0">
                 <a:latin typeface="Segoe UI" panose="020B0502040204020203" pitchFamily="34" charset="0"/>
                 <a:cs typeface="Segoe UI" panose="020B0502040204020203" pitchFamily="34" charset="0"/>
               </a:rPr>
-              <a:t> </a:t>
-            </a:r>
-            <a:r>
-              <a:rPr lang="en-US" sz="2000" dirty="0" err="1">
-                <a:latin typeface="Segoe UI" panose="020B0502040204020203" pitchFamily="34" charset="0"/>
-                <a:cs typeface="Segoe UI" panose="020B0502040204020203" pitchFamily="34" charset="0"/>
-              </a:rPr>
-              <a:t>trên</a:t>
-            </a:r>
-            <a:r>
-              <a:rPr lang="en-US" sz="2000" dirty="0">
-                <a:latin typeface="Segoe UI" panose="020B0502040204020203" pitchFamily="34" charset="0"/>
-                <a:cs typeface="Segoe UI" panose="020B0502040204020203" pitchFamily="34" charset="0"/>
-              </a:rPr>
-              <a:t> Internet.</a:t>
+              <a:t> Internet</a:t>
+            </a:r>
+            <a:r>
+              <a:rPr lang="en-US" sz="2000" dirty="0" smtClean="0">
+                <a:latin typeface="Segoe UI" panose="020B0502040204020203" pitchFamily="34" charset="0"/>
+                <a:cs typeface="Segoe UI" panose="020B0502040204020203" pitchFamily="34" charset="0"/>
+              </a:rPr>
+              <a:t>.</a:t>
             </a:r>
           </a:p>
           <a:p>
@@ -39804,14 +40481,14 @@
               <a:buNone/>
             </a:pPr>
             <a:r>
-              <a:rPr lang="en-US" sz="2000" dirty="0" err="1">
+              <a:rPr lang="en-US" sz="2000" dirty="0" err="1" smtClean="0">
                 <a:latin typeface="Segoe UI" panose="020B0502040204020203" pitchFamily="34" charset="0"/>
                 <a:cs typeface="Segoe UI" panose="020B0502040204020203" pitchFamily="34" charset="0"/>
               </a:rPr>
               <a:t>Đánh</a:t>
             </a:r>
             <a:r>
-              <a:rPr lang="en-US" sz="2000" dirty="0">
+              <a:rPr lang="en-US" sz="2000" dirty="0" smtClean="0">
                 <a:latin typeface="Segoe UI" panose="020B0502040204020203" pitchFamily="34" charset="0"/>
                 <a:cs typeface="Segoe UI" panose="020B0502040204020203" pitchFamily="34" charset="0"/>
               </a:rPr>
@@ -39859,11 +40536,74 @@
               <a:buChar char="Ø"/>
             </a:pPr>
             <a:r>
+              <a:rPr lang="en-US" sz="2000" dirty="0" err="1" smtClean="0">
+                <a:latin typeface="Segoe UI" panose="020B0502040204020203" pitchFamily="34" charset="0"/>
+                <a:cs typeface="Segoe UI" panose="020B0502040204020203" pitchFamily="34" charset="0"/>
+              </a:rPr>
+              <a:t>Có</a:t>
+            </a:r>
+            <a:r>
+              <a:rPr lang="en-US" sz="2000" dirty="0" smtClean="0">
+                <a:latin typeface="Segoe UI" panose="020B0502040204020203" pitchFamily="34" charset="0"/>
+                <a:cs typeface="Segoe UI" panose="020B0502040204020203" pitchFamily="34" charset="0"/>
+              </a:rPr>
+              <a:t> </a:t>
+            </a:r>
+            <a:r>
+              <a:rPr lang="en-US" sz="2000" dirty="0" err="1" smtClean="0">
+                <a:latin typeface="Segoe UI" panose="020B0502040204020203" pitchFamily="34" charset="0"/>
+                <a:cs typeface="Segoe UI" panose="020B0502040204020203" pitchFamily="34" charset="0"/>
+              </a:rPr>
+              <a:t>nhiều</a:t>
+            </a:r>
+            <a:r>
+              <a:rPr lang="en-US" sz="2000" dirty="0" smtClean="0">
+                <a:latin typeface="Segoe UI" panose="020B0502040204020203" pitchFamily="34" charset="0"/>
+                <a:cs typeface="Segoe UI" panose="020B0502040204020203" pitchFamily="34" charset="0"/>
+              </a:rPr>
+              <a:t> </a:t>
+            </a:r>
+            <a:r>
+              <a:rPr lang="en-US" sz="2000" dirty="0" err="1" smtClean="0">
+                <a:latin typeface="Segoe UI" panose="020B0502040204020203" pitchFamily="34" charset="0"/>
+                <a:cs typeface="Segoe UI" panose="020B0502040204020203" pitchFamily="34" charset="0"/>
+              </a:rPr>
+              <a:t>trang</a:t>
+            </a:r>
+            <a:r>
+              <a:rPr lang="en-US" sz="2000" dirty="0" smtClean="0">
+                <a:latin typeface="Segoe UI" panose="020B0502040204020203" pitchFamily="34" charset="0"/>
+                <a:cs typeface="Segoe UI" panose="020B0502040204020203" pitchFamily="34" charset="0"/>
+              </a:rPr>
+              <a:t> web </a:t>
+            </a:r>
+            <a:r>
+              <a:rPr lang="en-US" sz="2000" dirty="0" err="1" smtClean="0">
+                <a:latin typeface="Segoe UI" panose="020B0502040204020203" pitchFamily="34" charset="0"/>
+                <a:cs typeface="Segoe UI" panose="020B0502040204020203" pitchFamily="34" charset="0"/>
+              </a:rPr>
+              <a:t>đăng</a:t>
+            </a:r>
+            <a:r>
+              <a:rPr lang="en-US" sz="2000" dirty="0" smtClean="0">
+                <a:latin typeface="Segoe UI" panose="020B0502040204020203" pitchFamily="34" charset="0"/>
+                <a:cs typeface="Segoe UI" panose="020B0502040204020203" pitchFamily="34" charset="0"/>
+              </a:rPr>
+              <a:t> </a:t>
+            </a:r>
+            <a:r>
+              <a:rPr lang="en-US" sz="2000" dirty="0">
+                <a:latin typeface="Segoe UI" panose="020B0502040204020203" pitchFamily="34" charset="0"/>
+                <a:cs typeface="Segoe UI" panose="020B0502040204020203" pitchFamily="34" charset="0"/>
+              </a:rPr>
+              <a:t>tin </a:t>
+            </a:r>
+            <a:r>
               <a:rPr lang="en-US" sz="2000" dirty="0" err="1">
                 <a:latin typeface="Segoe UI" panose="020B0502040204020203" pitchFamily="34" charset="0"/>
                 <a:cs typeface="Segoe UI" panose="020B0502040204020203" pitchFamily="34" charset="0"/>
               </a:rPr>
-              <a:t>Tương</a:t>
+              <a:t>cho</a:t>
             </a:r>
             <a:r>
               <a:rPr lang="en-US" sz="2000" dirty="0">
@@ -39877,7 +40617,7 @@
                 <a:latin typeface="Segoe UI" panose="020B0502040204020203" pitchFamily="34" charset="0"/>
                 <a:cs typeface="Segoe UI" panose="020B0502040204020203" pitchFamily="34" charset="0"/>
               </a:rPr>
-              <a:t>đối</a:t>
+              <a:t>thuê</a:t>
             </a:r>
             <a:r>
               <a:rPr lang="en-US" sz="2000" dirty="0">
@@ -39891,85 +40631,19 @@
                 <a:latin typeface="Segoe UI" panose="020B0502040204020203" pitchFamily="34" charset="0"/>
                 <a:cs typeface="Segoe UI" panose="020B0502040204020203" pitchFamily="34" charset="0"/>
               </a:rPr>
-              <a:t>nhiều</a:t>
+              <a:t>phòng</a:t>
             </a:r>
             <a:r>
               <a:rPr lang="en-US" sz="2000" dirty="0">
                 <a:latin typeface="Segoe UI" panose="020B0502040204020203" pitchFamily="34" charset="0"/>
                 <a:cs typeface="Segoe UI" panose="020B0502040204020203" pitchFamily="34" charset="0"/>
               </a:rPr>
-              <a:t> </a:t>
-            </a:r>
-            <a:r>
-              <a:rPr lang="en-US" sz="2000" dirty="0" err="1">
-                <a:latin typeface="Segoe UI" panose="020B0502040204020203" pitchFamily="34" charset="0"/>
-                <a:cs typeface="Segoe UI" panose="020B0502040204020203" pitchFamily="34" charset="0"/>
-              </a:rPr>
-              <a:t>các</a:t>
-            </a:r>
-            <a:r>
-              <a:rPr lang="en-US" sz="2000" dirty="0">
-                <a:latin typeface="Segoe UI" panose="020B0502040204020203" pitchFamily="34" charset="0"/>
-                <a:cs typeface="Segoe UI" panose="020B0502040204020203" pitchFamily="34" charset="0"/>
-              </a:rPr>
-              <a:t> website </a:t>
-            </a:r>
-            <a:r>
-              <a:rPr lang="en-US" sz="2000" dirty="0" err="1">
-                <a:latin typeface="Segoe UI" panose="020B0502040204020203" pitchFamily="34" charset="0"/>
-                <a:cs typeface="Segoe UI" panose="020B0502040204020203" pitchFamily="34" charset="0"/>
-              </a:rPr>
-              <a:t>đăng</a:t>
-            </a:r>
-            <a:r>
-              <a:rPr lang="en-US" sz="2000" dirty="0">
-                <a:latin typeface="Segoe UI" panose="020B0502040204020203" pitchFamily="34" charset="0"/>
-                <a:cs typeface="Segoe UI" panose="020B0502040204020203" pitchFamily="34" charset="0"/>
-              </a:rPr>
-              <a:t> tin </a:t>
-            </a:r>
-            <a:r>
-              <a:rPr lang="en-US" sz="2000" dirty="0" err="1">
-                <a:latin typeface="Segoe UI" panose="020B0502040204020203" pitchFamily="34" charset="0"/>
-                <a:cs typeface="Segoe UI" panose="020B0502040204020203" pitchFamily="34" charset="0"/>
-              </a:rPr>
-              <a:t>cho</a:t>
-            </a:r>
-            <a:r>
-              <a:rPr lang="en-US" sz="2000" dirty="0">
-                <a:latin typeface="Segoe UI" panose="020B0502040204020203" pitchFamily="34" charset="0"/>
-                <a:cs typeface="Segoe UI" panose="020B0502040204020203" pitchFamily="34" charset="0"/>
-              </a:rPr>
-              <a:t> </a:t>
-            </a:r>
-            <a:r>
-              <a:rPr lang="en-US" sz="2000" dirty="0" err="1">
-                <a:latin typeface="Segoe UI" panose="020B0502040204020203" pitchFamily="34" charset="0"/>
-                <a:cs typeface="Segoe UI" panose="020B0502040204020203" pitchFamily="34" charset="0"/>
-              </a:rPr>
-              <a:t>thuê</a:t>
-            </a:r>
-            <a:r>
-              <a:rPr lang="en-US" sz="2000" dirty="0">
-                <a:latin typeface="Segoe UI" panose="020B0502040204020203" pitchFamily="34" charset="0"/>
-                <a:cs typeface="Segoe UI" panose="020B0502040204020203" pitchFamily="34" charset="0"/>
-              </a:rPr>
-              <a:t> </a:t>
-            </a:r>
-            <a:r>
-              <a:rPr lang="en-US" sz="2000" dirty="0" err="1">
-                <a:latin typeface="Segoe UI" panose="020B0502040204020203" pitchFamily="34" charset="0"/>
-                <a:cs typeface="Segoe UI" panose="020B0502040204020203" pitchFamily="34" charset="0"/>
-              </a:rPr>
-              <a:t>phòng</a:t>
-            </a:r>
-            <a:r>
-              <a:rPr lang="en-US" sz="2000" dirty="0">
-                <a:latin typeface="Segoe UI" panose="020B0502040204020203" pitchFamily="34" charset="0"/>
-                <a:cs typeface="Segoe UI" panose="020B0502040204020203" pitchFamily="34" charset="0"/>
-              </a:rPr>
               <a:t>	</a:t>
             </a:r>
+            <a:endParaRPr lang="en-US" sz="2000" dirty="0" smtClean="0">
+              <a:latin typeface="Segoe UI" panose="020B0502040204020203" pitchFamily="34" charset="0"/>
+              <a:cs typeface="Segoe UI" panose="020B0502040204020203" pitchFamily="34" charset="0"/>
+            </a:endParaRPr>
           </a:p>
           <a:p>
             <a:pPr lvl="1">
@@ -39984,14 +40658,227 @@
               <a:buChar char="Ø"/>
             </a:pPr>
             <a:r>
+              <a:rPr lang="en-US" sz="2000" dirty="0" err="1" smtClean="0">
+                <a:latin typeface="Segoe UI" panose="020B0502040204020203" pitchFamily="34" charset="0"/>
+                <a:cs typeface="Segoe UI" panose="020B0502040204020203" pitchFamily="34" charset="0"/>
+              </a:rPr>
+              <a:t>Thông</a:t>
+            </a:r>
+            <a:r>
+              <a:rPr lang="en-US" sz="2000" dirty="0" smtClean="0">
+                <a:latin typeface="Segoe UI" panose="020B0502040204020203" pitchFamily="34" charset="0"/>
+                <a:cs typeface="Segoe UI" panose="020B0502040204020203" pitchFamily="34" charset="0"/>
+              </a:rPr>
+              <a:t> tin </a:t>
+            </a:r>
+            <a:r>
+              <a:rPr lang="en-US" sz="2000" dirty="0" err="1" smtClean="0">
+                <a:latin typeface="Segoe UI" panose="020B0502040204020203" pitchFamily="34" charset="0"/>
+                <a:cs typeface="Segoe UI" panose="020B0502040204020203" pitchFamily="34" charset="0"/>
+              </a:rPr>
+              <a:t>chủ</a:t>
+            </a:r>
+            <a:r>
+              <a:rPr lang="en-US" sz="2000" dirty="0" smtClean="0">
+                <a:latin typeface="Segoe UI" panose="020B0502040204020203" pitchFamily="34" charset="0"/>
+                <a:cs typeface="Segoe UI" panose="020B0502040204020203" pitchFamily="34" charset="0"/>
+              </a:rPr>
+              <a:t> </a:t>
+            </a:r>
+            <a:r>
+              <a:rPr lang="en-US" sz="2000" dirty="0" err="1" smtClean="0">
+                <a:latin typeface="Segoe UI" panose="020B0502040204020203" pitchFamily="34" charset="0"/>
+                <a:cs typeface="Segoe UI" panose="020B0502040204020203" pitchFamily="34" charset="0"/>
+              </a:rPr>
+              <a:t>yếu</a:t>
+            </a:r>
+            <a:r>
+              <a:rPr lang="en-US" sz="2000" dirty="0" smtClean="0">
+                <a:latin typeface="Segoe UI" panose="020B0502040204020203" pitchFamily="34" charset="0"/>
+                <a:cs typeface="Segoe UI" panose="020B0502040204020203" pitchFamily="34" charset="0"/>
+              </a:rPr>
+              <a:t> </a:t>
+            </a:r>
+            <a:r>
+              <a:rPr lang="en-US" sz="2000" dirty="0" err="1" smtClean="0">
+                <a:latin typeface="Segoe UI" panose="020B0502040204020203" pitchFamily="34" charset="0"/>
+                <a:cs typeface="Segoe UI" panose="020B0502040204020203" pitchFamily="34" charset="0"/>
+              </a:rPr>
+              <a:t>từ</a:t>
+            </a:r>
+            <a:r>
+              <a:rPr lang="en-US" sz="2000" dirty="0" smtClean="0">
+                <a:latin typeface="Segoe UI" panose="020B0502040204020203" pitchFamily="34" charset="0"/>
+                <a:cs typeface="Segoe UI" panose="020B0502040204020203" pitchFamily="34" charset="0"/>
+              </a:rPr>
+              <a:t> </a:t>
+            </a:r>
+            <a:r>
               <a:rPr lang="en-US" sz="2000" dirty="0" err="1">
                 <a:latin typeface="Segoe UI" panose="020B0502040204020203" pitchFamily="34" charset="0"/>
                 <a:cs typeface="Segoe UI" panose="020B0502040204020203" pitchFamily="34" charset="0"/>
               </a:rPr>
-              <a:t>Nguồn</a:t>
+              <a:t>các</a:t>
             </a:r>
             <a:r>
               <a:rPr lang="en-US" sz="2000" dirty="0">
+                <a:latin typeface="Segoe UI" panose="020B0502040204020203" pitchFamily="34" charset="0"/>
+                <a:cs typeface="Segoe UI" panose="020B0502040204020203" pitchFamily="34" charset="0"/>
+              </a:rPr>
+              <a:t> </a:t>
+            </a:r>
+            <a:r>
+              <a:rPr lang="en-US" sz="2000" dirty="0" err="1">
+                <a:latin typeface="Segoe UI" panose="020B0502040204020203" pitchFamily="34" charset="0"/>
+                <a:cs typeface="Segoe UI" panose="020B0502040204020203" pitchFamily="34" charset="0"/>
+              </a:rPr>
+              <a:t>thành</a:t>
+            </a:r>
+            <a:r>
+              <a:rPr lang="en-US" sz="2000" dirty="0">
+                <a:latin typeface="Segoe UI" panose="020B0502040204020203" pitchFamily="34" charset="0"/>
+                <a:cs typeface="Segoe UI" panose="020B0502040204020203" pitchFamily="34" charset="0"/>
+              </a:rPr>
+              <a:t> </a:t>
+            </a:r>
+            <a:r>
+              <a:rPr lang="en-US" sz="2000" dirty="0" err="1">
+                <a:latin typeface="Segoe UI" panose="020B0502040204020203" pitchFamily="34" charset="0"/>
+                <a:cs typeface="Segoe UI" panose="020B0502040204020203" pitchFamily="34" charset="0"/>
+              </a:rPr>
+              <a:t>phố</a:t>
+            </a:r>
+            <a:r>
+              <a:rPr lang="en-US" sz="2000" dirty="0">
+                <a:latin typeface="Segoe UI" panose="020B0502040204020203" pitchFamily="34" charset="0"/>
+                <a:cs typeface="Segoe UI" panose="020B0502040204020203" pitchFamily="34" charset="0"/>
+              </a:rPr>
+              <a:t> </a:t>
+            </a:r>
+            <a:r>
+              <a:rPr lang="en-US" sz="2000" dirty="0" err="1">
+                <a:latin typeface="Segoe UI" panose="020B0502040204020203" pitchFamily="34" charset="0"/>
+                <a:cs typeface="Segoe UI" panose="020B0502040204020203" pitchFamily="34" charset="0"/>
+              </a:rPr>
+              <a:t>lớn</a:t>
+            </a:r>
+            <a:r>
+              <a:rPr lang="en-US" sz="2000" dirty="0">
+                <a:latin typeface="Segoe UI" panose="020B0502040204020203" pitchFamily="34" charset="0"/>
+                <a:cs typeface="Segoe UI" panose="020B0502040204020203" pitchFamily="34" charset="0"/>
+              </a:rPr>
+              <a:t> </a:t>
+            </a:r>
+            <a:r>
+              <a:rPr lang="en-US" sz="2000" dirty="0" err="1">
+                <a:latin typeface="Segoe UI" panose="020B0502040204020203" pitchFamily="34" charset="0"/>
+                <a:cs typeface="Segoe UI" panose="020B0502040204020203" pitchFamily="34" charset="0"/>
+              </a:rPr>
+              <a:t>như</a:t>
+            </a:r>
+            <a:r>
+              <a:rPr lang="en-US" sz="2000" dirty="0">
+                <a:latin typeface="Segoe UI" panose="020B0502040204020203" pitchFamily="34" charset="0"/>
+                <a:cs typeface="Segoe UI" panose="020B0502040204020203" pitchFamily="34" charset="0"/>
+              </a:rPr>
+              <a:t> </a:t>
+            </a:r>
+            <a:r>
+              <a:rPr lang="en-US" sz="2000" dirty="0" err="1">
+                <a:latin typeface="Segoe UI" panose="020B0502040204020203" pitchFamily="34" charset="0"/>
+                <a:cs typeface="Segoe UI" panose="020B0502040204020203" pitchFamily="34" charset="0"/>
+              </a:rPr>
+              <a:t>Hà</a:t>
+            </a:r>
+            <a:r>
+              <a:rPr lang="en-US" sz="2000" dirty="0">
+                <a:latin typeface="Segoe UI" panose="020B0502040204020203" pitchFamily="34" charset="0"/>
+                <a:cs typeface="Segoe UI" panose="020B0502040204020203" pitchFamily="34" charset="0"/>
+              </a:rPr>
+              <a:t> </a:t>
+            </a:r>
+            <a:r>
+              <a:rPr lang="en-US" sz="2000" dirty="0" err="1">
+                <a:latin typeface="Segoe UI" panose="020B0502040204020203" pitchFamily="34" charset="0"/>
+                <a:cs typeface="Segoe UI" panose="020B0502040204020203" pitchFamily="34" charset="0"/>
+              </a:rPr>
+              <a:t>Nội</a:t>
+            </a:r>
+            <a:r>
+              <a:rPr lang="en-US" sz="2000" dirty="0">
+                <a:latin typeface="Segoe UI" panose="020B0502040204020203" pitchFamily="34" charset="0"/>
+                <a:cs typeface="Segoe UI" panose="020B0502040204020203" pitchFamily="34" charset="0"/>
+              </a:rPr>
+              <a:t>, TP </a:t>
+            </a:r>
+            <a:r>
+              <a:rPr lang="en-US" sz="2000" dirty="0" err="1">
+                <a:latin typeface="Segoe UI" panose="020B0502040204020203" pitchFamily="34" charset="0"/>
+                <a:cs typeface="Segoe UI" panose="020B0502040204020203" pitchFamily="34" charset="0"/>
+              </a:rPr>
+              <a:t>Hồ</a:t>
+            </a:r>
+            <a:r>
+              <a:rPr lang="en-US" sz="2000" dirty="0">
+                <a:latin typeface="Segoe UI" panose="020B0502040204020203" pitchFamily="34" charset="0"/>
+                <a:cs typeface="Segoe UI" panose="020B0502040204020203" pitchFamily="34" charset="0"/>
+              </a:rPr>
+              <a:t> </a:t>
+            </a:r>
+            <a:r>
+              <a:rPr lang="en-US" sz="2000" dirty="0" err="1">
+                <a:latin typeface="Segoe UI" panose="020B0502040204020203" pitchFamily="34" charset="0"/>
+                <a:cs typeface="Segoe UI" panose="020B0502040204020203" pitchFamily="34" charset="0"/>
+              </a:rPr>
+              <a:t>Chí</a:t>
+            </a:r>
+            <a:r>
+              <a:rPr lang="en-US" sz="2000" dirty="0">
+                <a:latin typeface="Segoe UI" panose="020B0502040204020203" pitchFamily="34" charset="0"/>
+                <a:cs typeface="Segoe UI" panose="020B0502040204020203" pitchFamily="34" charset="0"/>
+              </a:rPr>
+              <a:t> Minh,… </a:t>
+            </a:r>
+            <a:endParaRPr lang="en-US" sz="2000" dirty="0">
+              <a:latin typeface="Segoe UI" panose="020B0502040204020203" pitchFamily="34" charset="0"/>
+              <a:cs typeface="Segoe UI" panose="020B0502040204020203" pitchFamily="34" charset="0"/>
+            </a:endParaRPr>
+          </a:p>
+          <a:p>
+            <a:pPr lvl="1">
+              <a:lnSpc>
+                <a:spcPct val="150000"/>
+              </a:lnSpc>
+              <a:buClr>
+                <a:schemeClr val="tx1"/>
+              </a:buClr>
+              <a:buSzPct val="85000"/>
+              <a:buFont typeface="Wingdings" pitchFamily="2" charset="2"/>
+              <a:buChar char="Ø"/>
+            </a:pPr>
+            <a:r>
+              <a:rPr lang="en-US" sz="2000" dirty="0" err="1" smtClean="0">
+                <a:latin typeface="Segoe UI" panose="020B0502040204020203" pitchFamily="34" charset="0"/>
+                <a:cs typeface="Segoe UI" panose="020B0502040204020203" pitchFamily="34" charset="0"/>
+              </a:rPr>
+              <a:t>Chất</a:t>
+            </a:r>
+            <a:r>
+              <a:rPr lang="en-US" sz="2000" dirty="0" smtClean="0">
+                <a:latin typeface="Segoe UI" panose="020B0502040204020203" pitchFamily="34" charset="0"/>
+                <a:cs typeface="Segoe UI" panose="020B0502040204020203" pitchFamily="34" charset="0"/>
+              </a:rPr>
+              <a:t> </a:t>
+            </a:r>
+            <a:r>
+              <a:rPr lang="en-US" sz="2000" dirty="0" err="1" smtClean="0">
+                <a:latin typeface="Segoe UI" panose="020B0502040204020203" pitchFamily="34" charset="0"/>
+                <a:cs typeface="Segoe UI" panose="020B0502040204020203" pitchFamily="34" charset="0"/>
+              </a:rPr>
+              <a:t>lượng</a:t>
+            </a:r>
+            <a:r>
+              <a:rPr lang="en-US" sz="2000" dirty="0" smtClean="0">
                 <a:latin typeface="Segoe UI" panose="020B0502040204020203" pitchFamily="34" charset="0"/>
                 <a:cs typeface="Segoe UI" panose="020B0502040204020203" pitchFamily="34" charset="0"/>
               </a:rPr>
@@ -40745,28 +41632,35 @@
               <a:t> </a:t>
             </a:r>
             <a:r>
-              <a:rPr lang="en-US" sz="2400" dirty="0" err="1">
+              <a:rPr lang="en-US" sz="2400" dirty="0" err="1" smtClean="0">
                 <a:latin typeface="Segoe UI" panose="020B0502040204020203" pitchFamily="34" charset="0"/>
                 <a:cs typeface="Segoe UI" panose="020B0502040204020203" pitchFamily="34" charset="0"/>
               </a:rPr>
               <a:t>nguồn</a:t>
             </a:r>
             <a:r>
-              <a:rPr lang="en-US" sz="2400" dirty="0">
-                <a:latin typeface="Segoe UI" panose="020B0502040204020203" pitchFamily="34" charset="0"/>
-                <a:cs typeface="Segoe UI" panose="020B0502040204020203" pitchFamily="34" charset="0"/>
-              </a:rPr>
-              <a:t> :</a:t>
-            </a:r>
+              <a:rPr lang="en-US" sz="2400" dirty="0" smtClean="0">
+                <a:latin typeface="Segoe UI" panose="020B0502040204020203" pitchFamily="34" charset="0"/>
+                <a:cs typeface="Segoe UI" panose="020B0502040204020203" pitchFamily="34" charset="0"/>
+              </a:rPr>
+              <a:t>:</a:t>
+            </a:r>
+            <a:endParaRPr lang="en-US" sz="2400" dirty="0">
+              <a:latin typeface="Segoe UI" panose="020B0502040204020203" pitchFamily="34" charset="0"/>
+              <a:cs typeface="Segoe UI" panose="020B0502040204020203" pitchFamily="34" charset="0"/>
+            </a:endParaRPr>
           </a:p>
           <a:p>
             <a:pPr lvl="1">
+              <a:lnSpc>
+                <a:spcPct val="150000"/>
+              </a:lnSpc>
               <a:buClr>
                 <a:schemeClr val="tx1"/>
               </a:buClr>
               <a:buSzPct val="85000"/>
               <a:buFont typeface="Wingdings" pitchFamily="2" charset="2"/>
-              <a:buChar char="§"/>
+              <a:buChar char="Ø"/>
             </a:pPr>
             <a:r>
               <a:rPr lang="en-US" sz="2200" dirty="0">
@@ -40916,11 +41810,457 @@
               <a:t> </a:t>
             </a:r>
             <a:r>
+              <a:rPr lang="en-US" sz="2200" dirty="0" err="1" smtClean="0">
+                <a:latin typeface="Segoe UI" panose="020B0502040204020203" pitchFamily="34" charset="0"/>
+                <a:cs typeface="Segoe UI" panose="020B0502040204020203" pitchFamily="34" charset="0"/>
+              </a:rPr>
+              <a:t>ghi</a:t>
+            </a:r>
+            <a:endParaRPr lang="en-US" sz="2200" dirty="0" smtClean="0">
+              <a:latin typeface="Segoe UI" panose="020B0502040204020203" pitchFamily="34" charset="0"/>
+              <a:cs typeface="Segoe UI" panose="020B0502040204020203" pitchFamily="34" charset="0"/>
+            </a:endParaRPr>
+          </a:p>
+          <a:p>
+            <a:pPr lvl="1">
+              <a:lnSpc>
+                <a:spcPct val="150000"/>
+              </a:lnSpc>
+              <a:buClr>
+                <a:schemeClr val="tx1"/>
+              </a:buClr>
+              <a:buSzPct val="85000"/>
+              <a:buFont typeface="Wingdings" pitchFamily="2" charset="2"/>
+              <a:buChar char="Ø"/>
+            </a:pPr>
+            <a:r>
+              <a:rPr lang="en-US" sz="2200" dirty="0">
+                <a:latin typeface="Segoe UI" panose="020B0502040204020203" pitchFamily="34" charset="0"/>
+                <a:cs typeface="Segoe UI" panose="020B0502040204020203" pitchFamily="34" charset="0"/>
+              </a:rPr>
+              <a:t> </a:t>
+            </a:r>
+            <a:r>
+              <a:rPr lang="en-US" sz="2200" dirty="0" smtClean="0">
+                <a:latin typeface="Segoe UI" panose="020B0502040204020203" pitchFamily="34" charset="0"/>
+                <a:cs typeface="Segoe UI" panose="020B0502040204020203" pitchFamily="34" charset="0"/>
+              </a:rPr>
+              <a:t> </a:t>
+            </a:r>
+            <a:r>
+              <a:rPr lang="en-US" sz="2200" dirty="0" err="1" smtClean="0">
+                <a:latin typeface="Segoe UI" panose="020B0502040204020203" pitchFamily="34" charset="0"/>
+                <a:cs typeface="Segoe UI" panose="020B0502040204020203" pitchFamily="34" charset="0"/>
+              </a:rPr>
+              <a:t>Tập</a:t>
+            </a:r>
+            <a:r>
+              <a:rPr lang="en-US" sz="2200" dirty="0" smtClean="0">
+                <a:latin typeface="Segoe UI" panose="020B0502040204020203" pitchFamily="34" charset="0"/>
+                <a:cs typeface="Segoe UI" panose="020B0502040204020203" pitchFamily="34" charset="0"/>
+              </a:rPr>
+              <a:t> </a:t>
+            </a:r>
+            <a:r>
               <a:rPr lang="en-US" sz="2200" dirty="0" err="1">
                 <a:latin typeface="Segoe UI" panose="020B0502040204020203" pitchFamily="34" charset="0"/>
                 <a:cs typeface="Segoe UI" panose="020B0502040204020203" pitchFamily="34" charset="0"/>
               </a:rPr>
+              <a:t>chung</a:t>
+            </a:r>
+            <a:r>
+              <a:rPr lang="en-US" sz="2200" dirty="0">
+                <a:latin typeface="Segoe UI" panose="020B0502040204020203" pitchFamily="34" charset="0"/>
+                <a:cs typeface="Segoe UI" panose="020B0502040204020203" pitchFamily="34" charset="0"/>
+              </a:rPr>
+              <a:t> </a:t>
+            </a:r>
+            <a:r>
+              <a:rPr lang="en-US" sz="2200" dirty="0" err="1">
+                <a:latin typeface="Segoe UI" panose="020B0502040204020203" pitchFamily="34" charset="0"/>
+                <a:cs typeface="Segoe UI" panose="020B0502040204020203" pitchFamily="34" charset="0"/>
+              </a:rPr>
+              <a:t>dữ</a:t>
+            </a:r>
+            <a:r>
+              <a:rPr lang="en-US" sz="2200" dirty="0">
+                <a:latin typeface="Segoe UI" panose="020B0502040204020203" pitchFamily="34" charset="0"/>
+                <a:cs typeface="Segoe UI" panose="020B0502040204020203" pitchFamily="34" charset="0"/>
+              </a:rPr>
+              <a:t> </a:t>
+            </a:r>
+            <a:r>
+              <a:rPr lang="en-US" sz="2200" dirty="0" err="1">
+                <a:latin typeface="Segoe UI" panose="020B0502040204020203" pitchFamily="34" charset="0"/>
+                <a:cs typeface="Segoe UI" panose="020B0502040204020203" pitchFamily="34" charset="0"/>
+              </a:rPr>
+              <a:t>liệu</a:t>
+            </a:r>
+            <a:r>
+              <a:rPr lang="en-US" sz="2200" dirty="0">
+                <a:latin typeface="Segoe UI" panose="020B0502040204020203" pitchFamily="34" charset="0"/>
+                <a:cs typeface="Segoe UI" panose="020B0502040204020203" pitchFamily="34" charset="0"/>
+              </a:rPr>
+              <a:t> </a:t>
+            </a:r>
+            <a:r>
+              <a:rPr lang="en-US" sz="2200" dirty="0" err="1">
+                <a:latin typeface="Segoe UI" panose="020B0502040204020203" pitchFamily="34" charset="0"/>
+                <a:cs typeface="Segoe UI" panose="020B0502040204020203" pitchFamily="34" charset="0"/>
+              </a:rPr>
+              <a:t>vào</a:t>
+            </a:r>
+            <a:r>
+              <a:rPr lang="en-US" sz="2200" dirty="0">
+                <a:latin typeface="Segoe UI" panose="020B0502040204020203" pitchFamily="34" charset="0"/>
+                <a:cs typeface="Segoe UI" panose="020B0502040204020203" pitchFamily="34" charset="0"/>
+              </a:rPr>
+              <a:t> </a:t>
+            </a:r>
+            <a:r>
+              <a:rPr lang="en-US" sz="2200" dirty="0" err="1">
+                <a:latin typeface="Segoe UI" panose="020B0502040204020203" pitchFamily="34" charset="0"/>
+                <a:cs typeface="Segoe UI" panose="020B0502040204020203" pitchFamily="34" charset="0"/>
+              </a:rPr>
+              <a:t>một</a:t>
+            </a:r>
+            <a:r>
+              <a:rPr lang="en-US" sz="2200" dirty="0">
+                <a:latin typeface="Segoe UI" panose="020B0502040204020203" pitchFamily="34" charset="0"/>
+                <a:cs typeface="Segoe UI" panose="020B0502040204020203" pitchFamily="34" charset="0"/>
+              </a:rPr>
+              <a:t> </a:t>
+            </a:r>
+            <a:r>
+              <a:rPr lang="en-US" sz="2200" dirty="0" err="1">
+                <a:latin typeface="Segoe UI" panose="020B0502040204020203" pitchFamily="34" charset="0"/>
+                <a:cs typeface="Segoe UI" panose="020B0502040204020203" pitchFamily="34" charset="0"/>
+              </a:rPr>
+              <a:t>khu</a:t>
+            </a:r>
+            <a:r>
+              <a:rPr lang="en-US" sz="2200" dirty="0">
+                <a:latin typeface="Segoe UI" panose="020B0502040204020203" pitchFamily="34" charset="0"/>
+                <a:cs typeface="Segoe UI" panose="020B0502040204020203" pitchFamily="34" charset="0"/>
+              </a:rPr>
+              <a:t> </a:t>
+            </a:r>
+            <a:r>
+              <a:rPr lang="en-US" sz="2200" dirty="0" err="1">
+                <a:latin typeface="Segoe UI" panose="020B0502040204020203" pitchFamily="34" charset="0"/>
+                <a:cs typeface="Segoe UI" panose="020B0502040204020203" pitchFamily="34" charset="0"/>
+              </a:rPr>
+              <a:t>vực</a:t>
+            </a:r>
+            <a:r>
+              <a:rPr lang="en-US" sz="2200" dirty="0">
+                <a:latin typeface="Segoe UI" panose="020B0502040204020203" pitchFamily="34" charset="0"/>
+                <a:cs typeface="Segoe UI" panose="020B0502040204020203" pitchFamily="34" charset="0"/>
+              </a:rPr>
+              <a:t> (</a:t>
+            </a:r>
+            <a:r>
+              <a:rPr lang="en-US" sz="2200" dirty="0" err="1">
+                <a:latin typeface="Segoe UI" panose="020B0502040204020203" pitchFamily="34" charset="0"/>
+                <a:cs typeface="Segoe UI" panose="020B0502040204020203" pitchFamily="34" charset="0"/>
+              </a:rPr>
+              <a:t>Hà</a:t>
+            </a:r>
+            <a:r>
+              <a:rPr lang="en-US" sz="2200" dirty="0">
+                <a:latin typeface="Segoe UI" panose="020B0502040204020203" pitchFamily="34" charset="0"/>
+                <a:cs typeface="Segoe UI" panose="020B0502040204020203" pitchFamily="34" charset="0"/>
+              </a:rPr>
+              <a:t> </a:t>
+            </a:r>
+            <a:r>
+              <a:rPr lang="en-US" sz="2200" dirty="0" err="1">
+                <a:latin typeface="Segoe UI" panose="020B0502040204020203" pitchFamily="34" charset="0"/>
+                <a:cs typeface="Segoe UI" panose="020B0502040204020203" pitchFamily="34" charset="0"/>
+              </a:rPr>
+              <a:t>Nội</a:t>
+            </a:r>
+            <a:r>
+              <a:rPr lang="en-US" sz="2200" dirty="0">
+                <a:latin typeface="Segoe UI" panose="020B0502040204020203" pitchFamily="34" charset="0"/>
+                <a:cs typeface="Segoe UI" panose="020B0502040204020203" pitchFamily="34" charset="0"/>
+              </a:rPr>
+              <a:t>)</a:t>
+            </a:r>
+            <a:endParaRPr lang="en-US" sz="2200" dirty="0" smtClean="0">
+              <a:latin typeface="Segoe UI" panose="020B0502040204020203" pitchFamily="34" charset="0"/>
+              <a:cs typeface="Segoe UI" panose="020B0502040204020203" pitchFamily="34" charset="0"/>
+            </a:endParaRPr>
+          </a:p>
+          <a:p>
+            <a:pPr lvl="1">
+              <a:lnSpc>
+                <a:spcPct val="150000"/>
+              </a:lnSpc>
+              <a:buClr>
+                <a:schemeClr val="tx1"/>
+              </a:buClr>
+              <a:buSzPct val="85000"/>
+              <a:buFont typeface="Wingdings" pitchFamily="2" charset="2"/>
+              <a:buChar char="Ø"/>
+            </a:pPr>
+            <a:r>
+              <a:rPr lang="en-US" sz="2200" dirty="0">
+                <a:latin typeface="Segoe UI" panose="020B0502040204020203" pitchFamily="34" charset="0"/>
+                <a:cs typeface="Segoe UI" panose="020B0502040204020203" pitchFamily="34" charset="0"/>
+              </a:rPr>
+              <a:t>	</a:t>
+            </a:r>
+            <a:r>
+              <a:rPr lang="en-US" sz="2200" dirty="0" err="1">
+                <a:latin typeface="Segoe UI" panose="020B0502040204020203" pitchFamily="34" charset="0"/>
+                <a:cs typeface="Segoe UI" panose="020B0502040204020203" pitchFamily="34" charset="0"/>
+              </a:rPr>
+              <a:t>Lượng</a:t>
+            </a:r>
+            <a:r>
+              <a:rPr lang="en-US" sz="2200" dirty="0">
+                <a:latin typeface="Segoe UI" panose="020B0502040204020203" pitchFamily="34" charset="0"/>
+                <a:cs typeface="Segoe UI" panose="020B0502040204020203" pitchFamily="34" charset="0"/>
+              </a:rPr>
+              <a:t> </a:t>
+            </a:r>
+            <a:r>
+              <a:rPr lang="en-US" sz="2200" dirty="0" err="1">
+                <a:latin typeface="Segoe UI" panose="020B0502040204020203" pitchFamily="34" charset="0"/>
+                <a:cs typeface="Segoe UI" panose="020B0502040204020203" pitchFamily="34" charset="0"/>
+              </a:rPr>
+              <a:t>bản</a:t>
+            </a:r>
+            <a:r>
+              <a:rPr lang="en-US" sz="2200" dirty="0">
+                <a:latin typeface="Segoe UI" panose="020B0502040204020203" pitchFamily="34" charset="0"/>
+                <a:cs typeface="Segoe UI" panose="020B0502040204020203" pitchFamily="34" charset="0"/>
+              </a:rPr>
+              <a:t> </a:t>
+            </a:r>
+            <a:r>
+              <a:rPr lang="en-US" sz="2200" dirty="0" err="1">
+                <a:latin typeface="Segoe UI" panose="020B0502040204020203" pitchFamily="34" charset="0"/>
+                <a:cs typeface="Segoe UI" panose="020B0502040204020203" pitchFamily="34" charset="0"/>
+              </a:rPr>
               <a:t>ghi</a:t>
+            </a:r>
+            <a:r>
+              <a:rPr lang="en-US" sz="2200" dirty="0">
+                <a:latin typeface="Segoe UI" panose="020B0502040204020203" pitchFamily="34" charset="0"/>
+                <a:cs typeface="Segoe UI" panose="020B0502040204020203" pitchFamily="34" charset="0"/>
+              </a:rPr>
+              <a:t> </a:t>
+            </a:r>
+            <a:r>
+              <a:rPr lang="en-US" sz="2200" dirty="0" err="1">
+                <a:latin typeface="Segoe UI" panose="020B0502040204020203" pitchFamily="34" charset="0"/>
+                <a:cs typeface="Segoe UI" panose="020B0502040204020203" pitchFamily="34" charset="0"/>
+              </a:rPr>
+              <a:t>trải</a:t>
+            </a:r>
+            <a:r>
+              <a:rPr lang="en-US" sz="2200" dirty="0">
+                <a:latin typeface="Segoe UI" panose="020B0502040204020203" pitchFamily="34" charset="0"/>
+                <a:cs typeface="Segoe UI" panose="020B0502040204020203" pitchFamily="34" charset="0"/>
+              </a:rPr>
+              <a:t> </a:t>
+            </a:r>
+            <a:r>
+              <a:rPr lang="en-US" sz="2200" dirty="0" err="1">
+                <a:latin typeface="Segoe UI" panose="020B0502040204020203" pitchFamily="34" charset="0"/>
+                <a:cs typeface="Segoe UI" panose="020B0502040204020203" pitchFamily="34" charset="0"/>
+              </a:rPr>
+              <a:t>dài</a:t>
+            </a:r>
+            <a:r>
+              <a:rPr lang="en-US" sz="2200" dirty="0">
+                <a:latin typeface="Segoe UI" panose="020B0502040204020203" pitchFamily="34" charset="0"/>
+                <a:cs typeface="Segoe UI" panose="020B0502040204020203" pitchFamily="34" charset="0"/>
+              </a:rPr>
+              <a:t> </a:t>
+            </a:r>
+            <a:r>
+              <a:rPr lang="en-US" sz="2200" dirty="0" err="1">
+                <a:latin typeface="Segoe UI" panose="020B0502040204020203" pitchFamily="34" charset="0"/>
+                <a:cs typeface="Segoe UI" panose="020B0502040204020203" pitchFamily="34" charset="0"/>
+              </a:rPr>
+              <a:t>trong</a:t>
+            </a:r>
+            <a:r>
+              <a:rPr lang="en-US" sz="2200" dirty="0">
+                <a:latin typeface="Segoe UI" panose="020B0502040204020203" pitchFamily="34" charset="0"/>
+                <a:cs typeface="Segoe UI" panose="020B0502040204020203" pitchFamily="34" charset="0"/>
+              </a:rPr>
+              <a:t> </a:t>
+            </a:r>
+            <a:r>
+              <a:rPr lang="en-US" sz="2200" dirty="0" err="1">
+                <a:latin typeface="Segoe UI" panose="020B0502040204020203" pitchFamily="34" charset="0"/>
+                <a:cs typeface="Segoe UI" panose="020B0502040204020203" pitchFamily="34" charset="0"/>
+              </a:rPr>
+              <a:t>nhiều</a:t>
+            </a:r>
+            <a:r>
+              <a:rPr lang="en-US" sz="2200" dirty="0">
+                <a:latin typeface="Segoe UI" panose="020B0502040204020203" pitchFamily="34" charset="0"/>
+                <a:cs typeface="Segoe UI" panose="020B0502040204020203" pitchFamily="34" charset="0"/>
+              </a:rPr>
+              <a:t> </a:t>
+            </a:r>
+            <a:r>
+              <a:rPr lang="en-US" sz="2200" dirty="0" err="1">
+                <a:latin typeface="Segoe UI" panose="020B0502040204020203" pitchFamily="34" charset="0"/>
+                <a:cs typeface="Segoe UI" panose="020B0502040204020203" pitchFamily="34" charset="0"/>
+              </a:rPr>
+              <a:t>năm</a:t>
+            </a:r>
+            <a:r>
+              <a:rPr lang="en-US" sz="2200" dirty="0">
+                <a:latin typeface="Segoe UI" panose="020B0502040204020203" pitchFamily="34" charset="0"/>
+                <a:cs typeface="Segoe UI" panose="020B0502040204020203" pitchFamily="34" charset="0"/>
+              </a:rPr>
+              <a:t> </a:t>
+            </a:r>
+          </a:p>
+          <a:p>
+            <a:pPr lvl="1">
+              <a:lnSpc>
+                <a:spcPct val="150000"/>
+              </a:lnSpc>
+              <a:buClr>
+                <a:schemeClr val="tx1"/>
+              </a:buClr>
+              <a:buSzPct val="85000"/>
+              <a:buFont typeface="Wingdings" pitchFamily="2" charset="2"/>
+              <a:buChar char="Ø"/>
+            </a:pPr>
+            <a:r>
+              <a:rPr lang="en-US" sz="2200" dirty="0">
+                <a:latin typeface="Segoe UI" panose="020B0502040204020203" pitchFamily="34" charset="0"/>
+                <a:cs typeface="Segoe UI" panose="020B0502040204020203" pitchFamily="34" charset="0"/>
+              </a:rPr>
+              <a:t>	</a:t>
+            </a:r>
+            <a:r>
+              <a:rPr lang="en-US" sz="2200" dirty="0" err="1">
+                <a:latin typeface="Segoe UI" panose="020B0502040204020203" pitchFamily="34" charset="0"/>
+                <a:cs typeface="Segoe UI" panose="020B0502040204020203" pitchFamily="34" charset="0"/>
+              </a:rPr>
+              <a:t>Thông</a:t>
+            </a:r>
+            <a:r>
+              <a:rPr lang="en-US" sz="2200" dirty="0">
+                <a:latin typeface="Segoe UI" panose="020B0502040204020203" pitchFamily="34" charset="0"/>
+                <a:cs typeface="Segoe UI" panose="020B0502040204020203" pitchFamily="34" charset="0"/>
+              </a:rPr>
+              <a:t> tin </a:t>
+            </a:r>
+            <a:r>
+              <a:rPr lang="en-US" sz="2200" dirty="0" err="1">
+                <a:latin typeface="Segoe UI" panose="020B0502040204020203" pitchFamily="34" charset="0"/>
+                <a:cs typeface="Segoe UI" panose="020B0502040204020203" pitchFamily="34" charset="0"/>
+              </a:rPr>
+              <a:t>phòng</a:t>
+            </a:r>
+            <a:r>
+              <a:rPr lang="en-US" sz="2200" dirty="0">
+                <a:latin typeface="Segoe UI" panose="020B0502040204020203" pitchFamily="34" charset="0"/>
+                <a:cs typeface="Segoe UI" panose="020B0502040204020203" pitchFamily="34" charset="0"/>
+              </a:rPr>
+              <a:t> </a:t>
+            </a:r>
+            <a:r>
+              <a:rPr lang="en-US" sz="2200" dirty="0" err="1">
+                <a:latin typeface="Segoe UI" panose="020B0502040204020203" pitchFamily="34" charset="0"/>
+                <a:cs typeface="Segoe UI" panose="020B0502040204020203" pitchFamily="34" charset="0"/>
+              </a:rPr>
+              <a:t>phải</a:t>
+            </a:r>
+            <a:r>
+              <a:rPr lang="en-US" sz="2200" dirty="0">
+                <a:latin typeface="Segoe UI" panose="020B0502040204020203" pitchFamily="34" charset="0"/>
+                <a:cs typeface="Segoe UI" panose="020B0502040204020203" pitchFamily="34" charset="0"/>
+              </a:rPr>
+              <a:t> </a:t>
+            </a:r>
+            <a:r>
+              <a:rPr lang="en-US" sz="2200" dirty="0" err="1">
+                <a:latin typeface="Segoe UI" panose="020B0502040204020203" pitchFamily="34" charset="0"/>
+                <a:cs typeface="Segoe UI" panose="020B0502040204020203" pitchFamily="34" charset="0"/>
+              </a:rPr>
+              <a:t>tương</a:t>
+            </a:r>
+            <a:r>
+              <a:rPr lang="en-US" sz="2200" dirty="0">
+                <a:latin typeface="Segoe UI" panose="020B0502040204020203" pitchFamily="34" charset="0"/>
+                <a:cs typeface="Segoe UI" panose="020B0502040204020203" pitchFamily="34" charset="0"/>
+              </a:rPr>
+              <a:t> </a:t>
+            </a:r>
+            <a:r>
+              <a:rPr lang="en-US" sz="2200" dirty="0" err="1">
+                <a:latin typeface="Segoe UI" panose="020B0502040204020203" pitchFamily="34" charset="0"/>
+                <a:cs typeface="Segoe UI" panose="020B0502040204020203" pitchFamily="34" charset="0"/>
+              </a:rPr>
+              <a:t>đối</a:t>
+            </a:r>
+            <a:r>
+              <a:rPr lang="en-US" sz="2200" dirty="0">
+                <a:latin typeface="Segoe UI" panose="020B0502040204020203" pitchFamily="34" charset="0"/>
+                <a:cs typeface="Segoe UI" panose="020B0502040204020203" pitchFamily="34" charset="0"/>
+              </a:rPr>
+              <a:t> </a:t>
+            </a:r>
+            <a:r>
+              <a:rPr lang="en-US" sz="2200" dirty="0" err="1">
+                <a:latin typeface="Segoe UI" panose="020B0502040204020203" pitchFamily="34" charset="0"/>
+                <a:cs typeface="Segoe UI" panose="020B0502040204020203" pitchFamily="34" charset="0"/>
+              </a:rPr>
+              <a:t>đầy</a:t>
+            </a:r>
+            <a:r>
+              <a:rPr lang="en-US" sz="2200" dirty="0">
+                <a:latin typeface="Segoe UI" panose="020B0502040204020203" pitchFamily="34" charset="0"/>
+                <a:cs typeface="Segoe UI" panose="020B0502040204020203" pitchFamily="34" charset="0"/>
+              </a:rPr>
+              <a:t> </a:t>
+            </a:r>
+            <a:r>
+              <a:rPr lang="en-US" sz="2200" dirty="0" err="1">
+                <a:latin typeface="Segoe UI" panose="020B0502040204020203" pitchFamily="34" charset="0"/>
+                <a:cs typeface="Segoe UI" panose="020B0502040204020203" pitchFamily="34" charset="0"/>
+              </a:rPr>
+              <a:t>đủ</a:t>
+            </a:r>
+            <a:r>
+              <a:rPr lang="en-US" sz="2200" dirty="0">
+                <a:latin typeface="Segoe UI" panose="020B0502040204020203" pitchFamily="34" charset="0"/>
+                <a:cs typeface="Segoe UI" panose="020B0502040204020203" pitchFamily="34" charset="0"/>
+              </a:rPr>
+              <a:t>, </a:t>
+            </a:r>
+            <a:r>
+              <a:rPr lang="en-US" sz="2200" dirty="0" err="1">
+                <a:latin typeface="Segoe UI" panose="020B0502040204020203" pitchFamily="34" charset="0"/>
+                <a:cs typeface="Segoe UI" panose="020B0502040204020203" pitchFamily="34" charset="0"/>
+              </a:rPr>
+              <a:t>rõ</a:t>
+            </a:r>
+            <a:r>
+              <a:rPr lang="en-US" sz="2200" dirty="0">
+                <a:latin typeface="Segoe UI" panose="020B0502040204020203" pitchFamily="34" charset="0"/>
+                <a:cs typeface="Segoe UI" panose="020B0502040204020203" pitchFamily="34" charset="0"/>
+              </a:rPr>
+              <a:t> </a:t>
+            </a:r>
+            <a:r>
+              <a:rPr lang="en-US" sz="2200" dirty="0" err="1">
+                <a:latin typeface="Segoe UI" panose="020B0502040204020203" pitchFamily="34" charset="0"/>
+                <a:cs typeface="Segoe UI" panose="020B0502040204020203" pitchFamily="34" charset="0"/>
+              </a:rPr>
+              <a:t>ràng</a:t>
             </a:r>
             <a:endParaRPr lang="en-US" sz="2200" dirty="0">
               <a:latin typeface="Segoe UI" panose="020B0502040204020203" pitchFamily="34" charset="0"/>
@@ -40929,281 +42269,15 @@
           </a:p>
           <a:p>
             <a:pPr lvl="1">
+              <a:lnSpc>
+                <a:spcPct val="150000"/>
+              </a:lnSpc>
               <a:buClr>
                 <a:schemeClr val="tx1"/>
               </a:buClr>
               <a:buSzPct val="85000"/>
               <a:buFont typeface="Wingdings" pitchFamily="2" charset="2"/>
-              <a:buChar char="§"/>
-            </a:pPr>
-            <a:r>
-              <a:rPr lang="en-US" sz="2200" dirty="0">
-                <a:latin typeface="Segoe UI" panose="020B0502040204020203" pitchFamily="34" charset="0"/>
-                <a:cs typeface="Segoe UI" panose="020B0502040204020203" pitchFamily="34" charset="0"/>
-              </a:rPr>
-              <a:t>	</a:t>
-            </a:r>
-            <a:r>
-              <a:rPr lang="en-US" sz="2200" dirty="0" err="1">
-                <a:latin typeface="Segoe UI" panose="020B0502040204020203" pitchFamily="34" charset="0"/>
-                <a:cs typeface="Segoe UI" panose="020B0502040204020203" pitchFamily="34" charset="0"/>
-              </a:rPr>
-              <a:t>Lượng</a:t>
-            </a:r>
-            <a:r>
-              <a:rPr lang="en-US" sz="2200" dirty="0">
-                <a:latin typeface="Segoe UI" panose="020B0502040204020203" pitchFamily="34" charset="0"/>
-                <a:cs typeface="Segoe UI" panose="020B0502040204020203" pitchFamily="34" charset="0"/>
-              </a:rPr>
-              <a:t> </a:t>
-            </a:r>
-            <a:r>
-              <a:rPr lang="en-US" sz="2200" dirty="0" err="1">
-                <a:latin typeface="Segoe UI" panose="020B0502040204020203" pitchFamily="34" charset="0"/>
-                <a:cs typeface="Segoe UI" panose="020B0502040204020203" pitchFamily="34" charset="0"/>
-              </a:rPr>
-              <a:t>bản</a:t>
-            </a:r>
-            <a:r>
-              <a:rPr lang="en-US" sz="2200" dirty="0">
-                <a:latin typeface="Segoe UI" panose="020B0502040204020203" pitchFamily="34" charset="0"/>
-                <a:cs typeface="Segoe UI" panose="020B0502040204020203" pitchFamily="34" charset="0"/>
-              </a:rPr>
-              <a:t> </a:t>
-            </a:r>
-            <a:r>
-              <a:rPr lang="en-US" sz="2200" dirty="0" err="1">
-                <a:latin typeface="Segoe UI" panose="020B0502040204020203" pitchFamily="34" charset="0"/>
-                <a:cs typeface="Segoe UI" panose="020B0502040204020203" pitchFamily="34" charset="0"/>
-              </a:rPr>
-              <a:t>ghi</a:t>
-            </a:r>
-            <a:r>
-              <a:rPr lang="en-US" sz="2200" dirty="0">
-                <a:latin typeface="Segoe UI" panose="020B0502040204020203" pitchFamily="34" charset="0"/>
-                <a:cs typeface="Segoe UI" panose="020B0502040204020203" pitchFamily="34" charset="0"/>
-              </a:rPr>
-              <a:t> </a:t>
-            </a:r>
-            <a:r>
-              <a:rPr lang="en-US" sz="2200" dirty="0" err="1">
-                <a:latin typeface="Segoe UI" panose="020B0502040204020203" pitchFamily="34" charset="0"/>
-                <a:cs typeface="Segoe UI" panose="020B0502040204020203" pitchFamily="34" charset="0"/>
-              </a:rPr>
-              <a:t>trải</a:t>
-            </a:r>
-            <a:r>
-              <a:rPr lang="en-US" sz="2200" dirty="0">
-                <a:latin typeface="Segoe UI" panose="020B0502040204020203" pitchFamily="34" charset="0"/>
-                <a:cs typeface="Segoe UI" panose="020B0502040204020203" pitchFamily="34" charset="0"/>
-              </a:rPr>
-              <a:t> </a:t>
-            </a:r>
-            <a:r>
-              <a:rPr lang="en-US" sz="2200" dirty="0" err="1">
-                <a:latin typeface="Segoe UI" panose="020B0502040204020203" pitchFamily="34" charset="0"/>
-                <a:cs typeface="Segoe UI" panose="020B0502040204020203" pitchFamily="34" charset="0"/>
-              </a:rPr>
-              <a:t>dài</a:t>
-            </a:r>
-            <a:r>
-              <a:rPr lang="en-US" sz="2200" dirty="0">
-                <a:latin typeface="Segoe UI" panose="020B0502040204020203" pitchFamily="34" charset="0"/>
-                <a:cs typeface="Segoe UI" panose="020B0502040204020203" pitchFamily="34" charset="0"/>
-              </a:rPr>
-              <a:t> </a:t>
-            </a:r>
-            <a:r>
-              <a:rPr lang="en-US" sz="2200" dirty="0" err="1">
-                <a:latin typeface="Segoe UI" panose="020B0502040204020203" pitchFamily="34" charset="0"/>
-                <a:cs typeface="Segoe UI" panose="020B0502040204020203" pitchFamily="34" charset="0"/>
-              </a:rPr>
-              <a:t>trong</a:t>
-            </a:r>
-            <a:r>
-              <a:rPr lang="en-US" sz="2200" dirty="0">
-                <a:latin typeface="Segoe UI" panose="020B0502040204020203" pitchFamily="34" charset="0"/>
-                <a:cs typeface="Segoe UI" panose="020B0502040204020203" pitchFamily="34" charset="0"/>
-              </a:rPr>
-              <a:t> </a:t>
-            </a:r>
-            <a:r>
-              <a:rPr lang="en-US" sz="2200" dirty="0" err="1">
-                <a:latin typeface="Segoe UI" panose="020B0502040204020203" pitchFamily="34" charset="0"/>
-                <a:cs typeface="Segoe UI" panose="020B0502040204020203" pitchFamily="34" charset="0"/>
-              </a:rPr>
-              <a:t>nhiều</a:t>
-            </a:r>
-            <a:r>
-              <a:rPr lang="en-US" sz="2200" dirty="0">
-                <a:latin typeface="Segoe UI" panose="020B0502040204020203" pitchFamily="34" charset="0"/>
-                <a:cs typeface="Segoe UI" panose="020B0502040204020203" pitchFamily="34" charset="0"/>
-              </a:rPr>
-              <a:t> </a:t>
-            </a:r>
-            <a:r>
-              <a:rPr lang="en-US" sz="2200" dirty="0" err="1">
-                <a:latin typeface="Segoe UI" panose="020B0502040204020203" pitchFamily="34" charset="0"/>
-                <a:cs typeface="Segoe UI" panose="020B0502040204020203" pitchFamily="34" charset="0"/>
-              </a:rPr>
-              <a:t>năm</a:t>
-            </a:r>
-            <a:r>
-              <a:rPr lang="en-US" sz="2200" dirty="0">
-                <a:latin typeface="Segoe UI" panose="020B0502040204020203" pitchFamily="34" charset="0"/>
-                <a:cs typeface="Segoe UI" panose="020B0502040204020203" pitchFamily="34" charset="0"/>
-              </a:rPr>
-              <a:t> </a:t>
-            </a:r>
-          </a:p>
-          <a:p>
-            <a:pPr lvl="1">
-              <a:buClr>
-                <a:schemeClr val="tx1"/>
-              </a:buClr>
-              <a:buSzPct val="85000"/>
-              <a:buFont typeface="Wingdings" pitchFamily="2" charset="2"/>
-              <a:buChar char="§"/>
-            </a:pPr>
-            <a:r>
-              <a:rPr lang="en-US" sz="2200" dirty="0">
-                <a:latin typeface="Segoe UI" panose="020B0502040204020203" pitchFamily="34" charset="0"/>
-                <a:cs typeface="Segoe UI" panose="020B0502040204020203" pitchFamily="34" charset="0"/>
-              </a:rPr>
-              <a:t>	</a:t>
-            </a:r>
-            <a:r>
-              <a:rPr lang="en-US" sz="2200" dirty="0" err="1">
-                <a:latin typeface="Segoe UI" panose="020B0502040204020203" pitchFamily="34" charset="0"/>
-                <a:cs typeface="Segoe UI" panose="020B0502040204020203" pitchFamily="34" charset="0"/>
-              </a:rPr>
-              <a:t>Thông</a:t>
-            </a:r>
-            <a:r>
-              <a:rPr lang="en-US" sz="2200" dirty="0">
-                <a:latin typeface="Segoe UI" panose="020B0502040204020203" pitchFamily="34" charset="0"/>
-                <a:cs typeface="Segoe UI" panose="020B0502040204020203" pitchFamily="34" charset="0"/>
-              </a:rPr>
-              <a:t> tin </a:t>
-            </a:r>
-            <a:r>
-              <a:rPr lang="en-US" sz="2200" dirty="0" err="1">
-                <a:latin typeface="Segoe UI" panose="020B0502040204020203" pitchFamily="34" charset="0"/>
-                <a:cs typeface="Segoe UI" panose="020B0502040204020203" pitchFamily="34" charset="0"/>
-              </a:rPr>
-              <a:t>phòng</a:t>
-            </a:r>
-            <a:r>
-              <a:rPr lang="en-US" sz="2200" dirty="0">
-                <a:latin typeface="Segoe UI" panose="020B0502040204020203" pitchFamily="34" charset="0"/>
-                <a:cs typeface="Segoe UI" panose="020B0502040204020203" pitchFamily="34" charset="0"/>
-              </a:rPr>
-              <a:t> </a:t>
-            </a:r>
-            <a:r>
-              <a:rPr lang="en-US" sz="2200" dirty="0" err="1">
-                <a:latin typeface="Segoe UI" panose="020B0502040204020203" pitchFamily="34" charset="0"/>
-                <a:cs typeface="Segoe UI" panose="020B0502040204020203" pitchFamily="34" charset="0"/>
-              </a:rPr>
-              <a:t>phải</a:t>
-            </a:r>
-            <a:r>
-              <a:rPr lang="en-US" sz="2200" dirty="0">
-                <a:latin typeface="Segoe UI" panose="020B0502040204020203" pitchFamily="34" charset="0"/>
-                <a:cs typeface="Segoe UI" panose="020B0502040204020203" pitchFamily="34" charset="0"/>
-              </a:rPr>
-              <a:t> </a:t>
-            </a:r>
-            <a:r>
-              <a:rPr lang="en-US" sz="2200" dirty="0" err="1">
-                <a:latin typeface="Segoe UI" panose="020B0502040204020203" pitchFamily="34" charset="0"/>
-                <a:cs typeface="Segoe UI" panose="020B0502040204020203" pitchFamily="34" charset="0"/>
-              </a:rPr>
-              <a:t>tương</a:t>
-            </a:r>
-            <a:r>
-              <a:rPr lang="en-US" sz="2200" dirty="0">
-                <a:latin typeface="Segoe UI" panose="020B0502040204020203" pitchFamily="34" charset="0"/>
-                <a:cs typeface="Segoe UI" panose="020B0502040204020203" pitchFamily="34" charset="0"/>
-              </a:rPr>
-              <a:t> </a:t>
-            </a:r>
-            <a:r>
-              <a:rPr lang="en-US" sz="2200" dirty="0" err="1">
-                <a:latin typeface="Segoe UI" panose="020B0502040204020203" pitchFamily="34" charset="0"/>
-                <a:cs typeface="Segoe UI" panose="020B0502040204020203" pitchFamily="34" charset="0"/>
-              </a:rPr>
-              <a:t>đối</a:t>
-            </a:r>
-            <a:r>
-              <a:rPr lang="en-US" sz="2200" dirty="0">
-                <a:latin typeface="Segoe UI" panose="020B0502040204020203" pitchFamily="34" charset="0"/>
-                <a:cs typeface="Segoe UI" panose="020B0502040204020203" pitchFamily="34" charset="0"/>
-              </a:rPr>
-              <a:t> </a:t>
-            </a:r>
-            <a:r>
-              <a:rPr lang="en-US" sz="2200" dirty="0" err="1">
-                <a:latin typeface="Segoe UI" panose="020B0502040204020203" pitchFamily="34" charset="0"/>
-                <a:cs typeface="Segoe UI" panose="020B0502040204020203" pitchFamily="34" charset="0"/>
-              </a:rPr>
-              <a:t>đầy</a:t>
-            </a:r>
-            <a:r>
-              <a:rPr lang="en-US" sz="2200" dirty="0">
-                <a:latin typeface="Segoe UI" panose="020B0502040204020203" pitchFamily="34" charset="0"/>
-                <a:cs typeface="Segoe UI" panose="020B0502040204020203" pitchFamily="34" charset="0"/>
-              </a:rPr>
-              <a:t> </a:t>
-            </a:r>
-            <a:r>
-              <a:rPr lang="en-US" sz="2200" dirty="0" err="1">
-                <a:latin typeface="Segoe UI" panose="020B0502040204020203" pitchFamily="34" charset="0"/>
-                <a:cs typeface="Segoe UI" panose="020B0502040204020203" pitchFamily="34" charset="0"/>
-              </a:rPr>
-              <a:t>đủ</a:t>
-            </a:r>
-            <a:r>
-              <a:rPr lang="en-US" sz="2200" dirty="0">
-                <a:latin typeface="Segoe UI" panose="020B0502040204020203" pitchFamily="34" charset="0"/>
-                <a:cs typeface="Segoe UI" panose="020B0502040204020203" pitchFamily="34" charset="0"/>
-              </a:rPr>
-              <a:t>, </a:t>
-            </a:r>
-            <a:r>
-              <a:rPr lang="en-US" sz="2200" dirty="0" err="1">
-                <a:latin typeface="Segoe UI" panose="020B0502040204020203" pitchFamily="34" charset="0"/>
-                <a:cs typeface="Segoe UI" panose="020B0502040204020203" pitchFamily="34" charset="0"/>
-              </a:rPr>
-              <a:t>rõ</a:t>
-            </a:r>
-            <a:r>
-              <a:rPr lang="en-US" sz="2200" dirty="0">
-                <a:latin typeface="Segoe UI" panose="020B0502040204020203" pitchFamily="34" charset="0"/>
-                <a:cs typeface="Segoe UI" panose="020B0502040204020203" pitchFamily="34" charset="0"/>
-              </a:rPr>
-              <a:t> </a:t>
-            </a:r>
-            <a:r>
-              <a:rPr lang="en-US" sz="2200" dirty="0" err="1">
-                <a:latin typeface="Segoe UI" panose="020B0502040204020203" pitchFamily="34" charset="0"/>
-                <a:cs typeface="Segoe UI" panose="020B0502040204020203" pitchFamily="34" charset="0"/>
-              </a:rPr>
-              <a:t>ràng</a:t>
-            </a:r>
-            <a:endParaRPr lang="en-US" sz="2200" dirty="0">
-              <a:latin typeface="Segoe UI" panose="020B0502040204020203" pitchFamily="34" charset="0"/>
-              <a:cs typeface="Segoe UI" panose="020B0502040204020203" pitchFamily="34" charset="0"/>
-            </a:endParaRPr>
-          </a:p>
-          <a:p>
-            <a:pPr lvl="1">
-              <a:buClr>
-                <a:schemeClr val="tx1"/>
-              </a:buClr>
-              <a:buSzPct val="85000"/>
-              <a:buFont typeface="Wingdings" pitchFamily="2" charset="2"/>
-              <a:buChar char="§"/>
+              <a:buChar char="Ø"/>
             </a:pPr>
             <a:r>
               <a:rPr lang="en-US" sz="2200" dirty="0">
@@ -42576,7 +43650,7 @@
   <a:extraClrSchemeLst/>
   <a:extLst>
     <a:ext uri="{05A4C25C-085E-4340-85A3-A5531E510DB2}">
-      <thm15:themeFamily xmlns:thm15="http://schemas.microsoft.com/office/thememl/2012/main" xmlns="" name="Ion Boardroom" id="{FC33163D-4339-46B1-8EED-24C834239D99}" vid="{B8502691-933B-45FE-8764-BA278511EF27}"/>
+      <thm15:themeFamily xmlns="" xmlns:thm15="http://schemas.microsoft.com/office/thememl/2012/main" name="Ion Boardroom" id="{FC33163D-4339-46B1-8EED-24C834239D99}" vid="{B8502691-933B-45FE-8764-BA278511EF27}"/>
     </a:ext>
   </a:extLst>
 </a:theme>

</xml_diff>

<commit_message>
bao cao sai de tai
</commit_message>
<xml_diff>
--- a/Slide.pptx
+++ b/Slide.pptx
@@ -129,7 +129,7 @@
   </p:defaultTextStyle>
   <p:extLst>
     <p:ext uri="{EFAFB233-063F-42B5-8137-9DF3F51BA10A}">
-      <p15:sldGuideLst xmlns:p15="http://schemas.microsoft.com/office/powerpoint/2012/main">
+      <p15:sldGuideLst xmlns:p15="http://schemas.microsoft.com/office/powerpoint/2012/main" xmlns="">
         <p15:guide id="1" orient="horz" pos="2160">
           <p15:clr>
             <a:srgbClr val="A4A3A4"/>
@@ -482,7 +482,7 @@
             <a:fld id="{5923F103-BC34-4FE4-A40E-EDDEECFDA5D0}" type="datetimeFigureOut">
               <a:rPr lang="en-US" dirty="0"/>
               <a:pPr/>
-              <a:t>6/16/2021</a:t>
+              <a:t>06/16/2021</a:t>
             </a:fld>
             <a:endParaRPr lang="en-US" dirty="0"/>
           </a:p>
@@ -1570,7 +1570,7 @@
           <a:p>
             <a:fld id="{923A1CC3-2375-41D4-9E03-427CAF2A4C1A}" type="datetimeFigureOut">
               <a:rPr lang="en-US" dirty="0"/>
-              <a:t>6/16/2021</a:t>
+              <a:t>06/16/2021</a:t>
             </a:fld>
             <a:endParaRPr lang="en-US" dirty="0"/>
           </a:p>
@@ -2550,7 +2550,7 @@
           <a:p>
             <a:fld id="{AFF16868-8199-4C2C-A5B1-63AEE139F88E}" type="datetimeFigureOut">
               <a:rPr lang="en-US" dirty="0"/>
-              <a:t>6/16/2021</a:t>
+              <a:t>06/16/2021</a:t>
             </a:fld>
             <a:endParaRPr lang="en-US" dirty="0"/>
           </a:p>
@@ -3684,7 +3684,7 @@
           <a:p>
             <a:fld id="{AAD9FF7F-6988-44CC-821B-644E70CD2F73}" type="datetimeFigureOut">
               <a:rPr lang="en-US" dirty="0"/>
-              <a:t>6/16/2021</a:t>
+              <a:t>06/16/2021</a:t>
             </a:fld>
             <a:endParaRPr lang="en-US" dirty="0"/>
           </a:p>
@@ -4717,7 +4717,7 @@
           <a:p>
             <a:fld id="{5C12C299-16B2-4475-990D-751901EACC14}" type="datetimeFigureOut">
               <a:rPr lang="en-US" dirty="0"/>
-              <a:t>6/16/2021</a:t>
+              <a:t>06/16/2021</a:t>
             </a:fld>
             <a:endParaRPr lang="en-US" dirty="0"/>
           </a:p>
@@ -5377,7 +5377,7 @@
           <a:p>
             <a:fld id="{9FE86839-B9D8-4651-8783-F325ECE74E65}" type="datetimeFigureOut">
               <a:rPr lang="en-US" dirty="0"/>
-              <a:t>6/16/2021</a:t>
+              <a:t>06/16/2021</a:t>
             </a:fld>
             <a:endParaRPr lang="en-US" dirty="0"/>
           </a:p>
@@ -6238,7 +6238,7 @@
           <a:p>
             <a:fld id="{FD484F64-32F6-45C5-931F-ADC1662401D0}" type="datetimeFigureOut">
               <a:rPr lang="en-US" dirty="0"/>
-              <a:t>6/16/2021</a:t>
+              <a:t>06/16/2021</a:t>
             </a:fld>
             <a:endParaRPr lang="en-US" dirty="0"/>
           </a:p>
@@ -6428,7 +6428,7 @@
           <a:p>
             <a:fld id="{53086D93-FCAC-47E0-A2EE-787E62CA814C}" type="datetimeFigureOut">
               <a:rPr lang="en-US" dirty="0"/>
-              <a:t>6/16/2021</a:t>
+              <a:t>06/16/2021</a:t>
             </a:fld>
             <a:endParaRPr lang="en-US" dirty="0"/>
           </a:p>
@@ -7400,7 +7400,7 @@
           <a:p>
             <a:fld id="{CDA879A6-0FD0-4734-A311-86BFCA472E6E}" type="datetimeFigureOut">
               <a:rPr lang="en-US" dirty="0"/>
-              <a:t>6/16/2021</a:t>
+              <a:t>06/16/2021</a:t>
             </a:fld>
             <a:endParaRPr lang="en-US" dirty="0"/>
           </a:p>
@@ -7611,7 +7611,7 @@
           <a:p>
             <a:fld id="{19C9CA7B-DFD4-44B5-8C60-D14B8CD1FB59}" type="datetimeFigureOut">
               <a:rPr lang="en-US" dirty="0"/>
-              <a:t>6/16/2021</a:t>
+              <a:t>06/16/2021</a:t>
             </a:fld>
             <a:endParaRPr lang="en-US" dirty="0"/>
           </a:p>
@@ -8645,7 +8645,7 @@
           <a:p>
             <a:fld id="{F34E6425-0181-43F2-84FC-787E803FD2F8}" type="datetimeFigureOut">
               <a:rPr lang="en-US" dirty="0"/>
-              <a:t>6/16/2021</a:t>
+              <a:t>06/16/2021</a:t>
             </a:fld>
             <a:endParaRPr lang="en-US" dirty="0"/>
           </a:p>
@@ -8917,7 +8917,7 @@
           <a:p>
             <a:fld id="{3BDB8791-F1B0-41E7-B7FD-A781E65C4266}" type="datetimeFigureOut">
               <a:rPr lang="en-US" dirty="0"/>
-              <a:t>6/16/2021</a:t>
+              <a:t>06/16/2021</a:t>
             </a:fld>
             <a:endParaRPr lang="en-US" dirty="0"/>
           </a:p>
@@ -9327,7 +9327,7 @@
           <a:p>
             <a:fld id="{5FDD63B2-E120-4ED8-B27B-C685F510A5FE}" type="datetimeFigureOut">
               <a:rPr lang="en-US" dirty="0"/>
-              <a:t>6/16/2021</a:t>
+              <a:t>06/16/2021</a:t>
             </a:fld>
             <a:endParaRPr lang="en-US" dirty="0"/>
           </a:p>
@@ -9454,7 +9454,7 @@
           <a:p>
             <a:fld id="{7AA18ACC-A947-437B-A130-35BD54FDF1E9}" type="datetimeFigureOut">
               <a:rPr lang="en-US" dirty="0"/>
-              <a:t>6/16/2021</a:t>
+              <a:t>06/16/2021</a:t>
             </a:fld>
             <a:endParaRPr lang="en-US" dirty="0"/>
           </a:p>
@@ -9549,7 +9549,7 @@
           <a:p>
             <a:fld id="{7C8D7E02-BCB8-4D50-A234-369438C08659}" type="datetimeFigureOut">
               <a:rPr lang="en-US" dirty="0"/>
-              <a:t>6/16/2021</a:t>
+              <a:t>06/16/2021</a:t>
             </a:fld>
             <a:endParaRPr lang="en-US" dirty="0"/>
           </a:p>
@@ -10630,7 +10630,7 @@
           <a:p>
             <a:fld id="{76E86A4C-8E40-4F87-A4F0-01A0687C5742}" type="datetimeFigureOut">
               <a:rPr lang="en-US" dirty="0"/>
-              <a:t>6/16/2021</a:t>
+              <a:t>06/16/2021</a:t>
             </a:fld>
             <a:endParaRPr lang="en-US" dirty="0"/>
           </a:p>
@@ -11738,7 +11738,7 @@
           <a:p>
             <a:fld id="{35E72C73-2D91-4E12-BA25-F0AA0C03599B}" type="datetimeFigureOut">
               <a:rPr lang="en-US" dirty="0"/>
-              <a:t>6/16/2021</a:t>
+              <a:t>06/16/2021</a:t>
             </a:fld>
             <a:endParaRPr lang="en-US" dirty="0"/>
           </a:p>
@@ -12735,7 +12735,7 @@
           <a:p>
             <a:fld id="{2BE451C3-0FF4-47C4-B829-773ADF60F88C}" type="datetimeFigureOut">
               <a:rPr lang="en-US" dirty="0"/>
-              <a:t>6/16/2021</a:t>
+              <a:t>06/16/2021</a:t>
             </a:fld>
             <a:endParaRPr lang="en-US" dirty="0"/>
           </a:p>
@@ -14465,33 +14465,72 @@
               <a:t> 2000 </a:t>
             </a:r>
             <a:r>
-              <a:rPr lang="en-US" sz="2000" dirty="0" err="1">
-                <a:latin typeface="Segoe UI" panose="020B0502040204020203" pitchFamily="34" charset="0"/>
-                <a:cs typeface="Segoe UI" panose="020B0502040204020203" pitchFamily="34" charset="0"/>
-              </a:rPr>
-              <a:t>bản</a:t>
-            </a:r>
-            <a:r>
-              <a:rPr lang="en-US" sz="2000" dirty="0">
-                <a:latin typeface="Segoe UI" panose="020B0502040204020203" pitchFamily="34" charset="0"/>
-                <a:cs typeface="Segoe UI" panose="020B0502040204020203" pitchFamily="34" charset="0"/>
-              </a:rPr>
-              <a:t> </a:t>
-            </a:r>
-            <a:r>
-              <a:rPr lang="en-US" sz="2000" dirty="0" err="1">
-                <a:latin typeface="Segoe UI" panose="020B0502040204020203" pitchFamily="34" charset="0"/>
-                <a:cs typeface="Segoe UI" panose="020B0502040204020203" pitchFamily="34" charset="0"/>
-              </a:rPr>
-              <a:t>ghi</a:t>
-            </a:r>
-            <a:r>
-              <a:rPr lang="en-US" sz="2000" dirty="0">
-                <a:latin typeface="Segoe UI" panose="020B0502040204020203" pitchFamily="34" charset="0"/>
-                <a:cs typeface="Segoe UI" panose="020B0502040204020203" pitchFamily="34" charset="0"/>
-              </a:rPr>
-              <a:t> </a:t>
-            </a:r>
+              <a:rPr lang="en-US" sz="2000" dirty="0" err="1" smtClean="0">
+                <a:latin typeface="Segoe UI" panose="020B0502040204020203" pitchFamily="34" charset="0"/>
+                <a:cs typeface="Segoe UI" panose="020B0502040204020203" pitchFamily="34" charset="0"/>
+              </a:rPr>
+              <a:t>bài</a:t>
+            </a:r>
+            <a:r>
+              <a:rPr lang="en-US" sz="2000" dirty="0" smtClean="0">
+                <a:latin typeface="Segoe UI" panose="020B0502040204020203" pitchFamily="34" charset="0"/>
+                <a:cs typeface="Segoe UI" panose="020B0502040204020203" pitchFamily="34" charset="0"/>
+              </a:rPr>
+              <a:t> </a:t>
+            </a:r>
+            <a:r>
+              <a:rPr lang="en-US" sz="2000" dirty="0" err="1" smtClean="0">
+                <a:latin typeface="Segoe UI" panose="020B0502040204020203" pitchFamily="34" charset="0"/>
+                <a:cs typeface="Segoe UI" panose="020B0502040204020203" pitchFamily="34" charset="0"/>
+              </a:rPr>
+              <a:t>đăng</a:t>
+            </a:r>
+            <a:r>
+              <a:rPr lang="en-US" sz="2000" dirty="0" smtClean="0">
+                <a:latin typeface="Segoe UI" panose="020B0502040204020203" pitchFamily="34" charset="0"/>
+                <a:cs typeface="Segoe UI" panose="020B0502040204020203" pitchFamily="34" charset="0"/>
+              </a:rPr>
+              <a:t> </a:t>
+            </a:r>
+            <a:r>
+              <a:rPr lang="en-US" sz="2000" dirty="0" err="1" smtClean="0">
+                <a:latin typeface="Segoe UI" panose="020B0502040204020203" pitchFamily="34" charset="0"/>
+                <a:cs typeface="Segoe UI" panose="020B0502040204020203" pitchFamily="34" charset="0"/>
+              </a:rPr>
+              <a:t>cho</a:t>
+            </a:r>
+            <a:r>
+              <a:rPr lang="en-US" sz="2000" dirty="0" smtClean="0">
+                <a:latin typeface="Segoe UI" panose="020B0502040204020203" pitchFamily="34" charset="0"/>
+                <a:cs typeface="Segoe UI" panose="020B0502040204020203" pitchFamily="34" charset="0"/>
+              </a:rPr>
+              <a:t> </a:t>
+            </a:r>
+            <a:r>
+              <a:rPr lang="en-US" sz="2000" dirty="0" err="1" smtClean="0">
+                <a:latin typeface="Segoe UI" panose="020B0502040204020203" pitchFamily="34" charset="0"/>
+                <a:cs typeface="Segoe UI" panose="020B0502040204020203" pitchFamily="34" charset="0"/>
+              </a:rPr>
+              <a:t>thuê</a:t>
+            </a:r>
+            <a:r>
+              <a:rPr lang="en-US" sz="2000" dirty="0" smtClean="0">
+                <a:latin typeface="Segoe UI" panose="020B0502040204020203" pitchFamily="34" charset="0"/>
+                <a:cs typeface="Segoe UI" panose="020B0502040204020203" pitchFamily="34" charset="0"/>
+              </a:rPr>
+              <a:t> </a:t>
+            </a:r>
+            <a:r>
+              <a:rPr lang="en-US" sz="2000" dirty="0" err="1" smtClean="0">
+                <a:latin typeface="Segoe UI" panose="020B0502040204020203" pitchFamily="34" charset="0"/>
+                <a:cs typeface="Segoe UI" panose="020B0502040204020203" pitchFamily="34" charset="0"/>
+              </a:rPr>
+              <a:t>phòng</a:t>
+            </a:r>
+            <a:endParaRPr lang="en-US" sz="2000" dirty="0">
+              <a:latin typeface="Segoe UI" panose="020B0502040204020203" pitchFamily="34" charset="0"/>
+              <a:cs typeface="Segoe UI" panose="020B0502040204020203" pitchFamily="34" charset="0"/>
+            </a:endParaRPr>
           </a:p>
           <a:p>
             <a:pPr marL="0" indent="0">
@@ -15462,11 +15501,39 @@
               <a:t>: </a:t>
             </a:r>
             <a:r>
+              <a:rPr lang="en-US" sz="2000" dirty="0" err="1" smtClean="0">
+                <a:latin typeface="Segoe UI" panose="020B0502040204020203" pitchFamily="34" charset="0"/>
+                <a:cs typeface="Segoe UI" panose="020B0502040204020203" pitchFamily="34" charset="0"/>
+              </a:rPr>
+              <a:t>Kết</a:t>
+            </a:r>
+            <a:r>
+              <a:rPr lang="en-US" sz="2000" dirty="0" smtClean="0">
+                <a:latin typeface="Segoe UI" panose="020B0502040204020203" pitchFamily="34" charset="0"/>
+                <a:cs typeface="Segoe UI" panose="020B0502040204020203" pitchFamily="34" charset="0"/>
+              </a:rPr>
+              <a:t> </a:t>
+            </a:r>
+            <a:r>
+              <a:rPr lang="en-US" sz="2000" dirty="0" err="1" smtClean="0">
+                <a:latin typeface="Segoe UI" panose="020B0502040204020203" pitchFamily="34" charset="0"/>
+                <a:cs typeface="Segoe UI" panose="020B0502040204020203" pitchFamily="34" charset="0"/>
+              </a:rPr>
+              <a:t>quả</a:t>
+            </a:r>
+            <a:r>
+              <a:rPr lang="en-US" sz="2000" dirty="0" smtClean="0">
+                <a:latin typeface="Segoe UI" panose="020B0502040204020203" pitchFamily="34" charset="0"/>
+                <a:cs typeface="Segoe UI" panose="020B0502040204020203" pitchFamily="34" charset="0"/>
+              </a:rPr>
+              <a:t> </a:t>
+            </a:r>
+            <a:r>
               <a:rPr lang="en-US" sz="2000" dirty="0" err="1">
                 <a:latin typeface="Segoe UI" panose="020B0502040204020203" pitchFamily="34" charset="0"/>
                 <a:cs typeface="Segoe UI" panose="020B0502040204020203" pitchFamily="34" charset="0"/>
               </a:rPr>
-              <a:t>Sau</a:t>
+              <a:t>quá</a:t>
             </a:r>
             <a:r>
               <a:rPr lang="en-US" sz="2000" dirty="0">
@@ -15480,7 +15547,7 @@
                 <a:latin typeface="Segoe UI" panose="020B0502040204020203" pitchFamily="34" charset="0"/>
                 <a:cs typeface="Segoe UI" panose="020B0502040204020203" pitchFamily="34" charset="0"/>
               </a:rPr>
-              <a:t>quá</a:t>
+              <a:t>trình</a:t>
             </a:r>
             <a:r>
               <a:rPr lang="en-US" sz="2000" dirty="0">
@@ -15494,7 +15561,7 @@
                 <a:latin typeface="Segoe UI" panose="020B0502040204020203" pitchFamily="34" charset="0"/>
                 <a:cs typeface="Segoe UI" panose="020B0502040204020203" pitchFamily="34" charset="0"/>
               </a:rPr>
-              <a:t>trình</a:t>
+              <a:t>xử</a:t>
             </a:r>
             <a:r>
               <a:rPr lang="en-US" sz="2000" dirty="0">
@@ -15508,35 +15575,35 @@
                 <a:latin typeface="Segoe UI" panose="020B0502040204020203" pitchFamily="34" charset="0"/>
                 <a:cs typeface="Segoe UI" panose="020B0502040204020203" pitchFamily="34" charset="0"/>
               </a:rPr>
-              <a:t>xử</a:t>
+              <a:t>lý</a:t>
             </a:r>
             <a:r>
               <a:rPr lang="en-US" sz="2000" dirty="0">
                 <a:latin typeface="Segoe UI" panose="020B0502040204020203" pitchFamily="34" charset="0"/>
                 <a:cs typeface="Segoe UI" panose="020B0502040204020203" pitchFamily="34" charset="0"/>
               </a:rPr>
-              <a:t> </a:t>
+              <a:t> ta </a:t>
             </a:r>
             <a:r>
               <a:rPr lang="en-US" sz="2000" dirty="0" err="1">
                 <a:latin typeface="Segoe UI" panose="020B0502040204020203" pitchFamily="34" charset="0"/>
                 <a:cs typeface="Segoe UI" panose="020B0502040204020203" pitchFamily="34" charset="0"/>
               </a:rPr>
-              <a:t>lý</a:t>
+              <a:t>sẽ</a:t>
             </a:r>
             <a:r>
               <a:rPr lang="en-US" sz="2000" dirty="0">
                 <a:latin typeface="Segoe UI" panose="020B0502040204020203" pitchFamily="34" charset="0"/>
                 <a:cs typeface="Segoe UI" panose="020B0502040204020203" pitchFamily="34" charset="0"/>
               </a:rPr>
-              <a:t> ta </a:t>
+              <a:t> </a:t>
             </a:r>
             <a:r>
               <a:rPr lang="en-US" sz="2000" dirty="0" err="1">
                 <a:latin typeface="Segoe UI" panose="020B0502040204020203" pitchFamily="34" charset="0"/>
                 <a:cs typeface="Segoe UI" panose="020B0502040204020203" pitchFamily="34" charset="0"/>
               </a:rPr>
-              <a:t>sẽ</a:t>
+              <a:t>thu</a:t>
             </a:r>
             <a:r>
               <a:rPr lang="en-US" sz="2000" dirty="0">
@@ -15550,6 +15617,286 @@
                 <a:latin typeface="Segoe UI" panose="020B0502040204020203" pitchFamily="34" charset="0"/>
                 <a:cs typeface="Segoe UI" panose="020B0502040204020203" pitchFamily="34" charset="0"/>
               </a:rPr>
+              <a:t>được</a:t>
+            </a:r>
+            <a:r>
+              <a:rPr lang="en-US" sz="2000" dirty="0">
+                <a:latin typeface="Segoe UI" panose="020B0502040204020203" pitchFamily="34" charset="0"/>
+                <a:cs typeface="Segoe UI" panose="020B0502040204020203" pitchFamily="34" charset="0"/>
+              </a:rPr>
+              <a:t> </a:t>
+            </a:r>
+            <a:r>
+              <a:rPr lang="en-US" sz="2000" dirty="0" err="1">
+                <a:latin typeface="Segoe UI" panose="020B0502040204020203" pitchFamily="34" charset="0"/>
+                <a:cs typeface="Segoe UI" panose="020B0502040204020203" pitchFamily="34" charset="0"/>
+              </a:rPr>
+              <a:t>thuộc</a:t>
+            </a:r>
+            <a:r>
+              <a:rPr lang="en-US" sz="2000" dirty="0">
+                <a:latin typeface="Segoe UI" panose="020B0502040204020203" pitchFamily="34" charset="0"/>
+                <a:cs typeface="Segoe UI" panose="020B0502040204020203" pitchFamily="34" charset="0"/>
+              </a:rPr>
+              <a:t> </a:t>
+            </a:r>
+            <a:r>
+              <a:rPr lang="en-US" sz="2000" dirty="0" err="1" smtClean="0">
+                <a:latin typeface="Segoe UI" panose="020B0502040204020203" pitchFamily="34" charset="0"/>
+                <a:cs typeface="Segoe UI" panose="020B0502040204020203" pitchFamily="34" charset="0"/>
+              </a:rPr>
+              <a:t>tính</a:t>
+            </a:r>
+            <a:r>
+              <a:rPr lang="en-US" sz="2000" dirty="0" smtClean="0">
+                <a:latin typeface="Segoe UI" panose="020B0502040204020203" pitchFamily="34" charset="0"/>
+                <a:cs typeface="Segoe UI" panose="020B0502040204020203" pitchFamily="34" charset="0"/>
+              </a:rPr>
+              <a:t> </a:t>
+            </a:r>
+            <a:r>
+              <a:rPr lang="en-US" sz="2000" dirty="0" err="1" smtClean="0">
+                <a:latin typeface="Segoe UI" panose="020B0502040204020203" pitchFamily="34" charset="0"/>
+                <a:cs typeface="Segoe UI" panose="020B0502040204020203" pitchFamily="34" charset="0"/>
+              </a:rPr>
+              <a:t>độc</a:t>
+            </a:r>
+            <a:r>
+              <a:rPr lang="en-US" sz="2000" dirty="0" smtClean="0">
+                <a:latin typeface="Segoe UI" panose="020B0502040204020203" pitchFamily="34" charset="0"/>
+                <a:cs typeface="Segoe UI" panose="020B0502040204020203" pitchFamily="34" charset="0"/>
+              </a:rPr>
+              <a:t> </a:t>
+            </a:r>
+            <a:r>
+              <a:rPr lang="en-US" sz="2000" dirty="0" err="1" smtClean="0">
+                <a:latin typeface="Segoe UI" panose="020B0502040204020203" pitchFamily="34" charset="0"/>
+                <a:cs typeface="Segoe UI" panose="020B0502040204020203" pitchFamily="34" charset="0"/>
+              </a:rPr>
+              <a:t>lập</a:t>
+            </a:r>
+            <a:r>
+              <a:rPr lang="en-US" sz="2000" dirty="0" smtClean="0">
+                <a:latin typeface="Segoe UI" panose="020B0502040204020203" pitchFamily="34" charset="0"/>
+                <a:cs typeface="Segoe UI" panose="020B0502040204020203" pitchFamily="34" charset="0"/>
+              </a:rPr>
+              <a:t> </a:t>
+            </a:r>
+            <a:r>
+              <a:rPr lang="en-US" sz="2000" dirty="0" err="1">
+                <a:latin typeface="Segoe UI" panose="020B0502040204020203" pitchFamily="34" charset="0"/>
+                <a:cs typeface="Segoe UI" panose="020B0502040204020203" pitchFamily="34" charset="0"/>
+              </a:rPr>
+              <a:t>và</a:t>
+            </a:r>
+            <a:r>
+              <a:rPr lang="en-US" sz="2000" dirty="0">
+                <a:latin typeface="Segoe UI" panose="020B0502040204020203" pitchFamily="34" charset="0"/>
+                <a:cs typeface="Segoe UI" panose="020B0502040204020203" pitchFamily="34" charset="0"/>
+              </a:rPr>
+              <a:t> </a:t>
+            </a:r>
+            <a:r>
+              <a:rPr lang="en-US" sz="2000" dirty="0" err="1" smtClean="0">
+                <a:latin typeface="Segoe UI" panose="020B0502040204020203" pitchFamily="34" charset="0"/>
+                <a:cs typeface="Segoe UI" panose="020B0502040204020203" pitchFamily="34" charset="0"/>
+              </a:rPr>
+              <a:t>đồng</a:t>
+            </a:r>
+            <a:r>
+              <a:rPr lang="en-US" sz="2000" dirty="0" smtClean="0">
+                <a:latin typeface="Segoe UI" panose="020B0502040204020203" pitchFamily="34" charset="0"/>
+                <a:cs typeface="Segoe UI" panose="020B0502040204020203" pitchFamily="34" charset="0"/>
+              </a:rPr>
+              <a:t> </a:t>
+            </a:r>
+            <a:r>
+              <a:rPr lang="en-US" sz="2000" dirty="0" err="1" smtClean="0">
+                <a:latin typeface="Segoe UI" panose="020B0502040204020203" pitchFamily="34" charset="0"/>
+                <a:cs typeface="Segoe UI" panose="020B0502040204020203" pitchFamily="34" charset="0"/>
+              </a:rPr>
+              <a:t>nhất</a:t>
+            </a:r>
+            <a:r>
+              <a:rPr lang="en-US" sz="2000" dirty="0" smtClean="0">
+                <a:latin typeface="Segoe UI" panose="020B0502040204020203" pitchFamily="34" charset="0"/>
+                <a:cs typeface="Segoe UI" panose="020B0502040204020203" pitchFamily="34" charset="0"/>
+              </a:rPr>
+              <a:t> </a:t>
+            </a:r>
+            <a:r>
+              <a:rPr lang="en-US" sz="2000" dirty="0" err="1" smtClean="0">
+                <a:latin typeface="Segoe UI" panose="020B0502040204020203" pitchFamily="34" charset="0"/>
+                <a:cs typeface="Segoe UI" panose="020B0502040204020203" pitchFamily="34" charset="0"/>
+              </a:rPr>
+              <a:t>và</a:t>
+            </a:r>
+            <a:r>
+              <a:rPr lang="en-US" sz="2000" dirty="0" smtClean="0">
+                <a:latin typeface="Segoe UI" panose="020B0502040204020203" pitchFamily="34" charset="0"/>
+                <a:cs typeface="Segoe UI" panose="020B0502040204020203" pitchFamily="34" charset="0"/>
+              </a:rPr>
+              <a:t> </a:t>
+            </a:r>
+            <a:r>
+              <a:rPr lang="en-US" sz="2000" dirty="0" err="1" smtClean="0">
+                <a:latin typeface="Segoe UI" panose="020B0502040204020203" pitchFamily="34" charset="0"/>
+                <a:cs typeface="Segoe UI" panose="020B0502040204020203" pitchFamily="34" charset="0"/>
+              </a:rPr>
+              <a:t>đặc</a:t>
+            </a:r>
+            <a:r>
+              <a:rPr lang="en-US" sz="2000" dirty="0" smtClean="0">
+                <a:latin typeface="Segoe UI" panose="020B0502040204020203" pitchFamily="34" charset="0"/>
+                <a:cs typeface="Segoe UI" panose="020B0502040204020203" pitchFamily="34" charset="0"/>
+              </a:rPr>
+              <a:t> </a:t>
+            </a:r>
+            <a:r>
+              <a:rPr lang="en-US" sz="2000" dirty="0" err="1" smtClean="0">
+                <a:latin typeface="Segoe UI" panose="020B0502040204020203" pitchFamily="34" charset="0"/>
+                <a:cs typeface="Segoe UI" panose="020B0502040204020203" pitchFamily="34" charset="0"/>
+              </a:rPr>
+              <a:t>biệt</a:t>
+            </a:r>
+            <a:r>
+              <a:rPr lang="en-US" sz="2000" dirty="0" smtClean="0">
+                <a:latin typeface="Segoe UI" panose="020B0502040204020203" pitchFamily="34" charset="0"/>
+                <a:cs typeface="Segoe UI" panose="020B0502040204020203" pitchFamily="34" charset="0"/>
+              </a:rPr>
+              <a:t> </a:t>
+            </a:r>
+            <a:r>
+              <a:rPr lang="en-US" sz="2000" dirty="0" err="1" smtClean="0">
+                <a:latin typeface="Segoe UI" panose="020B0502040204020203" pitchFamily="34" charset="0"/>
+                <a:cs typeface="Segoe UI" panose="020B0502040204020203" pitchFamily="34" charset="0"/>
+              </a:rPr>
+              <a:t>có</a:t>
+            </a:r>
+            <a:r>
+              <a:rPr lang="en-US" sz="2000" dirty="0" smtClean="0">
+                <a:latin typeface="Segoe UI" panose="020B0502040204020203" pitchFamily="34" charset="0"/>
+                <a:cs typeface="Segoe UI" panose="020B0502040204020203" pitchFamily="34" charset="0"/>
+              </a:rPr>
+              <a:t> </a:t>
+            </a:r>
+            <a:r>
+              <a:rPr lang="en-US" sz="2000" dirty="0" err="1" smtClean="0">
+                <a:latin typeface="Segoe UI" panose="020B0502040204020203" pitchFamily="34" charset="0"/>
+                <a:cs typeface="Segoe UI" panose="020B0502040204020203" pitchFamily="34" charset="0"/>
+              </a:rPr>
+              <a:t>ích</a:t>
+            </a:r>
+            <a:r>
+              <a:rPr lang="en-US" sz="2000" dirty="0" smtClean="0">
+                <a:latin typeface="Segoe UI" panose="020B0502040204020203" pitchFamily="34" charset="0"/>
+                <a:cs typeface="Segoe UI" panose="020B0502040204020203" pitchFamily="34" charset="0"/>
+              </a:rPr>
+              <a:t> </a:t>
+            </a:r>
+            <a:r>
+              <a:rPr lang="en-US" sz="2000" dirty="0" err="1" smtClean="0">
+                <a:latin typeface="Segoe UI" panose="020B0502040204020203" pitchFamily="34" charset="0"/>
+                <a:cs typeface="Segoe UI" panose="020B0502040204020203" pitchFamily="34" charset="0"/>
+              </a:rPr>
+              <a:t>cho</a:t>
+            </a:r>
+            <a:r>
+              <a:rPr lang="en-US" sz="2000" dirty="0" smtClean="0">
+                <a:latin typeface="Segoe UI" panose="020B0502040204020203" pitchFamily="34" charset="0"/>
+                <a:cs typeface="Segoe UI" panose="020B0502040204020203" pitchFamily="34" charset="0"/>
+              </a:rPr>
+              <a:t> </a:t>
+            </a:r>
+            <a:r>
+              <a:rPr lang="en-US" sz="2000" dirty="0" err="1" smtClean="0">
+                <a:latin typeface="Segoe UI" panose="020B0502040204020203" pitchFamily="34" charset="0"/>
+                <a:cs typeface="Segoe UI" panose="020B0502040204020203" pitchFamily="34" charset="0"/>
+              </a:rPr>
+              <a:t>mô</a:t>
+            </a:r>
+            <a:r>
+              <a:rPr lang="en-US" sz="2000" dirty="0" smtClean="0">
+                <a:latin typeface="Segoe UI" panose="020B0502040204020203" pitchFamily="34" charset="0"/>
+                <a:cs typeface="Segoe UI" panose="020B0502040204020203" pitchFamily="34" charset="0"/>
+              </a:rPr>
+              <a:t> </a:t>
+            </a:r>
+            <a:r>
+              <a:rPr lang="en-US" sz="2000" dirty="0" err="1" smtClean="0">
+                <a:latin typeface="Segoe UI" panose="020B0502040204020203" pitchFamily="34" charset="0"/>
+                <a:cs typeface="Segoe UI" panose="020B0502040204020203" pitchFamily="34" charset="0"/>
+              </a:rPr>
+              <a:t>hình</a:t>
+            </a:r>
+            <a:r>
+              <a:rPr lang="en-US" sz="2000" dirty="0" smtClean="0">
+                <a:latin typeface="Segoe UI" panose="020B0502040204020203" pitchFamily="34" charset="0"/>
+                <a:cs typeface="Segoe UI" panose="020B0502040204020203" pitchFamily="34" charset="0"/>
+              </a:rPr>
+              <a:t> </a:t>
+            </a:r>
+            <a:r>
+              <a:rPr lang="en-US" sz="2000" dirty="0" err="1" smtClean="0">
+                <a:latin typeface="Segoe UI" panose="020B0502040204020203" pitchFamily="34" charset="0"/>
+                <a:cs typeface="Segoe UI" panose="020B0502040204020203" pitchFamily="34" charset="0"/>
+              </a:rPr>
+              <a:t>từ</a:t>
+            </a:r>
+            <a:r>
+              <a:rPr lang="en-US" sz="2000" dirty="0" smtClean="0">
+                <a:latin typeface="Segoe UI" panose="020B0502040204020203" pitchFamily="34" charset="0"/>
+                <a:cs typeface="Segoe UI" panose="020B0502040204020203" pitchFamily="34" charset="0"/>
+              </a:rPr>
+              <a:t> </a:t>
+            </a:r>
+            <a:r>
+              <a:rPr lang="en-US" sz="2000" dirty="0" err="1" smtClean="0">
+                <a:latin typeface="Segoe UI" panose="020B0502040204020203" pitchFamily="34" charset="0"/>
+                <a:cs typeface="Segoe UI" panose="020B0502040204020203" pitchFamily="34" charset="0"/>
+              </a:rPr>
+              <a:t>dữ</a:t>
+            </a:r>
+            <a:r>
+              <a:rPr lang="en-US" sz="2000" dirty="0" smtClean="0">
+                <a:latin typeface="Segoe UI" panose="020B0502040204020203" pitchFamily="34" charset="0"/>
+                <a:cs typeface="Segoe UI" panose="020B0502040204020203" pitchFamily="34" charset="0"/>
+              </a:rPr>
+              <a:t> </a:t>
+            </a:r>
+            <a:r>
+              <a:rPr lang="en-US" sz="2000" dirty="0" err="1" smtClean="0">
+                <a:latin typeface="Segoe UI" panose="020B0502040204020203" pitchFamily="34" charset="0"/>
+                <a:cs typeface="Segoe UI" panose="020B0502040204020203" pitchFamily="34" charset="0"/>
+              </a:rPr>
+              <a:t>liệu</a:t>
+            </a:r>
+            <a:r>
+              <a:rPr lang="en-US" sz="2000" dirty="0" smtClean="0">
+                <a:latin typeface="Segoe UI" panose="020B0502040204020203" pitchFamily="34" charset="0"/>
+                <a:cs typeface="Segoe UI" panose="020B0502040204020203" pitchFamily="34" charset="0"/>
+              </a:rPr>
+              <a:t> </a:t>
+            </a:r>
+            <a:r>
+              <a:rPr lang="en-US" sz="2000" dirty="0" err="1" smtClean="0">
+                <a:latin typeface="Segoe UI" panose="020B0502040204020203" pitchFamily="34" charset="0"/>
+                <a:cs typeface="Segoe UI" panose="020B0502040204020203" pitchFamily="34" charset="0"/>
+              </a:rPr>
+              <a:t>thô</a:t>
+            </a:r>
+            <a:r>
+              <a:rPr lang="en-US" sz="2000" dirty="0" smtClean="0">
+                <a:latin typeface="Segoe UI" panose="020B0502040204020203" pitchFamily="34" charset="0"/>
+                <a:cs typeface="Segoe UI" panose="020B0502040204020203" pitchFamily="34" charset="0"/>
+              </a:rPr>
+              <a:t> </a:t>
+            </a:r>
+            <a:r>
+              <a:rPr lang="en-US" sz="2000" dirty="0" err="1">
+                <a:latin typeface="Segoe UI" panose="020B0502040204020203" pitchFamily="34" charset="0"/>
+                <a:cs typeface="Segoe UI" panose="020B0502040204020203" pitchFamily="34" charset="0"/>
+              </a:rPr>
               <a:t>thu</a:t>
             </a:r>
             <a:r>
@@ -15560,218 +15907,22 @@
               <a:t> </a:t>
             </a:r>
             <a:r>
-              <a:rPr lang="en-US" sz="2000" dirty="0" err="1">
+              <a:rPr lang="en-US" sz="2000" dirty="0" err="1" smtClean="0">
                 <a:latin typeface="Segoe UI" panose="020B0502040204020203" pitchFamily="34" charset="0"/>
                 <a:cs typeface="Segoe UI" panose="020B0502040204020203" pitchFamily="34" charset="0"/>
               </a:rPr>
               <a:t>được</a:t>
             </a:r>
-            <a:r>
-              <a:rPr lang="en-US" sz="2000" dirty="0">
-                <a:latin typeface="Segoe UI" panose="020B0502040204020203" pitchFamily="34" charset="0"/>
-                <a:cs typeface="Segoe UI" panose="020B0502040204020203" pitchFamily="34" charset="0"/>
-              </a:rPr>
-              <a:t> </a:t>
-            </a:r>
-            <a:r>
-              <a:rPr lang="en-US" sz="2000" dirty="0" err="1">
-                <a:latin typeface="Segoe UI" panose="020B0502040204020203" pitchFamily="34" charset="0"/>
-                <a:cs typeface="Segoe UI" panose="020B0502040204020203" pitchFamily="34" charset="0"/>
-              </a:rPr>
-              <a:t>thuộc</a:t>
-            </a:r>
-            <a:r>
-              <a:rPr lang="en-US" sz="2000" dirty="0">
-                <a:latin typeface="Segoe UI" panose="020B0502040204020203" pitchFamily="34" charset="0"/>
-                <a:cs typeface="Segoe UI" panose="020B0502040204020203" pitchFamily="34" charset="0"/>
-              </a:rPr>
-              <a:t> </a:t>
-            </a:r>
-            <a:r>
-              <a:rPr lang="en-US" sz="2000" dirty="0" err="1">
-                <a:latin typeface="Segoe UI" panose="020B0502040204020203" pitchFamily="34" charset="0"/>
-                <a:cs typeface="Segoe UI" panose="020B0502040204020203" pitchFamily="34" charset="0"/>
-              </a:rPr>
-              <a:t>tính</a:t>
-            </a:r>
-            <a:r>
-              <a:rPr lang="en-US" sz="2000" dirty="0">
-                <a:latin typeface="Segoe UI" panose="020B0502040204020203" pitchFamily="34" charset="0"/>
-                <a:cs typeface="Segoe UI" panose="020B0502040204020203" pitchFamily="34" charset="0"/>
-              </a:rPr>
-              <a:t> </a:t>
-            </a:r>
-            <a:r>
-              <a:rPr lang="en-US" sz="2000" dirty="0" err="1">
-                <a:latin typeface="Segoe UI" panose="020B0502040204020203" pitchFamily="34" charset="0"/>
-                <a:cs typeface="Segoe UI" panose="020B0502040204020203" pitchFamily="34" charset="0"/>
-              </a:rPr>
-              <a:t>riêng</a:t>
-            </a:r>
-            <a:r>
-              <a:rPr lang="en-US" sz="2000" dirty="0">
-                <a:latin typeface="Segoe UI" panose="020B0502040204020203" pitchFamily="34" charset="0"/>
-                <a:cs typeface="Segoe UI" panose="020B0502040204020203" pitchFamily="34" charset="0"/>
-              </a:rPr>
-              <a:t> </a:t>
-            </a:r>
-            <a:r>
-              <a:rPr lang="en-US" sz="2000" dirty="0" err="1">
-                <a:latin typeface="Segoe UI" panose="020B0502040204020203" pitchFamily="34" charset="0"/>
-                <a:cs typeface="Segoe UI" panose="020B0502040204020203" pitchFamily="34" charset="0"/>
-              </a:rPr>
-              <a:t>biệt</a:t>
-            </a:r>
-            <a:r>
-              <a:rPr lang="en-US" sz="2000" dirty="0">
-                <a:latin typeface="Segoe UI" panose="020B0502040204020203" pitchFamily="34" charset="0"/>
-                <a:cs typeface="Segoe UI" panose="020B0502040204020203" pitchFamily="34" charset="0"/>
-              </a:rPr>
-              <a:t> </a:t>
-            </a:r>
-            <a:r>
-              <a:rPr lang="en-US" sz="2000" dirty="0" err="1">
-                <a:latin typeface="Segoe UI" panose="020B0502040204020203" pitchFamily="34" charset="0"/>
-                <a:cs typeface="Segoe UI" panose="020B0502040204020203" pitchFamily="34" charset="0"/>
-              </a:rPr>
-              <a:t>và</a:t>
-            </a:r>
-            <a:r>
-              <a:rPr lang="en-US" sz="2000" dirty="0">
-                <a:latin typeface="Segoe UI" panose="020B0502040204020203" pitchFamily="34" charset="0"/>
-                <a:cs typeface="Segoe UI" panose="020B0502040204020203" pitchFamily="34" charset="0"/>
-              </a:rPr>
-              <a:t> </a:t>
-            </a:r>
-            <a:r>
-              <a:rPr lang="en-US" sz="2000" dirty="0" err="1">
-                <a:latin typeface="Segoe UI" panose="020B0502040204020203" pitchFamily="34" charset="0"/>
-                <a:cs typeface="Segoe UI" panose="020B0502040204020203" pitchFamily="34" charset="0"/>
-              </a:rPr>
-              <a:t>đầy</a:t>
-            </a:r>
-            <a:r>
-              <a:rPr lang="en-US" sz="2000" dirty="0">
-                <a:latin typeface="Segoe UI" panose="020B0502040204020203" pitchFamily="34" charset="0"/>
-                <a:cs typeface="Segoe UI" panose="020B0502040204020203" pitchFamily="34" charset="0"/>
-              </a:rPr>
-              <a:t> </a:t>
-            </a:r>
-            <a:r>
-              <a:rPr lang="en-US" sz="2000" dirty="0" err="1">
-                <a:latin typeface="Segoe UI" panose="020B0502040204020203" pitchFamily="34" charset="0"/>
-                <a:cs typeface="Segoe UI" panose="020B0502040204020203" pitchFamily="34" charset="0"/>
-              </a:rPr>
-              <a:t>đủ</a:t>
-            </a:r>
-            <a:r>
-              <a:rPr lang="en-US" sz="2000" dirty="0">
-                <a:latin typeface="Segoe UI" panose="020B0502040204020203" pitchFamily="34" charset="0"/>
-                <a:cs typeface="Segoe UI" panose="020B0502040204020203" pitchFamily="34" charset="0"/>
-              </a:rPr>
-              <a:t> </a:t>
-            </a:r>
-            <a:r>
-              <a:rPr lang="en-US" sz="2000" dirty="0" err="1">
-                <a:latin typeface="Segoe UI" panose="020B0502040204020203" pitchFamily="34" charset="0"/>
-                <a:cs typeface="Segoe UI" panose="020B0502040204020203" pitchFamily="34" charset="0"/>
-              </a:rPr>
-              <a:t>thông</a:t>
-            </a:r>
-            <a:r>
-              <a:rPr lang="en-US" sz="2000" dirty="0">
-                <a:latin typeface="Segoe UI" panose="020B0502040204020203" pitchFamily="34" charset="0"/>
-                <a:cs typeface="Segoe UI" panose="020B0502040204020203" pitchFamily="34" charset="0"/>
-              </a:rPr>
-              <a:t> tin </a:t>
-            </a:r>
-            <a:r>
-              <a:rPr lang="en-US" sz="2000" dirty="0" err="1">
-                <a:latin typeface="Segoe UI" panose="020B0502040204020203" pitchFamily="34" charset="0"/>
-                <a:cs typeface="Segoe UI" panose="020B0502040204020203" pitchFamily="34" charset="0"/>
-              </a:rPr>
-              <a:t>dữ</a:t>
-            </a:r>
-            <a:r>
-              <a:rPr lang="en-US" sz="2000" dirty="0">
-                <a:latin typeface="Segoe UI" panose="020B0502040204020203" pitchFamily="34" charset="0"/>
-                <a:cs typeface="Segoe UI" panose="020B0502040204020203" pitchFamily="34" charset="0"/>
-              </a:rPr>
-              <a:t> </a:t>
-            </a:r>
-            <a:r>
-              <a:rPr lang="en-US" sz="2000" dirty="0" err="1">
-                <a:latin typeface="Segoe UI" panose="020B0502040204020203" pitchFamily="34" charset="0"/>
-                <a:cs typeface="Segoe UI" panose="020B0502040204020203" pitchFamily="34" charset="0"/>
-              </a:rPr>
-              <a:t>liệu</a:t>
-            </a:r>
-            <a:r>
-              <a:rPr lang="en-US" sz="2000" dirty="0">
-                <a:latin typeface="Segoe UI" panose="020B0502040204020203" pitchFamily="34" charset="0"/>
-                <a:cs typeface="Segoe UI" panose="020B0502040204020203" pitchFamily="34" charset="0"/>
-              </a:rPr>
-              <a:t> </a:t>
-            </a:r>
-            <a:r>
-              <a:rPr lang="en-US" sz="2000" dirty="0" err="1">
-                <a:latin typeface="Segoe UI" panose="020B0502040204020203" pitchFamily="34" charset="0"/>
-                <a:cs typeface="Segoe UI" panose="020B0502040204020203" pitchFamily="34" charset="0"/>
-              </a:rPr>
-              <a:t>thô</a:t>
-            </a:r>
-            <a:r>
-              <a:rPr lang="en-US" sz="2000" dirty="0">
-                <a:latin typeface="Segoe UI" panose="020B0502040204020203" pitchFamily="34" charset="0"/>
-                <a:cs typeface="Segoe UI" panose="020B0502040204020203" pitchFamily="34" charset="0"/>
-              </a:rPr>
-              <a:t> </a:t>
-            </a:r>
-            <a:r>
-              <a:rPr lang="en-US" sz="2000" dirty="0" err="1">
-                <a:latin typeface="Segoe UI" panose="020B0502040204020203" pitchFamily="34" charset="0"/>
-                <a:cs typeface="Segoe UI" panose="020B0502040204020203" pitchFamily="34" charset="0"/>
-              </a:rPr>
-              <a:t>thu</a:t>
-            </a:r>
-            <a:r>
-              <a:rPr lang="en-US" sz="2000" dirty="0">
-                <a:latin typeface="Segoe UI" panose="020B0502040204020203" pitchFamily="34" charset="0"/>
-                <a:cs typeface="Segoe UI" panose="020B0502040204020203" pitchFamily="34" charset="0"/>
-              </a:rPr>
-              <a:t> </a:t>
-            </a:r>
-            <a:r>
-              <a:rPr lang="en-US" sz="2000" dirty="0" err="1">
-                <a:latin typeface="Segoe UI" panose="020B0502040204020203" pitchFamily="34" charset="0"/>
-                <a:cs typeface="Segoe UI" panose="020B0502040204020203" pitchFamily="34" charset="0"/>
-              </a:rPr>
-              <a:t>được</a:t>
-            </a:r>
-            <a:r>
-              <a:rPr lang="en-US" sz="2000" dirty="0">
-                <a:latin typeface="Segoe UI" panose="020B0502040204020203" pitchFamily="34" charset="0"/>
-                <a:cs typeface="Segoe UI" panose="020B0502040204020203" pitchFamily="34" charset="0"/>
-              </a:rPr>
-              <a:t> </a:t>
-            </a:r>
-            <a:r>
-              <a:rPr lang="en-US" sz="2000" dirty="0" err="1">
-                <a:latin typeface="Segoe UI" panose="020B0502040204020203" pitchFamily="34" charset="0"/>
-                <a:cs typeface="Segoe UI" panose="020B0502040204020203" pitchFamily="34" charset="0"/>
-              </a:rPr>
-              <a:t>từ</a:t>
-            </a:r>
-            <a:r>
-              <a:rPr lang="en-US" sz="2000" dirty="0">
-                <a:latin typeface="Segoe UI" panose="020B0502040204020203" pitchFamily="34" charset="0"/>
-                <a:cs typeface="Segoe UI" panose="020B0502040204020203" pitchFamily="34" charset="0"/>
-              </a:rPr>
-              <a:t> website</a:t>
-            </a:r>
+            <a:endParaRPr lang="en-US" sz="2000" dirty="0">
+              <a:latin typeface="Segoe UI" panose="020B0502040204020203" pitchFamily="34" charset="0"/>
+              <a:cs typeface="Segoe UI" panose="020B0502040204020203" pitchFamily="34" charset="0"/>
+            </a:endParaRPr>
           </a:p>
           <a:p>
             <a:pPr marL="0" indent="0">
+              <a:lnSpc>
+                <a:spcPct val="150000"/>
+              </a:lnSpc>
               <a:buClr>
                 <a:schemeClr val="tx1"/>
               </a:buClr>
@@ -15779,14 +15930,14 @@
               <a:buNone/>
             </a:pPr>
             <a:r>
-              <a:rPr lang="en-US" sz="2000" dirty="0" err="1">
+              <a:rPr lang="en-US" sz="2000" dirty="0" err="1" smtClean="0">
                 <a:latin typeface="Segoe UI" panose="020B0502040204020203" pitchFamily="34" charset="0"/>
                 <a:cs typeface="Segoe UI" panose="020B0502040204020203" pitchFamily="34" charset="0"/>
               </a:rPr>
               <a:t>Các</a:t>
             </a:r>
             <a:r>
-              <a:rPr lang="en-US" sz="2000" dirty="0">
+              <a:rPr lang="en-US" sz="2000" dirty="0" smtClean="0">
                 <a:latin typeface="Segoe UI" panose="020B0502040204020203" pitchFamily="34" charset="0"/>
                 <a:cs typeface="Segoe UI" panose="020B0502040204020203" pitchFamily="34" charset="0"/>
               </a:rPr>
@@ -16173,18 +16324,46 @@
               <a:t>thô</a:t>
             </a:r>
             <a:r>
+              <a:rPr lang="en-US" sz="2000" dirty="0" smtClean="0">
+                <a:latin typeface="Segoe UI" panose="020B0502040204020203" pitchFamily="34" charset="0"/>
+                <a:cs typeface="Segoe UI" panose="020B0502040204020203" pitchFamily="34" charset="0"/>
+              </a:rPr>
+              <a:t>: </a:t>
+            </a:r>
+            <a:r>
+              <a:rPr lang="en-US" sz="2000" dirty="0" err="1" smtClean="0">
+                <a:latin typeface="Segoe UI" panose="020B0502040204020203" pitchFamily="34" charset="0"/>
+                <a:cs typeface="Segoe UI" panose="020B0502040204020203" pitchFamily="34" charset="0"/>
+              </a:rPr>
+              <a:t>Chuẩn</a:t>
+            </a:r>
+            <a:r>
+              <a:rPr lang="en-US" sz="2000" dirty="0" smtClean="0">
+                <a:latin typeface="Segoe UI" panose="020B0502040204020203" pitchFamily="34" charset="0"/>
+                <a:cs typeface="Segoe UI" panose="020B0502040204020203" pitchFamily="34" charset="0"/>
+              </a:rPr>
+              <a:t> </a:t>
+            </a:r>
+            <a:r>
+              <a:rPr lang="en-US" sz="2000" dirty="0" err="1">
+                <a:latin typeface="Segoe UI" panose="020B0502040204020203" pitchFamily="34" charset="0"/>
+                <a:cs typeface="Segoe UI" panose="020B0502040204020203" pitchFamily="34" charset="0"/>
+              </a:rPr>
+              <a:t>hóa</a:t>
+            </a:r>
+            <a:r>
               <a:rPr lang="en-US" sz="2000" dirty="0">
                 <a:latin typeface="Segoe UI" panose="020B0502040204020203" pitchFamily="34" charset="0"/>
                 <a:cs typeface="Segoe UI" panose="020B0502040204020203" pitchFamily="34" charset="0"/>
               </a:rPr>
-              <a:t>: </a:t>
+              <a:t> </a:t>
             </a:r>
             <a:r>
               <a:rPr lang="en-US" sz="2000" dirty="0" err="1">
                 <a:latin typeface="Segoe UI" panose="020B0502040204020203" pitchFamily="34" charset="0"/>
                 <a:cs typeface="Segoe UI" panose="020B0502040204020203" pitchFamily="34" charset="0"/>
               </a:rPr>
-              <a:t>Chuẩn</a:t>
+              <a:t>đơn</a:t>
             </a:r>
             <a:r>
               <a:rPr lang="en-US" sz="2000" dirty="0">
@@ -16198,21 +16377,21 @@
                 <a:latin typeface="Segoe UI" panose="020B0502040204020203" pitchFamily="34" charset="0"/>
                 <a:cs typeface="Segoe UI" panose="020B0502040204020203" pitchFamily="34" charset="0"/>
               </a:rPr>
-              <a:t>hóa</a:t>
+              <a:t>vị</a:t>
             </a:r>
             <a:r>
               <a:rPr lang="en-US" sz="2000" dirty="0">
                 <a:latin typeface="Segoe UI" panose="020B0502040204020203" pitchFamily="34" charset="0"/>
                 <a:cs typeface="Segoe UI" panose="020B0502040204020203" pitchFamily="34" charset="0"/>
               </a:rPr>
-              <a:t> </a:t>
+              <a:t> do, </a:t>
             </a:r>
             <a:r>
               <a:rPr lang="en-US" sz="2000" dirty="0" err="1">
                 <a:latin typeface="Segoe UI" panose="020B0502040204020203" pitchFamily="34" charset="0"/>
                 <a:cs typeface="Segoe UI" panose="020B0502040204020203" pitchFamily="34" charset="0"/>
               </a:rPr>
-              <a:t>đơn</a:t>
+              <a:t>loại</a:t>
             </a:r>
             <a:r>
               <a:rPr lang="en-US" sz="2000" dirty="0">
@@ -16226,21 +16405,21 @@
                 <a:latin typeface="Segoe UI" panose="020B0502040204020203" pitchFamily="34" charset="0"/>
                 <a:cs typeface="Segoe UI" panose="020B0502040204020203" pitchFamily="34" charset="0"/>
               </a:rPr>
-              <a:t>vị</a:t>
+              <a:t>dữ</a:t>
             </a:r>
             <a:r>
               <a:rPr lang="en-US" sz="2000" dirty="0">
                 <a:latin typeface="Segoe UI" panose="020B0502040204020203" pitchFamily="34" charset="0"/>
                 <a:cs typeface="Segoe UI" panose="020B0502040204020203" pitchFamily="34" charset="0"/>
               </a:rPr>
-              <a:t> do, </a:t>
+              <a:t> </a:t>
             </a:r>
             <a:r>
               <a:rPr lang="en-US" sz="2000" dirty="0" err="1">
                 <a:latin typeface="Segoe UI" panose="020B0502040204020203" pitchFamily="34" charset="0"/>
                 <a:cs typeface="Segoe UI" panose="020B0502040204020203" pitchFamily="34" charset="0"/>
               </a:rPr>
-              <a:t>loại</a:t>
+              <a:t>liệu</a:t>
             </a:r>
             <a:r>
               <a:rPr lang="en-US" sz="2000" dirty="0">
@@ -16254,7 +16433,7 @@
                 <a:latin typeface="Segoe UI" panose="020B0502040204020203" pitchFamily="34" charset="0"/>
                 <a:cs typeface="Segoe UI" panose="020B0502040204020203" pitchFamily="34" charset="0"/>
               </a:rPr>
-              <a:t>dữ</a:t>
+              <a:t>cho</a:t>
             </a:r>
             <a:r>
               <a:rPr lang="en-US" sz="2000" dirty="0">
@@ -16268,7 +16447,7 @@
                 <a:latin typeface="Segoe UI" panose="020B0502040204020203" pitchFamily="34" charset="0"/>
                 <a:cs typeface="Segoe UI" panose="020B0502040204020203" pitchFamily="34" charset="0"/>
               </a:rPr>
-              <a:t>liệu</a:t>
+              <a:t>tất</a:t>
             </a:r>
             <a:r>
               <a:rPr lang="en-US" sz="2000" dirty="0">
@@ -16282,7 +16461,7 @@
                 <a:latin typeface="Segoe UI" panose="020B0502040204020203" pitchFamily="34" charset="0"/>
                 <a:cs typeface="Segoe UI" panose="020B0502040204020203" pitchFamily="34" charset="0"/>
               </a:rPr>
-              <a:t>tất</a:t>
+              <a:t>cả</a:t>
             </a:r>
             <a:r>
               <a:rPr lang="en-US" sz="2000" dirty="0">
@@ -16296,7 +16475,7 @@
                 <a:latin typeface="Segoe UI" panose="020B0502040204020203" pitchFamily="34" charset="0"/>
                 <a:cs typeface="Segoe UI" panose="020B0502040204020203" pitchFamily="34" charset="0"/>
               </a:rPr>
-              <a:t>cả</a:t>
+              <a:t>các</a:t>
             </a:r>
             <a:r>
               <a:rPr lang="en-US" sz="2000" dirty="0">
@@ -16310,7 +16489,7 @@
                 <a:latin typeface="Segoe UI" panose="020B0502040204020203" pitchFamily="34" charset="0"/>
                 <a:cs typeface="Segoe UI" panose="020B0502040204020203" pitchFamily="34" charset="0"/>
               </a:rPr>
-              <a:t>các</a:t>
+              <a:t>thuộc</a:t>
             </a:r>
             <a:r>
               <a:rPr lang="en-US" sz="2000" dirty="0">
@@ -16324,35 +16503,7 @@
                 <a:latin typeface="Segoe UI" panose="020B0502040204020203" pitchFamily="34" charset="0"/>
                 <a:cs typeface="Segoe UI" panose="020B0502040204020203" pitchFamily="34" charset="0"/>
               </a:rPr>
-              <a:t>thuộc</a:t>
-            </a:r>
-            <a:r>
-              <a:rPr lang="en-US" sz="2000" dirty="0">
-                <a:latin typeface="Segoe UI" panose="020B0502040204020203" pitchFamily="34" charset="0"/>
-                <a:cs typeface="Segoe UI" panose="020B0502040204020203" pitchFamily="34" charset="0"/>
-              </a:rPr>
-              <a:t> </a:t>
-            </a:r>
-            <a:r>
-              <a:rPr lang="en-US" sz="2000" dirty="0" err="1">
-                <a:latin typeface="Segoe UI" panose="020B0502040204020203" pitchFamily="34" charset="0"/>
-                <a:cs typeface="Segoe UI" panose="020B0502040204020203" pitchFamily="34" charset="0"/>
-              </a:rPr>
               <a:t>tính</a:t>
-            </a:r>
-            <a:r>
-              <a:rPr lang="en-US" sz="2000" dirty="0">
-                <a:latin typeface="Segoe UI" panose="020B0502040204020203" pitchFamily="34" charset="0"/>
-                <a:cs typeface="Segoe UI" panose="020B0502040204020203" pitchFamily="34" charset="0"/>
-              </a:rPr>
-              <a:t> </a:t>
-            </a:r>
-            <a:r>
-              <a:rPr lang="en-US" sz="2000" dirty="0" err="1">
-                <a:latin typeface="Segoe UI" panose="020B0502040204020203" pitchFamily="34" charset="0"/>
-                <a:cs typeface="Segoe UI" panose="020B0502040204020203" pitchFamily="34" charset="0"/>
-              </a:rPr>
-              <a:t>thô</a:t>
             </a:r>
             <a:r>
               <a:rPr lang="en-US" sz="2000" dirty="0">
@@ -16399,11 +16550,18 @@
               <a:buNone/>
             </a:pPr>
             <a:r>
+              <a:rPr lang="en-US" sz="2000" dirty="0" smtClean="0">
+                <a:latin typeface="Segoe UI" panose="020B0502040204020203" pitchFamily="34" charset="0"/>
+                <a:cs typeface="Segoe UI" panose="020B0502040204020203" pitchFamily="34" charset="0"/>
+              </a:rPr>
+              <a:t>VD </a:t>
+            </a:r>
+            <a:r>
               <a:rPr lang="en-US" sz="2000" dirty="0">
                 <a:latin typeface="Segoe UI" panose="020B0502040204020203" pitchFamily="34" charset="0"/>
                 <a:cs typeface="Segoe UI" panose="020B0502040204020203" pitchFamily="34" charset="0"/>
               </a:rPr>
-              <a:t> VD : </a:t>
+              <a:t>: </a:t>
             </a:r>
             <a:r>
               <a:rPr lang="en-US" sz="2000" dirty="0" err="1">
@@ -16752,13 +16910,13 @@
           <p:nvPr>
             <p:extLst>
               <p:ext uri="{D42A27DB-BD31-4B8C-83A1-F6EECF244321}">
-                <p14:modId xmlns:p14="http://schemas.microsoft.com/office/powerpoint/2010/main" val="4201352979"/>
+                <p14:modId xmlns:p14="http://schemas.microsoft.com/office/powerpoint/2010/main" val="4035869712"/>
               </p:ext>
             </p:extLst>
           </p:nvPr>
         </p:nvGraphicFramePr>
         <p:xfrm>
-          <a:off x="5608320" y="2731152"/>
+          <a:off x="5608320" y="2893077"/>
           <a:ext cx="6083300" cy="1723596"/>
         </p:xfrm>
         <a:graphic>
@@ -16771,14 +16929,14 @@
                 <a:gridCol w="4061460">
                   <a:extLst>
                     <a:ext uri="{9D8B030D-6E8A-4147-A177-3AD203B41FA5}">
-                      <a16:colId xmlns:a16="http://schemas.microsoft.com/office/drawing/2014/main" xmlns="" val="20000"/>
+                      <a16:colId xmlns="" xmlns:a16="http://schemas.microsoft.com/office/drawing/2014/main" val="20000"/>
                     </a:ext>
                   </a:extLst>
                 </a:gridCol>
                 <a:gridCol w="2021840">
                   <a:extLst>
                     <a:ext uri="{9D8B030D-6E8A-4147-A177-3AD203B41FA5}">
-                      <a16:colId xmlns:a16="http://schemas.microsoft.com/office/drawing/2014/main" xmlns="" val="20001"/>
+                      <a16:colId xmlns="" xmlns:a16="http://schemas.microsoft.com/office/drawing/2014/main" val="20001"/>
                     </a:ext>
                   </a:extLst>
                 </a:gridCol>
@@ -16850,7 +17008,7 @@
                 </a:tc>
                 <a:extLst>
                   <a:ext uri="{0D108BD9-81ED-4DB2-BD59-A6C34878D82A}">
-                    <a16:rowId xmlns:a16="http://schemas.microsoft.com/office/drawing/2014/main" xmlns="" val="10000"/>
+                    <a16:rowId xmlns="" xmlns:a16="http://schemas.microsoft.com/office/drawing/2014/main" val="10000"/>
                   </a:ext>
                 </a:extLst>
               </a:tr>
@@ -16959,7 +17117,7 @@
                 </a:tc>
                 <a:extLst>
                   <a:ext uri="{0D108BD9-81ED-4DB2-BD59-A6C34878D82A}">
-                    <a16:rowId xmlns:a16="http://schemas.microsoft.com/office/drawing/2014/main" xmlns="" val="10001"/>
+                    <a16:rowId xmlns="" xmlns:a16="http://schemas.microsoft.com/office/drawing/2014/main" val="10001"/>
                   </a:ext>
                 </a:extLst>
               </a:tr>
@@ -17100,7 +17258,7 @@
                 </a:tc>
                 <a:extLst>
                   <a:ext uri="{0D108BD9-81ED-4DB2-BD59-A6C34878D82A}">
-                    <a16:rowId xmlns:a16="http://schemas.microsoft.com/office/drawing/2014/main" xmlns="" val="10002"/>
+                    <a16:rowId xmlns="" xmlns:a16="http://schemas.microsoft.com/office/drawing/2014/main" val="10002"/>
                   </a:ext>
                 </a:extLst>
               </a:tr>
@@ -17118,7 +17276,7 @@
         </p:nvCxnSpPr>
         <p:spPr>
           <a:xfrm flipH="1">
-            <a:off x="8648700" y="4454748"/>
+            <a:off x="8648700" y="4616673"/>
             <a:ext cx="1270" cy="589692"/>
           </a:xfrm>
           <a:prstGeom prst="straightConnector1">
@@ -17662,6 +17820,66 @@
               </a:rPr>
               <a:t> </a:t>
             </a:r>
+            <a:r>
+              <a:rPr lang="en-US" sz="1900" dirty="0" smtClean="0">
+                <a:latin typeface="Segoe UI" panose="020B0502040204020203" pitchFamily="34" charset="0"/>
+                <a:cs typeface="Segoe UI" panose="020B0502040204020203" pitchFamily="34" charset="0"/>
+              </a:rPr>
+              <a:t>, </a:t>
+            </a:r>
+            <a:r>
+              <a:rPr lang="en-US" sz="1900" dirty="0" err="1" smtClean="0">
+                <a:latin typeface="Segoe UI" panose="020B0502040204020203" pitchFamily="34" charset="0"/>
+                <a:cs typeface="Segoe UI" panose="020B0502040204020203" pitchFamily="34" charset="0"/>
+              </a:rPr>
+              <a:t>Khoảng</a:t>
+            </a:r>
+            <a:r>
+              <a:rPr lang="en-US" sz="1900" dirty="0" smtClean="0">
+                <a:latin typeface="Segoe UI" panose="020B0502040204020203" pitchFamily="34" charset="0"/>
+                <a:cs typeface="Segoe UI" panose="020B0502040204020203" pitchFamily="34" charset="0"/>
+              </a:rPr>
+              <a:t> </a:t>
+            </a:r>
+            <a:r>
+              <a:rPr lang="en-US" sz="1900" dirty="0" err="1" smtClean="0">
+                <a:latin typeface="Segoe UI" panose="020B0502040204020203" pitchFamily="34" charset="0"/>
+                <a:cs typeface="Segoe UI" panose="020B0502040204020203" pitchFamily="34" charset="0"/>
+              </a:rPr>
+              <a:t>cách</a:t>
+            </a:r>
+            <a:r>
+              <a:rPr lang="en-US" sz="1900" dirty="0" smtClean="0">
+                <a:latin typeface="Segoe UI" panose="020B0502040204020203" pitchFamily="34" charset="0"/>
+                <a:cs typeface="Segoe UI" panose="020B0502040204020203" pitchFamily="34" charset="0"/>
+              </a:rPr>
+              <a:t> </a:t>
+            </a:r>
+            <a:r>
+              <a:rPr lang="en-US" sz="1900" dirty="0" err="1" smtClean="0">
+                <a:latin typeface="Segoe UI" panose="020B0502040204020203" pitchFamily="34" charset="0"/>
+                <a:cs typeface="Segoe UI" panose="020B0502040204020203" pitchFamily="34" charset="0"/>
+              </a:rPr>
+              <a:t>đường</a:t>
+            </a:r>
+            <a:r>
+              <a:rPr lang="en-US" sz="1900" dirty="0" smtClean="0">
+                <a:latin typeface="Segoe UI" panose="020B0502040204020203" pitchFamily="34" charset="0"/>
+                <a:cs typeface="Segoe UI" panose="020B0502040204020203" pitchFamily="34" charset="0"/>
+              </a:rPr>
+              <a:t> </a:t>
+            </a:r>
+            <a:r>
+              <a:rPr lang="en-US" sz="1900" dirty="0" err="1" smtClean="0">
+                <a:latin typeface="Segoe UI" panose="020B0502040204020203" pitchFamily="34" charset="0"/>
+                <a:cs typeface="Segoe UI" panose="020B0502040204020203" pitchFamily="34" charset="0"/>
+              </a:rPr>
+              <a:t>chính</a:t>
+            </a:r>
+            <a:endParaRPr lang="en-US" sz="1900" dirty="0">
+              <a:latin typeface="Segoe UI" panose="020B0502040204020203" pitchFamily="34" charset="0"/>
+              <a:cs typeface="Segoe UI" panose="020B0502040204020203" pitchFamily="34" charset="0"/>
+            </a:endParaRPr>
           </a:p>
           <a:p>
             <a:pPr lvl="1">
@@ -17921,287 +18139,14 @@
                 <a:latin typeface="Segoe UI" panose="020B0502040204020203" pitchFamily="34" charset="0"/>
                 <a:cs typeface="Segoe UI" panose="020B0502040204020203" pitchFamily="34" charset="0"/>
               </a:rPr>
-              <a:t> : </a:t>
-            </a:r>
-            <a:r>
-              <a:rPr lang="en-US" sz="2000" dirty="0" err="1">
-                <a:latin typeface="Segoe UI" panose="020B0502040204020203" pitchFamily="34" charset="0"/>
-                <a:cs typeface="Segoe UI" panose="020B0502040204020203" pitchFamily="34" charset="0"/>
-              </a:rPr>
-              <a:t>Mục</a:t>
-            </a:r>
-            <a:r>
-              <a:rPr lang="en-US" sz="2000" dirty="0">
-                <a:latin typeface="Segoe UI" panose="020B0502040204020203" pitchFamily="34" charset="0"/>
-                <a:cs typeface="Segoe UI" panose="020B0502040204020203" pitchFamily="34" charset="0"/>
-              </a:rPr>
-              <a:t> </a:t>
-            </a:r>
-            <a:r>
-              <a:rPr lang="en-US" sz="2000" dirty="0" err="1">
-                <a:latin typeface="Segoe UI" panose="020B0502040204020203" pitchFamily="34" charset="0"/>
-                <a:cs typeface="Segoe UI" panose="020B0502040204020203" pitchFamily="34" charset="0"/>
-              </a:rPr>
-              <a:t>đích</a:t>
-            </a:r>
-            <a:r>
-              <a:rPr lang="en-US" sz="2000" dirty="0">
-                <a:latin typeface="Segoe UI" panose="020B0502040204020203" pitchFamily="34" charset="0"/>
-                <a:cs typeface="Segoe UI" panose="020B0502040204020203" pitchFamily="34" charset="0"/>
-              </a:rPr>
-              <a:t> </a:t>
-            </a:r>
-            <a:r>
-              <a:rPr lang="en-US" sz="2000" dirty="0" err="1">
-                <a:latin typeface="Segoe UI" panose="020B0502040204020203" pitchFamily="34" charset="0"/>
-                <a:cs typeface="Segoe UI" panose="020B0502040204020203" pitchFamily="34" charset="0"/>
-              </a:rPr>
-              <a:t>hợp</a:t>
-            </a:r>
-            <a:r>
-              <a:rPr lang="en-US" sz="2000" dirty="0">
-                <a:latin typeface="Segoe UI" panose="020B0502040204020203" pitchFamily="34" charset="0"/>
-                <a:cs typeface="Segoe UI" panose="020B0502040204020203" pitchFamily="34" charset="0"/>
-              </a:rPr>
-              <a:t> </a:t>
-            </a:r>
-            <a:r>
-              <a:rPr lang="en-US" sz="2000" dirty="0" err="1">
-                <a:latin typeface="Segoe UI" panose="020B0502040204020203" pitchFamily="34" charset="0"/>
-                <a:cs typeface="Segoe UI" panose="020B0502040204020203" pitchFamily="34" charset="0"/>
-              </a:rPr>
-              <a:t>lệ</a:t>
-            </a:r>
-            <a:r>
-              <a:rPr lang="en-US" sz="2000" dirty="0">
-                <a:latin typeface="Segoe UI" panose="020B0502040204020203" pitchFamily="34" charset="0"/>
-                <a:cs typeface="Segoe UI" panose="020B0502040204020203" pitchFamily="34" charset="0"/>
-              </a:rPr>
-              <a:t> </a:t>
-            </a:r>
-            <a:r>
-              <a:rPr lang="en-US" sz="2000" dirty="0" err="1">
-                <a:latin typeface="Segoe UI" panose="020B0502040204020203" pitchFamily="34" charset="0"/>
-                <a:cs typeface="Segoe UI" panose="020B0502040204020203" pitchFamily="34" charset="0"/>
-              </a:rPr>
-              <a:t>hóa</a:t>
-            </a:r>
-            <a:r>
-              <a:rPr lang="en-US" sz="2000" dirty="0">
-                <a:latin typeface="Segoe UI" panose="020B0502040204020203" pitchFamily="34" charset="0"/>
-                <a:cs typeface="Segoe UI" panose="020B0502040204020203" pitchFamily="34" charset="0"/>
-              </a:rPr>
-              <a:t> </a:t>
-            </a:r>
-            <a:r>
-              <a:rPr lang="en-US" sz="2000" dirty="0" err="1">
-                <a:latin typeface="Segoe UI" panose="020B0502040204020203" pitchFamily="34" charset="0"/>
-                <a:cs typeface="Segoe UI" panose="020B0502040204020203" pitchFamily="34" charset="0"/>
-              </a:rPr>
-              <a:t>đầu</a:t>
-            </a:r>
-            <a:r>
-              <a:rPr lang="en-US" sz="2000" dirty="0">
-                <a:latin typeface="Segoe UI" panose="020B0502040204020203" pitchFamily="34" charset="0"/>
-                <a:cs typeface="Segoe UI" panose="020B0502040204020203" pitchFamily="34" charset="0"/>
-              </a:rPr>
-              <a:t> </a:t>
-            </a:r>
-            <a:r>
-              <a:rPr lang="en-US" sz="2000" dirty="0" err="1">
-                <a:latin typeface="Segoe UI" panose="020B0502040204020203" pitchFamily="34" charset="0"/>
-                <a:cs typeface="Segoe UI" panose="020B0502040204020203" pitchFamily="34" charset="0"/>
-              </a:rPr>
-              <a:t>vào</a:t>
-            </a:r>
-            <a:r>
-              <a:rPr lang="en-US" sz="2000" dirty="0">
-                <a:latin typeface="Segoe UI" panose="020B0502040204020203" pitchFamily="34" charset="0"/>
-                <a:cs typeface="Segoe UI" panose="020B0502040204020203" pitchFamily="34" charset="0"/>
-              </a:rPr>
-              <a:t> </a:t>
-            </a:r>
-            <a:r>
-              <a:rPr lang="en-US" sz="2000" dirty="0" err="1">
-                <a:latin typeface="Segoe UI" panose="020B0502040204020203" pitchFamily="34" charset="0"/>
-                <a:cs typeface="Segoe UI" panose="020B0502040204020203" pitchFamily="34" charset="0"/>
-              </a:rPr>
-              <a:t>mạng</a:t>
-            </a:r>
-            <a:r>
-              <a:rPr lang="en-US" sz="2000" dirty="0">
-                <a:latin typeface="Segoe UI" panose="020B0502040204020203" pitchFamily="34" charset="0"/>
-                <a:cs typeface="Segoe UI" panose="020B0502040204020203" pitchFamily="34" charset="0"/>
-              </a:rPr>
-              <a:t> neural </a:t>
-            </a:r>
-            <a:r>
-              <a:rPr lang="en-US" sz="2000" dirty="0" err="1">
-                <a:latin typeface="Segoe UI" panose="020B0502040204020203" pitchFamily="34" charset="0"/>
-                <a:cs typeface="Segoe UI" panose="020B0502040204020203" pitchFamily="34" charset="0"/>
-              </a:rPr>
-              <a:t>đều</a:t>
-            </a:r>
-            <a:r>
-              <a:rPr lang="en-US" sz="2000" dirty="0">
-                <a:latin typeface="Segoe UI" panose="020B0502040204020203" pitchFamily="34" charset="0"/>
-                <a:cs typeface="Segoe UI" panose="020B0502040204020203" pitchFamily="34" charset="0"/>
-              </a:rPr>
-              <a:t> </a:t>
-            </a:r>
-            <a:r>
-              <a:rPr lang="en-US" sz="2000" dirty="0" err="1">
-                <a:latin typeface="Segoe UI" panose="020B0502040204020203" pitchFamily="34" charset="0"/>
-                <a:cs typeface="Segoe UI" panose="020B0502040204020203" pitchFamily="34" charset="0"/>
-              </a:rPr>
-              <a:t>phải</a:t>
-            </a:r>
-            <a:r>
-              <a:rPr lang="en-US" sz="2000" dirty="0">
-                <a:latin typeface="Segoe UI" panose="020B0502040204020203" pitchFamily="34" charset="0"/>
-                <a:cs typeface="Segoe UI" panose="020B0502040204020203" pitchFamily="34" charset="0"/>
-              </a:rPr>
-              <a:t> </a:t>
-            </a:r>
-            <a:r>
-              <a:rPr lang="en-US" sz="2000" dirty="0" err="1">
-                <a:latin typeface="Segoe UI" panose="020B0502040204020203" pitchFamily="34" charset="0"/>
-                <a:cs typeface="Segoe UI" panose="020B0502040204020203" pitchFamily="34" charset="0"/>
-              </a:rPr>
-              <a:t>là</a:t>
-            </a:r>
-            <a:r>
-              <a:rPr lang="en-US" sz="2000" dirty="0">
-                <a:latin typeface="Segoe UI" panose="020B0502040204020203" pitchFamily="34" charset="0"/>
-                <a:cs typeface="Segoe UI" panose="020B0502040204020203" pitchFamily="34" charset="0"/>
-              </a:rPr>
-              <a:t> </a:t>
-            </a:r>
-            <a:r>
-              <a:rPr lang="en-US" sz="2000" dirty="0" err="1">
-                <a:latin typeface="Segoe UI" panose="020B0502040204020203" pitchFamily="34" charset="0"/>
-                <a:cs typeface="Segoe UI" panose="020B0502040204020203" pitchFamily="34" charset="0"/>
-              </a:rPr>
-              <a:t>dạng</a:t>
-            </a:r>
-            <a:r>
-              <a:rPr lang="en-US" sz="2000" dirty="0">
-                <a:latin typeface="Segoe UI" panose="020B0502040204020203" pitchFamily="34" charset="0"/>
-                <a:cs typeface="Segoe UI" panose="020B0502040204020203" pitchFamily="34" charset="0"/>
-              </a:rPr>
-              <a:t> </a:t>
-            </a:r>
-            <a:r>
-              <a:rPr lang="en-US" sz="2000" dirty="0" err="1">
-                <a:latin typeface="Segoe UI" panose="020B0502040204020203" pitchFamily="34" charset="0"/>
-                <a:cs typeface="Segoe UI" panose="020B0502040204020203" pitchFamily="34" charset="0"/>
-              </a:rPr>
-              <a:t>số</a:t>
-            </a:r>
-            <a:r>
-              <a:rPr lang="en-US" sz="2000" dirty="0">
-                <a:latin typeface="Segoe UI" panose="020B0502040204020203" pitchFamily="34" charset="0"/>
-                <a:cs typeface="Segoe UI" panose="020B0502040204020203" pitchFamily="34" charset="0"/>
-              </a:rPr>
-              <a:t> </a:t>
-            </a:r>
-            <a:r>
-              <a:rPr lang="en-US" sz="2000" dirty="0" err="1">
-                <a:latin typeface="Segoe UI" panose="020B0502040204020203" pitchFamily="34" charset="0"/>
-                <a:cs typeface="Segoe UI" panose="020B0502040204020203" pitchFamily="34" charset="0"/>
-              </a:rPr>
-              <a:t>và</a:t>
-            </a:r>
-            <a:r>
-              <a:rPr lang="en-US" sz="2000" dirty="0">
-                <a:latin typeface="Segoe UI" panose="020B0502040204020203" pitchFamily="34" charset="0"/>
-                <a:cs typeface="Segoe UI" panose="020B0502040204020203" pitchFamily="34" charset="0"/>
-              </a:rPr>
-              <a:t> </a:t>
-            </a:r>
-            <a:r>
-              <a:rPr lang="en-US" sz="2000" dirty="0" err="1">
-                <a:latin typeface="Segoe UI" panose="020B0502040204020203" pitchFamily="34" charset="0"/>
-                <a:cs typeface="Segoe UI" panose="020B0502040204020203" pitchFamily="34" charset="0"/>
-              </a:rPr>
-              <a:t>giúp</a:t>
-            </a:r>
-            <a:r>
-              <a:rPr lang="en-US" sz="2000" dirty="0">
-                <a:latin typeface="Segoe UI" panose="020B0502040204020203" pitchFamily="34" charset="0"/>
-                <a:cs typeface="Segoe UI" panose="020B0502040204020203" pitchFamily="34" charset="0"/>
-              </a:rPr>
-              <a:t> </a:t>
-            </a:r>
-            <a:r>
-              <a:rPr lang="en-US" sz="2000" dirty="0" err="1">
-                <a:latin typeface="Segoe UI" panose="020B0502040204020203" pitchFamily="34" charset="0"/>
-                <a:cs typeface="Segoe UI" panose="020B0502040204020203" pitchFamily="34" charset="0"/>
-              </a:rPr>
-              <a:t>mô</a:t>
-            </a:r>
-            <a:r>
-              <a:rPr lang="en-US" sz="2000" dirty="0">
-                <a:latin typeface="Segoe UI" panose="020B0502040204020203" pitchFamily="34" charset="0"/>
-                <a:cs typeface="Segoe UI" panose="020B0502040204020203" pitchFamily="34" charset="0"/>
-              </a:rPr>
-              <a:t> </a:t>
-            </a:r>
-            <a:r>
-              <a:rPr lang="en-US" sz="2000" dirty="0" err="1">
-                <a:latin typeface="Segoe UI" panose="020B0502040204020203" pitchFamily="34" charset="0"/>
-                <a:cs typeface="Segoe UI" panose="020B0502040204020203" pitchFamily="34" charset="0"/>
-              </a:rPr>
-              <a:t>hình</a:t>
-            </a:r>
-            <a:r>
-              <a:rPr lang="en-US" sz="2000" dirty="0">
-                <a:latin typeface="Segoe UI" panose="020B0502040204020203" pitchFamily="34" charset="0"/>
-                <a:cs typeface="Segoe UI" panose="020B0502040204020203" pitchFamily="34" charset="0"/>
-              </a:rPr>
-              <a:t> </a:t>
-            </a:r>
-            <a:r>
-              <a:rPr lang="en-US" sz="2000" dirty="0" err="1">
-                <a:latin typeface="Segoe UI" panose="020B0502040204020203" pitchFamily="34" charset="0"/>
-                <a:cs typeface="Segoe UI" panose="020B0502040204020203" pitchFamily="34" charset="0"/>
-              </a:rPr>
-              <a:t>học</a:t>
-            </a:r>
-            <a:r>
-              <a:rPr lang="en-US" sz="2000" dirty="0">
-                <a:latin typeface="Segoe UI" panose="020B0502040204020203" pitchFamily="34" charset="0"/>
-                <a:cs typeface="Segoe UI" panose="020B0502040204020203" pitchFamily="34" charset="0"/>
-              </a:rPr>
-              <a:t> </a:t>
-            </a:r>
-            <a:r>
-              <a:rPr lang="en-US" sz="2000" dirty="0" err="1">
-                <a:latin typeface="Segoe UI" panose="020B0502040204020203" pitchFamily="34" charset="0"/>
-                <a:cs typeface="Segoe UI" panose="020B0502040204020203" pitchFamily="34" charset="0"/>
-              </a:rPr>
-              <a:t>nhanh</a:t>
-            </a:r>
-            <a:r>
-              <a:rPr lang="en-US" sz="2000" dirty="0">
-                <a:latin typeface="Segoe UI" panose="020B0502040204020203" pitchFamily="34" charset="0"/>
-                <a:cs typeface="Segoe UI" panose="020B0502040204020203" pitchFamily="34" charset="0"/>
-              </a:rPr>
-              <a:t> </a:t>
-            </a:r>
-            <a:r>
-              <a:rPr lang="en-US" sz="2000" dirty="0" err="1">
-                <a:latin typeface="Segoe UI" panose="020B0502040204020203" pitchFamily="34" charset="0"/>
-                <a:cs typeface="Segoe UI" panose="020B0502040204020203" pitchFamily="34" charset="0"/>
-              </a:rPr>
-              <a:t>hơn</a:t>
-            </a:r>
-            <a:r>
-              <a:rPr lang="en-US" sz="2000" dirty="0">
-                <a:latin typeface="Segoe UI" panose="020B0502040204020203" pitchFamily="34" charset="0"/>
-                <a:cs typeface="Segoe UI" panose="020B0502040204020203" pitchFamily="34" charset="0"/>
-              </a:rPr>
-              <a:t>.</a:t>
+              <a:t> </a:t>
+            </a:r>
+            <a:r>
+              <a:rPr lang="en-US" sz="2000" dirty="0" smtClean="0">
+                <a:latin typeface="Segoe UI" panose="020B0502040204020203" pitchFamily="34" charset="0"/>
+                <a:cs typeface="Segoe UI" panose="020B0502040204020203" pitchFamily="34" charset="0"/>
+              </a:rPr>
+              <a:t>:</a:t>
             </a:r>
           </a:p>
           <a:p>
@@ -18214,88 +18159,88 @@
               <a:buChar char="§"/>
             </a:pPr>
             <a:r>
-              <a:rPr lang="en-US" sz="1900" dirty="0" err="1">
+              <a:rPr lang="en-US" sz="1900" dirty="0" err="1" smtClean="0">
                 <a:latin typeface="Segoe UI" panose="020B0502040204020203" pitchFamily="34" charset="0"/>
                 <a:cs typeface="Segoe UI" panose="020B0502040204020203" pitchFamily="34" charset="0"/>
               </a:rPr>
               <a:t>Sử</a:t>
             </a:r>
             <a:r>
-              <a:rPr lang="en-US" sz="1900" dirty="0">
-                <a:latin typeface="Segoe UI" panose="020B0502040204020203" pitchFamily="34" charset="0"/>
-                <a:cs typeface="Segoe UI" panose="020B0502040204020203" pitchFamily="34" charset="0"/>
-              </a:rPr>
-              <a:t> </a:t>
-            </a:r>
-            <a:r>
-              <a:rPr lang="en-US" sz="1900" dirty="0" err="1">
+              <a:rPr lang="en-US" sz="1900" dirty="0" smtClean="0">
+                <a:latin typeface="Segoe UI" panose="020B0502040204020203" pitchFamily="34" charset="0"/>
+                <a:cs typeface="Segoe UI" panose="020B0502040204020203" pitchFamily="34" charset="0"/>
+              </a:rPr>
+              <a:t> </a:t>
+            </a:r>
+            <a:r>
+              <a:rPr lang="en-US" sz="1900" dirty="0" err="1" smtClean="0">
                 <a:latin typeface="Segoe UI" panose="020B0502040204020203" pitchFamily="34" charset="0"/>
                 <a:cs typeface="Segoe UI" panose="020B0502040204020203" pitchFamily="34" charset="0"/>
               </a:rPr>
               <a:t>dụng</a:t>
             </a:r>
             <a:r>
-              <a:rPr lang="en-US" sz="1900" dirty="0">
+              <a:rPr lang="en-US" sz="1900" dirty="0" smtClean="0">
                 <a:latin typeface="Segoe UI" panose="020B0502040204020203" pitchFamily="34" charset="0"/>
                 <a:cs typeface="Segoe UI" panose="020B0502040204020203" pitchFamily="34" charset="0"/>
               </a:rPr>
               <a:t> Normalize </a:t>
             </a:r>
             <a:r>
-              <a:rPr lang="en-US" sz="1900" dirty="0" err="1">
+              <a:rPr lang="en-US" sz="1900" dirty="0" err="1" smtClean="0">
                 <a:latin typeface="Segoe UI" panose="020B0502040204020203" pitchFamily="34" charset="0"/>
                 <a:cs typeface="Segoe UI" panose="020B0502040204020203" pitchFamily="34" charset="0"/>
               </a:rPr>
               <a:t>cho</a:t>
             </a:r>
             <a:r>
-              <a:rPr lang="en-US" sz="1900" dirty="0">
-                <a:latin typeface="Segoe UI" panose="020B0502040204020203" pitchFamily="34" charset="0"/>
-                <a:cs typeface="Segoe UI" panose="020B0502040204020203" pitchFamily="34" charset="0"/>
-              </a:rPr>
-              <a:t> </a:t>
-            </a:r>
-            <a:r>
-              <a:rPr lang="en-US" sz="1900" dirty="0" err="1">
+              <a:rPr lang="en-US" sz="1900" dirty="0" smtClean="0">
+                <a:latin typeface="Segoe UI" panose="020B0502040204020203" pitchFamily="34" charset="0"/>
+                <a:cs typeface="Segoe UI" panose="020B0502040204020203" pitchFamily="34" charset="0"/>
+              </a:rPr>
+              <a:t> </a:t>
+            </a:r>
+            <a:r>
+              <a:rPr lang="en-US" sz="1900" dirty="0" err="1" smtClean="0">
                 <a:latin typeface="Segoe UI" panose="020B0502040204020203" pitchFamily="34" charset="0"/>
                 <a:cs typeface="Segoe UI" panose="020B0502040204020203" pitchFamily="34" charset="0"/>
               </a:rPr>
               <a:t>các</a:t>
             </a:r>
             <a:r>
-              <a:rPr lang="en-US" sz="1900" dirty="0">
-                <a:latin typeface="Segoe UI" panose="020B0502040204020203" pitchFamily="34" charset="0"/>
-                <a:cs typeface="Segoe UI" panose="020B0502040204020203" pitchFamily="34" charset="0"/>
-              </a:rPr>
-              <a:t> </a:t>
-            </a:r>
-            <a:r>
-              <a:rPr lang="en-US" sz="1900" dirty="0" err="1">
+              <a:rPr lang="en-US" sz="1900" dirty="0" smtClean="0">
+                <a:latin typeface="Segoe UI" panose="020B0502040204020203" pitchFamily="34" charset="0"/>
+                <a:cs typeface="Segoe UI" panose="020B0502040204020203" pitchFamily="34" charset="0"/>
+              </a:rPr>
+              <a:t> </a:t>
+            </a:r>
+            <a:r>
+              <a:rPr lang="en-US" sz="1900" dirty="0" err="1" smtClean="0">
                 <a:latin typeface="Segoe UI" panose="020B0502040204020203" pitchFamily="34" charset="0"/>
                 <a:cs typeface="Segoe UI" panose="020B0502040204020203" pitchFamily="34" charset="0"/>
               </a:rPr>
               <a:t>thuộc</a:t>
             </a:r>
             <a:r>
-              <a:rPr lang="en-US" sz="1900" dirty="0">
-                <a:latin typeface="Segoe UI" panose="020B0502040204020203" pitchFamily="34" charset="0"/>
-                <a:cs typeface="Segoe UI" panose="020B0502040204020203" pitchFamily="34" charset="0"/>
-              </a:rPr>
-              <a:t> </a:t>
-            </a:r>
-            <a:r>
-              <a:rPr lang="en-US" sz="1900" dirty="0" err="1">
+              <a:rPr lang="en-US" sz="1900" dirty="0" smtClean="0">
+                <a:latin typeface="Segoe UI" panose="020B0502040204020203" pitchFamily="34" charset="0"/>
+                <a:cs typeface="Segoe UI" panose="020B0502040204020203" pitchFamily="34" charset="0"/>
+              </a:rPr>
+              <a:t> </a:t>
+            </a:r>
+            <a:r>
+              <a:rPr lang="en-US" sz="1900" dirty="0" err="1" smtClean="0">
                 <a:latin typeface="Segoe UI" panose="020B0502040204020203" pitchFamily="34" charset="0"/>
                 <a:cs typeface="Segoe UI" panose="020B0502040204020203" pitchFamily="34" charset="0"/>
               </a:rPr>
               <a:t>tính</a:t>
             </a:r>
             <a:r>
-              <a:rPr lang="en-US" sz="1900" dirty="0">
-                <a:latin typeface="Segoe UI" panose="020B0502040204020203" pitchFamily="34" charset="0"/>
-                <a:cs typeface="Segoe UI" panose="020B0502040204020203" pitchFamily="34" charset="0"/>
-              </a:rPr>
-              <a:t> number </a:t>
+              <a:rPr lang="en-US" sz="1900" dirty="0" smtClean="0">
+                <a:latin typeface="Segoe UI" panose="020B0502040204020203" pitchFamily="34" charset="0"/>
+                <a:cs typeface="Segoe UI" panose="020B0502040204020203" pitchFamily="34" charset="0"/>
+              </a:rPr>
+              <a:t> Number </a:t>
             </a:r>
           </a:p>
           <a:p>
@@ -18308,14 +18253,14 @@
               <a:buChar char="§"/>
             </a:pPr>
             <a:r>
-              <a:rPr lang="en-US" sz="1900" dirty="0" err="1">
+              <a:rPr lang="en-US" sz="1900" dirty="0" err="1" smtClean="0">
                 <a:latin typeface="Segoe UI" panose="020B0502040204020203" pitchFamily="34" charset="0"/>
                 <a:cs typeface="Segoe UI" panose="020B0502040204020203" pitchFamily="34" charset="0"/>
               </a:rPr>
               <a:t>Sử</a:t>
             </a:r>
             <a:r>
-              <a:rPr lang="en-US" sz="1900" dirty="0">
+              <a:rPr lang="en-US" sz="1900" dirty="0" smtClean="0">
                 <a:latin typeface="Segoe UI" panose="020B0502040204020203" pitchFamily="34" charset="0"/>
                 <a:cs typeface="Segoe UI" panose="020B0502040204020203" pitchFamily="34" charset="0"/>
               </a:rPr>
@@ -19196,14 +19141,14 @@
                 <a:gridCol w="3998007">
                   <a:extLst>
                     <a:ext uri="{9D8B030D-6E8A-4147-A177-3AD203B41FA5}">
-                      <a16:colId xmlns:a16="http://schemas.microsoft.com/office/drawing/2014/main" xmlns="" val="20000"/>
+                      <a16:colId xmlns="" xmlns:a16="http://schemas.microsoft.com/office/drawing/2014/main" val="20000"/>
                     </a:ext>
                   </a:extLst>
                 </a:gridCol>
                 <a:gridCol w="4368752">
                   <a:extLst>
                     <a:ext uri="{9D8B030D-6E8A-4147-A177-3AD203B41FA5}">
-                      <a16:colId xmlns:a16="http://schemas.microsoft.com/office/drawing/2014/main" xmlns="" val="20001"/>
+                      <a16:colId xmlns="" xmlns:a16="http://schemas.microsoft.com/office/drawing/2014/main" val="20001"/>
                     </a:ext>
                   </a:extLst>
                 </a:gridCol>
@@ -19328,7 +19273,7 @@
                 </a:tc>
                 <a:extLst>
                   <a:ext uri="{0D108BD9-81ED-4DB2-BD59-A6C34878D82A}">
-                    <a16:rowId xmlns:a16="http://schemas.microsoft.com/office/drawing/2014/main" xmlns="" val="10000"/>
+                    <a16:rowId xmlns="" xmlns:a16="http://schemas.microsoft.com/office/drawing/2014/main" val="10000"/>
                   </a:ext>
                 </a:extLst>
               </a:tr>
@@ -19447,7 +19392,7 @@
                 </a:tc>
                 <a:extLst>
                   <a:ext uri="{0D108BD9-81ED-4DB2-BD59-A6C34878D82A}">
-                    <a16:rowId xmlns:a16="http://schemas.microsoft.com/office/drawing/2014/main" xmlns="" val="10001"/>
+                    <a16:rowId xmlns="" xmlns:a16="http://schemas.microsoft.com/office/drawing/2014/main" val="10001"/>
                   </a:ext>
                 </a:extLst>
               </a:tr>
@@ -19584,7 +19529,7 @@
                 </a:tc>
                 <a:extLst>
                   <a:ext uri="{0D108BD9-81ED-4DB2-BD59-A6C34878D82A}">
-                    <a16:rowId xmlns:a16="http://schemas.microsoft.com/office/drawing/2014/main" xmlns="" val="10002"/>
+                    <a16:rowId xmlns="" xmlns:a16="http://schemas.microsoft.com/office/drawing/2014/main" val="10002"/>
                   </a:ext>
                 </a:extLst>
               </a:tr>
@@ -19777,7 +19722,7 @@
                 </a:tc>
                 <a:extLst>
                   <a:ext uri="{0D108BD9-81ED-4DB2-BD59-A6C34878D82A}">
-                    <a16:rowId xmlns:a16="http://schemas.microsoft.com/office/drawing/2014/main" xmlns="" val="10003"/>
+                    <a16:rowId xmlns="" xmlns:a16="http://schemas.microsoft.com/office/drawing/2014/main" val="10003"/>
                   </a:ext>
                 </a:extLst>
               </a:tr>
@@ -19956,7 +19901,7 @@
                 </a:tc>
                 <a:extLst>
                   <a:ext uri="{0D108BD9-81ED-4DB2-BD59-A6C34878D82A}">
-                    <a16:rowId xmlns:a16="http://schemas.microsoft.com/office/drawing/2014/main" xmlns="" val="10004"/>
+                    <a16:rowId xmlns="" xmlns:a16="http://schemas.microsoft.com/office/drawing/2014/main" val="10004"/>
                   </a:ext>
                 </a:extLst>
               </a:tr>
@@ -20128,7 +20073,7 @@
                 </a:tc>
                 <a:extLst>
                   <a:ext uri="{0D108BD9-81ED-4DB2-BD59-A6C34878D82A}">
-                    <a16:rowId xmlns:a16="http://schemas.microsoft.com/office/drawing/2014/main" xmlns="" val="10005"/>
+                    <a16:rowId xmlns="" xmlns:a16="http://schemas.microsoft.com/office/drawing/2014/main" val="10005"/>
                   </a:ext>
                 </a:extLst>
               </a:tr>
@@ -23429,147 +23374,196 @@
               <a:t>: </a:t>
             </a:r>
             <a:r>
-              <a:rPr lang="vi-VN" sz="2200" dirty="0">
-                <a:latin typeface="Segoe UI" panose="020B0502040204020203" pitchFamily="34" charset="0"/>
-                <a:cs typeface="Segoe UI" panose="020B0502040204020203" pitchFamily="34" charset="0"/>
-              </a:rPr>
-              <a:t>B</a:t>
-            </a:r>
-            <a:r>
-              <a:rPr lang="en-US" sz="2200" dirty="0" err="1">
-                <a:latin typeface="Segoe UI" panose="020B0502040204020203" pitchFamily="34" charset="0"/>
-                <a:cs typeface="Segoe UI" panose="020B0502040204020203" pitchFamily="34" charset="0"/>
-              </a:rPr>
-              <a:t>ài</a:t>
-            </a:r>
-            <a:r>
-              <a:rPr lang="en-US" sz="2200" dirty="0">
-                <a:latin typeface="Segoe UI" panose="020B0502040204020203" pitchFamily="34" charset="0"/>
-                <a:cs typeface="Segoe UI" panose="020B0502040204020203" pitchFamily="34" charset="0"/>
-              </a:rPr>
-              <a:t> </a:t>
-            </a:r>
-            <a:r>
-              <a:rPr lang="en-US" sz="2200" dirty="0" err="1">
+              <a:rPr lang="en-US" sz="2200" dirty="0" err="1" smtClean="0">
+                <a:latin typeface="Segoe UI" panose="020B0502040204020203" pitchFamily="34" charset="0"/>
+                <a:cs typeface="Segoe UI" panose="020B0502040204020203" pitchFamily="34" charset="0"/>
+              </a:rPr>
+              <a:t>Đối</a:t>
+            </a:r>
+            <a:r>
+              <a:rPr lang="en-US" sz="2200" dirty="0" smtClean="0">
+                <a:latin typeface="Segoe UI" panose="020B0502040204020203" pitchFamily="34" charset="0"/>
+                <a:cs typeface="Segoe UI" panose="020B0502040204020203" pitchFamily="34" charset="0"/>
+              </a:rPr>
+              <a:t> </a:t>
+            </a:r>
+            <a:r>
+              <a:rPr lang="en-US" sz="2200" dirty="0" err="1" smtClean="0">
+                <a:latin typeface="Segoe UI" panose="020B0502040204020203" pitchFamily="34" charset="0"/>
+                <a:cs typeface="Segoe UI" panose="020B0502040204020203" pitchFamily="34" charset="0"/>
+              </a:rPr>
+              <a:t>với</a:t>
+            </a:r>
+            <a:r>
+              <a:rPr lang="en-US" sz="2200" dirty="0" smtClean="0">
+                <a:latin typeface="Segoe UI" panose="020B0502040204020203" pitchFamily="34" charset="0"/>
+                <a:cs typeface="Segoe UI" panose="020B0502040204020203" pitchFamily="34" charset="0"/>
+              </a:rPr>
+              <a:t> </a:t>
+            </a:r>
+            <a:r>
+              <a:rPr lang="en-US" sz="2200" dirty="0" err="1" smtClean="0">
+                <a:latin typeface="Segoe UI" panose="020B0502040204020203" pitchFamily="34" charset="0"/>
+                <a:cs typeface="Segoe UI" panose="020B0502040204020203" pitchFamily="34" charset="0"/>
+              </a:rPr>
+              <a:t>các</a:t>
+            </a:r>
+            <a:r>
+              <a:rPr lang="en-US" sz="2200" dirty="0" smtClean="0">
+                <a:latin typeface="Segoe UI" panose="020B0502040204020203" pitchFamily="34" charset="0"/>
+                <a:cs typeface="Segoe UI" panose="020B0502040204020203" pitchFamily="34" charset="0"/>
+              </a:rPr>
+              <a:t> </a:t>
+            </a:r>
+            <a:r>
+              <a:rPr lang="en-US" sz="2200" dirty="0" err="1" smtClean="0">
+                <a:latin typeface="Segoe UI" panose="020B0502040204020203" pitchFamily="34" charset="0"/>
+                <a:cs typeface="Segoe UI" panose="020B0502040204020203" pitchFamily="34" charset="0"/>
+              </a:rPr>
+              <a:t>bài</a:t>
+            </a:r>
+            <a:r>
+              <a:rPr lang="en-US" sz="2200" dirty="0" smtClean="0">
+                <a:latin typeface="Segoe UI" panose="020B0502040204020203" pitchFamily="34" charset="0"/>
+                <a:cs typeface="Segoe UI" panose="020B0502040204020203" pitchFamily="34" charset="0"/>
+              </a:rPr>
+              <a:t> </a:t>
+            </a:r>
+            <a:r>
+              <a:rPr lang="en-US" sz="2200" dirty="0" err="1" smtClean="0">
                 <a:latin typeface="Segoe UI" panose="020B0502040204020203" pitchFamily="34" charset="0"/>
                 <a:cs typeface="Segoe UI" panose="020B0502040204020203" pitchFamily="34" charset="0"/>
               </a:rPr>
               <a:t>toán</a:t>
             </a:r>
             <a:r>
-              <a:rPr lang="en-US" sz="2200" dirty="0">
-                <a:latin typeface="Segoe UI" panose="020B0502040204020203" pitchFamily="34" charset="0"/>
-                <a:cs typeface="Segoe UI" panose="020B0502040204020203" pitchFamily="34" charset="0"/>
-              </a:rPr>
-              <a:t> </a:t>
-            </a:r>
-            <a:r>
-              <a:rPr lang="vi-VN" sz="2200" dirty="0">
-                <a:latin typeface="Segoe UI" panose="020B0502040204020203" pitchFamily="34" charset="0"/>
-                <a:cs typeface="Segoe UI" panose="020B0502040204020203" pitchFamily="34" charset="0"/>
-              </a:rPr>
-              <a:t>dự báo </a:t>
-            </a:r>
-            <a:r>
-              <a:rPr lang="en-US" sz="2200" dirty="0" err="1">
+              <a:rPr lang="en-US" sz="2200" dirty="0" smtClean="0">
+                <a:latin typeface="Segoe UI" panose="020B0502040204020203" pitchFamily="34" charset="0"/>
+                <a:cs typeface="Segoe UI" panose="020B0502040204020203" pitchFamily="34" charset="0"/>
+              </a:rPr>
+              <a:t> </a:t>
+            </a:r>
+            <a:r>
+              <a:rPr lang="en-US" sz="2200" dirty="0" err="1" smtClean="0">
+                <a:latin typeface="Segoe UI" panose="020B0502040204020203" pitchFamily="34" charset="0"/>
+                <a:cs typeface="Segoe UI" panose="020B0502040204020203" pitchFamily="34" charset="0"/>
+              </a:rPr>
+              <a:t>hồi</a:t>
+            </a:r>
+            <a:r>
+              <a:rPr lang="en-US" sz="2200" dirty="0" smtClean="0">
+                <a:latin typeface="Segoe UI" panose="020B0502040204020203" pitchFamily="34" charset="0"/>
+                <a:cs typeface="Segoe UI" panose="020B0502040204020203" pitchFamily="34" charset="0"/>
+              </a:rPr>
+              <a:t> </a:t>
+            </a:r>
+            <a:r>
+              <a:rPr lang="en-US" sz="2200" dirty="0" err="1" smtClean="0">
+                <a:latin typeface="Segoe UI" panose="020B0502040204020203" pitchFamily="34" charset="0"/>
+                <a:cs typeface="Segoe UI" panose="020B0502040204020203" pitchFamily="34" charset="0"/>
+              </a:rPr>
+              <a:t>quy</a:t>
+            </a:r>
+            <a:r>
+              <a:rPr lang="en-US" sz="2200" dirty="0" smtClean="0">
+                <a:latin typeface="Segoe UI" panose="020B0502040204020203" pitchFamily="34" charset="0"/>
+                <a:cs typeface="Segoe UI" panose="020B0502040204020203" pitchFamily="34" charset="0"/>
+              </a:rPr>
+              <a:t> </a:t>
+            </a:r>
+            <a:r>
+              <a:rPr lang="en-US" sz="2200" dirty="0" err="1" smtClean="0">
                 <a:latin typeface="Segoe UI" panose="020B0502040204020203" pitchFamily="34" charset="0"/>
                 <a:cs typeface="Segoe UI" panose="020B0502040204020203" pitchFamily="34" charset="0"/>
               </a:rPr>
               <a:t>giá</a:t>
             </a:r>
             <a:r>
-              <a:rPr lang="en-US" sz="2200" dirty="0">
-                <a:latin typeface="Segoe UI" panose="020B0502040204020203" pitchFamily="34" charset="0"/>
-                <a:cs typeface="Segoe UI" panose="020B0502040204020203" pitchFamily="34" charset="0"/>
-              </a:rPr>
-              <a:t> </a:t>
-            </a:r>
-            <a:r>
-              <a:rPr lang="vi-VN" sz="2200" dirty="0">
-                <a:latin typeface="Segoe UI" panose="020B0502040204020203" pitchFamily="34" charset="0"/>
-                <a:cs typeface="Segoe UI" panose="020B0502040204020203" pitchFamily="34" charset="0"/>
-              </a:rPr>
-              <a:t>phòng có đầu ra là </a:t>
-            </a:r>
-            <a:r>
-              <a:rPr lang="en-US" sz="2200" dirty="0" err="1">
-                <a:latin typeface="Segoe UI" panose="020B0502040204020203" pitchFamily="34" charset="0"/>
-                <a:cs typeface="Segoe UI" panose="020B0502040204020203" pitchFamily="34" charset="0"/>
-              </a:rPr>
-              <a:t>giá</a:t>
-            </a:r>
-            <a:r>
-              <a:rPr lang="en-US" sz="2200" dirty="0">
-                <a:latin typeface="Segoe UI" panose="020B0502040204020203" pitchFamily="34" charset="0"/>
-                <a:cs typeface="Segoe UI" panose="020B0502040204020203" pitchFamily="34" charset="0"/>
-              </a:rPr>
-              <a:t> </a:t>
-            </a:r>
-            <a:r>
-              <a:rPr lang="en-US" sz="2200" dirty="0" err="1">
+              <a:rPr lang="en-US" sz="2200" dirty="0" smtClean="0">
+                <a:latin typeface="Segoe UI" panose="020B0502040204020203" pitchFamily="34" charset="0"/>
+                <a:cs typeface="Segoe UI" panose="020B0502040204020203" pitchFamily="34" charset="0"/>
+              </a:rPr>
+              <a:t> </a:t>
+            </a:r>
+            <a:r>
+              <a:rPr lang="en-US" sz="2200" dirty="0" err="1" smtClean="0">
                 <a:latin typeface="Segoe UI" panose="020B0502040204020203" pitchFamily="34" charset="0"/>
                 <a:cs typeface="Segoe UI" panose="020B0502040204020203" pitchFamily="34" charset="0"/>
               </a:rPr>
               <a:t>trị</a:t>
             </a:r>
             <a:r>
-              <a:rPr lang="en-US" sz="2200" dirty="0">
-                <a:latin typeface="Segoe UI" panose="020B0502040204020203" pitchFamily="34" charset="0"/>
-                <a:cs typeface="Segoe UI" panose="020B0502040204020203" pitchFamily="34" charset="0"/>
-              </a:rPr>
-              <a:t> </a:t>
-            </a:r>
-            <a:r>
-              <a:rPr lang="en-US" sz="2200" dirty="0" err="1">
+              <a:rPr lang="en-US" sz="2200" dirty="0" smtClean="0">
+                <a:latin typeface="Segoe UI" panose="020B0502040204020203" pitchFamily="34" charset="0"/>
+                <a:cs typeface="Segoe UI" panose="020B0502040204020203" pitchFamily="34" charset="0"/>
+              </a:rPr>
+              <a:t> </a:t>
+            </a:r>
+            <a:r>
+              <a:rPr lang="en-US" sz="2200" dirty="0" err="1" smtClean="0">
+                <a:latin typeface="Segoe UI" panose="020B0502040204020203" pitchFamily="34" charset="0"/>
+                <a:cs typeface="Segoe UI" panose="020B0502040204020203" pitchFamily="34" charset="0"/>
+              </a:rPr>
+              <a:t>thực</a:t>
+            </a:r>
+            <a:r>
+              <a:rPr lang="en-US" sz="2200" dirty="0" smtClean="0">
+                <a:latin typeface="Segoe UI" panose="020B0502040204020203" pitchFamily="34" charset="0"/>
+                <a:cs typeface="Segoe UI" panose="020B0502040204020203" pitchFamily="34" charset="0"/>
+              </a:rPr>
+              <a:t> </a:t>
+            </a:r>
+            <a:r>
+              <a:rPr lang="en-US" sz="2200" dirty="0" err="1" smtClean="0">
                 <a:latin typeface="Segoe UI" panose="020B0502040204020203" pitchFamily="34" charset="0"/>
                 <a:cs typeface="Segoe UI" panose="020B0502040204020203" pitchFamily="34" charset="0"/>
               </a:rPr>
               <a:t>không</a:t>
             </a:r>
             <a:r>
-              <a:rPr lang="en-US" sz="2200" dirty="0">
-                <a:latin typeface="Segoe UI" panose="020B0502040204020203" pitchFamily="34" charset="0"/>
-                <a:cs typeface="Segoe UI" panose="020B0502040204020203" pitchFamily="34" charset="0"/>
-              </a:rPr>
-              <a:t> </a:t>
-            </a:r>
-            <a:r>
-              <a:rPr lang="en-US" sz="2200" dirty="0" err="1">
-                <a:latin typeface="Segoe UI" panose="020B0502040204020203" pitchFamily="34" charset="0"/>
-                <a:cs typeface="Segoe UI" panose="020B0502040204020203" pitchFamily="34" charset="0"/>
-              </a:rPr>
-              <a:t>âm</a:t>
-            </a:r>
-            <a:r>
-              <a:rPr lang="en-US" sz="2200" dirty="0">
-                <a:latin typeface="Segoe UI" panose="020B0502040204020203" pitchFamily="34" charset="0"/>
-                <a:cs typeface="Segoe UI" panose="020B0502040204020203" pitchFamily="34" charset="0"/>
-              </a:rPr>
-              <a:t> </a:t>
-            </a:r>
-            <a:r>
-              <a:rPr lang="en-US" sz="2200" dirty="0" err="1">
-                <a:latin typeface="Segoe UI" panose="020B0502040204020203" pitchFamily="34" charset="0"/>
-                <a:cs typeface="Segoe UI" panose="020B0502040204020203" pitchFamily="34" charset="0"/>
-              </a:rPr>
-              <a:t>nên</a:t>
-            </a:r>
-            <a:r>
-              <a:rPr lang="en-US" sz="2200" dirty="0">
-                <a:latin typeface="Segoe UI" panose="020B0502040204020203" pitchFamily="34" charset="0"/>
-                <a:cs typeface="Segoe UI" panose="020B0502040204020203" pitchFamily="34" charset="0"/>
-              </a:rPr>
-              <a:t> ta </a:t>
+              <a:rPr lang="en-US" sz="2200" dirty="0" smtClean="0">
+                <a:latin typeface="Segoe UI" panose="020B0502040204020203" pitchFamily="34" charset="0"/>
+                <a:cs typeface="Segoe UI" panose="020B0502040204020203" pitchFamily="34" charset="0"/>
+              </a:rPr>
+              <a:t> </a:t>
             </a:r>
             <a:r>
               <a:rPr lang="en-US" sz="2200" dirty="0" err="1" smtClean="0">
                 <a:latin typeface="Segoe UI" panose="020B0502040204020203" pitchFamily="34" charset="0"/>
                 <a:cs typeface="Segoe UI" panose="020B0502040204020203" pitchFamily="34" charset="0"/>
               </a:rPr>
-              <a:t>chọn</a:t>
-            </a:r>
-            <a:r>
-              <a:rPr lang="en-US" sz="2200" dirty="0">
+              <a:t>giới</a:t>
+            </a:r>
+            <a:r>
+              <a:rPr lang="en-US" sz="2200" dirty="0" smtClean="0">
+                <a:latin typeface="Segoe UI" panose="020B0502040204020203" pitchFamily="34" charset="0"/>
+                <a:cs typeface="Segoe UI" panose="020B0502040204020203" pitchFamily="34" charset="0"/>
+              </a:rPr>
+              <a:t> </a:t>
+            </a:r>
+            <a:r>
+              <a:rPr lang="en-US" sz="2200" dirty="0" err="1" smtClean="0">
+                <a:latin typeface="Segoe UI" panose="020B0502040204020203" pitchFamily="34" charset="0"/>
+                <a:cs typeface="Segoe UI" panose="020B0502040204020203" pitchFamily="34" charset="0"/>
+              </a:rPr>
+              <a:t>hạn</a:t>
+            </a:r>
+            <a:r>
+              <a:rPr lang="en-US" sz="2200" dirty="0" smtClean="0">
+                <a:latin typeface="Segoe UI" panose="020B0502040204020203" pitchFamily="34" charset="0"/>
+                <a:cs typeface="Segoe UI" panose="020B0502040204020203" pitchFamily="34" charset="0"/>
+              </a:rPr>
+              <a:t> </a:t>
+            </a:r>
+            <a:r>
+              <a:rPr lang="en-US" sz="2200" dirty="0" err="1" smtClean="0">
+                <a:latin typeface="Segoe UI" panose="020B0502040204020203" pitchFamily="34" charset="0"/>
+                <a:cs typeface="Segoe UI" panose="020B0502040204020203" pitchFamily="34" charset="0"/>
+              </a:rPr>
+              <a:t>có</a:t>
+            </a:r>
+            <a:r>
+              <a:rPr lang="en-US" sz="2200" dirty="0" smtClean="0">
                 <a:latin typeface="Segoe UI" panose="020B0502040204020203" pitchFamily="34" charset="0"/>
                 <a:cs typeface="Segoe UI" panose="020B0502040204020203" pitchFamily="34" charset="0"/>
               </a:rPr>
@@ -23683,11 +23677,25 @@
               <a:t>: </a:t>
             </a:r>
             <a:r>
-              <a:rPr lang="en-US" sz="2200" dirty="0" err="1">
-                <a:latin typeface="Segoe UI" panose="020B0502040204020203" pitchFamily="34" charset="0"/>
-                <a:cs typeface="Segoe UI" panose="020B0502040204020203" pitchFamily="34" charset="0"/>
-              </a:rPr>
-              <a:t>Đối</a:t>
+              <a:rPr lang="en-US" sz="2200" dirty="0" smtClean="0">
+                <a:latin typeface="Segoe UI" panose="020B0502040204020203" pitchFamily="34" charset="0"/>
+                <a:cs typeface="Segoe UI" panose="020B0502040204020203" pitchFamily="34" charset="0"/>
+              </a:rPr>
+              <a:t>Ta </a:t>
+            </a:r>
+            <a:r>
+              <a:rPr lang="vi-VN" sz="2200" dirty="0" smtClean="0">
+                <a:latin typeface="Segoe UI" panose="020B0502040204020203" pitchFamily="34" charset="0"/>
+                <a:cs typeface="Segoe UI" panose="020B0502040204020203" pitchFamily="34" charset="0"/>
+              </a:rPr>
+              <a:t>sử </a:t>
+            </a:r>
+            <a:r>
+              <a:rPr lang="vi-VN" sz="2200" dirty="0">
+                <a:latin typeface="Segoe UI" panose="020B0502040204020203" pitchFamily="34" charset="0"/>
+                <a:cs typeface="Segoe UI" panose="020B0502040204020203" pitchFamily="34" charset="0"/>
+              </a:rPr>
+              <a:t>dụng</a:t>
             </a:r>
             <a:r>
               <a:rPr lang="en-US" sz="2200" dirty="0">
@@ -23697,145 +23705,149 @@
               <a:t> </a:t>
             </a:r>
             <a:r>
-              <a:rPr lang="en-US" sz="2200" dirty="0" err="1">
-                <a:latin typeface="Segoe UI" panose="020B0502040204020203" pitchFamily="34" charset="0"/>
-                <a:cs typeface="Segoe UI" panose="020B0502040204020203" pitchFamily="34" charset="0"/>
-              </a:rPr>
-              <a:t>với</a:t>
+              <a:rPr lang="en-US" sz="2200" b="1" i="1" dirty="0">
+                <a:latin typeface="Segoe UI" panose="020B0502040204020203" pitchFamily="34" charset="0"/>
+                <a:cs typeface="Segoe UI" panose="020B0502040204020203" pitchFamily="34" charset="0"/>
+              </a:rPr>
+              <a:t>MSE</a:t>
             </a:r>
             <a:r>
               <a:rPr lang="en-US" sz="2200" dirty="0">
                 <a:latin typeface="Segoe UI" panose="020B0502040204020203" pitchFamily="34" charset="0"/>
                 <a:cs typeface="Segoe UI" panose="020B0502040204020203" pitchFamily="34" charset="0"/>
               </a:rPr>
-              <a:t> </a:t>
-            </a:r>
-            <a:r>
-              <a:rPr lang="en-US" sz="2200" dirty="0" err="1">
-                <a:latin typeface="Segoe UI" panose="020B0502040204020203" pitchFamily="34" charset="0"/>
-                <a:cs typeface="Segoe UI" panose="020B0502040204020203" pitchFamily="34" charset="0"/>
-              </a:rPr>
-              <a:t>bài</a:t>
-            </a:r>
-            <a:r>
-              <a:rPr lang="en-US" sz="2200" dirty="0">
-                <a:latin typeface="Segoe UI" panose="020B0502040204020203" pitchFamily="34" charset="0"/>
-                <a:cs typeface="Segoe UI" panose="020B0502040204020203" pitchFamily="34" charset="0"/>
-              </a:rPr>
-              <a:t> </a:t>
-            </a:r>
-            <a:r>
-              <a:rPr lang="en-US" sz="2200" dirty="0" err="1">
-                <a:latin typeface="Segoe UI" panose="020B0502040204020203" pitchFamily="34" charset="0"/>
-                <a:cs typeface="Segoe UI" panose="020B0502040204020203" pitchFamily="34" charset="0"/>
-              </a:rPr>
-              <a:t>toán</a:t>
-            </a:r>
-            <a:r>
-              <a:rPr lang="en-US" sz="2200" dirty="0">
-                <a:latin typeface="Segoe UI" panose="020B0502040204020203" pitchFamily="34" charset="0"/>
-                <a:cs typeface="Segoe UI" panose="020B0502040204020203" pitchFamily="34" charset="0"/>
-              </a:rPr>
-              <a:t> </a:t>
-            </a:r>
-            <a:r>
-              <a:rPr lang="vi-VN" sz="2200" dirty="0">
-                <a:latin typeface="Segoe UI" panose="020B0502040204020203" pitchFamily="34" charset="0"/>
-                <a:cs typeface="Segoe UI" panose="020B0502040204020203" pitchFamily="34" charset="0"/>
-              </a:rPr>
-              <a:t>hồi quy </a:t>
-            </a:r>
-            <a:r>
-              <a:rPr lang="en-US" sz="2200" dirty="0" err="1">
-                <a:latin typeface="Segoe UI" panose="020B0502040204020203" pitchFamily="34" charset="0"/>
-                <a:cs typeface="Segoe UI" panose="020B0502040204020203" pitchFamily="34" charset="0"/>
-              </a:rPr>
-              <a:t>lựa</a:t>
-            </a:r>
-            <a:r>
-              <a:rPr lang="en-US" sz="2200" dirty="0">
-                <a:latin typeface="Segoe UI" panose="020B0502040204020203" pitchFamily="34" charset="0"/>
-                <a:cs typeface="Segoe UI" panose="020B0502040204020203" pitchFamily="34" charset="0"/>
-              </a:rPr>
-              <a:t> </a:t>
-            </a:r>
-            <a:r>
-              <a:rPr lang="en-US" sz="2200" dirty="0" err="1">
-                <a:latin typeface="Segoe UI" panose="020B0502040204020203" pitchFamily="34" charset="0"/>
-                <a:cs typeface="Segoe UI" panose="020B0502040204020203" pitchFamily="34" charset="0"/>
-              </a:rPr>
-              <a:t>chọn</a:t>
-            </a:r>
-            <a:r>
-              <a:rPr lang="en-US" sz="2200" dirty="0">
-                <a:latin typeface="Segoe UI" panose="020B0502040204020203" pitchFamily="34" charset="0"/>
-                <a:cs typeface="Segoe UI" panose="020B0502040204020203" pitchFamily="34" charset="0"/>
-              </a:rPr>
-              <a:t> </a:t>
-            </a:r>
-            <a:r>
-              <a:rPr lang="en-US" sz="2200" dirty="0" err="1">
-                <a:latin typeface="Segoe UI" panose="020B0502040204020203" pitchFamily="34" charset="0"/>
-                <a:cs typeface="Segoe UI" panose="020B0502040204020203" pitchFamily="34" charset="0"/>
-              </a:rPr>
-              <a:t>tốt</a:t>
-            </a:r>
-            <a:r>
-              <a:rPr lang="en-US" sz="2200" dirty="0">
-                <a:latin typeface="Segoe UI" panose="020B0502040204020203" pitchFamily="34" charset="0"/>
-                <a:cs typeface="Segoe UI" panose="020B0502040204020203" pitchFamily="34" charset="0"/>
-              </a:rPr>
-              <a:t> </a:t>
-            </a:r>
-            <a:r>
-              <a:rPr lang="en-US" sz="2200" dirty="0" err="1">
-                <a:latin typeface="Segoe UI" panose="020B0502040204020203" pitchFamily="34" charset="0"/>
-                <a:cs typeface="Segoe UI" panose="020B0502040204020203" pitchFamily="34" charset="0"/>
-              </a:rPr>
-              <a:t>nhất</a:t>
-            </a:r>
-            <a:r>
-              <a:rPr lang="en-US" sz="2200" dirty="0">
-                <a:latin typeface="Segoe UI" panose="020B0502040204020203" pitchFamily="34" charset="0"/>
-                <a:cs typeface="Segoe UI" panose="020B0502040204020203" pitchFamily="34" charset="0"/>
-              </a:rPr>
-              <a:t> </a:t>
-            </a:r>
-            <a:r>
-              <a:rPr lang="en-US" sz="2200" dirty="0" err="1">
-                <a:latin typeface="Segoe UI" panose="020B0502040204020203" pitchFamily="34" charset="0"/>
-                <a:cs typeface="Segoe UI" panose="020B0502040204020203" pitchFamily="34" charset="0"/>
-              </a:rPr>
-              <a:t>là</a:t>
-            </a:r>
-            <a:r>
-              <a:rPr lang="vi-VN" sz="2200" dirty="0">
-                <a:latin typeface="Segoe UI" panose="020B0502040204020203" pitchFamily="34" charset="0"/>
-                <a:cs typeface="Segoe UI" panose="020B0502040204020203" pitchFamily="34" charset="0"/>
-              </a:rPr>
-              <a:t> sử dụng</a:t>
-            </a:r>
-            <a:r>
-              <a:rPr lang="en-US" sz="2200" dirty="0">
-                <a:latin typeface="Segoe UI" panose="020B0502040204020203" pitchFamily="34" charset="0"/>
-                <a:cs typeface="Segoe UI" panose="020B0502040204020203" pitchFamily="34" charset="0"/>
-              </a:rPr>
-              <a:t> </a:t>
-            </a:r>
-            <a:r>
-              <a:rPr lang="en-US" sz="2200" b="1" i="1" dirty="0">
-                <a:latin typeface="Segoe UI" panose="020B0502040204020203" pitchFamily="34" charset="0"/>
-                <a:cs typeface="Segoe UI" panose="020B0502040204020203" pitchFamily="34" charset="0"/>
-              </a:rPr>
-              <a:t>MSE</a:t>
-            </a:r>
-            <a:r>
-              <a:rPr lang="en-US" sz="2200" dirty="0">
-                <a:latin typeface="Segoe UI" panose="020B0502040204020203" pitchFamily="34" charset="0"/>
-                <a:cs typeface="Segoe UI" panose="020B0502040204020203" pitchFamily="34" charset="0"/>
-              </a:rPr>
-              <a:t> (mean squared error)</a:t>
-            </a:r>
+              <a:t> (mean squared error</a:t>
+            </a:r>
+            <a:r>
+              <a:rPr lang="en-US" sz="2200" dirty="0" smtClean="0">
+                <a:latin typeface="Segoe UI" panose="020B0502040204020203" pitchFamily="34" charset="0"/>
+                <a:cs typeface="Segoe UI" panose="020B0502040204020203" pitchFamily="34" charset="0"/>
+              </a:rPr>
+              <a:t>) </a:t>
+            </a:r>
+            <a:r>
+              <a:rPr lang="en-US" sz="2200" dirty="0" err="1" smtClean="0">
+                <a:latin typeface="Segoe UI" panose="020B0502040204020203" pitchFamily="34" charset="0"/>
+                <a:cs typeface="Segoe UI" panose="020B0502040204020203" pitchFamily="34" charset="0"/>
+              </a:rPr>
+              <a:t>trong</a:t>
+            </a:r>
+            <a:r>
+              <a:rPr lang="en-US" sz="2200" dirty="0" smtClean="0">
+                <a:latin typeface="Segoe UI" panose="020B0502040204020203" pitchFamily="34" charset="0"/>
+                <a:cs typeface="Segoe UI" panose="020B0502040204020203" pitchFamily="34" charset="0"/>
+              </a:rPr>
+              <a:t> </a:t>
+            </a:r>
+            <a:r>
+              <a:rPr lang="en-US" sz="2200" dirty="0" err="1" smtClean="0">
+                <a:latin typeface="Segoe UI" panose="020B0502040204020203" pitchFamily="34" charset="0"/>
+                <a:cs typeface="Segoe UI" panose="020B0502040204020203" pitchFamily="34" charset="0"/>
+              </a:rPr>
+              <a:t>việc</a:t>
+            </a:r>
+            <a:r>
+              <a:rPr lang="en-US" sz="2200" dirty="0" smtClean="0">
+                <a:latin typeface="Segoe UI" panose="020B0502040204020203" pitchFamily="34" charset="0"/>
+                <a:cs typeface="Segoe UI" panose="020B0502040204020203" pitchFamily="34" charset="0"/>
+              </a:rPr>
+              <a:t> </a:t>
+            </a:r>
+            <a:r>
+              <a:rPr lang="en-US" sz="2200" dirty="0" err="1" smtClean="0">
+                <a:latin typeface="Segoe UI" panose="020B0502040204020203" pitchFamily="34" charset="0"/>
+                <a:cs typeface="Segoe UI" panose="020B0502040204020203" pitchFamily="34" charset="0"/>
+              </a:rPr>
+              <a:t>đánh</a:t>
+            </a:r>
+            <a:r>
+              <a:rPr lang="en-US" sz="2200" dirty="0" smtClean="0">
+                <a:latin typeface="Segoe UI" panose="020B0502040204020203" pitchFamily="34" charset="0"/>
+                <a:cs typeface="Segoe UI" panose="020B0502040204020203" pitchFamily="34" charset="0"/>
+              </a:rPr>
+              <a:t> </a:t>
+            </a:r>
+            <a:r>
+              <a:rPr lang="en-US" sz="2200" dirty="0" err="1" smtClean="0">
+                <a:latin typeface="Segoe UI" panose="020B0502040204020203" pitchFamily="34" charset="0"/>
+                <a:cs typeface="Segoe UI" panose="020B0502040204020203" pitchFamily="34" charset="0"/>
+              </a:rPr>
+              <a:t>giá</a:t>
+            </a:r>
+            <a:r>
+              <a:rPr lang="en-US" sz="2200" dirty="0" smtClean="0">
+                <a:latin typeface="Segoe UI" panose="020B0502040204020203" pitchFamily="34" charset="0"/>
+                <a:cs typeface="Segoe UI" panose="020B0502040204020203" pitchFamily="34" charset="0"/>
+              </a:rPr>
+              <a:t> </a:t>
+            </a:r>
+            <a:r>
+              <a:rPr lang="en-US" sz="2200" dirty="0" err="1" smtClean="0">
+                <a:latin typeface="Segoe UI" panose="020B0502040204020203" pitchFamily="34" charset="0"/>
+                <a:cs typeface="Segoe UI" panose="020B0502040204020203" pitchFamily="34" charset="0"/>
+              </a:rPr>
+              <a:t>mất</a:t>
+            </a:r>
+            <a:r>
+              <a:rPr lang="en-US" sz="2200" dirty="0" smtClean="0">
+                <a:latin typeface="Segoe UI" panose="020B0502040204020203" pitchFamily="34" charset="0"/>
+                <a:cs typeface="Segoe UI" panose="020B0502040204020203" pitchFamily="34" charset="0"/>
+              </a:rPr>
+              <a:t> </a:t>
+            </a:r>
+            <a:r>
+              <a:rPr lang="en-US" sz="2200" dirty="0" err="1" smtClean="0">
+                <a:latin typeface="Segoe UI" panose="020B0502040204020203" pitchFamily="34" charset="0"/>
+                <a:cs typeface="Segoe UI" panose="020B0502040204020203" pitchFamily="34" charset="0"/>
+              </a:rPr>
+              <a:t>mát</a:t>
+            </a:r>
+            <a:r>
+              <a:rPr lang="en-US" sz="2200" dirty="0" smtClean="0">
+                <a:latin typeface="Segoe UI" panose="020B0502040204020203" pitchFamily="34" charset="0"/>
+                <a:cs typeface="Segoe UI" panose="020B0502040204020203" pitchFamily="34" charset="0"/>
+              </a:rPr>
+              <a:t> </a:t>
+            </a:r>
+            <a:r>
+              <a:rPr lang="en-US" sz="2200" dirty="0" err="1" smtClean="0">
+                <a:latin typeface="Segoe UI" panose="020B0502040204020203" pitchFamily="34" charset="0"/>
+                <a:cs typeface="Segoe UI" panose="020B0502040204020203" pitchFamily="34" charset="0"/>
+              </a:rPr>
+              <a:t>của</a:t>
+            </a:r>
+            <a:r>
+              <a:rPr lang="en-US" sz="2200" dirty="0" smtClean="0">
+                <a:latin typeface="Segoe UI" panose="020B0502040204020203" pitchFamily="34" charset="0"/>
+                <a:cs typeface="Segoe UI" panose="020B0502040204020203" pitchFamily="34" charset="0"/>
+              </a:rPr>
+              <a:t> </a:t>
+            </a:r>
+            <a:r>
+              <a:rPr lang="en-US" sz="2200" dirty="0" err="1" smtClean="0">
+                <a:latin typeface="Segoe UI" panose="020B0502040204020203" pitchFamily="34" charset="0"/>
+                <a:cs typeface="Segoe UI" panose="020B0502040204020203" pitchFamily="34" charset="0"/>
+              </a:rPr>
+              <a:t>mô</a:t>
+            </a:r>
+            <a:r>
+              <a:rPr lang="en-US" sz="2200" dirty="0" smtClean="0">
+                <a:latin typeface="Segoe UI" panose="020B0502040204020203" pitchFamily="34" charset="0"/>
+                <a:cs typeface="Segoe UI" panose="020B0502040204020203" pitchFamily="34" charset="0"/>
+              </a:rPr>
+              <a:t> </a:t>
+            </a:r>
+            <a:r>
+              <a:rPr lang="en-US" sz="2200" dirty="0" err="1" smtClean="0">
+                <a:latin typeface="Segoe UI" panose="020B0502040204020203" pitchFamily="34" charset="0"/>
+                <a:cs typeface="Segoe UI" panose="020B0502040204020203" pitchFamily="34" charset="0"/>
+              </a:rPr>
+              <a:t>hình</a:t>
+            </a:r>
+            <a:endParaRPr lang="en-US" sz="2200" dirty="0">
+              <a:latin typeface="Segoe UI" panose="020B0502040204020203" pitchFamily="34" charset="0"/>
+              <a:cs typeface="Segoe UI" panose="020B0502040204020203" pitchFamily="34" charset="0"/>
+            </a:endParaRPr>
           </a:p>
         </p:txBody>
       </p:sp>
@@ -26452,14 +26464,14 @@
                 <a:gridCol w="3548450">
                   <a:extLst>
                     <a:ext uri="{9D8B030D-6E8A-4147-A177-3AD203B41FA5}">
-                      <a16:colId xmlns:a16="http://schemas.microsoft.com/office/drawing/2014/main" xmlns="" val="20000"/>
+                      <a16:colId xmlns="" xmlns:a16="http://schemas.microsoft.com/office/drawing/2014/main" val="20000"/>
                     </a:ext>
                   </a:extLst>
                 </a:gridCol>
                 <a:gridCol w="2756535">
                   <a:extLst>
                     <a:ext uri="{9D8B030D-6E8A-4147-A177-3AD203B41FA5}">
-                      <a16:colId xmlns:a16="http://schemas.microsoft.com/office/drawing/2014/main" xmlns="" val="20001"/>
+                      <a16:colId xmlns="" xmlns:a16="http://schemas.microsoft.com/office/drawing/2014/main" val="20001"/>
                     </a:ext>
                   </a:extLst>
                 </a:gridCol>
@@ -26487,7 +26499,7 @@
                 </a:tc>
                 <a:extLst>
                   <a:ext uri="{0D108BD9-81ED-4DB2-BD59-A6C34878D82A}">
-                    <a16:rowId xmlns:a16="http://schemas.microsoft.com/office/drawing/2014/main" xmlns="" val="10000"/>
+                    <a16:rowId xmlns="" xmlns:a16="http://schemas.microsoft.com/office/drawing/2014/main" val="10000"/>
                   </a:ext>
                 </a:extLst>
               </a:tr>
@@ -26615,7 +26627,7 @@
                 </a:tc>
                 <a:extLst>
                   <a:ext uri="{0D108BD9-81ED-4DB2-BD59-A6C34878D82A}">
-                    <a16:rowId xmlns:a16="http://schemas.microsoft.com/office/drawing/2014/main" xmlns="" val="10001"/>
+                    <a16:rowId xmlns="" xmlns:a16="http://schemas.microsoft.com/office/drawing/2014/main" val="10001"/>
                   </a:ext>
                 </a:extLst>
               </a:tr>
@@ -26750,7 +26762,7 @@
                 </a:tc>
                 <a:extLst>
                   <a:ext uri="{0D108BD9-81ED-4DB2-BD59-A6C34878D82A}">
-                    <a16:rowId xmlns:a16="http://schemas.microsoft.com/office/drawing/2014/main" xmlns="" val="10002"/>
+                    <a16:rowId xmlns="" xmlns:a16="http://schemas.microsoft.com/office/drawing/2014/main" val="10002"/>
                   </a:ext>
                 </a:extLst>
               </a:tr>
@@ -26836,7 +26848,7 @@
                 </a:tc>
                 <a:extLst>
                   <a:ext uri="{0D108BD9-81ED-4DB2-BD59-A6C34878D82A}">
-                    <a16:rowId xmlns:a16="http://schemas.microsoft.com/office/drawing/2014/main" xmlns="" val="10003"/>
+                    <a16:rowId xmlns="" xmlns:a16="http://schemas.microsoft.com/office/drawing/2014/main" val="10003"/>
                   </a:ext>
                 </a:extLst>
               </a:tr>
@@ -26907,7 +26919,7 @@
                 </a:tc>
                 <a:extLst>
                   <a:ext uri="{0D108BD9-81ED-4DB2-BD59-A6C34878D82A}">
-                    <a16:rowId xmlns:a16="http://schemas.microsoft.com/office/drawing/2014/main" xmlns="" val="10004"/>
+                    <a16:rowId xmlns="" xmlns:a16="http://schemas.microsoft.com/office/drawing/2014/main" val="10004"/>
                   </a:ext>
                 </a:extLst>
               </a:tr>
@@ -26975,7 +26987,7 @@
                 </a:tc>
                 <a:extLst>
                   <a:ext uri="{0D108BD9-81ED-4DB2-BD59-A6C34878D82A}">
-                    <a16:rowId xmlns:a16="http://schemas.microsoft.com/office/drawing/2014/main" xmlns="" val="10005"/>
+                    <a16:rowId xmlns="" xmlns:a16="http://schemas.microsoft.com/office/drawing/2014/main" val="10005"/>
                   </a:ext>
                 </a:extLst>
               </a:tr>
@@ -28489,7 +28501,7 @@
           <p:cNvPr id="3" name="Subtitle 2">
             <a:extLst>
               <a:ext uri="{FF2B5EF4-FFF2-40B4-BE49-F238E27FC236}">
-                <a16:creationId xmlns:a16="http://schemas.microsoft.com/office/drawing/2014/main" xmlns="" id="{56C48AFA-E4C6-40E0-9FD6-DBFF38EAF315}"/>
+                <a16:creationId xmlns="" xmlns:a16="http://schemas.microsoft.com/office/drawing/2014/main" id="{56C48AFA-E4C6-40E0-9FD6-DBFF38EAF315}"/>
               </a:ext>
             </a:extLst>
           </p:cNvPr>
@@ -29014,7 +29026,14 @@
                 <a:latin typeface="Segoe UI" panose="020B0502040204020203" pitchFamily="34" charset="0"/>
                 <a:cs typeface="Segoe UI" panose="020B0502040204020203" pitchFamily="34" charset="0"/>
               </a:rPr>
-              <a:t> Validation </a:t>
+              <a:t> </a:t>
+            </a:r>
+            <a:r>
+              <a:rPr lang="en-US" sz="2200" dirty="0" smtClean="0">
+                <a:latin typeface="Segoe UI" panose="020B0502040204020203" pitchFamily="34" charset="0"/>
+                <a:cs typeface="Segoe UI" panose="020B0502040204020203" pitchFamily="34" charset="0"/>
+              </a:rPr>
+              <a:t>Validation</a:t>
             </a:r>
             <a:endParaRPr lang="en-US" sz="2200" dirty="0">
               <a:latin typeface="Segoe UI" panose="020B0502040204020203" pitchFamily="34" charset="0"/>
@@ -29134,7 +29153,7 @@
           <p:cNvPr id="4" name="Table 3">
             <a:extLst>
               <a:ext uri="{FF2B5EF4-FFF2-40B4-BE49-F238E27FC236}">
-                <a16:creationId xmlns:a16="http://schemas.microsoft.com/office/drawing/2014/main" xmlns="" id="{E092789B-1CB0-4E39-B614-E372263DA5D1}"/>
+                <a16:creationId xmlns="" xmlns:a16="http://schemas.microsoft.com/office/drawing/2014/main" id="{E092789B-1CB0-4E39-B614-E372263DA5D1}"/>
               </a:ext>
             </a:extLst>
           </p:cNvPr>
@@ -29163,14 +29182,14 @@
                 <a:gridCol w="3943823">
                   <a:extLst>
                     <a:ext uri="{9D8B030D-6E8A-4147-A177-3AD203B41FA5}">
-                      <a16:colId xmlns:a16="http://schemas.microsoft.com/office/drawing/2014/main" xmlns="" val="150882546"/>
+                      <a16:colId xmlns="" xmlns:a16="http://schemas.microsoft.com/office/drawing/2014/main" val="150882546"/>
                     </a:ext>
                   </a:extLst>
                 </a:gridCol>
                 <a:gridCol w="1500352">
                   <a:extLst>
                     <a:ext uri="{9D8B030D-6E8A-4147-A177-3AD203B41FA5}">
-                      <a16:colId xmlns:a16="http://schemas.microsoft.com/office/drawing/2014/main" xmlns="" val="4160103928"/>
+                      <a16:colId xmlns="" xmlns:a16="http://schemas.microsoft.com/office/drawing/2014/main" val="4160103928"/>
                     </a:ext>
                   </a:extLst>
                 </a:gridCol>
@@ -29254,7 +29273,7 @@
                 </a:tc>
                 <a:extLst>
                   <a:ext uri="{0D108BD9-81ED-4DB2-BD59-A6C34878D82A}">
-                    <a16:rowId xmlns:a16="http://schemas.microsoft.com/office/drawing/2014/main" xmlns="" val="1780511228"/>
+                    <a16:rowId xmlns="" xmlns:a16="http://schemas.microsoft.com/office/drawing/2014/main" val="1780511228"/>
                   </a:ext>
                 </a:extLst>
               </a:tr>
@@ -29337,7 +29356,7 @@
                 </a:tc>
                 <a:extLst>
                   <a:ext uri="{0D108BD9-81ED-4DB2-BD59-A6C34878D82A}">
-                    <a16:rowId xmlns:a16="http://schemas.microsoft.com/office/drawing/2014/main" xmlns="" val="2767936982"/>
+                    <a16:rowId xmlns="" xmlns:a16="http://schemas.microsoft.com/office/drawing/2014/main" val="2767936982"/>
                   </a:ext>
                 </a:extLst>
               </a:tr>
@@ -29420,7 +29439,7 @@
                 </a:tc>
                 <a:extLst>
                   <a:ext uri="{0D108BD9-81ED-4DB2-BD59-A6C34878D82A}">
-                    <a16:rowId xmlns:a16="http://schemas.microsoft.com/office/drawing/2014/main" xmlns="" val="3796812353"/>
+                    <a16:rowId xmlns="" xmlns:a16="http://schemas.microsoft.com/office/drawing/2014/main" val="3796812353"/>
                   </a:ext>
                 </a:extLst>
               </a:tr>
@@ -29503,7 +29522,7 @@
                 </a:tc>
                 <a:extLst>
                   <a:ext uri="{0D108BD9-81ED-4DB2-BD59-A6C34878D82A}">
-                    <a16:rowId xmlns:a16="http://schemas.microsoft.com/office/drawing/2014/main" xmlns="" val="2160711784"/>
+                    <a16:rowId xmlns="" xmlns:a16="http://schemas.microsoft.com/office/drawing/2014/main" val="2160711784"/>
                   </a:ext>
                 </a:extLst>
               </a:tr>
@@ -29608,7 +29627,7 @@
                 </a:tc>
                 <a:extLst>
                   <a:ext uri="{0D108BD9-81ED-4DB2-BD59-A6C34878D82A}">
-                    <a16:rowId xmlns:a16="http://schemas.microsoft.com/office/drawing/2014/main" xmlns="" val="4119424671"/>
+                    <a16:rowId xmlns="" xmlns:a16="http://schemas.microsoft.com/office/drawing/2014/main" val="4119424671"/>
                   </a:ext>
                 </a:extLst>
               </a:tr>
@@ -30907,7 +30926,7 @@
           <p:cNvPr id="3" name="Subtitle 2">
             <a:extLst>
               <a:ext uri="{FF2B5EF4-FFF2-40B4-BE49-F238E27FC236}">
-                <a16:creationId xmlns:a16="http://schemas.microsoft.com/office/drawing/2014/main" xmlns="" id="{9D6605B7-EB45-4B65-81E9-0E4A3821D32D}"/>
+                <a16:creationId xmlns="" xmlns:a16="http://schemas.microsoft.com/office/drawing/2014/main" id="{9D6605B7-EB45-4B65-81E9-0E4A3821D32D}"/>
               </a:ext>
             </a:extLst>
           </p:cNvPr>
@@ -31201,7 +31220,7 @@
           <p:cNvPr id="4" name="Picture 3">
             <a:extLst>
               <a:ext uri="{FF2B5EF4-FFF2-40B4-BE49-F238E27FC236}">
-                <a16:creationId xmlns:a16="http://schemas.microsoft.com/office/drawing/2014/main" xmlns="" id="{E4D951B9-686F-44D7-B29A-09C9B812F1C0}"/>
+                <a16:creationId xmlns="" xmlns:a16="http://schemas.microsoft.com/office/drawing/2014/main" id="{E4D951B9-686F-44D7-B29A-09C9B812F1C0}"/>
               </a:ext>
             </a:extLst>
           </p:cNvPr>
@@ -31234,7 +31253,7 @@
           <p:cNvPr id="5" name="Picture 4">
             <a:extLst>
               <a:ext uri="{FF2B5EF4-FFF2-40B4-BE49-F238E27FC236}">
-                <a16:creationId xmlns:a16="http://schemas.microsoft.com/office/drawing/2014/main" xmlns="" id="{D2AA9E5D-7596-4184-AF77-E7A4A28B6724}"/>
+                <a16:creationId xmlns="" xmlns:a16="http://schemas.microsoft.com/office/drawing/2014/main" id="{D2AA9E5D-7596-4184-AF77-E7A4A28B6724}"/>
               </a:ext>
             </a:extLst>
           </p:cNvPr>
@@ -31262,7 +31281,7 @@
           <p:cNvPr id="6" name="Rectangle 5">
             <a:extLst>
               <a:ext uri="{FF2B5EF4-FFF2-40B4-BE49-F238E27FC236}">
-                <a16:creationId xmlns:a16="http://schemas.microsoft.com/office/drawing/2014/main" xmlns="" id="{243F69B7-6413-4B73-B46C-E1F19E6DEEC3}"/>
+                <a16:creationId xmlns="" xmlns:a16="http://schemas.microsoft.com/office/drawing/2014/main" id="{243F69B7-6413-4B73-B46C-E1F19E6DEEC3}"/>
               </a:ext>
             </a:extLst>
           </p:cNvPr>
@@ -31444,7 +31463,7 @@
           <p:cNvPr id="7" name="Straight Arrow Connector 6">
             <a:extLst>
               <a:ext uri="{FF2B5EF4-FFF2-40B4-BE49-F238E27FC236}">
-                <a16:creationId xmlns:a16="http://schemas.microsoft.com/office/drawing/2014/main" xmlns="" id="{F0AC5C00-DCCF-490B-ACB4-DAAEF19945A3}"/>
+                <a16:creationId xmlns="" xmlns:a16="http://schemas.microsoft.com/office/drawing/2014/main" id="{F0AC5C00-DCCF-490B-ACB4-DAAEF19945A3}"/>
               </a:ext>
             </a:extLst>
           </p:cNvPr>
@@ -31486,7 +31505,7 @@
           <p:cNvPr id="14" name="Rectangle 13">
             <a:extLst>
               <a:ext uri="{FF2B5EF4-FFF2-40B4-BE49-F238E27FC236}">
-                <a16:creationId xmlns:a16="http://schemas.microsoft.com/office/drawing/2014/main" xmlns="" id="{CF3BE4B5-A3BF-46BB-ADC6-251161593F6B}"/>
+                <a16:creationId xmlns="" xmlns:a16="http://schemas.microsoft.com/office/drawing/2014/main" id="{CF3BE4B5-A3BF-46BB-ADC6-251161593F6B}"/>
               </a:ext>
             </a:extLst>
           </p:cNvPr>
@@ -31584,7 +31603,7 @@
           <p:cNvPr id="15" name="Straight Arrow Connector 14">
             <a:extLst>
               <a:ext uri="{FF2B5EF4-FFF2-40B4-BE49-F238E27FC236}">
-                <a16:creationId xmlns:a16="http://schemas.microsoft.com/office/drawing/2014/main" xmlns="" id="{5559E77B-F589-4542-99BC-6FA54BB3C3EB}"/>
+                <a16:creationId xmlns="" xmlns:a16="http://schemas.microsoft.com/office/drawing/2014/main" id="{5559E77B-F589-4542-99BC-6FA54BB3C3EB}"/>
               </a:ext>
             </a:extLst>
           </p:cNvPr>
@@ -32134,13 +32153,208 @@
               <a:t> </a:t>
             </a:r>
             <a:r>
-              <a:rPr lang="en-US" sz="2400" b="1" dirty="0" err="1">
+              <a:rPr lang="en-US" sz="2400" b="1" dirty="0" err="1" smtClean="0">
                 <a:latin typeface="Segoe UI" panose="020B0502040204020203" pitchFamily="34" charset="0"/>
                 <a:cs typeface="Segoe UI" panose="020B0502040204020203" pitchFamily="34" charset="0"/>
               </a:rPr>
               <a:t>được</a:t>
             </a:r>
-            <a:endParaRPr lang="en-US" sz="2400" b="1" dirty="0">
+            <a:endParaRPr lang="en-US" sz="2400" b="1" dirty="0" smtClean="0">
+              <a:latin typeface="Segoe UI" panose="020B0502040204020203" pitchFamily="34" charset="0"/>
+              <a:cs typeface="Segoe UI" panose="020B0502040204020203" pitchFamily="34" charset="0"/>
+            </a:endParaRPr>
+          </a:p>
+          <a:p>
+            <a:pPr marL="0" indent="0">
+              <a:buClr>
+                <a:schemeClr val="tx1"/>
+              </a:buClr>
+              <a:buSzPct val="85000"/>
+              <a:buNone/>
+            </a:pPr>
+            <a:r>
+              <a:rPr lang="en-US" sz="2400" dirty="0">
+                <a:latin typeface="Segoe UI" panose="020B0502040204020203" pitchFamily="34" charset="0"/>
+                <a:cs typeface="Segoe UI" panose="020B0502040204020203" pitchFamily="34" charset="0"/>
+              </a:rPr>
+              <a:t>-   </a:t>
+            </a:r>
+            <a:r>
+              <a:rPr lang="en-US" sz="2400" dirty="0" err="1" smtClean="0">
+                <a:latin typeface="Segoe UI" panose="020B0502040204020203" pitchFamily="34" charset="0"/>
+                <a:cs typeface="Segoe UI" panose="020B0502040204020203" pitchFamily="34" charset="0"/>
+              </a:rPr>
+              <a:t>Xây</a:t>
+            </a:r>
+            <a:r>
+              <a:rPr lang="en-US" sz="2400" dirty="0" smtClean="0">
+                <a:latin typeface="Segoe UI" panose="020B0502040204020203" pitchFamily="34" charset="0"/>
+                <a:cs typeface="Segoe UI" panose="020B0502040204020203" pitchFamily="34" charset="0"/>
+              </a:rPr>
+              <a:t> </a:t>
+            </a:r>
+            <a:r>
+              <a:rPr lang="en-US" sz="2400" dirty="0" err="1">
+                <a:latin typeface="Segoe UI" panose="020B0502040204020203" pitchFamily="34" charset="0"/>
+                <a:cs typeface="Segoe UI" panose="020B0502040204020203" pitchFamily="34" charset="0"/>
+              </a:rPr>
+              <a:t>dựng</a:t>
+            </a:r>
+            <a:r>
+              <a:rPr lang="en-US" sz="2400" dirty="0">
+                <a:latin typeface="Segoe UI" panose="020B0502040204020203" pitchFamily="34" charset="0"/>
+                <a:cs typeface="Segoe UI" panose="020B0502040204020203" pitchFamily="34" charset="0"/>
+              </a:rPr>
+              <a:t> </a:t>
+            </a:r>
+            <a:r>
+              <a:rPr lang="en-US" sz="2400" dirty="0" err="1" smtClean="0">
+                <a:latin typeface="Segoe UI" panose="020B0502040204020203" pitchFamily="34" charset="0"/>
+                <a:cs typeface="Segoe UI" panose="020B0502040204020203" pitchFamily="34" charset="0"/>
+              </a:rPr>
+              <a:t>cơ</a:t>
+            </a:r>
+            <a:r>
+              <a:rPr lang="en-US" sz="2400" dirty="0" smtClean="0">
+                <a:latin typeface="Segoe UI" panose="020B0502040204020203" pitchFamily="34" charset="0"/>
+                <a:cs typeface="Segoe UI" panose="020B0502040204020203" pitchFamily="34" charset="0"/>
+              </a:rPr>
+              <a:t> </a:t>
+            </a:r>
+            <a:r>
+              <a:rPr lang="en-US" sz="2400" dirty="0" err="1" smtClean="0">
+                <a:latin typeface="Segoe UI" panose="020B0502040204020203" pitchFamily="34" charset="0"/>
+                <a:cs typeface="Segoe UI" panose="020B0502040204020203" pitchFamily="34" charset="0"/>
+              </a:rPr>
+              <a:t>sở</a:t>
+            </a:r>
+            <a:r>
+              <a:rPr lang="en-US" sz="2400" dirty="0" smtClean="0">
+                <a:latin typeface="Segoe UI" panose="020B0502040204020203" pitchFamily="34" charset="0"/>
+                <a:cs typeface="Segoe UI" panose="020B0502040204020203" pitchFamily="34" charset="0"/>
+              </a:rPr>
+              <a:t> </a:t>
+            </a:r>
+            <a:r>
+              <a:rPr lang="en-US" sz="2400" dirty="0" err="1" smtClean="0">
+                <a:latin typeface="Segoe UI" panose="020B0502040204020203" pitchFamily="34" charset="0"/>
+                <a:cs typeface="Segoe UI" panose="020B0502040204020203" pitchFamily="34" charset="0"/>
+              </a:rPr>
+              <a:t>dữ</a:t>
+            </a:r>
+            <a:r>
+              <a:rPr lang="en-US" sz="2400" dirty="0" smtClean="0">
+                <a:latin typeface="Segoe UI" panose="020B0502040204020203" pitchFamily="34" charset="0"/>
+                <a:cs typeface="Segoe UI" panose="020B0502040204020203" pitchFamily="34" charset="0"/>
+              </a:rPr>
+              <a:t> </a:t>
+            </a:r>
+            <a:r>
+              <a:rPr lang="en-US" sz="2400" dirty="0" err="1" smtClean="0">
+                <a:latin typeface="Segoe UI" panose="020B0502040204020203" pitchFamily="34" charset="0"/>
+                <a:cs typeface="Segoe UI" panose="020B0502040204020203" pitchFamily="34" charset="0"/>
+              </a:rPr>
+              <a:t>liệu</a:t>
+            </a:r>
+            <a:r>
+              <a:rPr lang="en-US" sz="2400" dirty="0" smtClean="0">
+                <a:latin typeface="Segoe UI" panose="020B0502040204020203" pitchFamily="34" charset="0"/>
+                <a:cs typeface="Segoe UI" panose="020B0502040204020203" pitchFamily="34" charset="0"/>
+              </a:rPr>
+              <a:t> </a:t>
+            </a:r>
+            <a:r>
+              <a:rPr lang="en-US" sz="2400" dirty="0" err="1" smtClean="0">
+                <a:latin typeface="Segoe UI" panose="020B0502040204020203" pitchFamily="34" charset="0"/>
+                <a:cs typeface="Segoe UI" panose="020B0502040204020203" pitchFamily="34" charset="0"/>
+              </a:rPr>
+              <a:t>cho</a:t>
+            </a:r>
+            <a:r>
+              <a:rPr lang="en-US" sz="2400" dirty="0" smtClean="0">
+                <a:latin typeface="Segoe UI" panose="020B0502040204020203" pitchFamily="34" charset="0"/>
+                <a:cs typeface="Segoe UI" panose="020B0502040204020203" pitchFamily="34" charset="0"/>
+              </a:rPr>
+              <a:t> </a:t>
+            </a:r>
+            <a:r>
+              <a:rPr lang="en-US" sz="2400" dirty="0" err="1" smtClean="0">
+                <a:latin typeface="Segoe UI" panose="020B0502040204020203" pitchFamily="34" charset="0"/>
+                <a:cs typeface="Segoe UI" panose="020B0502040204020203" pitchFamily="34" charset="0"/>
+              </a:rPr>
+              <a:t>bài</a:t>
+            </a:r>
+            <a:r>
+              <a:rPr lang="en-US" sz="2400" dirty="0" smtClean="0">
+                <a:latin typeface="Segoe UI" panose="020B0502040204020203" pitchFamily="34" charset="0"/>
+                <a:cs typeface="Segoe UI" panose="020B0502040204020203" pitchFamily="34" charset="0"/>
+              </a:rPr>
+              <a:t> </a:t>
+            </a:r>
+            <a:r>
+              <a:rPr lang="en-US" sz="2400" dirty="0" err="1" smtClean="0">
+                <a:latin typeface="Segoe UI" panose="020B0502040204020203" pitchFamily="34" charset="0"/>
+                <a:cs typeface="Segoe UI" panose="020B0502040204020203" pitchFamily="34" charset="0"/>
+              </a:rPr>
+              <a:t>toán</a:t>
+            </a:r>
+            <a:r>
+              <a:rPr lang="en-US" sz="2400" dirty="0" smtClean="0">
+                <a:latin typeface="Segoe UI" panose="020B0502040204020203" pitchFamily="34" charset="0"/>
+                <a:cs typeface="Segoe UI" panose="020B0502040204020203" pitchFamily="34" charset="0"/>
+              </a:rPr>
+              <a:t> </a:t>
+            </a:r>
+            <a:r>
+              <a:rPr lang="en-US" sz="2400" dirty="0" err="1" smtClean="0">
+                <a:latin typeface="Segoe UI" panose="020B0502040204020203" pitchFamily="34" charset="0"/>
+                <a:cs typeface="Segoe UI" panose="020B0502040204020203" pitchFamily="34" charset="0"/>
+              </a:rPr>
+              <a:t>dự</a:t>
+            </a:r>
+            <a:r>
+              <a:rPr lang="en-US" sz="2400" dirty="0" smtClean="0">
+                <a:latin typeface="Segoe UI" panose="020B0502040204020203" pitchFamily="34" charset="0"/>
+                <a:cs typeface="Segoe UI" panose="020B0502040204020203" pitchFamily="34" charset="0"/>
+              </a:rPr>
+              <a:t> </a:t>
+            </a:r>
+            <a:r>
+              <a:rPr lang="en-US" sz="2400" dirty="0" err="1" smtClean="0">
+                <a:latin typeface="Segoe UI" panose="020B0502040204020203" pitchFamily="34" charset="0"/>
+                <a:cs typeface="Segoe UI" panose="020B0502040204020203" pitchFamily="34" charset="0"/>
+              </a:rPr>
+              <a:t>báo</a:t>
+            </a:r>
+            <a:r>
+              <a:rPr lang="en-US" sz="2400" dirty="0" smtClean="0">
+                <a:latin typeface="Segoe UI" panose="020B0502040204020203" pitchFamily="34" charset="0"/>
+                <a:cs typeface="Segoe UI" panose="020B0502040204020203" pitchFamily="34" charset="0"/>
+              </a:rPr>
+              <a:t> </a:t>
+            </a:r>
+            <a:r>
+              <a:rPr lang="en-US" sz="2400" dirty="0" err="1" smtClean="0">
+                <a:latin typeface="Segoe UI" panose="020B0502040204020203" pitchFamily="34" charset="0"/>
+                <a:cs typeface="Segoe UI" panose="020B0502040204020203" pitchFamily="34" charset="0"/>
+              </a:rPr>
+              <a:t>giá</a:t>
+            </a:r>
+            <a:r>
+              <a:rPr lang="en-US" sz="2400" dirty="0" smtClean="0">
+                <a:latin typeface="Segoe UI" panose="020B0502040204020203" pitchFamily="34" charset="0"/>
+                <a:cs typeface="Segoe UI" panose="020B0502040204020203" pitchFamily="34" charset="0"/>
+              </a:rPr>
+              <a:t> </a:t>
+            </a:r>
+            <a:r>
+              <a:rPr lang="en-US" sz="2400" dirty="0" err="1" smtClean="0">
+                <a:latin typeface="Segoe UI" panose="020B0502040204020203" pitchFamily="34" charset="0"/>
+                <a:cs typeface="Segoe UI" panose="020B0502040204020203" pitchFamily="34" charset="0"/>
+              </a:rPr>
+              <a:t>phòng</a:t>
+            </a:r>
+            <a:endParaRPr lang="en-US" sz="2400" dirty="0">
               <a:latin typeface="Segoe UI" panose="020B0502040204020203" pitchFamily="34" charset="0"/>
               <a:cs typeface="Segoe UI" panose="020B0502040204020203" pitchFamily="34" charset="0"/>
             </a:endParaRPr>
@@ -32946,7 +33160,7 @@
           <p:cNvPr id="3" name="Subtitle 2">
             <a:extLst>
               <a:ext uri="{FF2B5EF4-FFF2-40B4-BE49-F238E27FC236}">
-                <a16:creationId xmlns:a16="http://schemas.microsoft.com/office/drawing/2014/main" xmlns="" id="{4E4C4921-7A26-40A0-9392-FF2243BEF77A}"/>
+                <a16:creationId xmlns="" xmlns:a16="http://schemas.microsoft.com/office/drawing/2014/main" id="{4E4C4921-7A26-40A0-9392-FF2243BEF77A}"/>
               </a:ext>
             </a:extLst>
           </p:cNvPr>
@@ -33384,14 +33598,70 @@
               <a:t> </a:t>
             </a:r>
             <a:r>
-              <a:rPr lang="en-US" sz="2400" dirty="0" err="1">
+              <a:rPr lang="en-US" sz="2400" dirty="0" err="1" smtClean="0">
+                <a:latin typeface="Segoe UI" panose="020B0502040204020203" pitchFamily="34" charset="0"/>
+                <a:cs typeface="Segoe UI" panose="020B0502040204020203" pitchFamily="34" charset="0"/>
+              </a:rPr>
+              <a:t>dữ</a:t>
+            </a:r>
+            <a:r>
+              <a:rPr lang="en-US" sz="2400" dirty="0" smtClean="0">
+                <a:latin typeface="Segoe UI" panose="020B0502040204020203" pitchFamily="34" charset="0"/>
+                <a:cs typeface="Segoe UI" panose="020B0502040204020203" pitchFamily="34" charset="0"/>
+              </a:rPr>
+              <a:t> </a:t>
+            </a:r>
+            <a:r>
+              <a:rPr lang="en-US" sz="2400" dirty="0" err="1" smtClean="0">
+                <a:latin typeface="Segoe UI" panose="020B0502040204020203" pitchFamily="34" charset="0"/>
+                <a:cs typeface="Segoe UI" panose="020B0502040204020203" pitchFamily="34" charset="0"/>
+              </a:rPr>
+              <a:t>liệu</a:t>
+            </a:r>
+            <a:r>
+              <a:rPr lang="en-US" sz="2400" dirty="0" smtClean="0">
+                <a:latin typeface="Segoe UI" panose="020B0502040204020203" pitchFamily="34" charset="0"/>
+                <a:cs typeface="Segoe UI" panose="020B0502040204020203" pitchFamily="34" charset="0"/>
+              </a:rPr>
+              <a:t> </a:t>
+            </a:r>
+            <a:r>
+              <a:rPr lang="en-US" sz="2400" dirty="0" err="1" smtClean="0">
+                <a:latin typeface="Segoe UI" panose="020B0502040204020203" pitchFamily="34" charset="0"/>
+                <a:cs typeface="Segoe UI" panose="020B0502040204020203" pitchFamily="34" charset="0"/>
+              </a:rPr>
+              <a:t>bài</a:t>
+            </a:r>
+            <a:r>
+              <a:rPr lang="en-US" sz="2400" dirty="0" smtClean="0">
+                <a:latin typeface="Segoe UI" panose="020B0502040204020203" pitchFamily="34" charset="0"/>
+                <a:cs typeface="Segoe UI" panose="020B0502040204020203" pitchFamily="34" charset="0"/>
+              </a:rPr>
+              <a:t> </a:t>
+            </a:r>
+            <a:r>
+              <a:rPr lang="en-US" sz="2400" dirty="0" err="1" smtClean="0">
+                <a:latin typeface="Segoe UI" panose="020B0502040204020203" pitchFamily="34" charset="0"/>
+                <a:cs typeface="Segoe UI" panose="020B0502040204020203" pitchFamily="34" charset="0"/>
+              </a:rPr>
+              <a:t>toán</a:t>
+            </a:r>
+            <a:r>
+              <a:rPr lang="en-US" sz="2400" dirty="0" smtClean="0">
+                <a:latin typeface="Segoe UI" panose="020B0502040204020203" pitchFamily="34" charset="0"/>
+                <a:cs typeface="Segoe UI" panose="020B0502040204020203" pitchFamily="34" charset="0"/>
+              </a:rPr>
+              <a:t> </a:t>
+            </a:r>
+            <a:r>
+              <a:rPr lang="en-US" sz="2400" dirty="0" err="1" smtClean="0">
                 <a:latin typeface="Segoe UI" panose="020B0502040204020203" pitchFamily="34" charset="0"/>
                 <a:cs typeface="Segoe UI" panose="020B0502040204020203" pitchFamily="34" charset="0"/>
               </a:rPr>
               <a:t>chưa</a:t>
             </a:r>
             <a:r>
-              <a:rPr lang="en-US" sz="2400" dirty="0">
+              <a:rPr lang="en-US" sz="2400" dirty="0" smtClean="0">
                 <a:latin typeface="Segoe UI" panose="020B0502040204020203" pitchFamily="34" charset="0"/>
                 <a:cs typeface="Segoe UI" panose="020B0502040204020203" pitchFamily="34" charset="0"/>
               </a:rPr>
@@ -33578,6 +33848,20 @@
                 <a:cs typeface="Segoe UI" panose="020B0502040204020203" pitchFamily="34" charset="0"/>
               </a:rPr>
               <a:t>bình</a:t>
+            </a:r>
+            <a:r>
+              <a:rPr lang="en-US" sz="2400" dirty="0" smtClean="0">
+                <a:latin typeface="Segoe UI" panose="020B0502040204020203" pitchFamily="34" charset="0"/>
+                <a:cs typeface="Segoe UI" panose="020B0502040204020203" pitchFamily="34" charset="0"/>
+              </a:rPr>
+              <a:t> </a:t>
+            </a:r>
+            <a:r>
+              <a:rPr lang="en-US" sz="2400" dirty="0" err="1" smtClean="0">
+                <a:latin typeface="Segoe UI" panose="020B0502040204020203" pitchFamily="34" charset="0"/>
+                <a:cs typeface="Segoe UI" panose="020B0502040204020203" pitchFamily="34" charset="0"/>
+              </a:rPr>
+              <a:t>khá</a:t>
             </a:r>
             <a:r>
               <a:rPr lang="en-US" sz="2400" dirty="0" smtClean="0">
@@ -36380,7 +36664,7 @@
                 <a:latin typeface="Segoe UI" panose="020B0502040204020203" pitchFamily="34" charset="0"/>
                 <a:cs typeface="Segoe UI" panose="020B0502040204020203" pitchFamily="34" charset="0"/>
               </a:rPr>
-              <a:t>xây</a:t>
+              <a:t>thiết</a:t>
             </a:r>
             <a:r>
               <a:rPr lang="en-US" sz="2000" dirty="0" smtClean="0">
@@ -36394,7 +36678,21 @@
                 <a:latin typeface="Segoe UI" panose="020B0502040204020203" pitchFamily="34" charset="0"/>
                 <a:cs typeface="Segoe UI" panose="020B0502040204020203" pitchFamily="34" charset="0"/>
               </a:rPr>
-              <a:t>dựng</a:t>
+              <a:t>lập</a:t>
+            </a:r>
+            <a:r>
+              <a:rPr lang="en-US" sz="2000" dirty="0">
+                <a:latin typeface="Segoe UI" panose="020B0502040204020203" pitchFamily="34" charset="0"/>
+                <a:cs typeface="Segoe UI" panose="020B0502040204020203" pitchFamily="34" charset="0"/>
+              </a:rPr>
+              <a:t> </a:t>
+            </a:r>
+            <a:r>
+              <a:rPr lang="en-US" sz="2000" dirty="0" err="1" smtClean="0">
+                <a:latin typeface="Segoe UI" panose="020B0502040204020203" pitchFamily="34" charset="0"/>
+                <a:cs typeface="Segoe UI" panose="020B0502040204020203" pitchFamily="34" charset="0"/>
+              </a:rPr>
+              <a:t>mô</a:t>
             </a:r>
             <a:r>
               <a:rPr lang="en-US" sz="2000" dirty="0" smtClean="0">
@@ -36408,7 +36706,7 @@
                 <a:latin typeface="Segoe UI" panose="020B0502040204020203" pitchFamily="34" charset="0"/>
                 <a:cs typeface="Segoe UI" panose="020B0502040204020203" pitchFamily="34" charset="0"/>
               </a:rPr>
-              <a:t>mô</a:t>
+              <a:t>hình</a:t>
             </a:r>
             <a:r>
               <a:rPr lang="en-US" sz="2000" dirty="0" smtClean="0">
@@ -36422,7 +36720,7 @@
                 <a:latin typeface="Segoe UI" panose="020B0502040204020203" pitchFamily="34" charset="0"/>
                 <a:cs typeface="Segoe UI" panose="020B0502040204020203" pitchFamily="34" charset="0"/>
               </a:rPr>
-              <a:t>hình</a:t>
+              <a:t>học</a:t>
             </a:r>
             <a:r>
               <a:rPr lang="en-US" sz="2000" dirty="0" smtClean="0">
@@ -36436,7 +36734,7 @@
                 <a:latin typeface="Segoe UI" panose="020B0502040204020203" pitchFamily="34" charset="0"/>
                 <a:cs typeface="Segoe UI" panose="020B0502040204020203" pitchFamily="34" charset="0"/>
               </a:rPr>
-              <a:t>học</a:t>
+              <a:t>sâu</a:t>
             </a:r>
             <a:r>
               <a:rPr lang="en-US" sz="2000" dirty="0" smtClean="0">
@@ -36450,7 +36748,7 @@
                 <a:latin typeface="Segoe UI" panose="020B0502040204020203" pitchFamily="34" charset="0"/>
                 <a:cs typeface="Segoe UI" panose="020B0502040204020203" pitchFamily="34" charset="0"/>
               </a:rPr>
-              <a:t>sâu</a:t>
+              <a:t>tương</a:t>
             </a:r>
             <a:r>
               <a:rPr lang="en-US" sz="2000" dirty="0" smtClean="0">
@@ -36464,7 +36762,7 @@
                 <a:latin typeface="Segoe UI" panose="020B0502040204020203" pitchFamily="34" charset="0"/>
                 <a:cs typeface="Segoe UI" panose="020B0502040204020203" pitchFamily="34" charset="0"/>
               </a:rPr>
-              <a:t>tương</a:t>
+              <a:t>đối</a:t>
             </a:r>
             <a:r>
               <a:rPr lang="en-US" sz="2000" dirty="0" smtClean="0">
@@ -36478,7 +36776,7 @@
                 <a:latin typeface="Segoe UI" panose="020B0502040204020203" pitchFamily="34" charset="0"/>
                 <a:cs typeface="Segoe UI" panose="020B0502040204020203" pitchFamily="34" charset="0"/>
               </a:rPr>
-              <a:t>đối</a:t>
+              <a:t>dễ</a:t>
             </a:r>
             <a:r>
               <a:rPr lang="en-US" sz="2000" dirty="0" smtClean="0">
@@ -36492,7 +36790,7 @@
                 <a:latin typeface="Segoe UI" panose="020B0502040204020203" pitchFamily="34" charset="0"/>
                 <a:cs typeface="Segoe UI" panose="020B0502040204020203" pitchFamily="34" charset="0"/>
               </a:rPr>
-              <a:t>dễ</a:t>
+              <a:t>dàng</a:t>
             </a:r>
             <a:r>
               <a:rPr lang="en-US" sz="2000" dirty="0" smtClean="0">
@@ -36506,7 +36804,7 @@
                 <a:latin typeface="Segoe UI" panose="020B0502040204020203" pitchFamily="34" charset="0"/>
                 <a:cs typeface="Segoe UI" panose="020B0502040204020203" pitchFamily="34" charset="0"/>
               </a:rPr>
-              <a:t>dàng</a:t>
+              <a:t>với</a:t>
             </a:r>
             <a:r>
               <a:rPr lang="en-US" sz="2000" dirty="0" smtClean="0">
@@ -36520,7 +36818,7 @@
                 <a:latin typeface="Segoe UI" panose="020B0502040204020203" pitchFamily="34" charset="0"/>
                 <a:cs typeface="Segoe UI" panose="020B0502040204020203" pitchFamily="34" charset="0"/>
               </a:rPr>
-              <a:t>với</a:t>
+              <a:t>các</a:t>
             </a:r>
             <a:r>
               <a:rPr lang="en-US" sz="2000" dirty="0" smtClean="0">
@@ -36534,7 +36832,7 @@
                 <a:latin typeface="Segoe UI" panose="020B0502040204020203" pitchFamily="34" charset="0"/>
                 <a:cs typeface="Segoe UI" panose="020B0502040204020203" pitchFamily="34" charset="0"/>
               </a:rPr>
-              <a:t>các</a:t>
+              <a:t>thư</a:t>
             </a:r>
             <a:r>
               <a:rPr lang="en-US" sz="2000" dirty="0" smtClean="0">
@@ -36548,7 +36846,7 @@
                 <a:latin typeface="Segoe UI" panose="020B0502040204020203" pitchFamily="34" charset="0"/>
                 <a:cs typeface="Segoe UI" panose="020B0502040204020203" pitchFamily="34" charset="0"/>
               </a:rPr>
-              <a:t>thư</a:t>
+              <a:t>viện</a:t>
             </a:r>
             <a:r>
               <a:rPr lang="en-US" sz="2000" dirty="0" smtClean="0">
@@ -36562,7 +36860,7 @@
                 <a:latin typeface="Segoe UI" panose="020B0502040204020203" pitchFamily="34" charset="0"/>
                 <a:cs typeface="Segoe UI" panose="020B0502040204020203" pitchFamily="34" charset="0"/>
               </a:rPr>
-              <a:t>viện</a:t>
+              <a:t>hỗ</a:t>
             </a:r>
             <a:r>
               <a:rPr lang="en-US" sz="2000" dirty="0" smtClean="0">
@@ -36576,7 +36874,7 @@
                 <a:latin typeface="Segoe UI" panose="020B0502040204020203" pitchFamily="34" charset="0"/>
                 <a:cs typeface="Segoe UI" panose="020B0502040204020203" pitchFamily="34" charset="0"/>
               </a:rPr>
-              <a:t>hỗ</a:t>
+              <a:t>trợ</a:t>
             </a:r>
             <a:r>
               <a:rPr lang="en-US" sz="2000" dirty="0" smtClean="0">
@@ -36590,63 +36888,63 @@
                 <a:latin typeface="Segoe UI" panose="020B0502040204020203" pitchFamily="34" charset="0"/>
                 <a:cs typeface="Segoe UI" panose="020B0502040204020203" pitchFamily="34" charset="0"/>
               </a:rPr>
-              <a:t>trợ</a:t>
+              <a:t>mạnh</a:t>
             </a:r>
             <a:r>
               <a:rPr lang="en-US" sz="2000" dirty="0" smtClean="0">
                 <a:latin typeface="Segoe UI" panose="020B0502040204020203" pitchFamily="34" charset="0"/>
                 <a:cs typeface="Segoe UI" panose="020B0502040204020203" pitchFamily="34" charset="0"/>
               </a:rPr>
-              <a:t> </a:t>
+              <a:t> : </a:t>
             </a:r>
             <a:r>
               <a:rPr lang="en-US" sz="2000" dirty="0" err="1" smtClean="0">
                 <a:latin typeface="Segoe UI" panose="020B0502040204020203" pitchFamily="34" charset="0"/>
                 <a:cs typeface="Segoe UI" panose="020B0502040204020203" pitchFamily="34" charset="0"/>
               </a:rPr>
-              <a:t>mạnh</a:t>
+              <a:t>TensorFlow</a:t>
             </a:r>
             <a:r>
               <a:rPr lang="en-US" sz="2000" dirty="0" smtClean="0">
                 <a:latin typeface="Segoe UI" panose="020B0502040204020203" pitchFamily="34" charset="0"/>
                 <a:cs typeface="Segoe UI" panose="020B0502040204020203" pitchFamily="34" charset="0"/>
               </a:rPr>
-              <a:t> : </a:t>
+              <a:t>, </a:t>
             </a:r>
             <a:r>
               <a:rPr lang="en-US" sz="2000" dirty="0" err="1" smtClean="0">
                 <a:latin typeface="Segoe UI" panose="020B0502040204020203" pitchFamily="34" charset="0"/>
                 <a:cs typeface="Segoe UI" panose="020B0502040204020203" pitchFamily="34" charset="0"/>
               </a:rPr>
-              <a:t>TensorFlow</a:t>
+              <a:t>PyTorch</a:t>
             </a:r>
             <a:r>
               <a:rPr lang="en-US" sz="2000" dirty="0" smtClean="0">
                 <a:latin typeface="Segoe UI" panose="020B0502040204020203" pitchFamily="34" charset="0"/>
                 <a:cs typeface="Segoe UI" panose="020B0502040204020203" pitchFamily="34" charset="0"/>
               </a:rPr>
-              <a:t>, </a:t>
+              <a:t>,… </a:t>
             </a:r>
             <a:r>
               <a:rPr lang="en-US" sz="2000" dirty="0" err="1" smtClean="0">
                 <a:latin typeface="Segoe UI" panose="020B0502040204020203" pitchFamily="34" charset="0"/>
                 <a:cs typeface="Segoe UI" panose="020B0502040204020203" pitchFamily="34" charset="0"/>
               </a:rPr>
-              <a:t>PyTorch</a:t>
+              <a:t>đơn</a:t>
             </a:r>
             <a:r>
               <a:rPr lang="en-US" sz="2000" dirty="0" smtClean="0">
                 <a:latin typeface="Segoe UI" panose="020B0502040204020203" pitchFamily="34" charset="0"/>
                 <a:cs typeface="Segoe UI" panose="020B0502040204020203" pitchFamily="34" charset="0"/>
               </a:rPr>
-              <a:t>,… </a:t>
+              <a:t> </a:t>
             </a:r>
             <a:r>
               <a:rPr lang="en-US" sz="2000" dirty="0" err="1" smtClean="0">
                 <a:latin typeface="Segoe UI" panose="020B0502040204020203" pitchFamily="34" charset="0"/>
                 <a:cs typeface="Segoe UI" panose="020B0502040204020203" pitchFamily="34" charset="0"/>
               </a:rPr>
-              <a:t>đơn</a:t>
+              <a:t>giản</a:t>
             </a:r>
             <a:r>
               <a:rPr lang="en-US" sz="2000" dirty="0" smtClean="0">
@@ -36660,7 +36958,7 @@
                 <a:latin typeface="Segoe UI" panose="020B0502040204020203" pitchFamily="34" charset="0"/>
                 <a:cs typeface="Segoe UI" panose="020B0502040204020203" pitchFamily="34" charset="0"/>
               </a:rPr>
-              <a:t>giản</a:t>
+              <a:t>bằng</a:t>
             </a:r>
             <a:r>
               <a:rPr lang="en-US" sz="2000" dirty="0" smtClean="0">
@@ -36674,7 +36972,7 @@
                 <a:latin typeface="Segoe UI" panose="020B0502040204020203" pitchFamily="34" charset="0"/>
                 <a:cs typeface="Segoe UI" panose="020B0502040204020203" pitchFamily="34" charset="0"/>
               </a:rPr>
-              <a:t>chính</a:t>
+              <a:t>việc</a:t>
             </a:r>
             <a:r>
               <a:rPr lang="en-US" sz="2000" dirty="0" smtClean="0">
@@ -36682,34 +36980,6 @@
                 <a:cs typeface="Segoe UI" panose="020B0502040204020203" pitchFamily="34" charset="0"/>
               </a:rPr>
               <a:t> </a:t>
-            </a:r>
-            <a:r>
-              <a:rPr lang="en-US" sz="2000" dirty="0" err="1" smtClean="0">
-                <a:latin typeface="Segoe UI" panose="020B0502040204020203" pitchFamily="34" charset="0"/>
-                <a:cs typeface="Segoe UI" panose="020B0502040204020203" pitchFamily="34" charset="0"/>
-              </a:rPr>
-              <a:t>là</a:t>
-            </a:r>
-            <a:r>
-              <a:rPr lang="en-US" sz="2000" dirty="0" smtClean="0">
-                <a:latin typeface="Segoe UI" panose="020B0502040204020203" pitchFamily="34" charset="0"/>
-                <a:cs typeface="Segoe UI" panose="020B0502040204020203" pitchFamily="34" charset="0"/>
-              </a:rPr>
-              <a:t> </a:t>
-            </a:r>
-            <a:r>
-              <a:rPr lang="en-US" sz="2000" dirty="0" err="1" smtClean="0">
-                <a:latin typeface="Segoe UI" panose="020B0502040204020203" pitchFamily="34" charset="0"/>
-                <a:cs typeface="Segoe UI" panose="020B0502040204020203" pitchFamily="34" charset="0"/>
-              </a:rPr>
-              <a:t>việc</a:t>
-            </a:r>
-            <a:r>
-              <a:rPr lang="en-US" sz="2000" dirty="0" smtClean="0">
-                <a:latin typeface="Segoe UI" panose="020B0502040204020203" pitchFamily="34" charset="0"/>
-                <a:cs typeface="Segoe UI" panose="020B0502040204020203" pitchFamily="34" charset="0"/>
-              </a:rPr>
-              <a:t> ta </a:t>
             </a:r>
             <a:r>
               <a:rPr lang="en-US" sz="2000" dirty="0" err="1" smtClean="0">
@@ -41191,7 +41461,739 @@
   <p:timing>
     <p:tnLst>
       <p:par>
-        <p:cTn id="1" dur="indefinite" restart="never" nodeType="tmRoot"/>
+        <p:cTn id="1" dur="indefinite" restart="never" nodeType="tmRoot">
+          <p:childTnLst>
+            <p:seq concurrent="1" nextAc="seek">
+              <p:cTn id="2" dur="indefinite" nodeType="mainSeq">
+                <p:childTnLst>
+                  <p:par>
+                    <p:cTn id="3" fill="hold">
+                      <p:stCondLst>
+                        <p:cond delay="indefinite"/>
+                      </p:stCondLst>
+                      <p:childTnLst>
+                        <p:par>
+                          <p:cTn id="4" fill="hold">
+                            <p:stCondLst>
+                              <p:cond delay="0"/>
+                            </p:stCondLst>
+                            <p:childTnLst>
+                              <p:par>
+                                <p:cTn id="5" presetID="2" presetClass="entr" presetSubtype="4" fill="hold" nodeType="clickEffect">
+                                  <p:stCondLst>
+                                    <p:cond delay="0"/>
+                                  </p:stCondLst>
+                                  <p:childTnLst>
+                                    <p:set>
+                                      <p:cBhvr>
+                                        <p:cTn id="6" dur="1" fill="hold">
+                                          <p:stCondLst>
+                                            <p:cond delay="0"/>
+                                          </p:stCondLst>
+                                        </p:cTn>
+                                        <p:tgtEl>
+                                          <p:spTgt spid="3">
+                                            <p:txEl>
+                                              <p:pRg st="0" end="0"/>
+                                            </p:txEl>
+                                          </p:spTgt>
+                                        </p:tgtEl>
+                                        <p:attrNameLst>
+                                          <p:attrName>style.visibility</p:attrName>
+                                        </p:attrNameLst>
+                                      </p:cBhvr>
+                                      <p:to>
+                                        <p:strVal val="visible"/>
+                                      </p:to>
+                                    </p:set>
+                                    <p:anim calcmode="lin" valueType="num">
+                                      <p:cBhvr additive="base">
+                                        <p:cTn id="7" dur="500" fill="hold"/>
+                                        <p:tgtEl>
+                                          <p:spTgt spid="3">
+                                            <p:txEl>
+                                              <p:pRg st="0" end="0"/>
+                                            </p:txEl>
+                                          </p:spTgt>
+                                        </p:tgtEl>
+                                        <p:attrNameLst>
+                                          <p:attrName>ppt_x</p:attrName>
+                                        </p:attrNameLst>
+                                      </p:cBhvr>
+                                      <p:tavLst>
+                                        <p:tav tm="0">
+                                          <p:val>
+                                            <p:strVal val="#ppt_x"/>
+                                          </p:val>
+                                        </p:tav>
+                                        <p:tav tm="100000">
+                                          <p:val>
+                                            <p:strVal val="#ppt_x"/>
+                                          </p:val>
+                                        </p:tav>
+                                      </p:tavLst>
+                                    </p:anim>
+                                    <p:anim calcmode="lin" valueType="num">
+                                      <p:cBhvr additive="base">
+                                        <p:cTn id="8" dur="500" fill="hold"/>
+                                        <p:tgtEl>
+                                          <p:spTgt spid="3">
+                                            <p:txEl>
+                                              <p:pRg st="0" end="0"/>
+                                            </p:txEl>
+                                          </p:spTgt>
+                                        </p:tgtEl>
+                                        <p:attrNameLst>
+                                          <p:attrName>ppt_y</p:attrName>
+                                        </p:attrNameLst>
+                                      </p:cBhvr>
+                                      <p:tavLst>
+                                        <p:tav tm="0">
+                                          <p:val>
+                                            <p:strVal val="1+#ppt_h/2"/>
+                                          </p:val>
+                                        </p:tav>
+                                        <p:tav tm="100000">
+                                          <p:val>
+                                            <p:strVal val="#ppt_y"/>
+                                          </p:val>
+                                        </p:tav>
+                                      </p:tavLst>
+                                    </p:anim>
+                                  </p:childTnLst>
+                                </p:cTn>
+                              </p:par>
+                            </p:childTnLst>
+                          </p:cTn>
+                        </p:par>
+                      </p:childTnLst>
+                    </p:cTn>
+                  </p:par>
+                  <p:par>
+                    <p:cTn id="9" fill="hold">
+                      <p:stCondLst>
+                        <p:cond delay="indefinite"/>
+                      </p:stCondLst>
+                      <p:childTnLst>
+                        <p:par>
+                          <p:cTn id="10" fill="hold">
+                            <p:stCondLst>
+                              <p:cond delay="0"/>
+                            </p:stCondLst>
+                            <p:childTnLst>
+                              <p:par>
+                                <p:cTn id="11" presetID="2" presetClass="entr" presetSubtype="4" fill="hold" nodeType="clickEffect">
+                                  <p:stCondLst>
+                                    <p:cond delay="0"/>
+                                  </p:stCondLst>
+                                  <p:childTnLst>
+                                    <p:set>
+                                      <p:cBhvr>
+                                        <p:cTn id="12" dur="1" fill="hold">
+                                          <p:stCondLst>
+                                            <p:cond delay="0"/>
+                                          </p:stCondLst>
+                                        </p:cTn>
+                                        <p:tgtEl>
+                                          <p:spTgt spid="3">
+                                            <p:txEl>
+                                              <p:pRg st="1" end="1"/>
+                                            </p:txEl>
+                                          </p:spTgt>
+                                        </p:tgtEl>
+                                        <p:attrNameLst>
+                                          <p:attrName>style.visibility</p:attrName>
+                                        </p:attrNameLst>
+                                      </p:cBhvr>
+                                      <p:to>
+                                        <p:strVal val="visible"/>
+                                      </p:to>
+                                    </p:set>
+                                    <p:anim calcmode="lin" valueType="num">
+                                      <p:cBhvr additive="base">
+                                        <p:cTn id="13" dur="500" fill="hold"/>
+                                        <p:tgtEl>
+                                          <p:spTgt spid="3">
+                                            <p:txEl>
+                                              <p:pRg st="1" end="1"/>
+                                            </p:txEl>
+                                          </p:spTgt>
+                                        </p:tgtEl>
+                                        <p:attrNameLst>
+                                          <p:attrName>ppt_x</p:attrName>
+                                        </p:attrNameLst>
+                                      </p:cBhvr>
+                                      <p:tavLst>
+                                        <p:tav tm="0">
+                                          <p:val>
+                                            <p:strVal val="#ppt_x"/>
+                                          </p:val>
+                                        </p:tav>
+                                        <p:tav tm="100000">
+                                          <p:val>
+                                            <p:strVal val="#ppt_x"/>
+                                          </p:val>
+                                        </p:tav>
+                                      </p:tavLst>
+                                    </p:anim>
+                                    <p:anim calcmode="lin" valueType="num">
+                                      <p:cBhvr additive="base">
+                                        <p:cTn id="14" dur="500" fill="hold"/>
+                                        <p:tgtEl>
+                                          <p:spTgt spid="3">
+                                            <p:txEl>
+                                              <p:pRg st="1" end="1"/>
+                                            </p:txEl>
+                                          </p:spTgt>
+                                        </p:tgtEl>
+                                        <p:attrNameLst>
+                                          <p:attrName>ppt_y</p:attrName>
+                                        </p:attrNameLst>
+                                      </p:cBhvr>
+                                      <p:tavLst>
+                                        <p:tav tm="0">
+                                          <p:val>
+                                            <p:strVal val="1+#ppt_h/2"/>
+                                          </p:val>
+                                        </p:tav>
+                                        <p:tav tm="100000">
+                                          <p:val>
+                                            <p:strVal val="#ppt_y"/>
+                                          </p:val>
+                                        </p:tav>
+                                      </p:tavLst>
+                                    </p:anim>
+                                  </p:childTnLst>
+                                </p:cTn>
+                              </p:par>
+                            </p:childTnLst>
+                          </p:cTn>
+                        </p:par>
+                      </p:childTnLst>
+                    </p:cTn>
+                  </p:par>
+                  <p:par>
+                    <p:cTn id="15" fill="hold">
+                      <p:stCondLst>
+                        <p:cond delay="indefinite"/>
+                      </p:stCondLst>
+                      <p:childTnLst>
+                        <p:par>
+                          <p:cTn id="16" fill="hold">
+                            <p:stCondLst>
+                              <p:cond delay="0"/>
+                            </p:stCondLst>
+                            <p:childTnLst>
+                              <p:par>
+                                <p:cTn id="17" presetID="42" presetClass="entr" presetSubtype="0" fill="hold" nodeType="clickEffect">
+                                  <p:stCondLst>
+                                    <p:cond delay="0"/>
+                                  </p:stCondLst>
+                                  <p:childTnLst>
+                                    <p:set>
+                                      <p:cBhvr>
+                                        <p:cTn id="18" dur="1" fill="hold">
+                                          <p:stCondLst>
+                                            <p:cond delay="0"/>
+                                          </p:stCondLst>
+                                        </p:cTn>
+                                        <p:tgtEl>
+                                          <p:spTgt spid="3">
+                                            <p:txEl>
+                                              <p:pRg st="2" end="2"/>
+                                            </p:txEl>
+                                          </p:spTgt>
+                                        </p:tgtEl>
+                                        <p:attrNameLst>
+                                          <p:attrName>style.visibility</p:attrName>
+                                        </p:attrNameLst>
+                                      </p:cBhvr>
+                                      <p:to>
+                                        <p:strVal val="visible"/>
+                                      </p:to>
+                                    </p:set>
+                                    <p:animEffect transition="in" filter="fade">
+                                      <p:cBhvr>
+                                        <p:cTn id="19" dur="1000"/>
+                                        <p:tgtEl>
+                                          <p:spTgt spid="3">
+                                            <p:txEl>
+                                              <p:pRg st="2" end="2"/>
+                                            </p:txEl>
+                                          </p:spTgt>
+                                        </p:tgtEl>
+                                      </p:cBhvr>
+                                    </p:animEffect>
+                                    <p:anim calcmode="lin" valueType="num">
+                                      <p:cBhvr>
+                                        <p:cTn id="20" dur="1000" fill="hold"/>
+                                        <p:tgtEl>
+                                          <p:spTgt spid="3">
+                                            <p:txEl>
+                                              <p:pRg st="2" end="2"/>
+                                            </p:txEl>
+                                          </p:spTgt>
+                                        </p:tgtEl>
+                                        <p:attrNameLst>
+                                          <p:attrName>ppt_x</p:attrName>
+                                        </p:attrNameLst>
+                                      </p:cBhvr>
+                                      <p:tavLst>
+                                        <p:tav tm="0">
+                                          <p:val>
+                                            <p:strVal val="#ppt_x"/>
+                                          </p:val>
+                                        </p:tav>
+                                        <p:tav tm="100000">
+                                          <p:val>
+                                            <p:strVal val="#ppt_x"/>
+                                          </p:val>
+                                        </p:tav>
+                                      </p:tavLst>
+                                    </p:anim>
+                                    <p:anim calcmode="lin" valueType="num">
+                                      <p:cBhvr>
+                                        <p:cTn id="21" dur="1000" fill="hold"/>
+                                        <p:tgtEl>
+                                          <p:spTgt spid="3">
+                                            <p:txEl>
+                                              <p:pRg st="2" end="2"/>
+                                            </p:txEl>
+                                          </p:spTgt>
+                                        </p:tgtEl>
+                                        <p:attrNameLst>
+                                          <p:attrName>ppt_y</p:attrName>
+                                        </p:attrNameLst>
+                                      </p:cBhvr>
+                                      <p:tavLst>
+                                        <p:tav tm="0">
+                                          <p:val>
+                                            <p:strVal val="#ppt_y+.1"/>
+                                          </p:val>
+                                        </p:tav>
+                                        <p:tav tm="100000">
+                                          <p:val>
+                                            <p:strVal val="#ppt_y"/>
+                                          </p:val>
+                                        </p:tav>
+                                      </p:tavLst>
+                                    </p:anim>
+                                  </p:childTnLst>
+                                </p:cTn>
+                              </p:par>
+                              <p:par>
+                                <p:cTn id="22" presetID="42" presetClass="entr" presetSubtype="0" fill="hold" nodeType="withEffect">
+                                  <p:stCondLst>
+                                    <p:cond delay="0"/>
+                                  </p:stCondLst>
+                                  <p:childTnLst>
+                                    <p:set>
+                                      <p:cBhvr>
+                                        <p:cTn id="23" dur="1" fill="hold">
+                                          <p:stCondLst>
+                                            <p:cond delay="0"/>
+                                          </p:stCondLst>
+                                        </p:cTn>
+                                        <p:tgtEl>
+                                          <p:spTgt spid="3">
+                                            <p:txEl>
+                                              <p:pRg st="3" end="3"/>
+                                            </p:txEl>
+                                          </p:spTgt>
+                                        </p:tgtEl>
+                                        <p:attrNameLst>
+                                          <p:attrName>style.visibility</p:attrName>
+                                        </p:attrNameLst>
+                                      </p:cBhvr>
+                                      <p:to>
+                                        <p:strVal val="visible"/>
+                                      </p:to>
+                                    </p:set>
+                                    <p:animEffect transition="in" filter="fade">
+                                      <p:cBhvr>
+                                        <p:cTn id="24" dur="1000"/>
+                                        <p:tgtEl>
+                                          <p:spTgt spid="3">
+                                            <p:txEl>
+                                              <p:pRg st="3" end="3"/>
+                                            </p:txEl>
+                                          </p:spTgt>
+                                        </p:tgtEl>
+                                      </p:cBhvr>
+                                    </p:animEffect>
+                                    <p:anim calcmode="lin" valueType="num">
+                                      <p:cBhvr>
+                                        <p:cTn id="25" dur="1000" fill="hold"/>
+                                        <p:tgtEl>
+                                          <p:spTgt spid="3">
+                                            <p:txEl>
+                                              <p:pRg st="3" end="3"/>
+                                            </p:txEl>
+                                          </p:spTgt>
+                                        </p:tgtEl>
+                                        <p:attrNameLst>
+                                          <p:attrName>ppt_x</p:attrName>
+                                        </p:attrNameLst>
+                                      </p:cBhvr>
+                                      <p:tavLst>
+                                        <p:tav tm="0">
+                                          <p:val>
+                                            <p:strVal val="#ppt_x"/>
+                                          </p:val>
+                                        </p:tav>
+                                        <p:tav tm="100000">
+                                          <p:val>
+                                            <p:strVal val="#ppt_x"/>
+                                          </p:val>
+                                        </p:tav>
+                                      </p:tavLst>
+                                    </p:anim>
+                                    <p:anim calcmode="lin" valueType="num">
+                                      <p:cBhvr>
+                                        <p:cTn id="26" dur="1000" fill="hold"/>
+                                        <p:tgtEl>
+                                          <p:spTgt spid="3">
+                                            <p:txEl>
+                                              <p:pRg st="3" end="3"/>
+                                            </p:txEl>
+                                          </p:spTgt>
+                                        </p:tgtEl>
+                                        <p:attrNameLst>
+                                          <p:attrName>ppt_y</p:attrName>
+                                        </p:attrNameLst>
+                                      </p:cBhvr>
+                                      <p:tavLst>
+                                        <p:tav tm="0">
+                                          <p:val>
+                                            <p:strVal val="#ppt_y+.1"/>
+                                          </p:val>
+                                        </p:tav>
+                                        <p:tav tm="100000">
+                                          <p:val>
+                                            <p:strVal val="#ppt_y"/>
+                                          </p:val>
+                                        </p:tav>
+                                      </p:tavLst>
+                                    </p:anim>
+                                  </p:childTnLst>
+                                </p:cTn>
+                              </p:par>
+                              <p:par>
+                                <p:cTn id="27" presetID="42" presetClass="entr" presetSubtype="0" fill="hold" nodeType="withEffect">
+                                  <p:stCondLst>
+                                    <p:cond delay="0"/>
+                                  </p:stCondLst>
+                                  <p:childTnLst>
+                                    <p:set>
+                                      <p:cBhvr>
+                                        <p:cTn id="28" dur="1" fill="hold">
+                                          <p:stCondLst>
+                                            <p:cond delay="0"/>
+                                          </p:stCondLst>
+                                        </p:cTn>
+                                        <p:tgtEl>
+                                          <p:spTgt spid="3">
+                                            <p:txEl>
+                                              <p:pRg st="4" end="4"/>
+                                            </p:txEl>
+                                          </p:spTgt>
+                                        </p:tgtEl>
+                                        <p:attrNameLst>
+                                          <p:attrName>style.visibility</p:attrName>
+                                        </p:attrNameLst>
+                                      </p:cBhvr>
+                                      <p:to>
+                                        <p:strVal val="visible"/>
+                                      </p:to>
+                                    </p:set>
+                                    <p:animEffect transition="in" filter="fade">
+                                      <p:cBhvr>
+                                        <p:cTn id="29" dur="1000"/>
+                                        <p:tgtEl>
+                                          <p:spTgt spid="3">
+                                            <p:txEl>
+                                              <p:pRg st="4" end="4"/>
+                                            </p:txEl>
+                                          </p:spTgt>
+                                        </p:tgtEl>
+                                      </p:cBhvr>
+                                    </p:animEffect>
+                                    <p:anim calcmode="lin" valueType="num">
+                                      <p:cBhvr>
+                                        <p:cTn id="30" dur="1000" fill="hold"/>
+                                        <p:tgtEl>
+                                          <p:spTgt spid="3">
+                                            <p:txEl>
+                                              <p:pRg st="4" end="4"/>
+                                            </p:txEl>
+                                          </p:spTgt>
+                                        </p:tgtEl>
+                                        <p:attrNameLst>
+                                          <p:attrName>ppt_x</p:attrName>
+                                        </p:attrNameLst>
+                                      </p:cBhvr>
+                                      <p:tavLst>
+                                        <p:tav tm="0">
+                                          <p:val>
+                                            <p:strVal val="#ppt_x"/>
+                                          </p:val>
+                                        </p:tav>
+                                        <p:tav tm="100000">
+                                          <p:val>
+                                            <p:strVal val="#ppt_x"/>
+                                          </p:val>
+                                        </p:tav>
+                                      </p:tavLst>
+                                    </p:anim>
+                                    <p:anim calcmode="lin" valueType="num">
+                                      <p:cBhvr>
+                                        <p:cTn id="31" dur="1000" fill="hold"/>
+                                        <p:tgtEl>
+                                          <p:spTgt spid="3">
+                                            <p:txEl>
+                                              <p:pRg st="4" end="4"/>
+                                            </p:txEl>
+                                          </p:spTgt>
+                                        </p:tgtEl>
+                                        <p:attrNameLst>
+                                          <p:attrName>ppt_y</p:attrName>
+                                        </p:attrNameLst>
+                                      </p:cBhvr>
+                                      <p:tavLst>
+                                        <p:tav tm="0">
+                                          <p:val>
+                                            <p:strVal val="#ppt_y+.1"/>
+                                          </p:val>
+                                        </p:tav>
+                                        <p:tav tm="100000">
+                                          <p:val>
+                                            <p:strVal val="#ppt_y"/>
+                                          </p:val>
+                                        </p:tav>
+                                      </p:tavLst>
+                                    </p:anim>
+                                  </p:childTnLst>
+                                </p:cTn>
+                              </p:par>
+                              <p:par>
+                                <p:cTn id="32" presetID="42" presetClass="entr" presetSubtype="0" fill="hold" nodeType="withEffect">
+                                  <p:stCondLst>
+                                    <p:cond delay="0"/>
+                                  </p:stCondLst>
+                                  <p:childTnLst>
+                                    <p:set>
+                                      <p:cBhvr>
+                                        <p:cTn id="33" dur="1" fill="hold">
+                                          <p:stCondLst>
+                                            <p:cond delay="0"/>
+                                          </p:stCondLst>
+                                        </p:cTn>
+                                        <p:tgtEl>
+                                          <p:spTgt spid="3">
+                                            <p:txEl>
+                                              <p:pRg st="5" end="5"/>
+                                            </p:txEl>
+                                          </p:spTgt>
+                                        </p:tgtEl>
+                                        <p:attrNameLst>
+                                          <p:attrName>style.visibility</p:attrName>
+                                        </p:attrNameLst>
+                                      </p:cBhvr>
+                                      <p:to>
+                                        <p:strVal val="visible"/>
+                                      </p:to>
+                                    </p:set>
+                                    <p:animEffect transition="in" filter="fade">
+                                      <p:cBhvr>
+                                        <p:cTn id="34" dur="1000"/>
+                                        <p:tgtEl>
+                                          <p:spTgt spid="3">
+                                            <p:txEl>
+                                              <p:pRg st="5" end="5"/>
+                                            </p:txEl>
+                                          </p:spTgt>
+                                        </p:tgtEl>
+                                      </p:cBhvr>
+                                    </p:animEffect>
+                                    <p:anim calcmode="lin" valueType="num">
+                                      <p:cBhvr>
+                                        <p:cTn id="35" dur="1000" fill="hold"/>
+                                        <p:tgtEl>
+                                          <p:spTgt spid="3">
+                                            <p:txEl>
+                                              <p:pRg st="5" end="5"/>
+                                            </p:txEl>
+                                          </p:spTgt>
+                                        </p:tgtEl>
+                                        <p:attrNameLst>
+                                          <p:attrName>ppt_x</p:attrName>
+                                        </p:attrNameLst>
+                                      </p:cBhvr>
+                                      <p:tavLst>
+                                        <p:tav tm="0">
+                                          <p:val>
+                                            <p:strVal val="#ppt_x"/>
+                                          </p:val>
+                                        </p:tav>
+                                        <p:tav tm="100000">
+                                          <p:val>
+                                            <p:strVal val="#ppt_x"/>
+                                          </p:val>
+                                        </p:tav>
+                                      </p:tavLst>
+                                    </p:anim>
+                                    <p:anim calcmode="lin" valueType="num">
+                                      <p:cBhvr>
+                                        <p:cTn id="36" dur="1000" fill="hold"/>
+                                        <p:tgtEl>
+                                          <p:spTgt spid="3">
+                                            <p:txEl>
+                                              <p:pRg st="5" end="5"/>
+                                            </p:txEl>
+                                          </p:spTgt>
+                                        </p:tgtEl>
+                                        <p:attrNameLst>
+                                          <p:attrName>ppt_y</p:attrName>
+                                        </p:attrNameLst>
+                                      </p:cBhvr>
+                                      <p:tavLst>
+                                        <p:tav tm="0">
+                                          <p:val>
+                                            <p:strVal val="#ppt_y+.1"/>
+                                          </p:val>
+                                        </p:tav>
+                                        <p:tav tm="100000">
+                                          <p:val>
+                                            <p:strVal val="#ppt_y"/>
+                                          </p:val>
+                                        </p:tav>
+                                      </p:tavLst>
+                                    </p:anim>
+                                  </p:childTnLst>
+                                </p:cTn>
+                              </p:par>
+                              <p:par>
+                                <p:cTn id="37" presetID="42" presetClass="entr" presetSubtype="0" fill="hold" nodeType="withEffect">
+                                  <p:stCondLst>
+                                    <p:cond delay="0"/>
+                                  </p:stCondLst>
+                                  <p:childTnLst>
+                                    <p:set>
+                                      <p:cBhvr>
+                                        <p:cTn id="38" dur="1" fill="hold">
+                                          <p:stCondLst>
+                                            <p:cond delay="0"/>
+                                          </p:stCondLst>
+                                        </p:cTn>
+                                        <p:tgtEl>
+                                          <p:spTgt spid="3">
+                                            <p:txEl>
+                                              <p:pRg st="6" end="6"/>
+                                            </p:txEl>
+                                          </p:spTgt>
+                                        </p:tgtEl>
+                                        <p:attrNameLst>
+                                          <p:attrName>style.visibility</p:attrName>
+                                        </p:attrNameLst>
+                                      </p:cBhvr>
+                                      <p:to>
+                                        <p:strVal val="visible"/>
+                                      </p:to>
+                                    </p:set>
+                                    <p:animEffect transition="in" filter="fade">
+                                      <p:cBhvr>
+                                        <p:cTn id="39" dur="1000"/>
+                                        <p:tgtEl>
+                                          <p:spTgt spid="3">
+                                            <p:txEl>
+                                              <p:pRg st="6" end="6"/>
+                                            </p:txEl>
+                                          </p:spTgt>
+                                        </p:tgtEl>
+                                      </p:cBhvr>
+                                    </p:animEffect>
+                                    <p:anim calcmode="lin" valueType="num">
+                                      <p:cBhvr>
+                                        <p:cTn id="40" dur="1000" fill="hold"/>
+                                        <p:tgtEl>
+                                          <p:spTgt spid="3">
+                                            <p:txEl>
+                                              <p:pRg st="6" end="6"/>
+                                            </p:txEl>
+                                          </p:spTgt>
+                                        </p:tgtEl>
+                                        <p:attrNameLst>
+                                          <p:attrName>ppt_x</p:attrName>
+                                        </p:attrNameLst>
+                                      </p:cBhvr>
+                                      <p:tavLst>
+                                        <p:tav tm="0">
+                                          <p:val>
+                                            <p:strVal val="#ppt_x"/>
+                                          </p:val>
+                                        </p:tav>
+                                        <p:tav tm="100000">
+                                          <p:val>
+                                            <p:strVal val="#ppt_x"/>
+                                          </p:val>
+                                        </p:tav>
+                                      </p:tavLst>
+                                    </p:anim>
+                                    <p:anim calcmode="lin" valueType="num">
+                                      <p:cBhvr>
+                                        <p:cTn id="41" dur="1000" fill="hold"/>
+                                        <p:tgtEl>
+                                          <p:spTgt spid="3">
+                                            <p:txEl>
+                                              <p:pRg st="6" end="6"/>
+                                            </p:txEl>
+                                          </p:spTgt>
+                                        </p:tgtEl>
+                                        <p:attrNameLst>
+                                          <p:attrName>ppt_y</p:attrName>
+                                        </p:attrNameLst>
+                                      </p:cBhvr>
+                                      <p:tavLst>
+                                        <p:tav tm="0">
+                                          <p:val>
+                                            <p:strVal val="#ppt_y+.1"/>
+                                          </p:val>
+                                        </p:tav>
+                                        <p:tav tm="100000">
+                                          <p:val>
+                                            <p:strVal val="#ppt_y"/>
+                                          </p:val>
+                                        </p:tav>
+                                      </p:tavLst>
+                                    </p:anim>
+                                  </p:childTnLst>
+                                </p:cTn>
+                              </p:par>
+                            </p:childTnLst>
+                          </p:cTn>
+                        </p:par>
+                      </p:childTnLst>
+                    </p:cTn>
+                  </p:par>
+                </p:childTnLst>
+              </p:cTn>
+              <p:prevCondLst>
+                <p:cond evt="onPrev" delay="0">
+                  <p:tgtEl>
+                    <p:sldTgt/>
+                  </p:tgtEl>
+                </p:cond>
+              </p:prevCondLst>
+              <p:nextCondLst>
+                <p:cond evt="onNext" delay="0">
+                  <p:tgtEl>
+                    <p:sldTgt/>
+                  </p:tgtEl>
+                </p:cond>
+              </p:nextCondLst>
+            </p:seq>
+          </p:childTnLst>
+        </p:cTn>
       </p:par>
     </p:tnLst>
   </p:timing>
@@ -43530,7 +44532,7 @@
   <a:extraClrSchemeLst/>
   <a:extLst>
     <a:ext uri="{05A4C25C-085E-4340-85A3-A5531E510DB2}">
-      <thm15:themeFamily xmlns:thm15="http://schemas.microsoft.com/office/thememl/2012/main" name="Ion Boardroom" id="{FC33163D-4339-46B1-8EED-24C834239D99}" vid="{B8502691-933B-45FE-8764-BA278511EF27}"/>
+      <thm15:themeFamily xmlns:thm15="http://schemas.microsoft.com/office/thememl/2012/main" xmlns="" name="Ion Boardroom" id="{FC33163D-4339-46B1-8EED-24C834239D99}" vid="{B8502691-933B-45FE-8764-BA278511EF27}"/>
     </a:ext>
   </a:extLst>
 </a:theme>

</xml_diff>